<commit_message>
Status Quo - April
</commit_message>
<xml_diff>
--- a/docs/slides/Proposal_presentation_MSAT-UI.pptx
+++ b/docs/slides/Proposal_presentation_MSAT-UI.pptx
@@ -5,10 +5,10 @@
     <p:sldMasterId id="2147483661" r:id="rId1"/>
   </p:sldMasterIdLst>
   <p:notesMasterIdLst>
-    <p:notesMasterId r:id="rId31"/>
+    <p:notesMasterId r:id="rId30"/>
   </p:notesMasterIdLst>
   <p:handoutMasterIdLst>
-    <p:handoutMasterId r:id="rId32"/>
+    <p:handoutMasterId r:id="rId31"/>
   </p:handoutMasterIdLst>
   <p:sldIdLst>
     <p:sldId id="259" r:id="rId2"/>
@@ -18,28 +18,27 @@
     <p:sldId id="270" r:id="rId6"/>
     <p:sldId id="274" r:id="rId7"/>
     <p:sldId id="273" r:id="rId8"/>
-    <p:sldId id="284" r:id="rId9"/>
-    <p:sldId id="276" r:id="rId10"/>
-    <p:sldId id="283" r:id="rId11"/>
-    <p:sldId id="287" r:id="rId12"/>
-    <p:sldId id="286" r:id="rId13"/>
-    <p:sldId id="291" r:id="rId14"/>
-    <p:sldId id="288" r:id="rId15"/>
-    <p:sldId id="289" r:id="rId16"/>
-    <p:sldId id="290" r:id="rId17"/>
-    <p:sldId id="296" r:id="rId18"/>
-    <p:sldId id="294" r:id="rId19"/>
-    <p:sldId id="295" r:id="rId20"/>
-    <p:sldId id="302" r:id="rId21"/>
-    <p:sldId id="304" r:id="rId22"/>
-    <p:sldId id="292" r:id="rId23"/>
-    <p:sldId id="298" r:id="rId24"/>
-    <p:sldId id="300" r:id="rId25"/>
-    <p:sldId id="301" r:id="rId26"/>
-    <p:sldId id="262" r:id="rId27"/>
-    <p:sldId id="263" r:id="rId28"/>
-    <p:sldId id="266" r:id="rId29"/>
-    <p:sldId id="319" r:id="rId30"/>
+    <p:sldId id="320" r:id="rId9"/>
+    <p:sldId id="284" r:id="rId10"/>
+    <p:sldId id="276" r:id="rId11"/>
+    <p:sldId id="283" r:id="rId12"/>
+    <p:sldId id="323" r:id="rId13"/>
+    <p:sldId id="321" r:id="rId14"/>
+    <p:sldId id="322" r:id="rId15"/>
+    <p:sldId id="286" r:id="rId16"/>
+    <p:sldId id="291" r:id="rId17"/>
+    <p:sldId id="288" r:id="rId18"/>
+    <p:sldId id="289" r:id="rId19"/>
+    <p:sldId id="302" r:id="rId20"/>
+    <p:sldId id="304" r:id="rId21"/>
+    <p:sldId id="292" r:id="rId22"/>
+    <p:sldId id="298" r:id="rId23"/>
+    <p:sldId id="300" r:id="rId24"/>
+    <p:sldId id="301" r:id="rId25"/>
+    <p:sldId id="262" r:id="rId26"/>
+    <p:sldId id="263" r:id="rId27"/>
+    <p:sldId id="266" r:id="rId28"/>
+    <p:sldId id="319" r:id="rId29"/>
   </p:sldIdLst>
   <p:sldSz cx="9906000" cy="6858000" type="A4"/>
   <p:notesSz cx="6669088" cy="9926638"/>
@@ -358,7 +357,7 @@
               <a:pPr>
                 <a:defRPr/>
               </a:pPr>
-              <a:t>22.04.2019</a:t>
+              <a:t>25.04.2019</a:t>
             </a:fld>
             <a:endParaRPr lang="de-DE"/>
           </a:p>
@@ -574,7 +573,7 @@
               <a:pPr>
                 <a:defRPr/>
               </a:pPr>
-              <a:t>22.04.2019</a:t>
+              <a:t>25.04.2019</a:t>
             </a:fld>
             <a:endParaRPr lang="de-DE"/>
           </a:p>
@@ -27398,12 +27397,6 @@
           <a:bodyPr/>
           <a:lstStyle/>
           <a:p>
-            <a:r>
-              <a:rPr lang="de-DE" dirty="0"/>
-              <a:t>Author</a:t>
-            </a:r>
-          </a:p>
-          <a:p>
             <a:pPr>
               <a:buFont typeface="Wingdings" panose="05000000000000000000" pitchFamily="2" charset="2"/>
               <a:buChar char="§"/>
@@ -27759,7 +27752,7 @@
                   <a:schemeClr val="tx2"/>
                 </a:solidFill>
               </a:rPr>
-              <a:t> What Current Tools do? - RQ 1</a:t>
+              <a:t>Research Question 1</a:t>
             </a:r>
           </a:p>
         </p:txBody>
@@ -27783,6 +27776,183 @@
               <a:rPr lang="de-DE" smtClean="0"/>
               <a:pPr/>
               <a:t>10</a:t>
+            </a:fld>
+            <a:endParaRPr lang="de-DE" dirty="0"/>
+          </a:p>
+        </p:txBody>
+      </p:sp>
+      <p:sp>
+        <p:nvSpPr>
+          <p:cNvPr id="5" name="Textplatzhalter 4"/>
+          <p:cNvSpPr>
+            <a:spLocks noGrp="1"/>
+          </p:cNvSpPr>
+          <p:nvPr>
+            <p:ph type="body" sz="quarter" idx="12"/>
+          </p:nvPr>
+        </p:nvSpPr>
+        <p:spPr/>
+        <p:txBody>
+          <a:bodyPr/>
+          <a:lstStyle/>
+          <a:p>
+            <a:pPr marL="0" indent="0">
+              <a:lnSpc>
+                <a:spcPct val="150000"/>
+              </a:lnSpc>
+              <a:buNone/>
+            </a:pPr>
+            <a:endParaRPr lang="en-GB" dirty="0"/>
+          </a:p>
+          <a:p>
+            <a:pPr marL="0" indent="0">
+              <a:lnSpc>
+                <a:spcPct val="150000"/>
+              </a:lnSpc>
+              <a:buNone/>
+            </a:pPr>
+            <a:endParaRPr lang="en-GB" dirty="0"/>
+          </a:p>
+          <a:p>
+            <a:pPr>
+              <a:lnSpc>
+                <a:spcPct val="150000"/>
+              </a:lnSpc>
+            </a:pPr>
+            <a:r>
+              <a:rPr lang="en-GB" sz="2400" dirty="0"/>
+              <a:t>How to display results of the same codebase from </a:t>
+            </a:r>
+          </a:p>
+          <a:p>
+            <a:pPr marL="0" indent="0" algn="r">
+              <a:lnSpc>
+                <a:spcPct val="150000"/>
+              </a:lnSpc>
+              <a:buNone/>
+            </a:pPr>
+            <a:r>
+              <a:rPr lang="en-GB" sz="2400" dirty="0"/>
+              <a:t>different analysis tools? </a:t>
+            </a:r>
+          </a:p>
+          <a:p>
+            <a:pPr>
+              <a:lnSpc>
+                <a:spcPct val="150000"/>
+              </a:lnSpc>
+            </a:pPr>
+            <a:endParaRPr lang="en-GB" sz="2400" dirty="0"/>
+          </a:p>
+          <a:p>
+            <a:pPr marL="0" indent="0">
+              <a:lnSpc>
+                <a:spcPct val="150000"/>
+              </a:lnSpc>
+              <a:buNone/>
+            </a:pPr>
+            <a:endParaRPr lang="en-GB" dirty="0"/>
+          </a:p>
+        </p:txBody>
+      </p:sp>
+      <p:sp>
+        <p:nvSpPr>
+          <p:cNvPr id="3" name="Fußzeilenplatzhalter 2"/>
+          <p:cNvSpPr>
+            <a:spLocks noGrp="1"/>
+          </p:cNvSpPr>
+          <p:nvPr>
+            <p:ph type="ftr" sz="quarter" idx="10"/>
+          </p:nvPr>
+        </p:nvSpPr>
+        <p:spPr/>
+        <p:txBody>
+          <a:bodyPr/>
+          <a:lstStyle/>
+          <a:p>
+            <a:r>
+              <a:rPr lang="de-DE"/>
+              <a:t>Software Engineering</a:t>
+            </a:r>
+            <a:endParaRPr lang="de-DE" dirty="0"/>
+          </a:p>
+        </p:txBody>
+      </p:sp>
+    </p:spTree>
+    <p:extLst>
+      <p:ext uri="{BB962C8B-B14F-4D97-AF65-F5344CB8AC3E}">
+        <p14:creationId xmlns:p14="http://schemas.microsoft.com/office/powerpoint/2010/main" val="1386339837"/>
+      </p:ext>
+    </p:extLst>
+  </p:cSld>
+  <p:clrMapOvr>
+    <a:masterClrMapping/>
+  </p:clrMapOvr>
+</p:sld>
+</file>
+
+<file path=ppt/slides/slide11.xml><?xml version="1.0" encoding="utf-8"?>
+<p:sld xmlns:a="http://schemas.openxmlformats.org/drawingml/2006/main" xmlns:r="http://schemas.openxmlformats.org/officeDocument/2006/relationships" xmlns:p="http://schemas.openxmlformats.org/presentationml/2006/main">
+  <p:cSld>
+    <p:spTree>
+      <p:nvGrpSpPr>
+        <p:cNvPr id="1" name=""/>
+        <p:cNvGrpSpPr/>
+        <p:nvPr/>
+      </p:nvGrpSpPr>
+      <p:grpSpPr>
+        <a:xfrm>
+          <a:off x="0" y="0"/>
+          <a:ext cx="0" cy="0"/>
+          <a:chOff x="0" y="0"/>
+          <a:chExt cx="0" cy="0"/>
+        </a:xfrm>
+      </p:grpSpPr>
+      <p:sp>
+        <p:nvSpPr>
+          <p:cNvPr id="2" name="Titel 1"/>
+          <p:cNvSpPr>
+            <a:spLocks noGrp="1"/>
+          </p:cNvSpPr>
+          <p:nvPr>
+            <p:ph type="title"/>
+          </p:nvPr>
+        </p:nvSpPr>
+        <p:spPr/>
+        <p:txBody>
+          <a:bodyPr/>
+          <a:lstStyle/>
+          <a:p>
+            <a:r>
+              <a:rPr lang="de-DE" dirty="0">
+                <a:solidFill>
+                  <a:schemeClr val="tx2"/>
+                </a:solidFill>
+              </a:rPr>
+              <a:t> What Current Tools do? - RQ 1</a:t>
+            </a:r>
+          </a:p>
+        </p:txBody>
+      </p:sp>
+      <p:sp>
+        <p:nvSpPr>
+          <p:cNvPr id="4" name="Foliennummernplatzhalter 3"/>
+          <p:cNvSpPr>
+            <a:spLocks noGrp="1"/>
+          </p:cNvSpPr>
+          <p:nvPr>
+            <p:ph type="sldNum" sz="quarter" idx="11"/>
+          </p:nvPr>
+        </p:nvSpPr>
+        <p:spPr/>
+        <p:txBody>
+          <a:bodyPr/>
+          <a:lstStyle/>
+          <a:p>
+            <a:fld id="{815DB69B-0A2B-4D0B-A3BD-360AAA24381D}" type="slidenum">
+              <a:rPr lang="de-DE" smtClean="0"/>
+              <a:pPr/>
+              <a:t>11</a:t>
             </a:fld>
             <a:endParaRPr lang="de-DE" dirty="0"/>
           </a:p>
@@ -27882,131 +28052,6 @@
 </p:sld>
 </file>
 
-<file path=ppt/slides/slide11.xml><?xml version="1.0" encoding="utf-8"?>
-<p:sld xmlns:a="http://schemas.openxmlformats.org/drawingml/2006/main" xmlns:r="http://schemas.openxmlformats.org/officeDocument/2006/relationships" xmlns:p="http://schemas.openxmlformats.org/presentationml/2006/main">
-  <p:cSld>
-    <p:spTree>
-      <p:nvGrpSpPr>
-        <p:cNvPr id="1" name=""/>
-        <p:cNvGrpSpPr/>
-        <p:nvPr/>
-      </p:nvGrpSpPr>
-      <p:grpSpPr>
-        <a:xfrm>
-          <a:off x="0" y="0"/>
-          <a:ext cx="0" cy="0"/>
-          <a:chOff x="0" y="0"/>
-          <a:chExt cx="0" cy="0"/>
-        </a:xfrm>
-      </p:grpSpPr>
-      <p:sp>
-        <p:nvSpPr>
-          <p:cNvPr id="2" name="Titel 1"/>
-          <p:cNvSpPr>
-            <a:spLocks noGrp="1"/>
-          </p:cNvSpPr>
-          <p:nvPr>
-            <p:ph type="title"/>
-          </p:nvPr>
-        </p:nvSpPr>
-        <p:spPr/>
-        <p:txBody>
-          <a:bodyPr/>
-          <a:lstStyle/>
-          <a:p>
-            <a:r>
-              <a:rPr lang="de-DE" dirty="0">
-                <a:solidFill>
-                  <a:schemeClr val="tx2"/>
-                </a:solidFill>
-              </a:rPr>
-              <a:t> What Current Tools do? - RQ 2</a:t>
-            </a:r>
-          </a:p>
-        </p:txBody>
-      </p:sp>
-      <p:sp>
-        <p:nvSpPr>
-          <p:cNvPr id="4" name="Foliennummernplatzhalter 3"/>
-          <p:cNvSpPr>
-            <a:spLocks noGrp="1"/>
-          </p:cNvSpPr>
-          <p:nvPr>
-            <p:ph type="sldNum" sz="quarter" idx="11"/>
-          </p:nvPr>
-        </p:nvSpPr>
-        <p:spPr/>
-        <p:txBody>
-          <a:bodyPr/>
-          <a:lstStyle/>
-          <a:p>
-            <a:fld id="{815DB69B-0A2B-4D0B-A3BD-360AAA24381D}" type="slidenum">
-              <a:rPr lang="de-DE" smtClean="0"/>
-              <a:pPr/>
-              <a:t>11</a:t>
-            </a:fld>
-            <a:endParaRPr lang="de-DE" dirty="0"/>
-          </a:p>
-        </p:txBody>
-      </p:sp>
-      <p:sp>
-        <p:nvSpPr>
-          <p:cNvPr id="5" name="Textplatzhalter 4"/>
-          <p:cNvSpPr>
-            <a:spLocks noGrp="1"/>
-          </p:cNvSpPr>
-          <p:nvPr>
-            <p:ph type="body" sz="quarter" idx="12"/>
-          </p:nvPr>
-        </p:nvSpPr>
-        <p:spPr/>
-        <p:txBody>
-          <a:bodyPr/>
-          <a:lstStyle/>
-          <a:p>
-            <a:r>
-              <a:rPr lang="de-DE" dirty="0"/>
-              <a:t>FindBugs</a:t>
-            </a:r>
-          </a:p>
-        </p:txBody>
-      </p:sp>
-      <p:sp>
-        <p:nvSpPr>
-          <p:cNvPr id="3" name="Fußzeilenplatzhalter 2"/>
-          <p:cNvSpPr>
-            <a:spLocks noGrp="1"/>
-          </p:cNvSpPr>
-          <p:nvPr>
-            <p:ph type="ftr" sz="quarter" idx="10"/>
-          </p:nvPr>
-        </p:nvSpPr>
-        <p:spPr/>
-        <p:txBody>
-          <a:bodyPr/>
-          <a:lstStyle/>
-          <a:p>
-            <a:r>
-              <a:rPr lang="de-DE"/>
-              <a:t>Software Engineering</a:t>
-            </a:r>
-            <a:endParaRPr lang="de-DE" dirty="0"/>
-          </a:p>
-        </p:txBody>
-      </p:sp>
-    </p:spTree>
-    <p:extLst>
-      <p:ext uri="{BB962C8B-B14F-4D97-AF65-F5344CB8AC3E}">
-        <p14:creationId xmlns:p14="http://schemas.microsoft.com/office/powerpoint/2010/main" val="1960195379"/>
-      </p:ext>
-    </p:extLst>
-  </p:cSld>
-  <p:clrMapOvr>
-    <a:masterClrMapping/>
-  </p:clrMapOvr>
-</p:sld>
-</file>
-
 <file path=ppt/slides/slide12.xml><?xml version="1.0" encoding="utf-8"?>
 <p:sld xmlns:a="http://schemas.openxmlformats.org/drawingml/2006/main" xmlns:r="http://schemas.openxmlformats.org/officeDocument/2006/relationships" xmlns:p="http://schemas.openxmlformats.org/presentationml/2006/main">
   <p:cSld>
@@ -28045,7 +28090,7 @@
                   <a:schemeClr val="tx2"/>
                 </a:solidFill>
               </a:rPr>
-              <a:t> What Current Tools do? - RQ 3</a:t>
+              <a:t> What Current Tools do? - RQ 1</a:t>
             </a:r>
           </a:p>
         </p:txBody>
@@ -28091,7 +28136,7 @@
           <a:p>
             <a:r>
               <a:rPr lang="de-DE" dirty="0"/>
-              <a:t>TeamScale </a:t>
+              <a:t>Tricorder</a:t>
             </a:r>
           </a:p>
         </p:txBody>
@@ -28124,7 +28169,7 @@
           <p:cNvPr id="7" name="Picture 6">
             <a:extLst>
               <a:ext uri="{FF2B5EF4-FFF2-40B4-BE49-F238E27FC236}">
-                <a16:creationId xmlns:a16="http://schemas.microsoft.com/office/drawing/2014/main" id="{890F7F07-D436-49DB-921B-7C41A16477AE}"/>
+                <a16:creationId xmlns:a16="http://schemas.microsoft.com/office/drawing/2014/main" id="{2AE0FA6B-E7C1-4463-8895-444593056313}"/>
               </a:ext>
             </a:extLst>
           </p:cNvPr>
@@ -28147,8 +28192,8 @@
         </p:blipFill>
         <p:spPr>
           <a:xfrm>
-            <a:off x="920552" y="2132856"/>
-            <a:ext cx="7945643" cy="4044331"/>
+            <a:off x="560512" y="1839485"/>
+            <a:ext cx="8856984" cy="4410167"/>
           </a:xfrm>
           <a:prstGeom prst="rect">
             <a:avLst/>
@@ -28158,7 +28203,7 @@
     </p:spTree>
     <p:extLst>
       <p:ext uri="{BB962C8B-B14F-4D97-AF65-F5344CB8AC3E}">
-        <p14:creationId xmlns:p14="http://schemas.microsoft.com/office/powerpoint/2010/main" val="287106929"/>
+        <p14:creationId xmlns:p14="http://schemas.microsoft.com/office/powerpoint/2010/main" val="3598314639"/>
       </p:ext>
     </p:extLst>
   </p:cSld>
@@ -28206,7 +28251,7 @@
                   <a:schemeClr val="tx2"/>
                 </a:solidFill>
               </a:rPr>
-              <a:t>Our Approaches</a:t>
+              <a:t>Research Question 2</a:t>
             </a:r>
           </a:p>
         </p:txBody>
@@ -28237,6 +28282,74 @@
       </p:sp>
       <p:sp>
         <p:nvSpPr>
+          <p:cNvPr id="5" name="Textplatzhalter 4"/>
+          <p:cNvSpPr>
+            <a:spLocks noGrp="1"/>
+          </p:cNvSpPr>
+          <p:nvPr>
+            <p:ph type="body" sz="quarter" idx="12"/>
+          </p:nvPr>
+        </p:nvSpPr>
+        <p:spPr/>
+        <p:txBody>
+          <a:bodyPr/>
+          <a:lstStyle/>
+          <a:p>
+            <a:pPr marL="0" indent="0">
+              <a:buNone/>
+            </a:pPr>
+            <a:endParaRPr lang="en-GB" dirty="0"/>
+          </a:p>
+          <a:p>
+            <a:pPr marL="0" indent="0">
+              <a:buNone/>
+            </a:pPr>
+            <a:endParaRPr lang="en-GB" dirty="0"/>
+          </a:p>
+          <a:p>
+            <a:r>
+              <a:rPr lang="en-GB" sz="2400" dirty="0"/>
+              <a:t>What feedback works to know that the bug fixing is on-going?</a:t>
+            </a:r>
+          </a:p>
+          <a:p>
+            <a:endParaRPr lang="en-GB" sz="2400" dirty="0"/>
+          </a:p>
+          <a:p>
+            <a:endParaRPr lang="en-GB" sz="2400" dirty="0"/>
+          </a:p>
+          <a:p>
+            <a:r>
+              <a:rPr lang="en-GB" dirty="0"/>
+              <a:t>What current tools do? </a:t>
+            </a:r>
+          </a:p>
+          <a:p>
+            <a:pPr marL="0" indent="0">
+              <a:buNone/>
+            </a:pPr>
+            <a:endParaRPr lang="en-GB" dirty="0"/>
+          </a:p>
+          <a:p>
+            <a:pPr lvl="2">
+              <a:buFont typeface="Wingdings" panose="05000000000000000000" pitchFamily="2" charset="2"/>
+              <a:buChar char="§"/>
+            </a:pPr>
+            <a:r>
+              <a:rPr lang="en-GB" dirty="0"/>
+              <a:t>Traditional approach – Nightly Builds</a:t>
+            </a:r>
+          </a:p>
+          <a:p>
+            <a:pPr marL="0" indent="0">
+              <a:buNone/>
+            </a:pPr>
+            <a:endParaRPr lang="en-GB" dirty="0"/>
+          </a:p>
+        </p:txBody>
+      </p:sp>
+      <p:sp>
+        <p:nvSpPr>
           <p:cNvPr id="3" name="Fußzeilenplatzhalter 2"/>
           <p:cNvSpPr>
             <a:spLocks noGrp="1"/>
@@ -28258,115 +28371,10 @@
           </a:p>
         </p:txBody>
       </p:sp>
-      <p:pic>
-        <p:nvPicPr>
-          <p:cNvPr id="7" name="Picture 6" descr="A close up of a logo&#10;&#10;Description automatically generated">
-            <a:extLst>
-              <a:ext uri="{FF2B5EF4-FFF2-40B4-BE49-F238E27FC236}">
-                <a16:creationId xmlns:a16="http://schemas.microsoft.com/office/drawing/2014/main" id="{8269BFC5-F04C-47E7-A8B1-51CDB2571100}"/>
-              </a:ext>
-            </a:extLst>
-          </p:cNvPr>
-          <p:cNvPicPr>
-            <a:picLocks noChangeAspect="1"/>
-          </p:cNvPicPr>
-          <p:nvPr/>
-        </p:nvPicPr>
-        <p:blipFill>
-          <a:blip r:embed="rId2">
-            <a:extLst>
-              <a:ext uri="{28A0092B-C50C-407E-A947-70E740481C1C}">
-                <a14:useLocalDpi xmlns:a14="http://schemas.microsoft.com/office/drawing/2010/main" val="0"/>
-              </a:ext>
-            </a:extLst>
-          </a:blip>
-          <a:stretch>
-            <a:fillRect/>
-          </a:stretch>
-        </p:blipFill>
-        <p:spPr>
-          <a:xfrm>
-            <a:off x="2315647" y="2045641"/>
-            <a:ext cx="5011976" cy="4263679"/>
-          </a:xfrm>
-          <a:prstGeom prst="rect">
-            <a:avLst/>
-          </a:prstGeom>
-        </p:spPr>
-      </p:pic>
-      <p:sp>
-        <p:nvSpPr>
-          <p:cNvPr id="5" name="TextBox 4">
-            <a:extLst>
-              <a:ext uri="{FF2B5EF4-FFF2-40B4-BE49-F238E27FC236}">
-                <a16:creationId xmlns:a16="http://schemas.microsoft.com/office/drawing/2014/main" id="{05AD6563-6C23-49EB-9950-B696F5ADF875}"/>
-              </a:ext>
-            </a:extLst>
-          </p:cNvPr>
-          <p:cNvSpPr txBox="1"/>
-          <p:nvPr/>
-        </p:nvSpPr>
-        <p:spPr>
-          <a:xfrm>
-            <a:off x="270900" y="1502301"/>
-            <a:ext cx="4685257" cy="774571"/>
-          </a:xfrm>
-          <a:prstGeom prst="rect">
-            <a:avLst/>
-          </a:prstGeom>
-          <a:noFill/>
-        </p:spPr>
-        <p:txBody>
-          <a:bodyPr wrap="none" lIns="0" rIns="0" rtlCol="0">
-            <a:spAutoFit/>
-          </a:bodyPr>
-          <a:lstStyle/>
-          <a:p>
-            <a:pPr marL="360000" indent="-360000">
-              <a:spcAft>
-                <a:spcPts val="1000"/>
-              </a:spcAft>
-              <a:buClr>
-                <a:schemeClr val="tx2"/>
-              </a:buClr>
-              <a:buSzPct val="80000"/>
-              <a:buFont typeface="Wingdings" panose="05000000000000000000" pitchFamily="2" charset="2"/>
-              <a:buChar char="n"/>
-            </a:pPr>
-            <a:r>
-              <a:rPr lang="de-DE" dirty="0"/>
-              <a:t>Research Methodology - </a:t>
-            </a:r>
-            <a:r>
-              <a:rPr lang="de-DE" dirty="0">
-                <a:solidFill>
-                  <a:schemeClr val="tx2"/>
-                </a:solidFill>
-              </a:rPr>
-              <a:t>UX Design Cycle</a:t>
-            </a:r>
-            <a:endParaRPr lang="de-DE" dirty="0"/>
-          </a:p>
-          <a:p>
-            <a:pPr marL="360000" indent="-360000">
-              <a:spcAft>
-                <a:spcPts val="1000"/>
-              </a:spcAft>
-              <a:buClr>
-                <a:schemeClr val="tx2"/>
-              </a:buClr>
-              <a:buSzPct val="80000"/>
-              <a:buFont typeface="Wingdings" panose="05000000000000000000" pitchFamily="2" charset="2"/>
-              <a:buChar char="n"/>
-            </a:pPr>
-            <a:endParaRPr lang="LID4096" dirty="0" err="1"/>
-          </a:p>
-        </p:txBody>
-      </p:sp>
     </p:spTree>
     <p:extLst>
       <p:ext uri="{BB962C8B-B14F-4D97-AF65-F5344CB8AC3E}">
-        <p14:creationId xmlns:p14="http://schemas.microsoft.com/office/powerpoint/2010/main" val="2449660059"/>
+        <p14:creationId xmlns:p14="http://schemas.microsoft.com/office/powerpoint/2010/main" val="1251747576"/>
       </p:ext>
     </p:extLst>
   </p:cSld>
@@ -28414,7 +28422,7 @@
                   <a:schemeClr val="tx2"/>
                 </a:solidFill>
               </a:rPr>
-              <a:t>Our Approaches</a:t>
+              <a:t>Research Question 3 </a:t>
             </a:r>
           </a:p>
         </p:txBody>
@@ -28461,97 +28469,26 @@
             <a:pPr marL="0" indent="0">
               <a:buNone/>
             </a:pPr>
-            <a:endParaRPr lang="de-DE" dirty="0"/>
+            <a:endParaRPr lang="en-GB" dirty="0"/>
+          </a:p>
+          <a:p>
+            <a:pPr marL="0" indent="0">
+              <a:buNone/>
+            </a:pPr>
+            <a:endParaRPr lang="en-GB" dirty="0"/>
+          </a:p>
+          <a:p>
+            <a:pPr marL="0" indent="0">
+              <a:buNone/>
+            </a:pPr>
+            <a:endParaRPr lang="en-GB" dirty="0"/>
           </a:p>
           <a:p>
             <a:r>
-              <a:rPr lang="de-DE" dirty="0"/>
-              <a:t>Software Engineering disciplines:</a:t>
+              <a:rPr lang="en-GB" sz="2400" dirty="0"/>
+              <a:t>How to carry traceability of bug fixing? </a:t>
             </a:r>
-            <a:br>
-              <a:rPr lang="de-DE" dirty="0"/>
-            </a:br>
-            <a:endParaRPr lang="de-DE" dirty="0"/>
-          </a:p>
-          <a:p>
-            <a:pPr lvl="4">
-              <a:buFont typeface="Wingdings" panose="05000000000000000000" pitchFamily="2" charset="2"/>
-              <a:buChar char="§"/>
-            </a:pPr>
-            <a:r>
-              <a:rPr lang="de-DE" dirty="0"/>
-              <a:t>Complex datasets</a:t>
-            </a:r>
-          </a:p>
-          <a:p>
-            <a:pPr lvl="4">
-              <a:buFont typeface="Wingdings" panose="05000000000000000000" pitchFamily="2" charset="2"/>
-              <a:buChar char="§"/>
-            </a:pPr>
-            <a:r>
-              <a:rPr lang="de-DE" dirty="0"/>
-              <a:t>Compiler reporting</a:t>
-            </a:r>
-          </a:p>
-          <a:p>
-            <a:pPr lvl="4">
-              <a:buFont typeface="Wingdings" panose="05000000000000000000" pitchFamily="2" charset="2"/>
-              <a:buChar char="§"/>
-            </a:pPr>
-            <a:r>
-              <a:rPr lang="de-DE" dirty="0"/>
-              <a:t>Continuous integration</a:t>
-            </a:r>
-          </a:p>
-          <a:p>
-            <a:pPr lvl="4">
-              <a:buFont typeface="Wingdings" panose="05000000000000000000" pitchFamily="2" charset="2"/>
-              <a:buChar char="§"/>
-            </a:pPr>
-            <a:r>
-              <a:rPr lang="de-DE" dirty="0"/>
-              <a:t>Refactoring tools</a:t>
-            </a:r>
-          </a:p>
-          <a:p>
-            <a:pPr lvl="4">
-              <a:buFont typeface="Wingdings" panose="05000000000000000000" pitchFamily="2" charset="2"/>
-              <a:buChar char="§"/>
-            </a:pPr>
-            <a:r>
-              <a:rPr lang="de-DE" dirty="0"/>
-              <a:t>Issue tracker</a:t>
-            </a:r>
-          </a:p>
-          <a:p>
-            <a:pPr lvl="4">
-              <a:buFont typeface="Wingdings" panose="05000000000000000000" pitchFamily="2" charset="2"/>
-              <a:buChar char="§"/>
-            </a:pPr>
-            <a:r>
-              <a:rPr lang="de-DE" dirty="0"/>
-              <a:t>Stack Overflow </a:t>
-            </a:r>
-          </a:p>
-          <a:p>
-            <a:pPr lvl="4">
-              <a:buFont typeface="Wingdings" panose="05000000000000000000" pitchFamily="2" charset="2"/>
-              <a:buChar char="§"/>
-            </a:pPr>
-            <a:r>
-              <a:rPr lang="de-DE" dirty="0"/>
-              <a:t>Gamification</a:t>
-            </a:r>
-          </a:p>
-          <a:p>
-            <a:pPr lvl="4">
-              <a:buFont typeface="Wingdings" panose="05000000000000000000" pitchFamily="2" charset="2"/>
-              <a:buChar char="§"/>
-            </a:pPr>
-            <a:r>
-              <a:rPr lang="de-DE" dirty="0"/>
-              <a:t>Usability Engineering</a:t>
-            </a:r>
+            <a:endParaRPr lang="de-DE" sz="2400" dirty="0"/>
           </a:p>
         </p:txBody>
       </p:sp>
@@ -28581,7 +28518,7 @@
     </p:spTree>
     <p:extLst>
       <p:ext uri="{BB962C8B-B14F-4D97-AF65-F5344CB8AC3E}">
-        <p14:creationId xmlns:p14="http://schemas.microsoft.com/office/powerpoint/2010/main" val="4265672591"/>
+        <p14:creationId xmlns:p14="http://schemas.microsoft.com/office/powerpoint/2010/main" val="1029131241"/>
       </p:ext>
     </p:extLst>
   </p:cSld>
@@ -28629,7 +28566,7 @@
                   <a:schemeClr val="tx2"/>
                 </a:solidFill>
               </a:rPr>
-              <a:t>Our Approaches</a:t>
+              <a:t> What Current Tools do? - RQ 3</a:t>
             </a:r>
           </a:p>
         </p:txBody>
@@ -28675,80 +28612,8 @@
           <a:p>
             <a:r>
               <a:rPr lang="de-DE" dirty="0"/>
-              <a:t>Complex datasets:</a:t>
+              <a:t>TeamScale </a:t>
             </a:r>
-          </a:p>
-          <a:p>
-            <a:endParaRPr lang="de-DE" dirty="0"/>
-          </a:p>
-          <a:p>
-            <a:pPr lvl="1">
-              <a:buFont typeface="Wingdings" panose="05000000000000000000" pitchFamily="2" charset="2"/>
-              <a:buChar char="§"/>
-            </a:pPr>
-            <a:r>
-              <a:rPr lang="en-GB" dirty="0"/>
-              <a:t>Dix et. al. - more complex grouping and linking of datasets in the context of a user interface of Spreadsheets application. </a:t>
-            </a:r>
-          </a:p>
-          <a:p>
-            <a:pPr lvl="1">
-              <a:buFont typeface="Wingdings" panose="05000000000000000000" pitchFamily="2" charset="2"/>
-              <a:buChar char="§"/>
-            </a:pPr>
-            <a:endParaRPr lang="en-GB" dirty="0"/>
-          </a:p>
-          <a:p>
-            <a:pPr marL="466362" lvl="1" indent="0">
-              <a:buNone/>
-            </a:pPr>
-            <a:r>
-              <a:rPr lang="en-GB" dirty="0"/>
-              <a:t>	Design lesson : extensibility of columns</a:t>
-            </a:r>
-          </a:p>
-          <a:p>
-            <a:pPr marL="466362" lvl="1" indent="0">
-              <a:buNone/>
-            </a:pPr>
-            <a:endParaRPr lang="en-GB" dirty="0"/>
-          </a:p>
-          <a:p>
-            <a:pPr lvl="1">
-              <a:buFont typeface="Wingdings" panose="05000000000000000000" pitchFamily="2" charset="2"/>
-              <a:buChar char="§"/>
-            </a:pPr>
-            <a:r>
-              <a:rPr lang="en-GB" dirty="0"/>
-              <a:t>Gaur et. al. </a:t>
-            </a:r>
-            <a:br>
-              <a:rPr lang="en-GB" dirty="0"/>
-            </a:br>
-            <a:br>
-              <a:rPr lang="en-GB" dirty="0"/>
-            </a:br>
-            <a:r>
-              <a:rPr lang="en-GB" dirty="0"/>
-              <a:t>- linear search problem in indexing as it takes more time for large volumes of data. So, different parameters are introduced to decrease computation time.</a:t>
-            </a:r>
-          </a:p>
-          <a:p>
-            <a:pPr lvl="1">
-              <a:buFont typeface="Wingdings" panose="05000000000000000000" pitchFamily="2" charset="2"/>
-              <a:buChar char="§"/>
-            </a:pPr>
-            <a:endParaRPr lang="en-GB" dirty="0"/>
-          </a:p>
-          <a:p>
-            <a:pPr marL="466362" lvl="1" indent="0">
-              <a:buNone/>
-            </a:pPr>
-            <a:r>
-              <a:rPr lang="en-GB" dirty="0"/>
-              <a:t>	Example: Searching for toy</a:t>
-            </a:r>
-            <a:endParaRPr lang="de-DE" dirty="0"/>
           </a:p>
         </p:txBody>
       </p:sp>
@@ -28777,10 +28642,10 @@
       </p:sp>
       <p:pic>
         <p:nvPicPr>
-          <p:cNvPr id="7" name="Picture 6" descr="A close up of a logo&#10;&#10;Description automatically generated">
+          <p:cNvPr id="7" name="Picture 6">
             <a:extLst>
               <a:ext uri="{FF2B5EF4-FFF2-40B4-BE49-F238E27FC236}">
-                <a16:creationId xmlns:a16="http://schemas.microsoft.com/office/drawing/2014/main" id="{BF7E2933-73C9-4A75-BA01-CAE65C93E87A}"/>
+                <a16:creationId xmlns:a16="http://schemas.microsoft.com/office/drawing/2014/main" id="{890F7F07-D436-49DB-921B-7C41A16477AE}"/>
               </a:ext>
             </a:extLst>
           </p:cNvPr>
@@ -28790,7 +28655,7 @@
           <p:nvPr/>
         </p:nvPicPr>
         <p:blipFill>
-          <a:blip r:embed="rId2" cstate="print">
+          <a:blip r:embed="rId2">
             <a:extLst>
               <a:ext uri="{28A0092B-C50C-407E-A947-70E740481C1C}">
                 <a14:useLocalDpi xmlns:a14="http://schemas.microsoft.com/office/drawing/2010/main" val="0"/>
@@ -28803,160 +28668,18 @@
         </p:blipFill>
         <p:spPr>
           <a:xfrm>
-            <a:off x="5266649" y="2541771"/>
-            <a:ext cx="1169574" cy="1383987"/>
+            <a:off x="354674" y="1844824"/>
+            <a:ext cx="8913411" cy="4536925"/>
           </a:xfrm>
           <a:prstGeom prst="rect">
             <a:avLst/>
           </a:prstGeom>
         </p:spPr>
       </p:pic>
-      <p:pic>
-        <p:nvPicPr>
-          <p:cNvPr id="8" name="Picture 7" descr="A close up of a logo&#10;&#10;Description automatically generated">
-            <a:extLst>
-              <a:ext uri="{FF2B5EF4-FFF2-40B4-BE49-F238E27FC236}">
-                <a16:creationId xmlns:a16="http://schemas.microsoft.com/office/drawing/2014/main" id="{D1959E97-4EFD-4B55-B820-FF23B73316C2}"/>
-              </a:ext>
-            </a:extLst>
-          </p:cNvPr>
-          <p:cNvPicPr>
-            <a:picLocks noChangeAspect="1"/>
-          </p:cNvPicPr>
-          <p:nvPr/>
-        </p:nvPicPr>
-        <p:blipFill>
-          <a:blip r:embed="rId2" cstate="print">
-            <a:extLst>
-              <a:ext uri="{28A0092B-C50C-407E-A947-70E740481C1C}">
-                <a14:useLocalDpi xmlns:a14="http://schemas.microsoft.com/office/drawing/2010/main" val="0"/>
-              </a:ext>
-            </a:extLst>
-          </a:blip>
-          <a:stretch>
-            <a:fillRect/>
-          </a:stretch>
-        </p:blipFill>
-        <p:spPr>
-          <a:xfrm>
-            <a:off x="4016896" y="5073962"/>
-            <a:ext cx="1169574" cy="1383987"/>
-          </a:xfrm>
-          <a:prstGeom prst="rect">
-            <a:avLst/>
-          </a:prstGeom>
-        </p:spPr>
-      </p:pic>
-      <p:sp>
-        <p:nvSpPr>
-          <p:cNvPr id="6" name="TextBox 5">
-            <a:extLst>
-              <a:ext uri="{FF2B5EF4-FFF2-40B4-BE49-F238E27FC236}">
-                <a16:creationId xmlns:a16="http://schemas.microsoft.com/office/drawing/2014/main" id="{8F3D827D-699E-436B-ACD2-FC80589A8D77}"/>
-              </a:ext>
-            </a:extLst>
-          </p:cNvPr>
-          <p:cNvSpPr txBox="1"/>
-          <p:nvPr/>
-        </p:nvSpPr>
-        <p:spPr>
-          <a:xfrm>
-            <a:off x="6166918" y="3455749"/>
-            <a:ext cx="538609" cy="369332"/>
-          </a:xfrm>
-          <a:prstGeom prst="rect">
-            <a:avLst/>
-          </a:prstGeom>
-          <a:noFill/>
-        </p:spPr>
-        <p:txBody>
-          <a:bodyPr wrap="none" lIns="0" rIns="0" rtlCol="0">
-            <a:spAutoFit/>
-          </a:bodyPr>
-          <a:lstStyle/>
-          <a:p>
-            <a:pPr>
-              <a:spcAft>
-                <a:spcPts val="1000"/>
-              </a:spcAft>
-              <a:buClr>
-                <a:schemeClr val="tx2"/>
-              </a:buClr>
-              <a:buSzPct val="80000"/>
-            </a:pPr>
-            <a:r>
-              <a:rPr lang="en-GB" b="1" dirty="0">
-                <a:solidFill>
-                  <a:srgbClr val="00B050"/>
-                </a:solidFill>
-              </a:rPr>
-              <a:t>RQ 1</a:t>
-            </a:r>
-            <a:endParaRPr lang="LID4096" b="1" dirty="0" err="1">
-              <a:solidFill>
-                <a:srgbClr val="00B050"/>
-              </a:solidFill>
-            </a:endParaRPr>
-          </a:p>
-        </p:txBody>
-      </p:sp>
-      <p:sp>
-        <p:nvSpPr>
-          <p:cNvPr id="9" name="TextBox 8">
-            <a:extLst>
-              <a:ext uri="{FF2B5EF4-FFF2-40B4-BE49-F238E27FC236}">
-                <a16:creationId xmlns:a16="http://schemas.microsoft.com/office/drawing/2014/main" id="{86DD756B-018E-48B1-A599-9AF56BAB01A1}"/>
-              </a:ext>
-            </a:extLst>
-          </p:cNvPr>
-          <p:cNvSpPr txBox="1"/>
-          <p:nvPr/>
-        </p:nvSpPr>
-        <p:spPr>
-          <a:xfrm>
-            <a:off x="4917165" y="5966529"/>
-            <a:ext cx="538609" cy="369332"/>
-          </a:xfrm>
-          <a:prstGeom prst="rect">
-            <a:avLst/>
-          </a:prstGeom>
-          <a:noFill/>
-        </p:spPr>
-        <p:txBody>
-          <a:bodyPr wrap="none" lIns="0" rIns="0" rtlCol="0">
-            <a:spAutoFit/>
-          </a:bodyPr>
-          <a:lstStyle/>
-          <a:p>
-            <a:pPr>
-              <a:spcAft>
-                <a:spcPts val="1000"/>
-              </a:spcAft>
-              <a:buClr>
-                <a:schemeClr val="tx2"/>
-              </a:buClr>
-              <a:buSzPct val="80000"/>
-            </a:pPr>
-            <a:r>
-              <a:rPr lang="en-GB" b="1" dirty="0">
-                <a:solidFill>
-                  <a:srgbClr val="00B050"/>
-                </a:solidFill>
-              </a:rPr>
-              <a:t>RQ 2</a:t>
-            </a:r>
-            <a:endParaRPr lang="LID4096" b="1" dirty="0" err="1">
-              <a:solidFill>
-                <a:srgbClr val="00B050"/>
-              </a:solidFill>
-            </a:endParaRPr>
-          </a:p>
-        </p:txBody>
-      </p:sp>
     </p:spTree>
     <p:extLst>
       <p:ext uri="{BB962C8B-B14F-4D97-AF65-F5344CB8AC3E}">
-        <p14:creationId xmlns:p14="http://schemas.microsoft.com/office/powerpoint/2010/main" val="693282793"/>
+        <p14:creationId xmlns:p14="http://schemas.microsoft.com/office/powerpoint/2010/main" val="287106929"/>
       </p:ext>
     </p:extLst>
   </p:cSld>
@@ -29035,88 +28758,6 @@
       </p:sp>
       <p:sp>
         <p:nvSpPr>
-          <p:cNvPr id="5" name="Textplatzhalter 4"/>
-          <p:cNvSpPr>
-            <a:spLocks noGrp="1"/>
-          </p:cNvSpPr>
-          <p:nvPr>
-            <p:ph type="body" sz="quarter" idx="12"/>
-          </p:nvPr>
-        </p:nvSpPr>
-        <p:spPr/>
-        <p:txBody>
-          <a:bodyPr/>
-          <a:lstStyle/>
-          <a:p>
-            <a:r>
-              <a:rPr lang="de-DE" dirty="0"/>
-              <a:t>Compiler reporting</a:t>
-            </a:r>
-          </a:p>
-          <a:p>
-            <a:endParaRPr lang="de-DE" dirty="0"/>
-          </a:p>
-          <a:p>
-            <a:endParaRPr lang="de-DE" dirty="0"/>
-          </a:p>
-          <a:p>
-            <a:pPr marL="0" indent="0">
-              <a:buNone/>
-            </a:pPr>
-            <a:r>
-              <a:rPr lang="en-GB" dirty="0"/>
-              <a:t>Horning et. al </a:t>
-            </a:r>
-          </a:p>
-          <a:p>
-            <a:pPr marL="0" indent="0">
-              <a:buNone/>
-            </a:pPr>
-            <a:endParaRPr lang="en-GB" dirty="0"/>
-          </a:p>
-          <a:p>
-            <a:pPr>
-              <a:buFontTx/>
-              <a:buChar char="-"/>
-            </a:pPr>
-            <a:r>
-              <a:rPr lang="en-GB" dirty="0"/>
-              <a:t>error logging with statistics </a:t>
-            </a:r>
-          </a:p>
-          <a:p>
-            <a:pPr marL="0" indent="0">
-              <a:buNone/>
-            </a:pPr>
-            <a:endParaRPr lang="en-GB" dirty="0"/>
-          </a:p>
-          <a:p>
-            <a:pPr>
-              <a:buFontTx/>
-              <a:buChar char="-"/>
-            </a:pPr>
-            <a:r>
-              <a:rPr lang="en-GB" dirty="0"/>
-              <a:t>stating what kind of bugs are not found along with bugs found</a:t>
-            </a:r>
-            <a:endParaRPr lang="de-DE" dirty="0"/>
-          </a:p>
-          <a:p>
-            <a:endParaRPr lang="de-DE" dirty="0"/>
-          </a:p>
-          <a:p>
-            <a:pPr marL="0" indent="0">
-              <a:buNone/>
-            </a:pPr>
-            <a:endParaRPr lang="de-DE" dirty="0"/>
-          </a:p>
-          <a:p>
-            <a:endParaRPr lang="de-DE" dirty="0"/>
-          </a:p>
-        </p:txBody>
-      </p:sp>
-      <p:sp>
-        <p:nvSpPr>
           <p:cNvPr id="3" name="Fußzeilenplatzhalter 2"/>
           <p:cNvSpPr>
             <a:spLocks noGrp="1"/>
@@ -29140,10 +28781,10 @@
       </p:sp>
       <p:pic>
         <p:nvPicPr>
-          <p:cNvPr id="6" name="Picture 5" descr="A close up of a logo&#10;&#10;Description automatically generated">
+          <p:cNvPr id="7" name="Picture 6" descr="A close up of a logo&#10;&#10;Description automatically generated">
             <a:extLst>
               <a:ext uri="{FF2B5EF4-FFF2-40B4-BE49-F238E27FC236}">
-                <a16:creationId xmlns:a16="http://schemas.microsoft.com/office/drawing/2014/main" id="{A7A020AF-72D7-4F42-A419-633515EC45C5}"/>
+                <a16:creationId xmlns:a16="http://schemas.microsoft.com/office/drawing/2014/main" id="{8269BFC5-F04C-47E7-A8B1-51CDB2571100}"/>
               </a:ext>
             </a:extLst>
           </p:cNvPr>
@@ -29153,7 +28794,7 @@
           <p:nvPr/>
         </p:nvPicPr>
         <p:blipFill>
-          <a:blip r:embed="rId2" cstate="print">
+          <a:blip r:embed="rId2">
             <a:extLst>
               <a:ext uri="{28A0092B-C50C-407E-A947-70E740481C1C}">
                 <a14:useLocalDpi xmlns:a14="http://schemas.microsoft.com/office/drawing/2010/main" val="0"/>
@@ -29166,71 +28807,18 @@
         </p:blipFill>
         <p:spPr>
           <a:xfrm>
-            <a:off x="3656856" y="2541771"/>
-            <a:ext cx="1169574" cy="1383987"/>
+            <a:off x="1928664" y="1014169"/>
+            <a:ext cx="5677290" cy="4829661"/>
           </a:xfrm>
           <a:prstGeom prst="rect">
             <a:avLst/>
           </a:prstGeom>
         </p:spPr>
       </p:pic>
-      <p:sp>
-        <p:nvSpPr>
-          <p:cNvPr id="7" name="TextBox 6">
-            <a:extLst>
-              <a:ext uri="{FF2B5EF4-FFF2-40B4-BE49-F238E27FC236}">
-                <a16:creationId xmlns:a16="http://schemas.microsoft.com/office/drawing/2014/main" id="{6BB21ED6-4A8E-493A-8ACF-D99A2089DC68}"/>
-              </a:ext>
-            </a:extLst>
-          </p:cNvPr>
-          <p:cNvSpPr txBox="1"/>
-          <p:nvPr/>
-        </p:nvSpPr>
-        <p:spPr>
-          <a:xfrm>
-            <a:off x="4557125" y="3452231"/>
-            <a:ext cx="538609" cy="369332"/>
-          </a:xfrm>
-          <a:prstGeom prst="rect">
-            <a:avLst/>
-          </a:prstGeom>
-          <a:noFill/>
-        </p:spPr>
-        <p:txBody>
-          <a:bodyPr wrap="none" lIns="0" rIns="0" rtlCol="0">
-            <a:spAutoFit/>
-          </a:bodyPr>
-          <a:lstStyle/>
-          <a:p>
-            <a:pPr>
-              <a:spcAft>
-                <a:spcPts val="1000"/>
-              </a:spcAft>
-              <a:buClr>
-                <a:schemeClr val="tx2"/>
-              </a:buClr>
-              <a:buSzPct val="80000"/>
-            </a:pPr>
-            <a:r>
-              <a:rPr lang="en-GB" b="1" dirty="0">
-                <a:solidFill>
-                  <a:srgbClr val="00B050"/>
-                </a:solidFill>
-              </a:rPr>
-              <a:t>RQ 1</a:t>
-            </a:r>
-            <a:endParaRPr lang="LID4096" b="1" dirty="0" err="1">
-              <a:solidFill>
-                <a:srgbClr val="00B050"/>
-              </a:solidFill>
-            </a:endParaRPr>
-          </a:p>
-        </p:txBody>
-      </p:sp>
     </p:spTree>
     <p:extLst>
       <p:ext uri="{BB962C8B-B14F-4D97-AF65-F5344CB8AC3E}">
-        <p14:creationId xmlns:p14="http://schemas.microsoft.com/office/powerpoint/2010/main" val="648326557"/>
+        <p14:creationId xmlns:p14="http://schemas.microsoft.com/office/powerpoint/2010/main" val="2449660059"/>
       </p:ext>
     </p:extLst>
   </p:cSld>
@@ -29322,87 +28910,100 @@
           <a:bodyPr/>
           <a:lstStyle/>
           <a:p>
+            <a:pPr marL="0" indent="0">
+              <a:buNone/>
+            </a:pPr>
+            <a:endParaRPr lang="de-DE" dirty="0"/>
+          </a:p>
+          <a:p>
+            <a:r>
+              <a:rPr lang="de-DE" dirty="0"/>
+              <a:t>Software Engineering disciplines:</a:t>
+            </a:r>
+            <a:br>
+              <a:rPr lang="de-DE" dirty="0"/>
+            </a:br>
+            <a:endParaRPr lang="de-DE" dirty="0"/>
+          </a:p>
+          <a:p>
+            <a:pPr lvl="4">
+              <a:buFont typeface="Wingdings" panose="05000000000000000000" pitchFamily="2" charset="2"/>
+              <a:buChar char="§"/>
+            </a:pPr>
+            <a:r>
+              <a:rPr lang="de-DE" dirty="0"/>
+              <a:t>Complex datasets</a:t>
+            </a:r>
+          </a:p>
+          <a:p>
+            <a:pPr lvl="4">
+              <a:buFont typeface="Wingdings" panose="05000000000000000000" pitchFamily="2" charset="2"/>
+              <a:buChar char="§"/>
+            </a:pPr>
+            <a:r>
+              <a:rPr lang="de-DE" dirty="0"/>
+              <a:t>Compiler reporting</a:t>
+            </a:r>
+          </a:p>
+          <a:p>
+            <a:pPr lvl="4">
+              <a:buFont typeface="Wingdings" panose="05000000000000000000" pitchFamily="2" charset="2"/>
+              <a:buChar char="§"/>
+            </a:pPr>
+            <a:r>
+              <a:rPr lang="de-DE" dirty="0"/>
+              <a:t>Continuous integration</a:t>
+            </a:r>
+          </a:p>
+          <a:p>
+            <a:pPr lvl="4">
+              <a:buFont typeface="Wingdings" panose="05000000000000000000" pitchFamily="2" charset="2"/>
+              <a:buChar char="§"/>
+            </a:pPr>
             <a:r>
               <a:rPr lang="de-DE" dirty="0"/>
               <a:t>Refactoring tools</a:t>
             </a:r>
           </a:p>
           <a:p>
-            <a:endParaRPr lang="de-DE" dirty="0"/>
-          </a:p>
-          <a:p>
-            <a:pPr marL="0" indent="0">
-              <a:buNone/>
+            <a:pPr lvl="4">
+              <a:buFont typeface="Wingdings" panose="05000000000000000000" pitchFamily="2" charset="2"/>
+              <a:buChar char="§"/>
             </a:pPr>
             <a:r>
-              <a:rPr lang="en-GB" dirty="0" err="1"/>
-              <a:t>Dustinca</a:t>
+              <a:rPr lang="de-DE" dirty="0"/>
+              <a:t>Issue tracker</a:t>
             </a:r>
-            <a:r>
-              <a:rPr lang="en-GB" dirty="0"/>
-              <a:t> </a:t>
-            </a:r>
-          </a:p>
-          <a:p>
-            <a:pPr marL="0" indent="0">
-              <a:buNone/>
+          </a:p>
+          <a:p>
+            <a:pPr lvl="4">
+              <a:buFont typeface="Wingdings" panose="05000000000000000000" pitchFamily="2" charset="2"/>
+              <a:buChar char="§"/>
             </a:pPr>
             <a:r>
-              <a:rPr lang="en-GB" dirty="0"/>
-              <a:t>-     barrier of discoverability </a:t>
+              <a:rPr lang="de-DE" dirty="0"/>
+              <a:t>Stack Overflow </a:t>
             </a:r>
           </a:p>
           <a:p>
-            <a:pPr>
-              <a:buFontTx/>
-              <a:buChar char="-"/>
+            <a:pPr lvl="4">
+              <a:buFont typeface="Wingdings" panose="05000000000000000000" pitchFamily="2" charset="2"/>
+              <a:buChar char="§"/>
             </a:pPr>
             <a:r>
-              <a:rPr lang="en-GB" dirty="0"/>
-              <a:t>introduced a smart tag for code can be refactored. </a:t>
+              <a:rPr lang="de-DE" dirty="0"/>
+              <a:t>Gamification</a:t>
             </a:r>
-            <a:br>
-              <a:rPr lang="en-GB" dirty="0"/>
-            </a:br>
-            <a:endParaRPr lang="en-GB" dirty="0"/>
-          </a:p>
-          <a:p>
-            <a:pPr>
-              <a:buFontTx/>
-              <a:buChar char="-"/>
+          </a:p>
+          <a:p>
+            <a:pPr lvl="4">
+              <a:buFont typeface="Wingdings" panose="05000000000000000000" pitchFamily="2" charset="2"/>
+              <a:buChar char="§"/>
             </a:pPr>
             <a:r>
-              <a:rPr lang="en-GB" dirty="0"/>
-              <a:t>'on-board' phase _ </a:t>
+              <a:rPr lang="de-DE" dirty="0"/>
+              <a:t>Usability Engineering</a:t>
             </a:r>
-            <a:r>
-              <a:rPr lang="en-GB" b="1" dirty="0"/>
-              <a:t>Gamification</a:t>
-            </a:r>
-          </a:p>
-          <a:p>
-            <a:pPr>
-              <a:buFontTx/>
-              <a:buChar char="-"/>
-            </a:pPr>
-            <a:endParaRPr lang="en-GB" dirty="0"/>
-          </a:p>
-          <a:p>
-            <a:pPr>
-              <a:buFontTx/>
-              <a:buChar char="-"/>
-            </a:pPr>
-            <a:endParaRPr lang="en-GB" dirty="0"/>
-          </a:p>
-          <a:p>
-            <a:pPr marL="0" indent="0">
-              <a:buNone/>
-            </a:pPr>
-            <a:r>
-              <a:rPr lang="en-GB" dirty="0"/>
-              <a:t>Hayashi et. al. - task level commits in order to maintain edit history</a:t>
-            </a:r>
-            <a:endParaRPr lang="de-DE" dirty="0"/>
           </a:p>
         </p:txBody>
       </p:sp>
@@ -29429,188 +29030,10 @@
           </a:p>
         </p:txBody>
       </p:sp>
-      <p:pic>
-        <p:nvPicPr>
-          <p:cNvPr id="6" name="Picture 5" descr="A close up of a logo&#10;&#10;Description automatically generated">
-            <a:extLst>
-              <a:ext uri="{FF2B5EF4-FFF2-40B4-BE49-F238E27FC236}">
-                <a16:creationId xmlns:a16="http://schemas.microsoft.com/office/drawing/2014/main" id="{13AAAABB-019E-44AD-A346-D7359BA8F9B0}"/>
-              </a:ext>
-            </a:extLst>
-          </p:cNvPr>
-          <p:cNvPicPr>
-            <a:picLocks noChangeAspect="1"/>
-          </p:cNvPicPr>
-          <p:nvPr/>
-        </p:nvPicPr>
-        <p:blipFill>
-          <a:blip r:embed="rId2" cstate="print">
-            <a:extLst>
-              <a:ext uri="{28A0092B-C50C-407E-A947-70E740481C1C}">
-                <a14:useLocalDpi xmlns:a14="http://schemas.microsoft.com/office/drawing/2010/main" val="0"/>
-              </a:ext>
-            </a:extLst>
-          </a:blip>
-          <a:stretch>
-            <a:fillRect/>
-          </a:stretch>
-        </p:blipFill>
-        <p:spPr>
-          <a:xfrm>
-            <a:off x="6033120" y="2852936"/>
-            <a:ext cx="1169574" cy="1383987"/>
-          </a:xfrm>
-          <a:prstGeom prst="rect">
-            <a:avLst/>
-          </a:prstGeom>
-        </p:spPr>
-      </p:pic>
-      <p:pic>
-        <p:nvPicPr>
-          <p:cNvPr id="7" name="Picture 6" descr="A close up of a logo&#10;&#10;Description automatically generated">
-            <a:extLst>
-              <a:ext uri="{FF2B5EF4-FFF2-40B4-BE49-F238E27FC236}">
-                <a16:creationId xmlns:a16="http://schemas.microsoft.com/office/drawing/2014/main" id="{6533C5BF-7C96-4D39-9B00-A12D29212E0D}"/>
-              </a:ext>
-            </a:extLst>
-          </p:cNvPr>
-          <p:cNvPicPr>
-            <a:picLocks noChangeAspect="1"/>
-          </p:cNvPicPr>
-          <p:nvPr/>
-        </p:nvPicPr>
-        <p:blipFill>
-          <a:blip r:embed="rId2" cstate="print">
-            <a:extLst>
-              <a:ext uri="{28A0092B-C50C-407E-A947-70E740481C1C}">
-                <a14:useLocalDpi xmlns:a14="http://schemas.microsoft.com/office/drawing/2010/main" val="0"/>
-              </a:ext>
-            </a:extLst>
-          </a:blip>
-          <a:stretch>
-            <a:fillRect/>
-          </a:stretch>
-        </p:blipFill>
-        <p:spPr>
-          <a:xfrm>
-            <a:off x="7183222" y="4897594"/>
-            <a:ext cx="1169574" cy="1383987"/>
-          </a:xfrm>
-          <a:prstGeom prst="rect">
-            <a:avLst/>
-          </a:prstGeom>
-        </p:spPr>
-      </p:pic>
-      <p:sp>
-        <p:nvSpPr>
-          <p:cNvPr id="8" name="TextBox 7">
-            <a:extLst>
-              <a:ext uri="{FF2B5EF4-FFF2-40B4-BE49-F238E27FC236}">
-                <a16:creationId xmlns:a16="http://schemas.microsoft.com/office/drawing/2014/main" id="{2A382B04-71BC-4C99-9255-B364CECC4A15}"/>
-              </a:ext>
-            </a:extLst>
-          </p:cNvPr>
-          <p:cNvSpPr txBox="1"/>
-          <p:nvPr/>
-        </p:nvSpPr>
-        <p:spPr>
-          <a:xfrm>
-            <a:off x="6933389" y="3741093"/>
-            <a:ext cx="538609" cy="369332"/>
-          </a:xfrm>
-          <a:prstGeom prst="rect">
-            <a:avLst/>
-          </a:prstGeom>
-          <a:noFill/>
-        </p:spPr>
-        <p:txBody>
-          <a:bodyPr wrap="none" lIns="0" rIns="0" rtlCol="0">
-            <a:spAutoFit/>
-          </a:bodyPr>
-          <a:lstStyle/>
-          <a:p>
-            <a:pPr>
-              <a:spcAft>
-                <a:spcPts val="1000"/>
-              </a:spcAft>
-              <a:buClr>
-                <a:schemeClr val="tx2"/>
-              </a:buClr>
-              <a:buSzPct val="80000"/>
-            </a:pPr>
-            <a:r>
-              <a:rPr lang="en-GB" b="1" dirty="0">
-                <a:solidFill>
-                  <a:srgbClr val="00B050"/>
-                </a:solidFill>
-              </a:rPr>
-              <a:t>RQ 3</a:t>
-            </a:r>
-            <a:endParaRPr lang="LID4096" b="1" dirty="0" err="1">
-              <a:solidFill>
-                <a:srgbClr val="00B050"/>
-              </a:solidFill>
-            </a:endParaRPr>
-          </a:p>
-        </p:txBody>
-      </p:sp>
-      <p:sp>
-        <p:nvSpPr>
-          <p:cNvPr id="9" name="TextBox 8">
-            <a:extLst>
-              <a:ext uri="{FF2B5EF4-FFF2-40B4-BE49-F238E27FC236}">
-                <a16:creationId xmlns:a16="http://schemas.microsoft.com/office/drawing/2014/main" id="{CA37C721-241F-45CF-8E26-5CCD2CEC25F0}"/>
-              </a:ext>
-            </a:extLst>
-          </p:cNvPr>
-          <p:cNvSpPr txBox="1"/>
-          <p:nvPr/>
-        </p:nvSpPr>
-        <p:spPr>
-          <a:xfrm>
-            <a:off x="8083491" y="5777667"/>
-            <a:ext cx="538609" cy="369332"/>
-          </a:xfrm>
-          <a:prstGeom prst="rect">
-            <a:avLst/>
-          </a:prstGeom>
-          <a:noFill/>
-        </p:spPr>
-        <p:txBody>
-          <a:bodyPr wrap="none" lIns="0" rIns="0" rtlCol="0">
-            <a:spAutoFit/>
-          </a:bodyPr>
-          <a:lstStyle/>
-          <a:p>
-            <a:pPr>
-              <a:spcAft>
-                <a:spcPts val="1000"/>
-              </a:spcAft>
-              <a:buClr>
-                <a:schemeClr val="tx2"/>
-              </a:buClr>
-              <a:buSzPct val="80000"/>
-            </a:pPr>
-            <a:r>
-              <a:rPr lang="en-GB" b="1" dirty="0">
-                <a:solidFill>
-                  <a:srgbClr val="00B050"/>
-                </a:solidFill>
-              </a:rPr>
-              <a:t>RQ 3</a:t>
-            </a:r>
-            <a:endParaRPr lang="LID4096" b="1" dirty="0" err="1">
-              <a:solidFill>
-                <a:srgbClr val="00B050"/>
-              </a:solidFill>
-            </a:endParaRPr>
-          </a:p>
-        </p:txBody>
-      </p:sp>
     </p:spTree>
     <p:extLst>
       <p:ext uri="{BB962C8B-B14F-4D97-AF65-F5344CB8AC3E}">
-        <p14:creationId xmlns:p14="http://schemas.microsoft.com/office/powerpoint/2010/main" val="2976832284"/>
+        <p14:creationId xmlns:p14="http://schemas.microsoft.com/office/powerpoint/2010/main" val="4265672591"/>
       </p:ext>
     </p:extLst>
   </p:cSld>
@@ -29704,6 +29127,47 @@
           <a:p>
             <a:r>
               <a:rPr lang="de-DE" dirty="0"/>
+              <a:t>Complex datasets:</a:t>
+            </a:r>
+          </a:p>
+          <a:p>
+            <a:endParaRPr lang="de-DE" dirty="0"/>
+          </a:p>
+          <a:p>
+            <a:pPr lvl="1">
+              <a:buFont typeface="Wingdings" panose="05000000000000000000" pitchFamily="2" charset="2"/>
+              <a:buChar char="§"/>
+            </a:pPr>
+            <a:r>
+              <a:rPr lang="en-GB" dirty="0"/>
+              <a:t>Dix et. al. - complex grouping and linking of datasets for Spreadsheets application </a:t>
+            </a:r>
+          </a:p>
+          <a:p>
+            <a:pPr lvl="1">
+              <a:buFont typeface="Wingdings" panose="05000000000000000000" pitchFamily="2" charset="2"/>
+              <a:buChar char="§"/>
+            </a:pPr>
+            <a:endParaRPr lang="en-GB" dirty="0"/>
+          </a:p>
+          <a:p>
+            <a:pPr marL="466362" lvl="1" indent="0">
+              <a:buNone/>
+            </a:pPr>
+            <a:r>
+              <a:rPr lang="en-GB" dirty="0"/>
+              <a:t>	Design lesson : extensibility of columns</a:t>
+            </a:r>
+          </a:p>
+          <a:p>
+            <a:pPr marL="466362" lvl="1" indent="0">
+              <a:buNone/>
+            </a:pPr>
+            <a:endParaRPr lang="en-GB" dirty="0"/>
+          </a:p>
+          <a:p>
+            <a:r>
+              <a:rPr lang="de-DE" dirty="0"/>
               <a:t>Issue tracker</a:t>
             </a:r>
           </a:p>
@@ -29711,8 +29175,9 @@
             <a:endParaRPr lang="de-DE" dirty="0"/>
           </a:p>
           <a:p>
-            <a:pPr marL="0" indent="0">
-              <a:buNone/>
+            <a:pPr lvl="1">
+              <a:buFont typeface="Wingdings" panose="05000000000000000000" pitchFamily="2" charset="2"/>
+              <a:buChar char="§"/>
             </a:pPr>
             <a:r>
               <a:rPr lang="en-GB" dirty="0" err="1"/>
@@ -29724,12 +29189,16 @@
             </a:r>
           </a:p>
           <a:p>
-            <a:endParaRPr lang="en-GB" dirty="0"/>
-          </a:p>
-          <a:p>
             <a:pPr lvl="1">
               <a:buFont typeface="Wingdings" panose="05000000000000000000" pitchFamily="2" charset="2"/>
               <a:buChar char="§"/>
+            </a:pPr>
+            <a:endParaRPr lang="en-GB" dirty="0"/>
+          </a:p>
+          <a:p>
+            <a:pPr lvl="2">
+              <a:buFont typeface="Wingdings" panose="05000000000000000000" pitchFamily="2" charset="2"/>
+              <a:buChar char="v"/>
             </a:pPr>
             <a:r>
               <a:rPr lang="en-GB" dirty="0"/>
@@ -29737,36 +29206,20 @@
             </a:r>
           </a:p>
           <a:p>
-            <a:pPr lvl="1">
+            <a:pPr lvl="2">
               <a:buFont typeface="Wingdings" panose="05000000000000000000" pitchFamily="2" charset="2"/>
-              <a:buChar char="§"/>
+              <a:buChar char="v"/>
             </a:pPr>
             <a:r>
               <a:rPr lang="en-GB" dirty="0"/>
-              <a:t>Expressiveness </a:t>
+              <a:t>Expressiveness  </a:t>
             </a:r>
           </a:p>
           <a:p>
-            <a:pPr lvl="1">
-              <a:buFont typeface="Wingdings" panose="05000000000000000000" pitchFamily="2" charset="2"/>
-              <a:buChar char="§"/>
+            <a:pPr marL="466362" lvl="1" indent="0">
+              <a:buNone/>
             </a:pPr>
             <a:endParaRPr lang="en-GB" dirty="0"/>
-          </a:p>
-          <a:p>
-            <a:pPr marL="0" indent="0">
-              <a:buNone/>
-            </a:pPr>
-            <a:r>
-              <a:rPr lang="en-GB" dirty="0"/>
-              <a:t>Ideal to describe the priory as per team decision instead of personal choice.  </a:t>
-            </a:r>
-          </a:p>
-          <a:p>
-            <a:pPr marL="0" indent="0">
-              <a:buNone/>
-            </a:pPr>
-            <a:endParaRPr lang="de-DE" dirty="0"/>
           </a:p>
         </p:txBody>
       </p:sp>
@@ -29795,10 +29248,10 @@
       </p:sp>
       <p:pic>
         <p:nvPicPr>
-          <p:cNvPr id="6" name="Picture 5" descr="A close up of a logo&#10;&#10;Description automatically generated">
+          <p:cNvPr id="7" name="Picture 6" descr="A close up of a logo&#10;&#10;Description automatically generated">
             <a:extLst>
               <a:ext uri="{FF2B5EF4-FFF2-40B4-BE49-F238E27FC236}">
-                <a16:creationId xmlns:a16="http://schemas.microsoft.com/office/drawing/2014/main" id="{9D91CC95-7BCB-4DC1-98E4-1240A074794B}"/>
+                <a16:creationId xmlns:a16="http://schemas.microsoft.com/office/drawing/2014/main" id="{BF7E2933-73C9-4A75-BA01-CAE65C93E87A}"/>
               </a:ext>
             </a:extLst>
           </p:cNvPr>
@@ -29821,71 +29274,54 @@
         </p:blipFill>
         <p:spPr>
           <a:xfrm>
-            <a:off x="7329264" y="4406446"/>
-            <a:ext cx="1169574" cy="1383987"/>
+            <a:off x="5241032" y="2406920"/>
+            <a:ext cx="863735" cy="1022080"/>
           </a:xfrm>
           <a:prstGeom prst="rect">
             <a:avLst/>
           </a:prstGeom>
         </p:spPr>
       </p:pic>
-      <p:sp>
-        <p:nvSpPr>
-          <p:cNvPr id="7" name="TextBox 6">
+      <p:pic>
+        <p:nvPicPr>
+          <p:cNvPr id="11" name="Picture 10" descr="A close up of a logo&#10;&#10;Description automatically generated">
             <a:extLst>
               <a:ext uri="{FF2B5EF4-FFF2-40B4-BE49-F238E27FC236}">
-                <a16:creationId xmlns:a16="http://schemas.microsoft.com/office/drawing/2014/main" id="{B4B899BD-D79C-448F-8E8E-5DE6831DDA3A}"/>
+                <a16:creationId xmlns:a16="http://schemas.microsoft.com/office/drawing/2014/main" id="{E1C50C8A-5433-4F71-AF7A-8449CCEEBB1D}"/>
               </a:ext>
             </a:extLst>
           </p:cNvPr>
-          <p:cNvSpPr txBox="1"/>
+          <p:cNvPicPr>
+            <a:picLocks noChangeAspect="1"/>
+          </p:cNvPicPr>
           <p:nvPr/>
-        </p:nvSpPr>
+        </p:nvPicPr>
+        <p:blipFill>
+          <a:blip r:embed="rId2" cstate="print">
+            <a:extLst>
+              <a:ext uri="{28A0092B-C50C-407E-A947-70E740481C1C}">
+                <a14:useLocalDpi xmlns:a14="http://schemas.microsoft.com/office/drawing/2010/main" val="0"/>
+              </a:ext>
+            </a:extLst>
+          </a:blip>
+          <a:stretch>
+            <a:fillRect/>
+          </a:stretch>
+        </p:blipFill>
         <p:spPr>
           <a:xfrm>
-            <a:off x="8258774" y="5337113"/>
-            <a:ext cx="538609" cy="369332"/>
+            <a:off x="3800872" y="5078548"/>
+            <a:ext cx="863735" cy="1022080"/>
           </a:xfrm>
           <a:prstGeom prst="rect">
             <a:avLst/>
           </a:prstGeom>
-          <a:noFill/>
         </p:spPr>
-        <p:txBody>
-          <a:bodyPr wrap="none" lIns="0" rIns="0" rtlCol="0">
-            <a:spAutoFit/>
-          </a:bodyPr>
-          <a:lstStyle/>
-          <a:p>
-            <a:pPr>
-              <a:spcAft>
-                <a:spcPts val="1000"/>
-              </a:spcAft>
-              <a:buClr>
-                <a:schemeClr val="tx2"/>
-              </a:buClr>
-              <a:buSzPct val="80000"/>
-            </a:pPr>
-            <a:r>
-              <a:rPr lang="en-GB" b="1" dirty="0">
-                <a:solidFill>
-                  <a:srgbClr val="00B050"/>
-                </a:solidFill>
-              </a:rPr>
-              <a:t>RQ 1</a:t>
-            </a:r>
-            <a:endParaRPr lang="LID4096" b="1" dirty="0" err="1">
-              <a:solidFill>
-                <a:srgbClr val="00B050"/>
-              </a:solidFill>
-            </a:endParaRPr>
-          </a:p>
-        </p:txBody>
-      </p:sp>
+      </p:pic>
     </p:spTree>
     <p:extLst>
       <p:ext uri="{BB962C8B-B14F-4D97-AF65-F5344CB8AC3E}">
-        <p14:creationId xmlns:p14="http://schemas.microsoft.com/office/powerpoint/2010/main" val="1147838235"/>
+        <p14:creationId xmlns:p14="http://schemas.microsoft.com/office/powerpoint/2010/main" val="693282793"/>
       </p:ext>
     </p:extLst>
   </p:cSld>
@@ -29933,7 +29369,7 @@
                   <a:schemeClr val="tx2"/>
                 </a:solidFill>
               </a:rPr>
-              <a:t>Our Approaches</a:t>
+              <a:t>Example: RQ 1</a:t>
             </a:r>
           </a:p>
         </p:txBody>
@@ -29979,42 +29415,8 @@
           <a:p>
             <a:r>
               <a:rPr lang="de-DE" dirty="0"/>
-              <a:t>Stack Overflow</a:t>
+              <a:t>Prototype 1</a:t>
             </a:r>
-            <a:br>
-              <a:rPr lang="de-DE" dirty="0"/>
-            </a:br>
-            <a:endParaRPr lang="de-DE" dirty="0"/>
-          </a:p>
-          <a:p>
-            <a:pPr marL="0" indent="0">
-              <a:buNone/>
-            </a:pPr>
-            <a:r>
-              <a:rPr lang="de-DE" dirty="0"/>
-              <a:t> -  Wang et. al. : 10934198 questions on a 'User Interface' topic</a:t>
-            </a:r>
-          </a:p>
-          <a:p>
-            <a:pPr marL="0" indent="0">
-              <a:buNone/>
-            </a:pPr>
-            <a:r>
-              <a:rPr lang="en-GB" dirty="0"/>
-              <a:t> -  </a:t>
-            </a:r>
-            <a:r>
-              <a:rPr lang="en-GB" dirty="0" err="1"/>
-              <a:t>Treude</a:t>
-            </a:r>
-            <a:r>
-              <a:rPr lang="en-GB" dirty="0"/>
-              <a:t> et. al. : 72.30 % questions have between 2 and 4 tags</a:t>
-            </a:r>
-            <a:endParaRPr lang="de-DE" dirty="0"/>
-          </a:p>
-          <a:p>
-            <a:endParaRPr lang="de-DE" dirty="0"/>
           </a:p>
         </p:txBody>
       </p:sp>
@@ -30046,7 +29448,7 @@
           <p:cNvPr id="7" name="Picture 6" descr="A screenshot of a cell phone&#10;&#10;Description automatically generated">
             <a:extLst>
               <a:ext uri="{FF2B5EF4-FFF2-40B4-BE49-F238E27FC236}">
-                <a16:creationId xmlns:a16="http://schemas.microsoft.com/office/drawing/2014/main" id="{FE83DF5C-495D-4DA2-8B20-D7806E518B54}"/>
+                <a16:creationId xmlns:a16="http://schemas.microsoft.com/office/drawing/2014/main" id="{D419A6B9-A463-4E36-AD73-EAB84249ED0F}"/>
               </a:ext>
             </a:extLst>
           </p:cNvPr>
@@ -30069,107 +29471,18 @@
         </p:blipFill>
         <p:spPr>
           <a:xfrm>
-            <a:off x="1320625" y="3011699"/>
-            <a:ext cx="7264750" cy="3370050"/>
+            <a:off x="833155" y="1994816"/>
+            <a:ext cx="8239125" cy="3933825"/>
           </a:xfrm>
           <a:prstGeom prst="rect">
             <a:avLst/>
           </a:prstGeom>
         </p:spPr>
       </p:pic>
-      <p:pic>
-        <p:nvPicPr>
-          <p:cNvPr id="9" name="Picture 8" descr="A close up of a logo&#10;&#10;Description automatically generated">
-            <a:extLst>
-              <a:ext uri="{FF2B5EF4-FFF2-40B4-BE49-F238E27FC236}">
-                <a16:creationId xmlns:a16="http://schemas.microsoft.com/office/drawing/2014/main" id="{6AB77186-1F87-49FF-9B3B-90D739756623}"/>
-              </a:ext>
-            </a:extLst>
-          </p:cNvPr>
-          <p:cNvPicPr>
-            <a:picLocks noChangeAspect="1"/>
-          </p:cNvPicPr>
-          <p:nvPr/>
-        </p:nvPicPr>
-        <p:blipFill>
-          <a:blip r:embed="rId3" cstate="print">
-            <a:extLst>
-              <a:ext uri="{28A0092B-C50C-407E-A947-70E740481C1C}">
-                <a14:useLocalDpi xmlns:a14="http://schemas.microsoft.com/office/drawing/2010/main" val="0"/>
-              </a:ext>
-            </a:extLst>
-          </a:blip>
-          <a:stretch>
-            <a:fillRect/>
-          </a:stretch>
-        </p:blipFill>
-        <p:spPr>
-          <a:xfrm>
-            <a:off x="6825208" y="1656190"/>
-            <a:ext cx="1169574" cy="1383987"/>
-          </a:xfrm>
-          <a:prstGeom prst="rect">
-            <a:avLst/>
-          </a:prstGeom>
-        </p:spPr>
-      </p:pic>
-      <p:sp>
-        <p:nvSpPr>
-          <p:cNvPr id="8" name="TextBox 7">
-            <a:extLst>
-              <a:ext uri="{FF2B5EF4-FFF2-40B4-BE49-F238E27FC236}">
-                <a16:creationId xmlns:a16="http://schemas.microsoft.com/office/drawing/2014/main" id="{A3BA382D-FE9E-4017-A20D-6262B60732AF}"/>
-              </a:ext>
-            </a:extLst>
-          </p:cNvPr>
-          <p:cNvSpPr txBox="1"/>
-          <p:nvPr/>
-        </p:nvSpPr>
-        <p:spPr>
-          <a:xfrm>
-            <a:off x="7751469" y="2482302"/>
-            <a:ext cx="538609" cy="369332"/>
-          </a:xfrm>
-          <a:prstGeom prst="rect">
-            <a:avLst/>
-          </a:prstGeom>
-          <a:noFill/>
-        </p:spPr>
-        <p:txBody>
-          <a:bodyPr wrap="none" lIns="0" rIns="0" rtlCol="0">
-            <a:spAutoFit/>
-          </a:bodyPr>
-          <a:lstStyle/>
-          <a:p>
-            <a:pPr>
-              <a:spcAft>
-                <a:spcPts val="1000"/>
-              </a:spcAft>
-              <a:buClr>
-                <a:schemeClr val="tx2"/>
-              </a:buClr>
-              <a:buSzPct val="80000"/>
-            </a:pPr>
-            <a:r>
-              <a:rPr lang="en-GB" b="1" dirty="0">
-                <a:solidFill>
-                  <a:srgbClr val="00B050"/>
-                </a:solidFill>
-              </a:rPr>
-              <a:t>RQ 1</a:t>
-            </a:r>
-            <a:endParaRPr lang="LID4096" b="1" dirty="0" err="1">
-              <a:solidFill>
-                <a:srgbClr val="00B050"/>
-              </a:solidFill>
-            </a:endParaRPr>
-          </a:p>
-        </p:txBody>
-      </p:sp>
     </p:spTree>
     <p:extLst>
       <p:ext uri="{BB962C8B-B14F-4D97-AF65-F5344CB8AC3E}">
-        <p14:creationId xmlns:p14="http://schemas.microsoft.com/office/powerpoint/2010/main" val="3449848190"/>
+        <p14:creationId xmlns:p14="http://schemas.microsoft.com/office/powerpoint/2010/main" val="1144100588"/>
       </p:ext>
     </p:extLst>
   </p:cSld>
@@ -30376,167 +29689,6 @@
           <a:p>
             <a:r>
               <a:rPr lang="de-DE" dirty="0"/>
-              <a:t>Prototype 1</a:t>
-            </a:r>
-          </a:p>
-        </p:txBody>
-      </p:sp>
-      <p:sp>
-        <p:nvSpPr>
-          <p:cNvPr id="3" name="Fußzeilenplatzhalter 2"/>
-          <p:cNvSpPr>
-            <a:spLocks noGrp="1"/>
-          </p:cNvSpPr>
-          <p:nvPr>
-            <p:ph type="ftr" sz="quarter" idx="10"/>
-          </p:nvPr>
-        </p:nvSpPr>
-        <p:spPr/>
-        <p:txBody>
-          <a:bodyPr/>
-          <a:lstStyle/>
-          <a:p>
-            <a:r>
-              <a:rPr lang="de-DE"/>
-              <a:t>Software Engineering</a:t>
-            </a:r>
-            <a:endParaRPr lang="de-DE" dirty="0"/>
-          </a:p>
-        </p:txBody>
-      </p:sp>
-      <p:pic>
-        <p:nvPicPr>
-          <p:cNvPr id="7" name="Picture 6" descr="A screenshot of a cell phone&#10;&#10;Description automatically generated">
-            <a:extLst>
-              <a:ext uri="{FF2B5EF4-FFF2-40B4-BE49-F238E27FC236}">
-                <a16:creationId xmlns:a16="http://schemas.microsoft.com/office/drawing/2014/main" id="{D419A6B9-A463-4E36-AD73-EAB84249ED0F}"/>
-              </a:ext>
-            </a:extLst>
-          </p:cNvPr>
-          <p:cNvPicPr>
-            <a:picLocks noChangeAspect="1"/>
-          </p:cNvPicPr>
-          <p:nvPr/>
-        </p:nvPicPr>
-        <p:blipFill>
-          <a:blip r:embed="rId2">
-            <a:extLst>
-              <a:ext uri="{28A0092B-C50C-407E-A947-70E740481C1C}">
-                <a14:useLocalDpi xmlns:a14="http://schemas.microsoft.com/office/drawing/2010/main" val="0"/>
-              </a:ext>
-            </a:extLst>
-          </a:blip>
-          <a:stretch>
-            <a:fillRect/>
-          </a:stretch>
-        </p:blipFill>
-        <p:spPr>
-          <a:xfrm>
-            <a:off x="833155" y="1994816"/>
-            <a:ext cx="8239125" cy="3933825"/>
-          </a:xfrm>
-          <a:prstGeom prst="rect">
-            <a:avLst/>
-          </a:prstGeom>
-        </p:spPr>
-      </p:pic>
-    </p:spTree>
-    <p:extLst>
-      <p:ext uri="{BB962C8B-B14F-4D97-AF65-F5344CB8AC3E}">
-        <p14:creationId xmlns:p14="http://schemas.microsoft.com/office/powerpoint/2010/main" val="1144100588"/>
-      </p:ext>
-    </p:extLst>
-  </p:cSld>
-  <p:clrMapOvr>
-    <a:masterClrMapping/>
-  </p:clrMapOvr>
-</p:sld>
-</file>
-
-<file path=ppt/slides/slide21.xml><?xml version="1.0" encoding="utf-8"?>
-<p:sld xmlns:a="http://schemas.openxmlformats.org/drawingml/2006/main" xmlns:r="http://schemas.openxmlformats.org/officeDocument/2006/relationships" xmlns:p="http://schemas.openxmlformats.org/presentationml/2006/main">
-  <p:cSld>
-    <p:spTree>
-      <p:nvGrpSpPr>
-        <p:cNvPr id="1" name=""/>
-        <p:cNvGrpSpPr/>
-        <p:nvPr/>
-      </p:nvGrpSpPr>
-      <p:grpSpPr>
-        <a:xfrm>
-          <a:off x="0" y="0"/>
-          <a:ext cx="0" cy="0"/>
-          <a:chOff x="0" y="0"/>
-          <a:chExt cx="0" cy="0"/>
-        </a:xfrm>
-      </p:grpSpPr>
-      <p:sp>
-        <p:nvSpPr>
-          <p:cNvPr id="2" name="Titel 1"/>
-          <p:cNvSpPr>
-            <a:spLocks noGrp="1"/>
-          </p:cNvSpPr>
-          <p:nvPr>
-            <p:ph type="title"/>
-          </p:nvPr>
-        </p:nvSpPr>
-        <p:spPr/>
-        <p:txBody>
-          <a:bodyPr/>
-          <a:lstStyle/>
-          <a:p>
-            <a:r>
-              <a:rPr lang="de-DE" dirty="0">
-                <a:solidFill>
-                  <a:schemeClr val="tx2"/>
-                </a:solidFill>
-              </a:rPr>
-              <a:t>Example: RQ 1</a:t>
-            </a:r>
-          </a:p>
-        </p:txBody>
-      </p:sp>
-      <p:sp>
-        <p:nvSpPr>
-          <p:cNvPr id="4" name="Foliennummernplatzhalter 3"/>
-          <p:cNvSpPr>
-            <a:spLocks noGrp="1"/>
-          </p:cNvSpPr>
-          <p:nvPr>
-            <p:ph type="sldNum" sz="quarter" idx="11"/>
-          </p:nvPr>
-        </p:nvSpPr>
-        <p:spPr/>
-        <p:txBody>
-          <a:bodyPr/>
-          <a:lstStyle/>
-          <a:p>
-            <a:fld id="{815DB69B-0A2B-4D0B-A3BD-360AAA24381D}" type="slidenum">
-              <a:rPr lang="de-DE" smtClean="0"/>
-              <a:pPr/>
-              <a:t>21</a:t>
-            </a:fld>
-            <a:endParaRPr lang="de-DE" dirty="0"/>
-          </a:p>
-        </p:txBody>
-      </p:sp>
-      <p:sp>
-        <p:nvSpPr>
-          <p:cNvPr id="5" name="Textplatzhalter 4"/>
-          <p:cNvSpPr>
-            <a:spLocks noGrp="1"/>
-          </p:cNvSpPr>
-          <p:nvPr>
-            <p:ph type="body" sz="quarter" idx="12"/>
-          </p:nvPr>
-        </p:nvSpPr>
-        <p:spPr/>
-        <p:txBody>
-          <a:bodyPr/>
-          <a:lstStyle/>
-          <a:p>
-            <a:r>
-              <a:rPr lang="de-DE" dirty="0"/>
               <a:t>Prototype 2</a:t>
             </a:r>
           </a:p>
@@ -30614,6 +29766,197 @@
 </p:sld>
 </file>
 
+<file path=ppt/slides/slide21.xml><?xml version="1.0" encoding="utf-8"?>
+<p:sld xmlns:a="http://schemas.openxmlformats.org/drawingml/2006/main" xmlns:r="http://schemas.openxmlformats.org/officeDocument/2006/relationships" xmlns:p="http://schemas.openxmlformats.org/presentationml/2006/main">
+  <p:cSld>
+    <p:spTree>
+      <p:nvGrpSpPr>
+        <p:cNvPr id="1" name=""/>
+        <p:cNvGrpSpPr/>
+        <p:nvPr/>
+      </p:nvGrpSpPr>
+      <p:grpSpPr>
+        <a:xfrm>
+          <a:off x="0" y="0"/>
+          <a:ext cx="0" cy="0"/>
+          <a:chOff x="0" y="0"/>
+          <a:chExt cx="0" cy="0"/>
+        </a:xfrm>
+      </p:grpSpPr>
+      <p:sp>
+        <p:nvSpPr>
+          <p:cNvPr id="2" name="Titel 1"/>
+          <p:cNvSpPr>
+            <a:spLocks noGrp="1"/>
+          </p:cNvSpPr>
+          <p:nvPr>
+            <p:ph type="title"/>
+          </p:nvPr>
+        </p:nvSpPr>
+        <p:spPr/>
+        <p:txBody>
+          <a:bodyPr/>
+          <a:lstStyle/>
+          <a:p>
+            <a:r>
+              <a:rPr lang="de-DE" dirty="0">
+                <a:solidFill>
+                  <a:schemeClr val="tx2"/>
+                </a:solidFill>
+              </a:rPr>
+              <a:t>Evaluation</a:t>
+            </a:r>
+          </a:p>
+        </p:txBody>
+      </p:sp>
+      <p:sp>
+        <p:nvSpPr>
+          <p:cNvPr id="4" name="Foliennummernplatzhalter 3"/>
+          <p:cNvSpPr>
+            <a:spLocks noGrp="1"/>
+          </p:cNvSpPr>
+          <p:nvPr>
+            <p:ph type="sldNum" sz="quarter" idx="11"/>
+          </p:nvPr>
+        </p:nvSpPr>
+        <p:spPr/>
+        <p:txBody>
+          <a:bodyPr/>
+          <a:lstStyle/>
+          <a:p>
+            <a:fld id="{815DB69B-0A2B-4D0B-A3BD-360AAA24381D}" type="slidenum">
+              <a:rPr lang="de-DE" smtClean="0"/>
+              <a:pPr/>
+              <a:t>21</a:t>
+            </a:fld>
+            <a:endParaRPr lang="de-DE" dirty="0"/>
+          </a:p>
+        </p:txBody>
+      </p:sp>
+      <p:sp>
+        <p:nvSpPr>
+          <p:cNvPr id="5" name="Textplatzhalter 4"/>
+          <p:cNvSpPr>
+            <a:spLocks noGrp="1"/>
+          </p:cNvSpPr>
+          <p:nvPr>
+            <p:ph type="body" sz="quarter" idx="12"/>
+          </p:nvPr>
+        </p:nvSpPr>
+        <p:spPr>
+          <a:xfrm>
+            <a:off x="273050" y="1268412"/>
+            <a:ext cx="9361488" cy="5113337"/>
+          </a:xfrm>
+        </p:spPr>
+        <p:txBody>
+          <a:bodyPr/>
+          <a:lstStyle/>
+          <a:p>
+            <a:endParaRPr lang="de-DE" dirty="0"/>
+          </a:p>
+          <a:p>
+            <a:r>
+              <a:rPr lang="de-DE" dirty="0"/>
+              <a:t>Experimental Design</a:t>
+            </a:r>
+          </a:p>
+          <a:p>
+            <a:endParaRPr lang="de-DE" dirty="0"/>
+          </a:p>
+          <a:p>
+            <a:pPr lvl="1">
+              <a:buFont typeface="Wingdings" panose="05000000000000000000" pitchFamily="2" charset="2"/>
+              <a:buChar char="§"/>
+            </a:pPr>
+            <a:r>
+              <a:rPr lang="de-DE" dirty="0"/>
+              <a:t>Recruit Test Users</a:t>
+            </a:r>
+            <a:br>
+              <a:rPr lang="de-DE" dirty="0"/>
+            </a:br>
+            <a:endParaRPr lang="de-DE" dirty="0"/>
+          </a:p>
+          <a:p>
+            <a:pPr lvl="1">
+              <a:buFont typeface="Wingdings" panose="05000000000000000000" pitchFamily="2" charset="2"/>
+              <a:buChar char="§"/>
+            </a:pPr>
+            <a:r>
+              <a:rPr lang="de-DE" dirty="0"/>
+              <a:t>Order of evaluation altered</a:t>
+            </a:r>
+          </a:p>
+          <a:p>
+            <a:pPr lvl="1">
+              <a:buFont typeface="Wingdings" panose="05000000000000000000" pitchFamily="2" charset="2"/>
+              <a:buChar char="§"/>
+            </a:pPr>
+            <a:endParaRPr lang="de-DE" dirty="0"/>
+          </a:p>
+          <a:p>
+            <a:pPr lvl="1">
+              <a:buFont typeface="Wingdings" panose="05000000000000000000" pitchFamily="2" charset="2"/>
+              <a:buChar char="§"/>
+            </a:pPr>
+            <a:r>
+              <a:rPr lang="de-DE" dirty="0"/>
+              <a:t>Perform Tasks</a:t>
+            </a:r>
+            <a:br>
+              <a:rPr lang="de-DE" dirty="0"/>
+            </a:br>
+            <a:endParaRPr lang="de-DE" dirty="0"/>
+          </a:p>
+          <a:p>
+            <a:pPr lvl="2">
+              <a:buFont typeface="Wingdings" panose="05000000000000000000" pitchFamily="2" charset="2"/>
+              <a:buChar char="§"/>
+            </a:pPr>
+            <a:r>
+              <a:rPr lang="de-DE" dirty="0"/>
+              <a:t>Example: Find a bug which is reported in common by available tools.</a:t>
+            </a:r>
+          </a:p>
+        </p:txBody>
+      </p:sp>
+      <p:sp>
+        <p:nvSpPr>
+          <p:cNvPr id="3" name="Fußzeilenplatzhalter 2"/>
+          <p:cNvSpPr>
+            <a:spLocks noGrp="1"/>
+          </p:cNvSpPr>
+          <p:nvPr>
+            <p:ph type="ftr" sz="quarter" idx="10"/>
+          </p:nvPr>
+        </p:nvSpPr>
+        <p:spPr/>
+        <p:txBody>
+          <a:bodyPr/>
+          <a:lstStyle/>
+          <a:p>
+            <a:r>
+              <a:rPr lang="de-DE"/>
+              <a:t>Software Engineering</a:t>
+            </a:r>
+            <a:endParaRPr lang="de-DE" dirty="0"/>
+          </a:p>
+        </p:txBody>
+      </p:sp>
+    </p:spTree>
+    <p:extLst>
+      <p:ext uri="{BB962C8B-B14F-4D97-AF65-F5344CB8AC3E}">
+        <p14:creationId xmlns:p14="http://schemas.microsoft.com/office/powerpoint/2010/main" val="3338934910"/>
+      </p:ext>
+    </p:extLst>
+  </p:cSld>
+  <p:clrMapOvr>
+    <a:masterClrMapping/>
+  </p:clrMapOvr>
+</p:sld>
+</file>
+
 <file path=ppt/slides/slide22.xml><?xml version="1.0" encoding="utf-8"?>
 <p:sld xmlns:a="http://schemas.openxmlformats.org/drawingml/2006/main" xmlns:r="http://schemas.openxmlformats.org/officeDocument/2006/relationships" xmlns:p="http://schemas.openxmlformats.org/presentationml/2006/main">
   <p:cSld>
@@ -30652,7 +29995,7 @@
                   <a:schemeClr val="tx2"/>
                 </a:solidFill>
               </a:rPr>
-              <a:t>Evaluation</a:t>
+              <a:t>Evaluation – Usability Inspection Methods </a:t>
             </a:r>
           </a:p>
         </p:txBody>
@@ -30698,10 +30041,28 @@
           <a:p>
             <a:r>
               <a:rPr lang="de-DE" dirty="0"/>
-              <a:t>Experimental Design</a:t>
+              <a:t>Cognitive Walkthrough</a:t>
             </a:r>
           </a:p>
           <a:p>
+            <a:pPr marL="0" indent="0">
+              <a:buNone/>
+            </a:pPr>
+            <a:endParaRPr lang="de-DE" dirty="0"/>
+          </a:p>
+          <a:p>
+            <a:pPr marL="0" indent="0">
+              <a:buNone/>
+            </a:pPr>
+            <a:r>
+              <a:rPr lang="de-DE" dirty="0"/>
+              <a:t>For each step to a predefined task, the following aspects are analysed.</a:t>
+            </a:r>
+          </a:p>
+          <a:p>
+            <a:pPr marL="0" indent="0">
+              <a:buNone/>
+            </a:pPr>
             <a:endParaRPr lang="de-DE" dirty="0"/>
           </a:p>
           <a:p>
@@ -30710,68 +30071,13 @@
               <a:buChar char="§"/>
             </a:pPr>
             <a:r>
-              <a:rPr lang="de-DE" dirty="0"/>
-              <a:t>Number of Test Users:</a:t>
+              <a:rPr lang="en-GB" dirty="0"/>
+              <a:t>Will the user try and achieve the right outcome?	</a:t>
             </a:r>
             <a:br>
-              <a:rPr lang="de-DE" dirty="0"/>
+              <a:rPr lang="en-GB" dirty="0"/>
             </a:br>
-            <a:endParaRPr lang="de-DE" dirty="0"/>
-          </a:p>
-          <a:p>
-            <a:pPr marL="0" indent="0">
-              <a:buNone/>
-            </a:pPr>
-            <a:br>
-              <a:rPr lang="de-DE" dirty="0"/>
-            </a:br>
-            <a:r>
-              <a:rPr lang="de-DE" dirty="0"/>
-              <a:t>		Dr. Nielsen recommends – </a:t>
-            </a:r>
-            <a:r>
-              <a:rPr lang="de-DE" b="1" dirty="0"/>
-              <a:t>5 </a:t>
-            </a:r>
-          </a:p>
-          <a:p>
-            <a:pPr marL="0" indent="0">
-              <a:buNone/>
-            </a:pPr>
             <a:endParaRPr lang="en-GB" dirty="0"/>
-          </a:p>
-          <a:p>
-            <a:pPr marL="0" indent="0">
-              <a:buNone/>
-            </a:pPr>
-            <a:r>
-              <a:rPr lang="en-GB" dirty="0"/>
-              <a:t>Nielsen, Jakob, and </a:t>
-            </a:r>
-            <a:r>
-              <a:rPr lang="en-GB" dirty="0" err="1"/>
-              <a:t>Landauer</a:t>
-            </a:r>
-            <a:r>
-              <a:rPr lang="en-GB" dirty="0"/>
-              <a:t>, Thomas K.: </a:t>
-            </a:r>
-          </a:p>
-          <a:p>
-            <a:pPr marL="0" indent="0">
-              <a:buNone/>
-            </a:pPr>
-            <a:r>
-              <a:rPr lang="en-GB" dirty="0"/>
-              <a:t>"A mathematical model of the finding of usability problems," </a:t>
-            </a:r>
-            <a:endParaRPr lang="de-DE" dirty="0"/>
-          </a:p>
-          <a:p>
-            <a:pPr marL="0" indent="0">
-              <a:buNone/>
-            </a:pPr>
-            <a:endParaRPr lang="de-DE" dirty="0"/>
           </a:p>
           <a:p>
             <a:pPr>
@@ -30779,25 +30085,38 @@
               <a:buChar char="§"/>
             </a:pPr>
             <a:r>
-              <a:rPr lang="de-DE" dirty="0"/>
-              <a:t>Order of evaluation:</a:t>
+              <a:rPr lang="en-GB" dirty="0"/>
+              <a:t>Will the user notice that the correct action is available to them?</a:t>
             </a:r>
+            <a:br>
+              <a:rPr lang="en-GB" dirty="0"/>
+            </a:br>
+            <a:endParaRPr lang="en-GB" dirty="0"/>
           </a:p>
           <a:p>
             <a:pPr>
               <a:buFont typeface="Wingdings" panose="05000000000000000000" pitchFamily="2" charset="2"/>
               <a:buChar char="§"/>
             </a:pPr>
-            <a:endParaRPr lang="de-DE" dirty="0"/>
-          </a:p>
-          <a:p>
-            <a:pPr marL="0" indent="0">
-              <a:buNone/>
+            <a:r>
+              <a:rPr lang="en-GB" dirty="0"/>
+              <a:t>Will the user associate the correct action with the outcome they expect to achieve?</a:t>
+            </a:r>
+            <a:br>
+              <a:rPr lang="en-GB" dirty="0"/>
+            </a:br>
+            <a:endParaRPr lang="en-GB" dirty="0"/>
+          </a:p>
+          <a:p>
+            <a:pPr>
+              <a:buFont typeface="Wingdings" panose="05000000000000000000" pitchFamily="2" charset="2"/>
+              <a:buChar char="§"/>
             </a:pPr>
             <a:r>
-              <a:rPr lang="de-DE" dirty="0"/>
-              <a:t>		Users tend to learn – order of presenting prototyes is altered</a:t>
+              <a:rPr lang="en-GB" dirty="0"/>
+              <a:t>If the correct action is performed; will the user see that progress is being made towards their intended outcome?</a:t>
             </a:r>
+            <a:endParaRPr lang="de-DE" dirty="0"/>
           </a:p>
         </p:txBody>
       </p:sp>
@@ -30824,46 +30143,10 @@
           </a:p>
         </p:txBody>
       </p:sp>
-      <p:pic>
-        <p:nvPicPr>
-          <p:cNvPr id="7" name="Picture 6" descr="A close up of text on a white background&#10;&#10;Description automatically generated">
-            <a:extLst>
-              <a:ext uri="{FF2B5EF4-FFF2-40B4-BE49-F238E27FC236}">
-                <a16:creationId xmlns:a16="http://schemas.microsoft.com/office/drawing/2014/main" id="{98B653CF-A088-4553-A288-0862278DC9AF}"/>
-              </a:ext>
-            </a:extLst>
-          </p:cNvPr>
-          <p:cNvPicPr>
-            <a:picLocks noChangeAspect="1"/>
-          </p:cNvPicPr>
-          <p:nvPr/>
-        </p:nvPicPr>
-        <p:blipFill>
-          <a:blip r:embed="rId2">
-            <a:extLst>
-              <a:ext uri="{28A0092B-C50C-407E-A947-70E740481C1C}">
-                <a14:useLocalDpi xmlns:a14="http://schemas.microsoft.com/office/drawing/2010/main" val="0"/>
-              </a:ext>
-            </a:extLst>
-          </a:blip>
-          <a:stretch>
-            <a:fillRect/>
-          </a:stretch>
-        </p:blipFill>
-        <p:spPr>
-          <a:xfrm>
-            <a:off x="5097016" y="1916832"/>
-            <a:ext cx="3607375" cy="2155278"/>
-          </a:xfrm>
-          <a:prstGeom prst="rect">
-            <a:avLst/>
-          </a:prstGeom>
-        </p:spPr>
-      </p:pic>
     </p:spTree>
     <p:extLst>
       <p:ext uri="{BB962C8B-B14F-4D97-AF65-F5344CB8AC3E}">
-        <p14:creationId xmlns:p14="http://schemas.microsoft.com/office/powerpoint/2010/main" val="3338934910"/>
+        <p14:creationId xmlns:p14="http://schemas.microsoft.com/office/powerpoint/2010/main" val="2950414662"/>
       </p:ext>
     </p:extLst>
   </p:cSld>
@@ -30935,205 +30218,6 @@
               <a:rPr lang="de-DE" smtClean="0"/>
               <a:pPr/>
               <a:t>23</a:t>
-            </a:fld>
-            <a:endParaRPr lang="de-DE" dirty="0"/>
-          </a:p>
-        </p:txBody>
-      </p:sp>
-      <p:sp>
-        <p:nvSpPr>
-          <p:cNvPr id="5" name="Textplatzhalter 4"/>
-          <p:cNvSpPr>
-            <a:spLocks noGrp="1"/>
-          </p:cNvSpPr>
-          <p:nvPr>
-            <p:ph type="body" sz="quarter" idx="12"/>
-          </p:nvPr>
-        </p:nvSpPr>
-        <p:spPr/>
-        <p:txBody>
-          <a:bodyPr/>
-          <a:lstStyle/>
-          <a:p>
-            <a:r>
-              <a:rPr lang="de-DE" dirty="0"/>
-              <a:t>Cognitive Walkthrough</a:t>
-            </a:r>
-          </a:p>
-          <a:p>
-            <a:pPr marL="0" indent="0">
-              <a:buNone/>
-            </a:pPr>
-            <a:endParaRPr lang="de-DE" dirty="0"/>
-          </a:p>
-          <a:p>
-            <a:pPr marL="0" indent="0">
-              <a:buNone/>
-            </a:pPr>
-            <a:r>
-              <a:rPr lang="de-DE" dirty="0"/>
-              <a:t>For each step to a predefined task, the following aspects are analysed.</a:t>
-            </a:r>
-          </a:p>
-          <a:p>
-            <a:pPr marL="0" indent="0">
-              <a:buNone/>
-            </a:pPr>
-            <a:endParaRPr lang="de-DE" dirty="0"/>
-          </a:p>
-          <a:p>
-            <a:pPr>
-              <a:buFont typeface="Wingdings" panose="05000000000000000000" pitchFamily="2" charset="2"/>
-              <a:buChar char="§"/>
-            </a:pPr>
-            <a:r>
-              <a:rPr lang="en-GB" dirty="0"/>
-              <a:t>Will the user try and achieve the right outcome?	</a:t>
-            </a:r>
-            <a:br>
-              <a:rPr lang="en-GB" dirty="0"/>
-            </a:br>
-            <a:endParaRPr lang="en-GB" dirty="0"/>
-          </a:p>
-          <a:p>
-            <a:pPr>
-              <a:buFont typeface="Wingdings" panose="05000000000000000000" pitchFamily="2" charset="2"/>
-              <a:buChar char="§"/>
-            </a:pPr>
-            <a:r>
-              <a:rPr lang="en-GB" dirty="0"/>
-              <a:t>Will the user notice that the correct action is available to them?</a:t>
-            </a:r>
-            <a:br>
-              <a:rPr lang="en-GB" dirty="0"/>
-            </a:br>
-            <a:endParaRPr lang="en-GB" dirty="0"/>
-          </a:p>
-          <a:p>
-            <a:pPr>
-              <a:buFont typeface="Wingdings" panose="05000000000000000000" pitchFamily="2" charset="2"/>
-              <a:buChar char="§"/>
-            </a:pPr>
-            <a:r>
-              <a:rPr lang="en-GB" dirty="0"/>
-              <a:t>Will the user associate the correct action with the outcome they expect to achieve?</a:t>
-            </a:r>
-            <a:br>
-              <a:rPr lang="en-GB" dirty="0"/>
-            </a:br>
-            <a:endParaRPr lang="en-GB" dirty="0"/>
-          </a:p>
-          <a:p>
-            <a:pPr>
-              <a:buFont typeface="Wingdings" panose="05000000000000000000" pitchFamily="2" charset="2"/>
-              <a:buChar char="§"/>
-            </a:pPr>
-            <a:r>
-              <a:rPr lang="en-GB" dirty="0"/>
-              <a:t>If the correct action is performed; will the user see that progress is being made towards their intended outcome?</a:t>
-            </a:r>
-            <a:endParaRPr lang="de-DE" dirty="0"/>
-          </a:p>
-        </p:txBody>
-      </p:sp>
-      <p:sp>
-        <p:nvSpPr>
-          <p:cNvPr id="3" name="Fußzeilenplatzhalter 2"/>
-          <p:cNvSpPr>
-            <a:spLocks noGrp="1"/>
-          </p:cNvSpPr>
-          <p:nvPr>
-            <p:ph type="ftr" sz="quarter" idx="10"/>
-          </p:nvPr>
-        </p:nvSpPr>
-        <p:spPr/>
-        <p:txBody>
-          <a:bodyPr/>
-          <a:lstStyle/>
-          <a:p>
-            <a:r>
-              <a:rPr lang="de-DE"/>
-              <a:t>Software Engineering</a:t>
-            </a:r>
-            <a:endParaRPr lang="de-DE" dirty="0"/>
-          </a:p>
-        </p:txBody>
-      </p:sp>
-    </p:spTree>
-    <p:extLst>
-      <p:ext uri="{BB962C8B-B14F-4D97-AF65-F5344CB8AC3E}">
-        <p14:creationId xmlns:p14="http://schemas.microsoft.com/office/powerpoint/2010/main" val="2950414662"/>
-      </p:ext>
-    </p:extLst>
-  </p:cSld>
-  <p:clrMapOvr>
-    <a:masterClrMapping/>
-  </p:clrMapOvr>
-</p:sld>
-</file>
-
-<file path=ppt/slides/slide24.xml><?xml version="1.0" encoding="utf-8"?>
-<p:sld xmlns:a="http://schemas.openxmlformats.org/drawingml/2006/main" xmlns:r="http://schemas.openxmlformats.org/officeDocument/2006/relationships" xmlns:p="http://schemas.openxmlformats.org/presentationml/2006/main">
-  <p:cSld>
-    <p:spTree>
-      <p:nvGrpSpPr>
-        <p:cNvPr id="1" name=""/>
-        <p:cNvGrpSpPr/>
-        <p:nvPr/>
-      </p:nvGrpSpPr>
-      <p:grpSpPr>
-        <a:xfrm>
-          <a:off x="0" y="0"/>
-          <a:ext cx="0" cy="0"/>
-          <a:chOff x="0" y="0"/>
-          <a:chExt cx="0" cy="0"/>
-        </a:xfrm>
-      </p:grpSpPr>
-      <p:sp>
-        <p:nvSpPr>
-          <p:cNvPr id="2" name="Titel 1"/>
-          <p:cNvSpPr>
-            <a:spLocks noGrp="1"/>
-          </p:cNvSpPr>
-          <p:nvPr>
-            <p:ph type="title"/>
-          </p:nvPr>
-        </p:nvSpPr>
-        <p:spPr/>
-        <p:txBody>
-          <a:bodyPr/>
-          <a:lstStyle/>
-          <a:p>
-            <a:r>
-              <a:rPr lang="de-DE" dirty="0">
-                <a:solidFill>
-                  <a:schemeClr val="tx2"/>
-                </a:solidFill>
-              </a:rPr>
-              <a:t>Evaluation – Usability Inspection Methods </a:t>
-            </a:r>
-          </a:p>
-        </p:txBody>
-      </p:sp>
-      <p:sp>
-        <p:nvSpPr>
-          <p:cNvPr id="4" name="Foliennummernplatzhalter 3"/>
-          <p:cNvSpPr>
-            <a:spLocks noGrp="1"/>
-          </p:cNvSpPr>
-          <p:nvPr>
-            <p:ph type="sldNum" sz="quarter" idx="11"/>
-          </p:nvPr>
-        </p:nvSpPr>
-        <p:spPr/>
-        <p:txBody>
-          <a:bodyPr/>
-          <a:lstStyle/>
-          <a:p>
-            <a:fld id="{815DB69B-0A2B-4D0B-A3BD-360AAA24381D}" type="slidenum">
-              <a:rPr lang="de-DE" smtClean="0"/>
-              <a:pPr/>
-              <a:t>24</a:t>
             </a:fld>
             <a:endParaRPr lang="de-DE" dirty="0"/>
           </a:p>
@@ -31233,6 +30317,274 @@
 </p:sld>
 </file>
 
+<file path=ppt/slides/slide24.xml><?xml version="1.0" encoding="utf-8"?>
+<p:sld xmlns:a="http://schemas.openxmlformats.org/drawingml/2006/main" xmlns:r="http://schemas.openxmlformats.org/officeDocument/2006/relationships" xmlns:p="http://schemas.openxmlformats.org/presentationml/2006/main">
+  <p:cSld>
+    <p:spTree>
+      <p:nvGrpSpPr>
+        <p:cNvPr id="1" name=""/>
+        <p:cNvGrpSpPr/>
+        <p:nvPr/>
+      </p:nvGrpSpPr>
+      <p:grpSpPr>
+        <a:xfrm>
+          <a:off x="0" y="0"/>
+          <a:ext cx="0" cy="0"/>
+          <a:chOff x="0" y="0"/>
+          <a:chExt cx="0" cy="0"/>
+        </a:xfrm>
+      </p:grpSpPr>
+      <p:sp>
+        <p:nvSpPr>
+          <p:cNvPr id="2" name="Titel 1"/>
+          <p:cNvSpPr>
+            <a:spLocks noGrp="1"/>
+          </p:cNvSpPr>
+          <p:nvPr>
+            <p:ph type="title"/>
+          </p:nvPr>
+        </p:nvSpPr>
+        <p:spPr/>
+        <p:txBody>
+          <a:bodyPr/>
+          <a:lstStyle/>
+          <a:p>
+            <a:r>
+              <a:rPr lang="de-DE" dirty="0">
+                <a:solidFill>
+                  <a:schemeClr val="tx2"/>
+                </a:solidFill>
+              </a:rPr>
+              <a:t>Evaluation – Usability Inspection Methods </a:t>
+            </a:r>
+          </a:p>
+        </p:txBody>
+      </p:sp>
+      <p:sp>
+        <p:nvSpPr>
+          <p:cNvPr id="4" name="Foliennummernplatzhalter 3"/>
+          <p:cNvSpPr>
+            <a:spLocks noGrp="1"/>
+          </p:cNvSpPr>
+          <p:nvPr>
+            <p:ph type="sldNum" sz="quarter" idx="11"/>
+          </p:nvPr>
+        </p:nvSpPr>
+        <p:spPr/>
+        <p:txBody>
+          <a:bodyPr/>
+          <a:lstStyle/>
+          <a:p>
+            <a:fld id="{815DB69B-0A2B-4D0B-A3BD-360AAA24381D}" type="slidenum">
+              <a:rPr lang="de-DE" smtClean="0"/>
+              <a:pPr/>
+              <a:t>24</a:t>
+            </a:fld>
+            <a:endParaRPr lang="de-DE" dirty="0"/>
+          </a:p>
+        </p:txBody>
+      </p:sp>
+      <p:sp>
+        <p:nvSpPr>
+          <p:cNvPr id="5" name="Textplatzhalter 4"/>
+          <p:cNvSpPr>
+            <a:spLocks noGrp="1"/>
+          </p:cNvSpPr>
+          <p:nvPr>
+            <p:ph type="body" sz="quarter" idx="12"/>
+          </p:nvPr>
+        </p:nvSpPr>
+        <p:spPr/>
+        <p:txBody>
+          <a:bodyPr/>
+          <a:lstStyle/>
+          <a:p>
+            <a:r>
+              <a:rPr lang="de-DE" dirty="0"/>
+              <a:t>Heuristic Evaluation</a:t>
+            </a:r>
+          </a:p>
+          <a:p>
+            <a:endParaRPr lang="de-DE" dirty="0"/>
+          </a:p>
+          <a:p>
+            <a:pPr marL="0" indent="0">
+              <a:buNone/>
+            </a:pPr>
+            <a:endParaRPr lang="de-DE" dirty="0"/>
+          </a:p>
+          <a:p>
+            <a:pPr marL="0" indent="0">
+              <a:buNone/>
+            </a:pPr>
+            <a:r>
+              <a:rPr lang="de-DE" dirty="0"/>
+              <a:t>Each problem w.r.t. a heuristic is rated accordingly; 0 – 4</a:t>
+            </a:r>
+          </a:p>
+          <a:p>
+            <a:pPr marL="0" indent="0">
+              <a:buNone/>
+            </a:pPr>
+            <a:endParaRPr lang="de-DE" dirty="0"/>
+          </a:p>
+          <a:p>
+            <a:pPr marL="0" indent="0">
+              <a:buNone/>
+            </a:pPr>
+            <a:r>
+              <a:rPr lang="en-GB" b="1" dirty="0"/>
+              <a:t>0</a:t>
+            </a:r>
+            <a:r>
+              <a:rPr lang="en-GB" dirty="0"/>
+              <a:t> - do not agree this is a usability problem </a:t>
+            </a:r>
+          </a:p>
+          <a:p>
+            <a:pPr marL="0" indent="0">
+              <a:buNone/>
+            </a:pPr>
+            <a:r>
+              <a:rPr lang="en-GB" b="1" dirty="0"/>
+              <a:t>1</a:t>
+            </a:r>
+            <a:r>
+              <a:rPr lang="en-GB" dirty="0"/>
+              <a:t> - cosmetic problem</a:t>
+            </a:r>
+          </a:p>
+          <a:p>
+            <a:pPr marL="0" indent="0">
+              <a:buNone/>
+            </a:pPr>
+            <a:r>
+              <a:rPr lang="en-GB" b="1" dirty="0"/>
+              <a:t>2</a:t>
+            </a:r>
+            <a:r>
+              <a:rPr lang="en-GB" dirty="0"/>
+              <a:t> - minor usability problem</a:t>
+            </a:r>
+          </a:p>
+          <a:p>
+            <a:pPr marL="0" indent="0">
+              <a:buNone/>
+            </a:pPr>
+            <a:r>
+              <a:rPr lang="en-GB" b="1" dirty="0"/>
+              <a:t>3</a:t>
+            </a:r>
+            <a:r>
+              <a:rPr lang="en-GB" dirty="0"/>
+              <a:t> - major usability problem ( important to fix ) </a:t>
+            </a:r>
+          </a:p>
+          <a:p>
+            <a:pPr marL="0" indent="0">
+              <a:buNone/>
+            </a:pPr>
+            <a:r>
+              <a:rPr lang="en-GB" b="1" dirty="0"/>
+              <a:t>4</a:t>
+            </a:r>
+            <a:r>
+              <a:rPr lang="en-GB" dirty="0"/>
+              <a:t> - usability catastrophe ( imperative to fix )</a:t>
+            </a:r>
+            <a:endParaRPr lang="de-DE" dirty="0"/>
+          </a:p>
+        </p:txBody>
+      </p:sp>
+      <p:sp>
+        <p:nvSpPr>
+          <p:cNvPr id="3" name="Fußzeilenplatzhalter 2"/>
+          <p:cNvSpPr>
+            <a:spLocks noGrp="1"/>
+          </p:cNvSpPr>
+          <p:nvPr>
+            <p:ph type="ftr" sz="quarter" idx="10"/>
+          </p:nvPr>
+        </p:nvSpPr>
+        <p:spPr/>
+        <p:txBody>
+          <a:bodyPr/>
+          <a:lstStyle/>
+          <a:p>
+            <a:r>
+              <a:rPr lang="de-DE"/>
+              <a:t>Software Engineering</a:t>
+            </a:r>
+            <a:endParaRPr lang="de-DE" dirty="0"/>
+          </a:p>
+        </p:txBody>
+      </p:sp>
+      <p:sp>
+        <p:nvSpPr>
+          <p:cNvPr id="6" name="TextBox 5">
+            <a:extLst>
+              <a:ext uri="{FF2B5EF4-FFF2-40B4-BE49-F238E27FC236}">
+                <a16:creationId xmlns:a16="http://schemas.microsoft.com/office/drawing/2014/main" id="{2BF7B2BA-669C-40D9-9469-E11D62866F00}"/>
+              </a:ext>
+            </a:extLst>
+          </p:cNvPr>
+          <p:cNvSpPr txBox="1"/>
+          <p:nvPr/>
+        </p:nvSpPr>
+        <p:spPr>
+          <a:xfrm rot="20466419">
+            <a:off x="5675400" y="5062213"/>
+            <a:ext cx="3058530" cy="523220"/>
+          </a:xfrm>
+          <a:prstGeom prst="rect">
+            <a:avLst/>
+          </a:prstGeom>
+          <a:noFill/>
+        </p:spPr>
+        <p:txBody>
+          <a:bodyPr wrap="none" lIns="0" rIns="0" rtlCol="0">
+            <a:spAutoFit/>
+          </a:bodyPr>
+          <a:lstStyle/>
+          <a:p>
+            <a:pPr>
+              <a:spcAft>
+                <a:spcPts val="1000"/>
+              </a:spcAft>
+              <a:buClr>
+                <a:schemeClr val="tx2"/>
+              </a:buClr>
+              <a:buSzPct val="80000"/>
+            </a:pPr>
+            <a:r>
+              <a:rPr lang="en-GB" sz="2800" dirty="0">
+                <a:solidFill>
+                  <a:srgbClr val="00B050"/>
+                </a:solidFill>
+              </a:rPr>
+              <a:t>Comparative Study</a:t>
+            </a:r>
+            <a:endParaRPr lang="LID4096" sz="2800" dirty="0" err="1">
+              <a:solidFill>
+                <a:srgbClr val="00B050"/>
+              </a:solidFill>
+            </a:endParaRPr>
+          </a:p>
+        </p:txBody>
+      </p:sp>
+    </p:spTree>
+    <p:extLst>
+      <p:ext uri="{BB962C8B-B14F-4D97-AF65-F5344CB8AC3E}">
+        <p14:creationId xmlns:p14="http://schemas.microsoft.com/office/powerpoint/2010/main" val="3297951378"/>
+      </p:ext>
+    </p:extLst>
+  </p:cSld>
+  <p:clrMapOvr>
+    <a:masterClrMapping/>
+  </p:clrMapOvr>
+</p:sld>
+</file>
+
 <file path=ppt/slides/slide25.xml><?xml version="1.0" encoding="utf-8"?>
 <p:sld xmlns:a="http://schemas.openxmlformats.org/drawingml/2006/main" xmlns:r="http://schemas.openxmlformats.org/officeDocument/2006/relationships" xmlns:p="http://schemas.openxmlformats.org/presentationml/2006/main">
   <p:cSld>
@@ -31271,7 +30623,7 @@
                   <a:schemeClr val="tx2"/>
                 </a:solidFill>
               </a:rPr>
-              <a:t>Evaluation – Usability Inspection Methods </a:t>
+              <a:t>Time Plan</a:t>
             </a:r>
           </a:p>
         </p:txBody>
@@ -31295,274 +30647,6 @@
               <a:rPr lang="de-DE" smtClean="0"/>
               <a:pPr/>
               <a:t>25</a:t>
-            </a:fld>
-            <a:endParaRPr lang="de-DE" dirty="0"/>
-          </a:p>
-        </p:txBody>
-      </p:sp>
-      <p:sp>
-        <p:nvSpPr>
-          <p:cNvPr id="5" name="Textplatzhalter 4"/>
-          <p:cNvSpPr>
-            <a:spLocks noGrp="1"/>
-          </p:cNvSpPr>
-          <p:nvPr>
-            <p:ph type="body" sz="quarter" idx="12"/>
-          </p:nvPr>
-        </p:nvSpPr>
-        <p:spPr/>
-        <p:txBody>
-          <a:bodyPr/>
-          <a:lstStyle/>
-          <a:p>
-            <a:r>
-              <a:rPr lang="de-DE" dirty="0"/>
-              <a:t>Heuristic Evaluation</a:t>
-            </a:r>
-          </a:p>
-          <a:p>
-            <a:endParaRPr lang="de-DE" dirty="0"/>
-          </a:p>
-          <a:p>
-            <a:pPr marL="0" indent="0">
-              <a:buNone/>
-            </a:pPr>
-            <a:endParaRPr lang="de-DE" dirty="0"/>
-          </a:p>
-          <a:p>
-            <a:pPr marL="0" indent="0">
-              <a:buNone/>
-            </a:pPr>
-            <a:r>
-              <a:rPr lang="de-DE" dirty="0"/>
-              <a:t>Each problem w.r.t. a heuristic is rated accordingly; 0 – 4</a:t>
-            </a:r>
-          </a:p>
-          <a:p>
-            <a:pPr marL="0" indent="0">
-              <a:buNone/>
-            </a:pPr>
-            <a:endParaRPr lang="de-DE" dirty="0"/>
-          </a:p>
-          <a:p>
-            <a:pPr marL="0" indent="0">
-              <a:buNone/>
-            </a:pPr>
-            <a:r>
-              <a:rPr lang="en-GB" b="1" dirty="0"/>
-              <a:t>0</a:t>
-            </a:r>
-            <a:r>
-              <a:rPr lang="en-GB" dirty="0"/>
-              <a:t> - do not agree this is a usability problem </a:t>
-            </a:r>
-          </a:p>
-          <a:p>
-            <a:pPr marL="0" indent="0">
-              <a:buNone/>
-            </a:pPr>
-            <a:r>
-              <a:rPr lang="en-GB" b="1" dirty="0"/>
-              <a:t>1</a:t>
-            </a:r>
-            <a:r>
-              <a:rPr lang="en-GB" dirty="0"/>
-              <a:t> - cosmetic problem</a:t>
-            </a:r>
-          </a:p>
-          <a:p>
-            <a:pPr marL="0" indent="0">
-              <a:buNone/>
-            </a:pPr>
-            <a:r>
-              <a:rPr lang="en-GB" b="1" dirty="0"/>
-              <a:t>2</a:t>
-            </a:r>
-            <a:r>
-              <a:rPr lang="en-GB" dirty="0"/>
-              <a:t> - minor usability problem</a:t>
-            </a:r>
-          </a:p>
-          <a:p>
-            <a:pPr marL="0" indent="0">
-              <a:buNone/>
-            </a:pPr>
-            <a:r>
-              <a:rPr lang="en-GB" b="1" dirty="0"/>
-              <a:t>3</a:t>
-            </a:r>
-            <a:r>
-              <a:rPr lang="en-GB" dirty="0"/>
-              <a:t> - major usability problem ( important to fix ) </a:t>
-            </a:r>
-          </a:p>
-          <a:p>
-            <a:pPr marL="0" indent="0">
-              <a:buNone/>
-            </a:pPr>
-            <a:r>
-              <a:rPr lang="en-GB" b="1" dirty="0"/>
-              <a:t>4</a:t>
-            </a:r>
-            <a:r>
-              <a:rPr lang="en-GB" dirty="0"/>
-              <a:t> - usability catastrophe ( imperative to fix )</a:t>
-            </a:r>
-            <a:endParaRPr lang="de-DE" dirty="0"/>
-          </a:p>
-        </p:txBody>
-      </p:sp>
-      <p:sp>
-        <p:nvSpPr>
-          <p:cNvPr id="3" name="Fußzeilenplatzhalter 2"/>
-          <p:cNvSpPr>
-            <a:spLocks noGrp="1"/>
-          </p:cNvSpPr>
-          <p:nvPr>
-            <p:ph type="ftr" sz="quarter" idx="10"/>
-          </p:nvPr>
-        </p:nvSpPr>
-        <p:spPr/>
-        <p:txBody>
-          <a:bodyPr/>
-          <a:lstStyle/>
-          <a:p>
-            <a:r>
-              <a:rPr lang="de-DE"/>
-              <a:t>Software Engineering</a:t>
-            </a:r>
-            <a:endParaRPr lang="de-DE" dirty="0"/>
-          </a:p>
-        </p:txBody>
-      </p:sp>
-      <p:sp>
-        <p:nvSpPr>
-          <p:cNvPr id="6" name="TextBox 5">
-            <a:extLst>
-              <a:ext uri="{FF2B5EF4-FFF2-40B4-BE49-F238E27FC236}">
-                <a16:creationId xmlns:a16="http://schemas.microsoft.com/office/drawing/2014/main" id="{2BF7B2BA-669C-40D9-9469-E11D62866F00}"/>
-              </a:ext>
-            </a:extLst>
-          </p:cNvPr>
-          <p:cNvSpPr txBox="1"/>
-          <p:nvPr/>
-        </p:nvSpPr>
-        <p:spPr>
-          <a:xfrm rot="20466419">
-            <a:off x="5675400" y="5062213"/>
-            <a:ext cx="3058530" cy="523220"/>
-          </a:xfrm>
-          <a:prstGeom prst="rect">
-            <a:avLst/>
-          </a:prstGeom>
-          <a:noFill/>
-        </p:spPr>
-        <p:txBody>
-          <a:bodyPr wrap="none" lIns="0" rIns="0" rtlCol="0">
-            <a:spAutoFit/>
-          </a:bodyPr>
-          <a:lstStyle/>
-          <a:p>
-            <a:pPr>
-              <a:spcAft>
-                <a:spcPts val="1000"/>
-              </a:spcAft>
-              <a:buClr>
-                <a:schemeClr val="tx2"/>
-              </a:buClr>
-              <a:buSzPct val="80000"/>
-            </a:pPr>
-            <a:r>
-              <a:rPr lang="en-GB" sz="2800" dirty="0">
-                <a:solidFill>
-                  <a:srgbClr val="00B050"/>
-                </a:solidFill>
-              </a:rPr>
-              <a:t>Comparative Study</a:t>
-            </a:r>
-            <a:endParaRPr lang="LID4096" sz="2800" dirty="0" err="1">
-              <a:solidFill>
-                <a:srgbClr val="00B050"/>
-              </a:solidFill>
-            </a:endParaRPr>
-          </a:p>
-        </p:txBody>
-      </p:sp>
-    </p:spTree>
-    <p:extLst>
-      <p:ext uri="{BB962C8B-B14F-4D97-AF65-F5344CB8AC3E}">
-        <p14:creationId xmlns:p14="http://schemas.microsoft.com/office/powerpoint/2010/main" val="3297951378"/>
-      </p:ext>
-    </p:extLst>
-  </p:cSld>
-  <p:clrMapOvr>
-    <a:masterClrMapping/>
-  </p:clrMapOvr>
-</p:sld>
-</file>
-
-<file path=ppt/slides/slide26.xml><?xml version="1.0" encoding="utf-8"?>
-<p:sld xmlns:a="http://schemas.openxmlformats.org/drawingml/2006/main" xmlns:r="http://schemas.openxmlformats.org/officeDocument/2006/relationships" xmlns:p="http://schemas.openxmlformats.org/presentationml/2006/main">
-  <p:cSld>
-    <p:spTree>
-      <p:nvGrpSpPr>
-        <p:cNvPr id="1" name=""/>
-        <p:cNvGrpSpPr/>
-        <p:nvPr/>
-      </p:nvGrpSpPr>
-      <p:grpSpPr>
-        <a:xfrm>
-          <a:off x="0" y="0"/>
-          <a:ext cx="0" cy="0"/>
-          <a:chOff x="0" y="0"/>
-          <a:chExt cx="0" cy="0"/>
-        </a:xfrm>
-      </p:grpSpPr>
-      <p:sp>
-        <p:nvSpPr>
-          <p:cNvPr id="2" name="Titel 1"/>
-          <p:cNvSpPr>
-            <a:spLocks noGrp="1"/>
-          </p:cNvSpPr>
-          <p:nvPr>
-            <p:ph type="title"/>
-          </p:nvPr>
-        </p:nvSpPr>
-        <p:spPr/>
-        <p:txBody>
-          <a:bodyPr/>
-          <a:lstStyle/>
-          <a:p>
-            <a:r>
-              <a:rPr lang="de-DE" dirty="0">
-                <a:solidFill>
-                  <a:schemeClr val="tx2"/>
-                </a:solidFill>
-              </a:rPr>
-              <a:t>Time Plan</a:t>
-            </a:r>
-          </a:p>
-        </p:txBody>
-      </p:sp>
-      <p:sp>
-        <p:nvSpPr>
-          <p:cNvPr id="4" name="Foliennummernplatzhalter 3"/>
-          <p:cNvSpPr>
-            <a:spLocks noGrp="1"/>
-          </p:cNvSpPr>
-          <p:nvPr>
-            <p:ph type="sldNum" sz="quarter" idx="11"/>
-          </p:nvPr>
-        </p:nvSpPr>
-        <p:spPr/>
-        <p:txBody>
-          <a:bodyPr/>
-          <a:lstStyle/>
-          <a:p>
-            <a:fld id="{815DB69B-0A2B-4D0B-A3BD-360AAA24381D}" type="slidenum">
-              <a:rPr lang="de-DE" smtClean="0"/>
-              <a:pPr/>
-              <a:t>26</a:t>
             </a:fld>
             <a:endParaRPr lang="de-DE" dirty="0"/>
           </a:p>
@@ -31692,7 +30776,7 @@
 </p:sld>
 </file>
 
-<file path=ppt/slides/slide27.xml><?xml version="1.0" encoding="utf-8"?>
+<file path=ppt/slides/slide26.xml><?xml version="1.0" encoding="utf-8"?>
 <p:sld xmlns:a="http://schemas.openxmlformats.org/drawingml/2006/main" xmlns:r="http://schemas.openxmlformats.org/officeDocument/2006/relationships" xmlns:p="http://schemas.openxmlformats.org/presentationml/2006/main">
   <p:cSld>
     <p:spTree>
@@ -31789,7 +30873,7 @@
             <a:fld id="{815DB69B-0A2B-4D0B-A3BD-360AAA24381D}" type="slidenum">
               <a:rPr lang="de-DE" smtClean="0"/>
               <a:pPr/>
-              <a:t>27</a:t>
+              <a:t>26</a:t>
             </a:fld>
             <a:endParaRPr lang="de-DE" dirty="0"/>
           </a:p>
@@ -31865,7 +30949,7 @@
 </p:sld>
 </file>
 
-<file path=ppt/slides/slide28.xml><?xml version="1.0" encoding="utf-8"?>
+<file path=ppt/slides/slide27.xml><?xml version="1.0" encoding="utf-8"?>
 <p:sld xmlns:a="http://schemas.openxmlformats.org/drawingml/2006/main" xmlns:r="http://schemas.openxmlformats.org/officeDocument/2006/relationships" xmlns:p="http://schemas.openxmlformats.org/presentationml/2006/main">
   <p:cSld>
     <p:spTree>
@@ -31926,27 +31010,8 @@
             <a:fld id="{815DB69B-0A2B-4D0B-A3BD-360AAA24381D}" type="slidenum">
               <a:rPr lang="de-DE" smtClean="0"/>
               <a:pPr/>
-              <a:t>28</a:t>
+              <a:t>27</a:t>
             </a:fld>
-            <a:endParaRPr lang="de-DE" dirty="0"/>
-          </a:p>
-        </p:txBody>
-      </p:sp>
-      <p:sp>
-        <p:nvSpPr>
-          <p:cNvPr id="5" name="Textplatzhalter 4"/>
-          <p:cNvSpPr>
-            <a:spLocks noGrp="1"/>
-          </p:cNvSpPr>
-          <p:nvPr>
-            <p:ph type="body" sz="quarter" idx="12"/>
-          </p:nvPr>
-        </p:nvSpPr>
-        <p:spPr/>
-        <p:txBody>
-          <a:bodyPr/>
-          <a:lstStyle/>
-          <a:p>
             <a:endParaRPr lang="de-DE" dirty="0"/>
           </a:p>
         </p:txBody>
@@ -32023,7 +31088,7 @@
 </p:sld>
 </file>
 
-<file path=ppt/slides/slide29.xml><?xml version="1.0" encoding="utf-8"?>
+<file path=ppt/slides/slide28.xml><?xml version="1.0" encoding="utf-8"?>
 <p:sld xmlns:a="http://schemas.openxmlformats.org/drawingml/2006/main" xmlns:r="http://schemas.openxmlformats.org/officeDocument/2006/relationships" xmlns:p="http://schemas.openxmlformats.org/presentationml/2006/main">
   <p:cSld>
     <p:spTree>
@@ -32084,7 +31149,7 @@
             <a:fld id="{815DB69B-0A2B-4D0B-A3BD-360AAA24381D}" type="slidenum">
               <a:rPr lang="de-DE" smtClean="0"/>
               <a:pPr/>
-              <a:t>29</a:t>
+              <a:t>28</a:t>
             </a:fld>
             <a:endParaRPr lang="de-DE" dirty="0"/>
           </a:p>
@@ -32117,12 +31182,9 @@
             </a:r>
           </a:p>
           <a:p>
-            <a:r>
-              <a:rPr lang="de-DE" dirty="0"/>
-              <a:t>Future scope of SARIF</a:t>
-            </a:r>
-          </a:p>
-          <a:p>
+            <a:pPr marL="0" indent="0">
+              <a:buNone/>
+            </a:pPr>
             <a:endParaRPr lang="de-DE" dirty="0"/>
           </a:p>
           <a:p>
@@ -32132,19 +31194,128 @@
             </a:r>
           </a:p>
           <a:p>
+            <a:endParaRPr lang="de-DE" dirty="0"/>
+          </a:p>
+          <a:p>
             <a:r>
               <a:rPr lang="de-DE" dirty="0"/>
-              <a:t>It should be Usable</a:t>
+              <a:t>This Thesis work follows UX Design Cycle to achieve usable prototypes focussing on research questions such as, </a:t>
             </a:r>
-          </a:p>
-          <a:p>
+            <a:r>
+              <a:rPr lang="en-GB" dirty="0"/>
+              <a:t> </a:t>
+            </a:r>
+          </a:p>
+          <a:p>
+            <a:pPr marL="0" indent="0">
+              <a:buNone/>
+            </a:pPr>
+            <a:endParaRPr lang="en-GB" dirty="0"/>
+          </a:p>
+          <a:p>
+            <a:pPr lvl="1">
+              <a:buFont typeface="Wingdings" panose="05000000000000000000" pitchFamily="2" charset="2"/>
+              <a:buChar char="§"/>
+            </a:pPr>
+            <a:r>
+              <a:rPr lang="en-GB" dirty="0"/>
+              <a:t>How to display results of the same codebase from different analysis tools?</a:t>
+            </a:r>
+          </a:p>
+          <a:p>
+            <a:pPr lvl="1">
+              <a:lnSpc>
+                <a:spcPct val="150000"/>
+              </a:lnSpc>
+              <a:buFont typeface="Wingdings" panose="05000000000000000000" pitchFamily="2" charset="2"/>
+              <a:buChar char="§"/>
+            </a:pPr>
+            <a:r>
+              <a:rPr lang="en-GB" dirty="0"/>
+              <a:t>What feedback works to know that the bug fixing is on-going?</a:t>
+            </a:r>
+          </a:p>
+          <a:p>
+            <a:pPr lvl="1">
+              <a:lnSpc>
+                <a:spcPct val="150000"/>
+              </a:lnSpc>
+              <a:buFont typeface="Wingdings" panose="05000000000000000000" pitchFamily="2" charset="2"/>
+              <a:buChar char="§"/>
+            </a:pPr>
+            <a:r>
+              <a:rPr lang="en-GB" dirty="0"/>
+              <a:t>How to carry traceability of bug fixing? </a:t>
+            </a:r>
             <a:endParaRPr lang="de-DE" dirty="0"/>
           </a:p>
           <a:p>
+            <a:pPr marL="0" indent="0">
+              <a:lnSpc>
+                <a:spcPct val="150000"/>
+              </a:lnSpc>
+              <a:buNone/>
+            </a:pPr>
+            <a:endParaRPr lang="en-GB" dirty="0"/>
+          </a:p>
+          <a:p>
+            <a:pPr marL="0" indent="0" algn="r">
+              <a:lnSpc>
+                <a:spcPct val="150000"/>
+              </a:lnSpc>
+              <a:buNone/>
+            </a:pPr>
+            <a:endParaRPr lang="en-GB" dirty="0"/>
+          </a:p>
+          <a:p>
+            <a:pPr marL="0" indent="0" algn="r">
+              <a:lnSpc>
+                <a:spcPct val="150000"/>
+              </a:lnSpc>
+              <a:buNone/>
+            </a:pPr>
+            <a:endParaRPr lang="en-GB" dirty="0"/>
+          </a:p>
+          <a:p>
+            <a:pPr marL="0" indent="0" algn="r">
+              <a:lnSpc>
+                <a:spcPct val="150000"/>
+              </a:lnSpc>
+              <a:buNone/>
+            </a:pPr>
+            <a:endParaRPr lang="en-GB" dirty="0"/>
+          </a:p>
+          <a:p>
+            <a:pPr marL="0" indent="0" algn="r">
+              <a:lnSpc>
+                <a:spcPct val="150000"/>
+              </a:lnSpc>
+              <a:buNone/>
+            </a:pPr>
             <a:r>
-              <a:rPr lang="de-DE" dirty="0"/>
-              <a:t>This Thesis follows UX Design Cycle to achieve usable prototypes.</a:t>
+              <a:rPr lang="en-GB" dirty="0"/>
+              <a:t> </a:t>
             </a:r>
+          </a:p>
+          <a:p>
+            <a:pPr>
+              <a:lnSpc>
+                <a:spcPct val="150000"/>
+              </a:lnSpc>
+            </a:pPr>
+            <a:endParaRPr lang="en-GB" dirty="0"/>
+          </a:p>
+          <a:p>
+            <a:pPr marL="0" indent="0">
+              <a:lnSpc>
+                <a:spcPct val="150000"/>
+              </a:lnSpc>
+              <a:buNone/>
+            </a:pPr>
+            <a:endParaRPr lang="en-GB" dirty="0"/>
+          </a:p>
+          <a:p>
+            <a:endParaRPr lang="de-DE" dirty="0"/>
           </a:p>
         </p:txBody>
       </p:sp>
@@ -32235,7 +31406,12 @@
             <p:ph type="body" sz="quarter" idx="12"/>
           </p:nvPr>
         </p:nvSpPr>
-        <p:spPr/>
+        <p:spPr>
+          <a:xfrm>
+            <a:off x="273050" y="620688"/>
+            <a:ext cx="9361488" cy="5113337"/>
+          </a:xfrm>
+        </p:spPr>
         <p:txBody>
           <a:bodyPr/>
           <a:lstStyle/>
@@ -32352,7 +31528,7 @@
         </p:blipFill>
         <p:spPr>
           <a:xfrm>
-            <a:off x="3418418" y="3822714"/>
+            <a:off x="3418418" y="2564904"/>
             <a:ext cx="3069163" cy="2321720"/>
           </a:xfrm>
           <a:prstGeom prst="rect">
@@ -32915,8 +32091,8 @@
         </p:blipFill>
         <p:spPr>
           <a:xfrm>
-            <a:off x="4016896" y="44496"/>
-            <a:ext cx="5763887" cy="4429247"/>
+            <a:off x="3321786" y="44496"/>
+            <a:ext cx="6458997" cy="4963403"/>
           </a:xfrm>
           <a:prstGeom prst="rect">
             <a:avLst/>
@@ -32959,72 +32135,48 @@
         </p:nvSpPr>
         <p:spPr>
           <a:xfrm>
-            <a:off x="248147" y="4141635"/>
-            <a:ext cx="9361488" cy="5113337"/>
+            <a:off x="462823" y="2112463"/>
+            <a:ext cx="3626081" cy="2096235"/>
           </a:xfrm>
         </p:spPr>
         <p:txBody>
           <a:bodyPr/>
           <a:lstStyle/>
           <a:p>
-            <a:endParaRPr lang="de-DE" dirty="0"/>
-          </a:p>
-          <a:p>
-            <a:pPr marL="0" indent="0">
-              <a:buNone/>
-            </a:pPr>
-            <a:endParaRPr lang="de-DE" dirty="0"/>
-          </a:p>
-          <a:p>
-            <a:pPr marL="0" indent="0">
-              <a:buNone/>
-            </a:pPr>
-            <a:r>
-              <a:rPr lang="de-DE" dirty="0"/>
-              <a:t>	- </a:t>
-            </a:r>
             <a:r>
               <a:rPr lang="en-GB" dirty="0"/>
-              <a:t>Christakis, Maria; Bird, Christian (2016): What developers want and need from 			  program analysis: an empirical study. </a:t>
-            </a:r>
-            <a:endParaRPr lang="de-DE" dirty="0"/>
-          </a:p>
-          <a:p>
-            <a:pPr marL="0" indent="0">
-              <a:buNone/>
-            </a:pPr>
-            <a:r>
-              <a:rPr lang="en-GB" dirty="0"/>
-              <a:t>      - Johnson, Brittany; Song, </a:t>
-            </a:r>
-            <a:r>
-              <a:rPr lang="en-GB" dirty="0" err="1"/>
-              <a:t>Yoonki</a:t>
-            </a:r>
-            <a:r>
-              <a:rPr lang="en-GB" dirty="0"/>
-              <a:t>; Murphy-Hill, Emerson; </a:t>
-            </a:r>
-            <a:r>
-              <a:rPr lang="en-GB" dirty="0" err="1"/>
-              <a:t>Bowdidge</a:t>
-            </a:r>
-            <a:r>
-              <a:rPr lang="en-GB" dirty="0"/>
-              <a:t>, Robert (2013): </a:t>
+              <a:t>Christakis et. al.</a:t>
             </a:r>
             <a:br>
               <a:rPr lang="en-GB" dirty="0"/>
             </a:br>
+            <a:endParaRPr lang="en-GB" dirty="0"/>
+          </a:p>
+          <a:p>
             <a:r>
               <a:rPr lang="en-GB" dirty="0"/>
-              <a:t>         Why don't software developers use static analysis tools to find bugs?</a:t>
+              <a:t>Brittany et. al.</a:t>
             </a:r>
-            <a:endParaRPr lang="de-DE" dirty="0">
-              <a:solidFill>
-                <a:schemeClr val="tx2"/>
-              </a:solidFill>
-            </a:endParaRPr>
+          </a:p>
+          <a:p>
+            <a:pPr lvl="1">
+              <a:buFontTx/>
+              <a:buChar char="-"/>
+            </a:pPr>
+            <a:r>
+              <a:rPr lang="en-GB" sz="1600" dirty="0"/>
+              <a:t>Tool output</a:t>
+            </a:r>
+          </a:p>
+          <a:p>
+            <a:pPr lvl="1">
+              <a:buFontTx/>
+              <a:buChar char="-"/>
+            </a:pPr>
+            <a:r>
+              <a:rPr lang="en-GB" sz="1600" dirty="0"/>
+              <a:t>Result understandability</a:t>
+            </a:r>
           </a:p>
           <a:p>
             <a:pPr>
@@ -33116,7 +32268,7 @@
         </p:nvSpPr>
         <p:spPr>
           <a:xfrm>
-            <a:off x="632520" y="2113607"/>
+            <a:off x="452374" y="1412560"/>
             <a:ext cx="1787669" cy="369332"/>
           </a:xfrm>
           <a:prstGeom prst="rect">
@@ -33145,6 +32297,134 @@
           </a:p>
         </p:txBody>
       </p:sp>
+      <p:cxnSp>
+        <p:nvCxnSpPr>
+          <p:cNvPr id="9" name="Straight Arrow Connector 8">
+            <a:extLst>
+              <a:ext uri="{FF2B5EF4-FFF2-40B4-BE49-F238E27FC236}">
+                <a16:creationId xmlns:a16="http://schemas.microsoft.com/office/drawing/2014/main" id="{210B974A-706F-443C-B99B-98D539EC8CCD}"/>
+              </a:ext>
+            </a:extLst>
+          </p:cNvPr>
+          <p:cNvCxnSpPr/>
+          <p:nvPr/>
+        </p:nvCxnSpPr>
+        <p:spPr>
+          <a:xfrm>
+            <a:off x="6551284" y="5007899"/>
+            <a:ext cx="2520280" cy="0"/>
+          </a:xfrm>
+          <a:prstGeom prst="straightConnector1">
+            <a:avLst/>
+          </a:prstGeom>
+          <a:ln>
+            <a:tailEnd type="triangle"/>
+          </a:ln>
+        </p:spPr>
+        <p:style>
+          <a:lnRef idx="1">
+            <a:schemeClr val="accent2"/>
+          </a:lnRef>
+          <a:fillRef idx="0">
+            <a:schemeClr val="accent2"/>
+          </a:fillRef>
+          <a:effectRef idx="0">
+            <a:schemeClr val="accent2"/>
+          </a:effectRef>
+          <a:fontRef idx="minor">
+            <a:schemeClr val="tx1"/>
+          </a:fontRef>
+        </p:style>
+      </p:cxnSp>
+      <p:sp>
+        <p:nvSpPr>
+          <p:cNvPr id="10" name="TextBox 9">
+            <a:extLst>
+              <a:ext uri="{FF2B5EF4-FFF2-40B4-BE49-F238E27FC236}">
+                <a16:creationId xmlns:a16="http://schemas.microsoft.com/office/drawing/2014/main" id="{FC32CC40-E826-4236-8E02-A0D2FC5387C2}"/>
+              </a:ext>
+            </a:extLst>
+          </p:cNvPr>
+          <p:cNvSpPr txBox="1"/>
+          <p:nvPr/>
+        </p:nvSpPr>
+        <p:spPr>
+          <a:xfrm>
+            <a:off x="7960065" y="5021240"/>
+            <a:ext cx="1166986" cy="261610"/>
+          </a:xfrm>
+          <a:prstGeom prst="rect">
+            <a:avLst/>
+          </a:prstGeom>
+          <a:noFill/>
+        </p:spPr>
+        <p:txBody>
+          <a:bodyPr wrap="none" lIns="0" rIns="0" rtlCol="0">
+            <a:spAutoFit/>
+          </a:bodyPr>
+          <a:lstStyle/>
+          <a:p>
+            <a:pPr>
+              <a:spcAft>
+                <a:spcPts val="1000"/>
+              </a:spcAft>
+              <a:buClr>
+                <a:schemeClr val="tx2"/>
+              </a:buClr>
+              <a:buSzPct val="80000"/>
+            </a:pPr>
+            <a:r>
+              <a:rPr lang="en-GB" sz="1100" dirty="0">
+                <a:solidFill>
+                  <a:srgbClr val="7030A0"/>
+                </a:solidFill>
+              </a:rPr>
+              <a:t>Survey responses </a:t>
+            </a:r>
+            <a:endParaRPr lang="LID4096" sz="1100" dirty="0" err="1">
+              <a:solidFill>
+                <a:srgbClr val="7030A0"/>
+              </a:solidFill>
+            </a:endParaRPr>
+          </a:p>
+        </p:txBody>
+      </p:sp>
+      <p:pic>
+        <p:nvPicPr>
+          <p:cNvPr id="12" name="Picture 11">
+            <a:extLst>
+              <a:ext uri="{FF2B5EF4-FFF2-40B4-BE49-F238E27FC236}">
+                <a16:creationId xmlns:a16="http://schemas.microsoft.com/office/drawing/2014/main" id="{9C36C666-F1E1-486A-9C42-9CA960B9BE66}"/>
+              </a:ext>
+            </a:extLst>
+          </p:cNvPr>
+          <p:cNvPicPr>
+            <a:picLocks noChangeAspect="1"/>
+          </p:cNvPicPr>
+          <p:nvPr/>
+        </p:nvPicPr>
+        <p:blipFill>
+          <a:blip r:embed="rId3">
+            <a:extLst>
+              <a:ext uri="{28A0092B-C50C-407E-A947-70E740481C1C}">
+                <a14:useLocalDpi xmlns:a14="http://schemas.microsoft.com/office/drawing/2010/main" val="0"/>
+              </a:ext>
+            </a:extLst>
+          </a:blip>
+          <a:stretch>
+            <a:fillRect/>
+          </a:stretch>
+        </p:blipFill>
+        <p:spPr>
+          <a:xfrm>
+            <a:off x="270900" y="4300807"/>
+            <a:ext cx="5301588" cy="2096235"/>
+          </a:xfrm>
+          <a:prstGeom prst="rect">
+            <a:avLst/>
+          </a:prstGeom>
+        </p:spPr>
+      </p:pic>
     </p:spTree>
     <p:extLst>
       <p:ext uri="{BB962C8B-B14F-4D97-AF65-F5344CB8AC3E}">
@@ -33248,7 +32528,7 @@
           <a:p>
             <a:r>
               <a:rPr lang="de-DE" dirty="0"/>
-              <a:t>Developers seem to use multiple static analysis tools each having own coverage.</a:t>
+              <a:t>Developers use multiple static analysis tools each having own coverage.</a:t>
             </a:r>
           </a:p>
           <a:p>
@@ -33270,7 +32550,7 @@
             </a:pPr>
             <a:r>
               <a:rPr lang="en-GB" dirty="0"/>
-              <a:t>Using multiple static analysis tools in order to prioritise the bug warning alerts</a:t>
+              <a:t>Prioritise the bug warning alerts</a:t>
             </a:r>
           </a:p>
           <a:p>
@@ -33296,14 +32576,7 @@
             </a:pPr>
             <a:r>
               <a:rPr lang="en-GB" dirty="0"/>
-              <a:t>Using results of three different static analysis tools for a programming language, </a:t>
-            </a:r>
-            <a:br>
-              <a:rPr lang="en-GB" dirty="0"/>
-            </a:br>
-            <a:r>
-              <a:rPr lang="en-GB" dirty="0"/>
-              <a:t>Java and merges them together in order to show warnings to the developer.</a:t>
+              <a:t>Merges 3 tools for Java to show warnings </a:t>
             </a:r>
           </a:p>
           <a:p>
@@ -33314,35 +32587,6 @@
               <a:rPr lang="en-GB" dirty="0"/>
               <a:t>( Na Meng et. al. )</a:t>
             </a:r>
-          </a:p>
-          <a:p>
-            <a:pPr>
-              <a:buFont typeface="Arial" panose="020B0604020202020204" pitchFamily="34" charset="0"/>
-              <a:buChar char="•"/>
-            </a:pPr>
-            <a:endParaRPr lang="en-GB" dirty="0"/>
-          </a:p>
-          <a:p>
-            <a:pPr marL="0" indent="0">
-              <a:buNone/>
-            </a:pPr>
-            <a:r>
-              <a:rPr lang="en-GB" dirty="0"/>
-              <a:t>							But </a:t>
-            </a:r>
-            <a:r>
-              <a:rPr lang="en-GB" dirty="0">
-                <a:solidFill>
-                  <a:srgbClr val="00B050"/>
-                </a:solidFill>
-              </a:rPr>
-              <a:t>USABILITY</a:t>
-            </a:r>
-            <a:r>
-              <a:rPr lang="en-GB" dirty="0"/>
-              <a:t> is not addressed…</a:t>
-            </a:r>
-            <a:endParaRPr lang="de-DE" dirty="0"/>
           </a:p>
         </p:txBody>
       </p:sp>
@@ -33420,7 +32664,7 @@
                   <a:schemeClr val="tx2"/>
                 </a:solidFill>
               </a:rPr>
-              <a:t> Problem Statement</a:t>
+              <a:t>Multiple Tools</a:t>
             </a:r>
           </a:p>
         </p:txBody>
@@ -33464,31 +32708,127 @@
           <a:bodyPr/>
           <a:lstStyle/>
           <a:p>
+            <a:pPr>
+              <a:buFont typeface="Wingdings" panose="05000000000000000000" pitchFamily="2" charset="2"/>
+              <a:buChar char="§"/>
+            </a:pPr>
+            <a:r>
+              <a:rPr lang="en-GB" dirty="0"/>
+              <a:t>Tricorder</a:t>
+            </a:r>
+          </a:p>
+          <a:p>
+            <a:pPr lvl="1">
+              <a:buFont typeface="Arial" panose="020B0604020202020204" pitchFamily="34" charset="0"/>
+              <a:buChar char="•"/>
+            </a:pPr>
+            <a:r>
+              <a:rPr lang="en-GB" sz="1600" dirty="0" err="1"/>
+              <a:t>ReviewBot</a:t>
+            </a:r>
+            <a:endParaRPr lang="en-GB" sz="1600" dirty="0"/>
+          </a:p>
+          <a:p>
+            <a:pPr lvl="1">
+              <a:buFont typeface="Arial" panose="020B0604020202020204" pitchFamily="34" charset="0"/>
+              <a:buChar char="•"/>
+            </a:pPr>
+            <a:r>
+              <a:rPr lang="en-GB" sz="1600" dirty="0"/>
+              <a:t>Separate bug coverage by separate tool </a:t>
+            </a:r>
+          </a:p>
+          <a:p>
+            <a:pPr lvl="1">
+              <a:buFont typeface="Arial" panose="020B0604020202020204" pitchFamily="34" charset="0"/>
+              <a:buChar char="•"/>
+            </a:pPr>
+            <a:r>
+              <a:rPr lang="en-GB" sz="1600" dirty="0"/>
+              <a:t>Evaluation: Summative – Click rates</a:t>
+            </a:r>
+          </a:p>
+          <a:p>
+            <a:pPr marL="0" indent="0" algn="r">
+              <a:buNone/>
+            </a:pPr>
+            <a:r>
+              <a:rPr lang="en-GB" dirty="0"/>
+              <a:t>(Caitlin et. al. )</a:t>
+            </a:r>
+          </a:p>
+          <a:p>
+            <a:pPr>
+              <a:buFont typeface="Arial" panose="020B0604020202020204" pitchFamily="34" charset="0"/>
+              <a:buChar char="•"/>
+            </a:pPr>
             <a:endParaRPr lang="en-GB" dirty="0"/>
           </a:p>
           <a:p>
+            <a:pPr>
+              <a:buFont typeface="Arial" panose="020B0604020202020204" pitchFamily="34" charset="0"/>
+              <a:buChar char="•"/>
+            </a:pPr>
+            <a:r>
+              <a:rPr lang="en-GB" dirty="0"/>
+              <a:t>Parfait</a:t>
+            </a:r>
+          </a:p>
+          <a:p>
+            <a:pPr lvl="1">
+              <a:buFont typeface="Arial" panose="020B0604020202020204" pitchFamily="34" charset="0"/>
+              <a:buChar char="•"/>
+            </a:pPr>
+            <a:r>
+              <a:rPr lang="en-GB" sz="1600" dirty="0"/>
+              <a:t>Scalability ( easy , expensive analysis )</a:t>
+            </a:r>
+          </a:p>
+          <a:p>
+            <a:pPr lvl="1">
+              <a:buFont typeface="Arial" panose="020B0604020202020204" pitchFamily="34" charset="0"/>
+              <a:buChar char="•"/>
+            </a:pPr>
+            <a:r>
+              <a:rPr lang="en-GB" sz="1600" dirty="0"/>
+              <a:t>Precision ( bug track – real, no, potential ) </a:t>
+            </a:r>
+          </a:p>
+          <a:p>
+            <a:pPr marL="0" indent="0" algn="r">
+              <a:buNone/>
+            </a:pPr>
+            <a:r>
+              <a:rPr lang="en-GB" dirty="0"/>
+              <a:t>(Cristina et. al. )</a:t>
+            </a:r>
+          </a:p>
+          <a:p>
+            <a:pPr marL="0" indent="0">
+              <a:buNone/>
+            </a:pPr>
             <a:endParaRPr lang="en-GB" dirty="0"/>
-          </a:p>
-          <a:p>
-            <a:r>
-              <a:rPr lang="en-GB" sz="2400" dirty="0"/>
-              <a:t>How to integrate the results of multiple static analysis tools </a:t>
-            </a:r>
-            <a:br>
-              <a:rPr lang="en-GB" sz="2400" dirty="0"/>
-            </a:br>
-            <a:endParaRPr lang="en-GB" sz="2400" dirty="0"/>
           </a:p>
           <a:p>
             <a:pPr marL="0" indent="0">
               <a:buNone/>
             </a:pPr>
             <a:r>
-              <a:rPr lang="en-GB" sz="2400" dirty="0"/>
-              <a:t>													in a unified user interface?</a:t>
+              <a:rPr lang="en-GB" dirty="0"/>
+              <a:t>							But </a:t>
             </a:r>
-          </a:p>
-          <a:p>
+            <a:r>
+              <a:rPr lang="en-GB" dirty="0">
+                <a:solidFill>
+                  <a:srgbClr val="00B050"/>
+                </a:solidFill>
+              </a:rPr>
+              <a:t>USABILITY</a:t>
+            </a:r>
+            <a:r>
+              <a:rPr lang="en-GB" dirty="0"/>
+              <a:t> is not addressed…</a:t>
+            </a:r>
             <a:endParaRPr lang="de-DE" dirty="0"/>
           </a:p>
         </p:txBody>
@@ -33516,10 +32856,54 @@
           </a:p>
         </p:txBody>
       </p:sp>
+      <p:sp>
+        <p:nvSpPr>
+          <p:cNvPr id="6" name="Rectangle: Rounded Corners 5">
+            <a:extLst>
+              <a:ext uri="{FF2B5EF4-FFF2-40B4-BE49-F238E27FC236}">
+                <a16:creationId xmlns:a16="http://schemas.microsoft.com/office/drawing/2014/main" id="{7B1A95CE-58D3-4A2F-96D9-3FCCC8DB722D}"/>
+              </a:ext>
+            </a:extLst>
+          </p:cNvPr>
+          <p:cNvSpPr/>
+          <p:nvPr/>
+        </p:nvSpPr>
+        <p:spPr bwMode="auto">
+          <a:xfrm>
+            <a:off x="3152800" y="5445224"/>
+            <a:ext cx="3672408" cy="432048"/>
+          </a:xfrm>
+          <a:prstGeom prst="roundRect">
+            <a:avLst/>
+          </a:prstGeom>
+          <a:noFill/>
+          <a:ln w="12700">
+            <a:solidFill>
+              <a:srgbClr val="FF0000"/>
+            </a:solidFill>
+            <a:miter lim="800000"/>
+            <a:headEnd/>
+            <a:tailEnd/>
+          </a:ln>
+          <a:effectLst/>
+        </p:spPr>
+        <p:txBody>
+          <a:bodyPr wrap="none" rtlCol="0" anchor="ctr"/>
+          <a:lstStyle/>
+          <a:p>
+            <a:pPr algn="ctr"/>
+            <a:endParaRPr lang="LID4096" sz="1600" b="1" dirty="0">
+              <a:solidFill>
+                <a:schemeClr val="bg1"/>
+              </a:solidFill>
+            </a:endParaRPr>
+          </a:p>
+        </p:txBody>
+      </p:sp>
     </p:spTree>
     <p:extLst>
       <p:ext uri="{BB962C8B-B14F-4D97-AF65-F5344CB8AC3E}">
-        <p14:creationId xmlns:p14="http://schemas.microsoft.com/office/powerpoint/2010/main" val="4204401702"/>
+        <p14:creationId xmlns:p14="http://schemas.microsoft.com/office/powerpoint/2010/main" val="1143630792"/>
       </p:ext>
     </p:extLst>
   </p:cSld>
@@ -33567,7 +32951,7 @@
                   <a:schemeClr val="tx2"/>
                 </a:solidFill>
               </a:rPr>
-              <a:t>Research Questions </a:t>
+              <a:t> Problem Statement</a:t>
             </a:r>
           </a:p>
         </p:txBody>
@@ -33611,59 +32995,48 @@
           <a:bodyPr/>
           <a:lstStyle/>
           <a:p>
+            <a:endParaRPr lang="en-GB" dirty="0"/>
+          </a:p>
+          <a:p>
+            <a:endParaRPr lang="en-GB" dirty="0"/>
+          </a:p>
+          <a:p>
+            <a:endParaRPr lang="en-GB" dirty="0"/>
+          </a:p>
+          <a:p>
+            <a:r>
+              <a:rPr lang="en-GB" sz="2400" dirty="0"/>
+              <a:t>How to integrate the results of multiple static analysis tools </a:t>
+            </a:r>
+            <a:br>
+              <a:rPr lang="en-GB" sz="2400" dirty="0"/>
+            </a:br>
+            <a:endParaRPr lang="en-GB" sz="2400" dirty="0"/>
+          </a:p>
+          <a:p>
             <a:pPr marL="0" indent="0">
               <a:buNone/>
             </a:pPr>
-            <a:endParaRPr lang="en-GB" dirty="0"/>
-          </a:p>
-          <a:p>
-            <a:pPr marL="0" indent="0">
-              <a:buNone/>
-            </a:pPr>
-            <a:endParaRPr lang="en-GB" dirty="0"/>
-          </a:p>
-          <a:p>
-            <a:pPr marL="342900" indent="-342900">
-              <a:buAutoNum type="arabicPeriod"/>
+            <a:r>
+              <a:rPr lang="en-GB" sz="2400" dirty="0"/>
+              <a:t>													in a unified user interface?</a:t>
+            </a:r>
+          </a:p>
+          <a:p>
+            <a:endParaRPr lang="de-DE" dirty="0"/>
+          </a:p>
+          <a:p>
+            <a:endParaRPr lang="de-DE" dirty="0"/>
+          </a:p>
+          <a:p>
+            <a:pPr lvl="1">
+              <a:buFont typeface="Wingdings" panose="05000000000000000000" pitchFamily="2" charset="2"/>
+              <a:buChar char="v"/>
             </a:pPr>
             <a:r>
-              <a:rPr lang="en-GB" dirty="0"/>
-              <a:t>How to display results of the same codebase from different analysis tools? </a:t>
+              <a:rPr lang="de-DE" dirty="0"/>
+              <a:t>3 Research Questions</a:t>
             </a:r>
-          </a:p>
-          <a:p>
-            <a:pPr marL="342900" indent="-342900">
-              <a:buAutoNum type="arabicPeriod"/>
-            </a:pPr>
-            <a:endParaRPr lang="en-GB" dirty="0"/>
-          </a:p>
-          <a:p>
-            <a:pPr marL="342900" indent="-342900">
-              <a:buFont typeface="+mj-lt"/>
-              <a:buAutoNum type="arabicPeriod"/>
-            </a:pPr>
-            <a:r>
-              <a:rPr lang="en-GB" dirty="0"/>
-              <a:t>What feedback works to know that the bug fixing is on-going? </a:t>
-            </a:r>
-          </a:p>
-          <a:p>
-            <a:pPr marL="342900" indent="-342900">
-              <a:buFont typeface="+mj-lt"/>
-              <a:buAutoNum type="arabicPeriod"/>
-            </a:pPr>
-            <a:endParaRPr lang="en-GB" dirty="0"/>
-          </a:p>
-          <a:p>
-            <a:pPr marL="342900" indent="-342900">
-              <a:buFont typeface="+mj-lt"/>
-              <a:buAutoNum type="arabicPeriod"/>
-            </a:pPr>
-            <a:r>
-              <a:rPr lang="en-GB" dirty="0"/>
-              <a:t>How to carry traceability of bug fixing? </a:t>
-            </a:r>
-            <a:endParaRPr lang="de-DE" dirty="0"/>
           </a:p>
         </p:txBody>
       </p:sp>
@@ -33693,7 +33066,7 @@
     </p:spTree>
     <p:extLst>
       <p:ext uri="{BB962C8B-B14F-4D97-AF65-F5344CB8AC3E}">
-        <p14:creationId xmlns:p14="http://schemas.microsoft.com/office/powerpoint/2010/main" val="1386339837"/>
+        <p14:creationId xmlns:p14="http://schemas.microsoft.com/office/powerpoint/2010/main" val="4204401702"/>
       </p:ext>
     </p:extLst>
   </p:cSld>

</xml_diff>

<commit_message>
Status Quo - 5.5
</commit_message>
<xml_diff>
--- a/docs/slides/Proposal_presentation_MSAT-UI.pptx
+++ b/docs/slides/Proposal_presentation_MSAT-UI.pptx
@@ -5,10 +5,10 @@
     <p:sldMasterId id="2147483661" r:id="rId1"/>
   </p:sldMasterIdLst>
   <p:notesMasterIdLst>
-    <p:notesMasterId r:id="rId30"/>
+    <p:notesMasterId r:id="rId31"/>
   </p:notesMasterIdLst>
   <p:handoutMasterIdLst>
-    <p:handoutMasterId r:id="rId31"/>
+    <p:handoutMasterId r:id="rId32"/>
   </p:handoutMasterIdLst>
   <p:sldIdLst>
     <p:sldId id="259" r:id="rId2"/>
@@ -17,28 +17,29 @@
     <p:sldId id="269" r:id="rId5"/>
     <p:sldId id="270" r:id="rId6"/>
     <p:sldId id="274" r:id="rId7"/>
-    <p:sldId id="273" r:id="rId8"/>
-    <p:sldId id="320" r:id="rId9"/>
-    <p:sldId id="284" r:id="rId10"/>
-    <p:sldId id="276" r:id="rId11"/>
-    <p:sldId id="283" r:id="rId12"/>
-    <p:sldId id="323" r:id="rId13"/>
-    <p:sldId id="321" r:id="rId14"/>
-    <p:sldId id="322" r:id="rId15"/>
-    <p:sldId id="286" r:id="rId16"/>
-    <p:sldId id="291" r:id="rId17"/>
-    <p:sldId id="288" r:id="rId18"/>
-    <p:sldId id="289" r:id="rId19"/>
-    <p:sldId id="302" r:id="rId20"/>
-    <p:sldId id="304" r:id="rId21"/>
-    <p:sldId id="292" r:id="rId22"/>
-    <p:sldId id="298" r:id="rId23"/>
-    <p:sldId id="300" r:id="rId24"/>
-    <p:sldId id="301" r:id="rId25"/>
-    <p:sldId id="262" r:id="rId26"/>
-    <p:sldId id="263" r:id="rId27"/>
-    <p:sldId id="266" r:id="rId28"/>
-    <p:sldId id="319" r:id="rId29"/>
+    <p:sldId id="324" r:id="rId8"/>
+    <p:sldId id="273" r:id="rId9"/>
+    <p:sldId id="320" r:id="rId10"/>
+    <p:sldId id="284" r:id="rId11"/>
+    <p:sldId id="276" r:id="rId12"/>
+    <p:sldId id="283" r:id="rId13"/>
+    <p:sldId id="323" r:id="rId14"/>
+    <p:sldId id="321" r:id="rId15"/>
+    <p:sldId id="322" r:id="rId16"/>
+    <p:sldId id="286" r:id="rId17"/>
+    <p:sldId id="291" r:id="rId18"/>
+    <p:sldId id="288" r:id="rId19"/>
+    <p:sldId id="289" r:id="rId20"/>
+    <p:sldId id="302" r:id="rId21"/>
+    <p:sldId id="304" r:id="rId22"/>
+    <p:sldId id="292" r:id="rId23"/>
+    <p:sldId id="298" r:id="rId24"/>
+    <p:sldId id="300" r:id="rId25"/>
+    <p:sldId id="301" r:id="rId26"/>
+    <p:sldId id="262" r:id="rId27"/>
+    <p:sldId id="263" r:id="rId28"/>
+    <p:sldId id="266" r:id="rId29"/>
+    <p:sldId id="319" r:id="rId30"/>
   </p:sldIdLst>
   <p:sldSz cx="9906000" cy="6858000" type="A4"/>
   <p:notesSz cx="6669088" cy="9926638"/>
@@ -357,7 +358,7 @@
               <a:pPr>
                 <a:defRPr/>
               </a:pPr>
-              <a:t>25.04.2019</a:t>
+              <a:t>05.05.2019</a:t>
             </a:fld>
             <a:endParaRPr lang="de-DE"/>
           </a:p>
@@ -573,7 +574,7 @@
               <a:pPr>
                 <a:defRPr/>
               </a:pPr>
-              <a:t>25.04.2019</a:t>
+              <a:t>05.05.2019</a:t>
             </a:fld>
             <a:endParaRPr lang="de-DE"/>
           </a:p>
@@ -900,6 +901,67 @@
 </file>
 
 <file path=ppt/notesSlides/notesSlide1.xml><?xml version="1.0" encoding="utf-8"?>
+<p:notes xmlns:a="http://schemas.openxmlformats.org/drawingml/2006/main" xmlns:r="http://schemas.openxmlformats.org/officeDocument/2006/relationships" xmlns:p="http://schemas.openxmlformats.org/presentationml/2006/main">
+  <p:cSld>
+    <p:spTree>
+      <p:nvGrpSpPr>
+        <p:cNvPr id="1" name=""/>
+        <p:cNvGrpSpPr/>
+        <p:nvPr/>
+      </p:nvGrpSpPr>
+      <p:grpSpPr>
+        <a:xfrm>
+          <a:off x="0" y="0"/>
+          <a:ext cx="0" cy="0"/>
+          <a:chOff x="0" y="0"/>
+          <a:chExt cx="0" cy="0"/>
+        </a:xfrm>
+      </p:grpSpPr>
+      <p:sp>
+        <p:nvSpPr>
+          <p:cNvPr id="2" name="Slide Image Placeholder 1"/>
+          <p:cNvSpPr>
+            <a:spLocks noGrp="1" noRot="1" noChangeAspect="1"/>
+          </p:cNvSpPr>
+          <p:nvPr>
+            <p:ph type="sldImg"/>
+          </p:nvPr>
+        </p:nvSpPr>
+        <p:spPr/>
+      </p:sp>
+      <p:sp>
+        <p:nvSpPr>
+          <p:cNvPr id="3" name="Notes Placeholder 2"/>
+          <p:cNvSpPr>
+            <a:spLocks noGrp="1"/>
+          </p:cNvSpPr>
+          <p:nvPr>
+            <p:ph type="body" idx="1"/>
+          </p:nvPr>
+        </p:nvSpPr>
+        <p:spPr/>
+        <p:txBody>
+          <a:bodyPr/>
+          <a:lstStyle/>
+          <a:p>
+            <a:endParaRPr lang="LID4096" dirty="0"/>
+          </a:p>
+        </p:txBody>
+      </p:sp>
+    </p:spTree>
+    <p:extLst>
+      <p:ext uri="{BB962C8B-B14F-4D97-AF65-F5344CB8AC3E}">
+        <p14:creationId xmlns:p14="http://schemas.microsoft.com/office/powerpoint/2010/main" val="3446020533"/>
+      </p:ext>
+    </p:extLst>
+  </p:cSld>
+  <p:clrMapOvr>
+    <a:masterClrMapping/>
+  </p:clrMapOvr>
+</p:notes>
+</file>
+
+<file path=ppt/notesSlides/notesSlide2.xml><?xml version="1.0" encoding="utf-8"?>
 <p:notes xmlns:a="http://schemas.openxmlformats.org/drawingml/2006/main" xmlns:r="http://schemas.openxmlformats.org/officeDocument/2006/relationships" xmlns:p="http://schemas.openxmlformats.org/presentationml/2006/main">
   <p:cSld>
     <p:spTree>
@@ -27752,7 +27814,7 @@
                   <a:schemeClr val="tx2"/>
                 </a:solidFill>
               </a:rPr>
-              <a:t>Research Question 1</a:t>
+              <a:t> Problem Statement</a:t>
             </a:r>
           </a:p>
         </p:txBody>
@@ -27796,62 +27858,48 @@
           <a:bodyPr/>
           <a:lstStyle/>
           <a:p>
+            <a:endParaRPr lang="en-GB" dirty="0"/>
+          </a:p>
+          <a:p>
+            <a:endParaRPr lang="en-GB" dirty="0"/>
+          </a:p>
+          <a:p>
+            <a:endParaRPr lang="en-GB" dirty="0"/>
+          </a:p>
+          <a:p>
+            <a:r>
+              <a:rPr lang="en-GB" sz="2400" dirty="0"/>
+              <a:t>How to integrate the results of multiple static analysis tools </a:t>
+            </a:r>
+            <a:br>
+              <a:rPr lang="en-GB" sz="2400" dirty="0"/>
+            </a:br>
+            <a:endParaRPr lang="en-GB" sz="2400" dirty="0"/>
+          </a:p>
+          <a:p>
             <a:pPr marL="0" indent="0">
-              <a:lnSpc>
-                <a:spcPct val="150000"/>
-              </a:lnSpc>
               <a:buNone/>
             </a:pPr>
-            <a:endParaRPr lang="en-GB" dirty="0"/>
-          </a:p>
-          <a:p>
-            <a:pPr marL="0" indent="0">
-              <a:lnSpc>
-                <a:spcPct val="150000"/>
-              </a:lnSpc>
-              <a:buNone/>
+            <a:r>
+              <a:rPr lang="en-GB" sz="2400" dirty="0"/>
+              <a:t>													in a unified user interface?</a:t>
+            </a:r>
+          </a:p>
+          <a:p>
+            <a:endParaRPr lang="de-DE" dirty="0"/>
+          </a:p>
+          <a:p>
+            <a:endParaRPr lang="de-DE" dirty="0"/>
+          </a:p>
+          <a:p>
+            <a:pPr lvl="1">
+              <a:buFont typeface="Wingdings" panose="05000000000000000000" pitchFamily="2" charset="2"/>
+              <a:buChar char="v"/>
             </a:pPr>
-            <a:endParaRPr lang="en-GB" dirty="0"/>
-          </a:p>
-          <a:p>
-            <a:pPr>
-              <a:lnSpc>
-                <a:spcPct val="150000"/>
-              </a:lnSpc>
-            </a:pPr>
-            <a:r>
-              <a:rPr lang="en-GB" sz="2400" dirty="0"/>
-              <a:t>How to display results of the same codebase from </a:t>
-            </a:r>
-          </a:p>
-          <a:p>
-            <a:pPr marL="0" indent="0" algn="r">
-              <a:lnSpc>
-                <a:spcPct val="150000"/>
-              </a:lnSpc>
-              <a:buNone/>
-            </a:pPr>
-            <a:r>
-              <a:rPr lang="en-GB" sz="2400" dirty="0"/>
-              <a:t>different analysis tools? </a:t>
-            </a:r>
-          </a:p>
-          <a:p>
-            <a:pPr>
-              <a:lnSpc>
-                <a:spcPct val="150000"/>
-              </a:lnSpc>
-            </a:pPr>
-            <a:endParaRPr lang="en-GB" sz="2400" dirty="0"/>
-          </a:p>
-          <a:p>
-            <a:pPr marL="0" indent="0">
-              <a:lnSpc>
-                <a:spcPct val="150000"/>
-              </a:lnSpc>
-              <a:buNone/>
-            </a:pPr>
-            <a:endParaRPr lang="en-GB" dirty="0"/>
+            <a:r>
+              <a:rPr lang="de-DE" dirty="0"/>
+              <a:t>3 Research Questions</a:t>
+            </a:r>
           </a:p>
         </p:txBody>
       </p:sp>
@@ -27881,7 +27929,7 @@
     </p:spTree>
     <p:extLst>
       <p:ext uri="{BB962C8B-B14F-4D97-AF65-F5344CB8AC3E}">
-        <p14:creationId xmlns:p14="http://schemas.microsoft.com/office/powerpoint/2010/main" val="1386339837"/>
+        <p14:creationId xmlns:p14="http://schemas.microsoft.com/office/powerpoint/2010/main" val="4204401702"/>
       </p:ext>
     </p:extLst>
   </p:cSld>
@@ -27929,7 +27977,7 @@
                   <a:schemeClr val="tx2"/>
                 </a:solidFill>
               </a:rPr>
-              <a:t> What Current Tools do? - RQ 1</a:t>
+              <a:t>Research Question 1</a:t>
             </a:r>
           </a:p>
         </p:txBody>
@@ -27953,6 +28001,183 @@
               <a:rPr lang="de-DE" smtClean="0"/>
               <a:pPr/>
               <a:t>11</a:t>
+            </a:fld>
+            <a:endParaRPr lang="de-DE" dirty="0"/>
+          </a:p>
+        </p:txBody>
+      </p:sp>
+      <p:sp>
+        <p:nvSpPr>
+          <p:cNvPr id="5" name="Textplatzhalter 4"/>
+          <p:cNvSpPr>
+            <a:spLocks noGrp="1"/>
+          </p:cNvSpPr>
+          <p:nvPr>
+            <p:ph type="body" sz="quarter" idx="12"/>
+          </p:nvPr>
+        </p:nvSpPr>
+        <p:spPr/>
+        <p:txBody>
+          <a:bodyPr/>
+          <a:lstStyle/>
+          <a:p>
+            <a:pPr marL="0" indent="0">
+              <a:lnSpc>
+                <a:spcPct val="150000"/>
+              </a:lnSpc>
+              <a:buNone/>
+            </a:pPr>
+            <a:endParaRPr lang="en-GB" dirty="0"/>
+          </a:p>
+          <a:p>
+            <a:pPr marL="0" indent="0">
+              <a:lnSpc>
+                <a:spcPct val="150000"/>
+              </a:lnSpc>
+              <a:buNone/>
+            </a:pPr>
+            <a:endParaRPr lang="en-GB" dirty="0"/>
+          </a:p>
+          <a:p>
+            <a:pPr>
+              <a:lnSpc>
+                <a:spcPct val="150000"/>
+              </a:lnSpc>
+            </a:pPr>
+            <a:r>
+              <a:rPr lang="en-GB" sz="2400" dirty="0"/>
+              <a:t>How to display results of the same codebase from </a:t>
+            </a:r>
+          </a:p>
+          <a:p>
+            <a:pPr marL="0" indent="0" algn="r">
+              <a:lnSpc>
+                <a:spcPct val="150000"/>
+              </a:lnSpc>
+              <a:buNone/>
+            </a:pPr>
+            <a:r>
+              <a:rPr lang="en-GB" sz="2400" dirty="0"/>
+              <a:t>different analysis tools? </a:t>
+            </a:r>
+          </a:p>
+          <a:p>
+            <a:pPr>
+              <a:lnSpc>
+                <a:spcPct val="150000"/>
+              </a:lnSpc>
+            </a:pPr>
+            <a:endParaRPr lang="en-GB" sz="2400" dirty="0"/>
+          </a:p>
+          <a:p>
+            <a:pPr marL="0" indent="0">
+              <a:lnSpc>
+                <a:spcPct val="150000"/>
+              </a:lnSpc>
+              <a:buNone/>
+            </a:pPr>
+            <a:endParaRPr lang="en-GB" dirty="0"/>
+          </a:p>
+        </p:txBody>
+      </p:sp>
+      <p:sp>
+        <p:nvSpPr>
+          <p:cNvPr id="3" name="Fußzeilenplatzhalter 2"/>
+          <p:cNvSpPr>
+            <a:spLocks noGrp="1"/>
+          </p:cNvSpPr>
+          <p:nvPr>
+            <p:ph type="ftr" sz="quarter" idx="10"/>
+          </p:nvPr>
+        </p:nvSpPr>
+        <p:spPr/>
+        <p:txBody>
+          <a:bodyPr/>
+          <a:lstStyle/>
+          <a:p>
+            <a:r>
+              <a:rPr lang="de-DE"/>
+              <a:t>Software Engineering</a:t>
+            </a:r>
+            <a:endParaRPr lang="de-DE" dirty="0"/>
+          </a:p>
+        </p:txBody>
+      </p:sp>
+    </p:spTree>
+    <p:extLst>
+      <p:ext uri="{BB962C8B-B14F-4D97-AF65-F5344CB8AC3E}">
+        <p14:creationId xmlns:p14="http://schemas.microsoft.com/office/powerpoint/2010/main" val="1386339837"/>
+      </p:ext>
+    </p:extLst>
+  </p:cSld>
+  <p:clrMapOvr>
+    <a:masterClrMapping/>
+  </p:clrMapOvr>
+</p:sld>
+</file>
+
+<file path=ppt/slides/slide12.xml><?xml version="1.0" encoding="utf-8"?>
+<p:sld xmlns:a="http://schemas.openxmlformats.org/drawingml/2006/main" xmlns:r="http://schemas.openxmlformats.org/officeDocument/2006/relationships" xmlns:p="http://schemas.openxmlformats.org/presentationml/2006/main">
+  <p:cSld>
+    <p:spTree>
+      <p:nvGrpSpPr>
+        <p:cNvPr id="1" name=""/>
+        <p:cNvGrpSpPr/>
+        <p:nvPr/>
+      </p:nvGrpSpPr>
+      <p:grpSpPr>
+        <a:xfrm>
+          <a:off x="0" y="0"/>
+          <a:ext cx="0" cy="0"/>
+          <a:chOff x="0" y="0"/>
+          <a:chExt cx="0" cy="0"/>
+        </a:xfrm>
+      </p:grpSpPr>
+      <p:sp>
+        <p:nvSpPr>
+          <p:cNvPr id="2" name="Titel 1"/>
+          <p:cNvSpPr>
+            <a:spLocks noGrp="1"/>
+          </p:cNvSpPr>
+          <p:nvPr>
+            <p:ph type="title"/>
+          </p:nvPr>
+        </p:nvSpPr>
+        <p:spPr/>
+        <p:txBody>
+          <a:bodyPr/>
+          <a:lstStyle/>
+          <a:p>
+            <a:r>
+              <a:rPr lang="de-DE" dirty="0">
+                <a:solidFill>
+                  <a:schemeClr val="tx2"/>
+                </a:solidFill>
+              </a:rPr>
+              <a:t> What Current Tools do? - RQ 1: .. display results!</a:t>
+            </a:r>
+          </a:p>
+        </p:txBody>
+      </p:sp>
+      <p:sp>
+        <p:nvSpPr>
+          <p:cNvPr id="4" name="Foliennummernplatzhalter 3"/>
+          <p:cNvSpPr>
+            <a:spLocks noGrp="1"/>
+          </p:cNvSpPr>
+          <p:nvPr>
+            <p:ph type="sldNum" sz="quarter" idx="11"/>
+          </p:nvPr>
+        </p:nvSpPr>
+        <p:spPr/>
+        <p:txBody>
+          <a:bodyPr/>
+          <a:lstStyle/>
+          <a:p>
+            <a:fld id="{815DB69B-0A2B-4D0B-A3BD-360AAA24381D}" type="slidenum">
+              <a:rPr lang="de-DE" smtClean="0"/>
+              <a:pPr/>
+              <a:t>12</a:t>
             </a:fld>
             <a:endParaRPr lang="de-DE" dirty="0"/>
           </a:p>
@@ -28052,7 +28277,7 @@
 </p:sld>
 </file>
 
-<file path=ppt/slides/slide12.xml><?xml version="1.0" encoding="utf-8"?>
+<file path=ppt/slides/slide13.xml><?xml version="1.0" encoding="utf-8"?>
 <p:sld xmlns:a="http://schemas.openxmlformats.org/drawingml/2006/main" xmlns:r="http://schemas.openxmlformats.org/officeDocument/2006/relationships" xmlns:p="http://schemas.openxmlformats.org/presentationml/2006/main">
   <p:cSld>
     <p:spTree>
@@ -28090,7 +28315,7 @@
                   <a:schemeClr val="tx2"/>
                 </a:solidFill>
               </a:rPr>
-              <a:t> What Current Tools do? - RQ 1</a:t>
+              <a:t> What Current Tools do? - RQ 1: .. display results!</a:t>
             </a:r>
           </a:p>
         </p:txBody>
@@ -28113,7 +28338,7 @@
             <a:fld id="{815DB69B-0A2B-4D0B-A3BD-360AAA24381D}" type="slidenum">
               <a:rPr lang="de-DE" smtClean="0"/>
               <a:pPr/>
-              <a:t>12</a:t>
+              <a:t>13</a:t>
             </a:fld>
             <a:endParaRPr lang="de-DE" dirty="0"/>
           </a:p>
@@ -28213,177 +28438,6 @@
 </p:sld>
 </file>
 
-<file path=ppt/slides/slide13.xml><?xml version="1.0" encoding="utf-8"?>
-<p:sld xmlns:a="http://schemas.openxmlformats.org/drawingml/2006/main" xmlns:r="http://schemas.openxmlformats.org/officeDocument/2006/relationships" xmlns:p="http://schemas.openxmlformats.org/presentationml/2006/main">
-  <p:cSld>
-    <p:spTree>
-      <p:nvGrpSpPr>
-        <p:cNvPr id="1" name=""/>
-        <p:cNvGrpSpPr/>
-        <p:nvPr/>
-      </p:nvGrpSpPr>
-      <p:grpSpPr>
-        <a:xfrm>
-          <a:off x="0" y="0"/>
-          <a:ext cx="0" cy="0"/>
-          <a:chOff x="0" y="0"/>
-          <a:chExt cx="0" cy="0"/>
-        </a:xfrm>
-      </p:grpSpPr>
-      <p:sp>
-        <p:nvSpPr>
-          <p:cNvPr id="2" name="Titel 1"/>
-          <p:cNvSpPr>
-            <a:spLocks noGrp="1"/>
-          </p:cNvSpPr>
-          <p:nvPr>
-            <p:ph type="title"/>
-          </p:nvPr>
-        </p:nvSpPr>
-        <p:spPr/>
-        <p:txBody>
-          <a:bodyPr/>
-          <a:lstStyle/>
-          <a:p>
-            <a:r>
-              <a:rPr lang="de-DE" dirty="0">
-                <a:solidFill>
-                  <a:schemeClr val="tx2"/>
-                </a:solidFill>
-              </a:rPr>
-              <a:t>Research Question 2</a:t>
-            </a:r>
-          </a:p>
-        </p:txBody>
-      </p:sp>
-      <p:sp>
-        <p:nvSpPr>
-          <p:cNvPr id="4" name="Foliennummernplatzhalter 3"/>
-          <p:cNvSpPr>
-            <a:spLocks noGrp="1"/>
-          </p:cNvSpPr>
-          <p:nvPr>
-            <p:ph type="sldNum" sz="quarter" idx="11"/>
-          </p:nvPr>
-        </p:nvSpPr>
-        <p:spPr/>
-        <p:txBody>
-          <a:bodyPr/>
-          <a:lstStyle/>
-          <a:p>
-            <a:fld id="{815DB69B-0A2B-4D0B-A3BD-360AAA24381D}" type="slidenum">
-              <a:rPr lang="de-DE" smtClean="0"/>
-              <a:pPr/>
-              <a:t>13</a:t>
-            </a:fld>
-            <a:endParaRPr lang="de-DE" dirty="0"/>
-          </a:p>
-        </p:txBody>
-      </p:sp>
-      <p:sp>
-        <p:nvSpPr>
-          <p:cNvPr id="5" name="Textplatzhalter 4"/>
-          <p:cNvSpPr>
-            <a:spLocks noGrp="1"/>
-          </p:cNvSpPr>
-          <p:nvPr>
-            <p:ph type="body" sz="quarter" idx="12"/>
-          </p:nvPr>
-        </p:nvSpPr>
-        <p:spPr/>
-        <p:txBody>
-          <a:bodyPr/>
-          <a:lstStyle/>
-          <a:p>
-            <a:pPr marL="0" indent="0">
-              <a:buNone/>
-            </a:pPr>
-            <a:endParaRPr lang="en-GB" dirty="0"/>
-          </a:p>
-          <a:p>
-            <a:pPr marL="0" indent="0">
-              <a:buNone/>
-            </a:pPr>
-            <a:endParaRPr lang="en-GB" dirty="0"/>
-          </a:p>
-          <a:p>
-            <a:r>
-              <a:rPr lang="en-GB" sz="2400" dirty="0"/>
-              <a:t>What feedback works to know that the bug fixing is on-going?</a:t>
-            </a:r>
-          </a:p>
-          <a:p>
-            <a:endParaRPr lang="en-GB" sz="2400" dirty="0"/>
-          </a:p>
-          <a:p>
-            <a:endParaRPr lang="en-GB" sz="2400" dirty="0"/>
-          </a:p>
-          <a:p>
-            <a:r>
-              <a:rPr lang="en-GB" dirty="0"/>
-              <a:t>What current tools do? </a:t>
-            </a:r>
-          </a:p>
-          <a:p>
-            <a:pPr marL="0" indent="0">
-              <a:buNone/>
-            </a:pPr>
-            <a:endParaRPr lang="en-GB" dirty="0"/>
-          </a:p>
-          <a:p>
-            <a:pPr lvl="2">
-              <a:buFont typeface="Wingdings" panose="05000000000000000000" pitchFamily="2" charset="2"/>
-              <a:buChar char="§"/>
-            </a:pPr>
-            <a:r>
-              <a:rPr lang="en-GB" dirty="0"/>
-              <a:t>Traditional approach – Nightly Builds</a:t>
-            </a:r>
-          </a:p>
-          <a:p>
-            <a:pPr marL="0" indent="0">
-              <a:buNone/>
-            </a:pPr>
-            <a:endParaRPr lang="en-GB" dirty="0"/>
-          </a:p>
-        </p:txBody>
-      </p:sp>
-      <p:sp>
-        <p:nvSpPr>
-          <p:cNvPr id="3" name="Fußzeilenplatzhalter 2"/>
-          <p:cNvSpPr>
-            <a:spLocks noGrp="1"/>
-          </p:cNvSpPr>
-          <p:nvPr>
-            <p:ph type="ftr" sz="quarter" idx="10"/>
-          </p:nvPr>
-        </p:nvSpPr>
-        <p:spPr/>
-        <p:txBody>
-          <a:bodyPr/>
-          <a:lstStyle/>
-          <a:p>
-            <a:r>
-              <a:rPr lang="de-DE"/>
-              <a:t>Software Engineering</a:t>
-            </a:r>
-            <a:endParaRPr lang="de-DE" dirty="0"/>
-          </a:p>
-        </p:txBody>
-      </p:sp>
-    </p:spTree>
-    <p:extLst>
-      <p:ext uri="{BB962C8B-B14F-4D97-AF65-F5344CB8AC3E}">
-        <p14:creationId xmlns:p14="http://schemas.microsoft.com/office/powerpoint/2010/main" val="1251747576"/>
-      </p:ext>
-    </p:extLst>
-  </p:cSld>
-  <p:clrMapOvr>
-    <a:masterClrMapping/>
-  </p:clrMapOvr>
-</p:sld>
-</file>
-
 <file path=ppt/slides/slide14.xml><?xml version="1.0" encoding="utf-8"?>
 <p:sld xmlns:a="http://schemas.openxmlformats.org/drawingml/2006/main" xmlns:r="http://schemas.openxmlformats.org/officeDocument/2006/relationships" xmlns:p="http://schemas.openxmlformats.org/presentationml/2006/main">
   <p:cSld>
@@ -28422,7 +28476,7 @@
                   <a:schemeClr val="tx2"/>
                 </a:solidFill>
               </a:rPr>
-              <a:t>Research Question 3 </a:t>
+              <a:t>Research Question 2</a:t>
             </a:r>
           </a:p>
         </p:txBody>
@@ -28478,17 +28532,44 @@
             <a:endParaRPr lang="en-GB" dirty="0"/>
           </a:p>
           <a:p>
+            <a:r>
+              <a:rPr lang="en-GB" sz="2400" dirty="0"/>
+              <a:t>What feedback works to know that the bug fixing is on-going?</a:t>
+            </a:r>
+          </a:p>
+          <a:p>
+            <a:endParaRPr lang="en-GB" sz="2400" dirty="0"/>
+          </a:p>
+          <a:p>
+            <a:endParaRPr lang="en-GB" sz="2400" dirty="0"/>
+          </a:p>
+          <a:p>
+            <a:r>
+              <a:rPr lang="en-GB" dirty="0"/>
+              <a:t>What current tools do? </a:t>
+            </a:r>
+          </a:p>
+          <a:p>
             <a:pPr marL="0" indent="0">
               <a:buNone/>
             </a:pPr>
             <a:endParaRPr lang="en-GB" dirty="0"/>
           </a:p>
           <a:p>
-            <a:r>
-              <a:rPr lang="en-GB" sz="2400" dirty="0"/>
-              <a:t>How to carry traceability of bug fixing? </a:t>
-            </a:r>
-            <a:endParaRPr lang="de-DE" sz="2400" dirty="0"/>
+            <a:pPr lvl="2">
+              <a:buFont typeface="Wingdings" panose="05000000000000000000" pitchFamily="2" charset="2"/>
+              <a:buChar char="§"/>
+            </a:pPr>
+            <a:r>
+              <a:rPr lang="en-GB" dirty="0"/>
+              <a:t>Traditional approach – Nightly Builds</a:t>
+            </a:r>
+          </a:p>
+          <a:p>
+            <a:pPr marL="0" indent="0">
+              <a:buNone/>
+            </a:pPr>
+            <a:endParaRPr lang="en-GB" dirty="0"/>
           </a:p>
         </p:txBody>
       </p:sp>
@@ -28518,7 +28599,7 @@
     </p:spTree>
     <p:extLst>
       <p:ext uri="{BB962C8B-B14F-4D97-AF65-F5344CB8AC3E}">
-        <p14:creationId xmlns:p14="http://schemas.microsoft.com/office/powerpoint/2010/main" val="1029131241"/>
+        <p14:creationId xmlns:p14="http://schemas.microsoft.com/office/powerpoint/2010/main" val="1251747576"/>
       </p:ext>
     </p:extLst>
   </p:cSld>
@@ -28566,7 +28647,7 @@
                   <a:schemeClr val="tx2"/>
                 </a:solidFill>
               </a:rPr>
-              <a:t> What Current Tools do? - RQ 3</a:t>
+              <a:t>Research Question 3 </a:t>
             </a:r>
           </a:p>
         </p:txBody>
@@ -28610,10 +28691,29 @@
           <a:bodyPr/>
           <a:lstStyle/>
           <a:p>
-            <a:r>
-              <a:rPr lang="de-DE" dirty="0"/>
-              <a:t>TeamScale </a:t>
-            </a:r>
+            <a:pPr marL="0" indent="0">
+              <a:buNone/>
+            </a:pPr>
+            <a:endParaRPr lang="en-GB" dirty="0"/>
+          </a:p>
+          <a:p>
+            <a:pPr marL="0" indent="0">
+              <a:buNone/>
+            </a:pPr>
+            <a:endParaRPr lang="en-GB" dirty="0"/>
+          </a:p>
+          <a:p>
+            <a:pPr marL="0" indent="0">
+              <a:buNone/>
+            </a:pPr>
+            <a:endParaRPr lang="en-GB" dirty="0"/>
+          </a:p>
+          <a:p>
+            <a:r>
+              <a:rPr lang="en-GB" sz="2400" dirty="0"/>
+              <a:t>How to carry traceability of bug fixing? </a:t>
+            </a:r>
+            <a:endParaRPr lang="de-DE" sz="2400" dirty="0"/>
           </a:p>
         </p:txBody>
       </p:sp>
@@ -28640,46 +28740,10 @@
           </a:p>
         </p:txBody>
       </p:sp>
-      <p:pic>
-        <p:nvPicPr>
-          <p:cNvPr id="7" name="Picture 6">
-            <a:extLst>
-              <a:ext uri="{FF2B5EF4-FFF2-40B4-BE49-F238E27FC236}">
-                <a16:creationId xmlns:a16="http://schemas.microsoft.com/office/drawing/2014/main" id="{890F7F07-D436-49DB-921B-7C41A16477AE}"/>
-              </a:ext>
-            </a:extLst>
-          </p:cNvPr>
-          <p:cNvPicPr>
-            <a:picLocks noChangeAspect="1"/>
-          </p:cNvPicPr>
-          <p:nvPr/>
-        </p:nvPicPr>
-        <p:blipFill>
-          <a:blip r:embed="rId2">
-            <a:extLst>
-              <a:ext uri="{28A0092B-C50C-407E-A947-70E740481C1C}">
-                <a14:useLocalDpi xmlns:a14="http://schemas.microsoft.com/office/drawing/2010/main" val="0"/>
-              </a:ext>
-            </a:extLst>
-          </a:blip>
-          <a:stretch>
-            <a:fillRect/>
-          </a:stretch>
-        </p:blipFill>
-        <p:spPr>
-          <a:xfrm>
-            <a:off x="354674" y="1844824"/>
-            <a:ext cx="8913411" cy="4536925"/>
-          </a:xfrm>
-          <a:prstGeom prst="rect">
-            <a:avLst/>
-          </a:prstGeom>
-        </p:spPr>
-      </p:pic>
     </p:spTree>
     <p:extLst>
       <p:ext uri="{BB962C8B-B14F-4D97-AF65-F5344CB8AC3E}">
-        <p14:creationId xmlns:p14="http://schemas.microsoft.com/office/powerpoint/2010/main" val="287106929"/>
+        <p14:creationId xmlns:p14="http://schemas.microsoft.com/office/powerpoint/2010/main" val="1029131241"/>
       </p:ext>
     </p:extLst>
   </p:cSld>
@@ -28727,7 +28791,7 @@
                   <a:schemeClr val="tx2"/>
                 </a:solidFill>
               </a:rPr>
-              <a:t>Our Approaches</a:t>
+              <a:t> What Current Tools do? - RQ 3: .. traceability!</a:t>
             </a:r>
           </a:p>
         </p:txBody>
@@ -28758,6 +28822,28 @@
       </p:sp>
       <p:sp>
         <p:nvSpPr>
+          <p:cNvPr id="5" name="Textplatzhalter 4"/>
+          <p:cNvSpPr>
+            <a:spLocks noGrp="1"/>
+          </p:cNvSpPr>
+          <p:nvPr>
+            <p:ph type="body" sz="quarter" idx="12"/>
+          </p:nvPr>
+        </p:nvSpPr>
+        <p:spPr/>
+        <p:txBody>
+          <a:bodyPr/>
+          <a:lstStyle/>
+          <a:p>
+            <a:r>
+              <a:rPr lang="de-DE" dirty="0"/>
+              <a:t>Teamscale </a:t>
+            </a:r>
+          </a:p>
+        </p:txBody>
+      </p:sp>
+      <p:sp>
+        <p:nvSpPr>
           <p:cNvPr id="3" name="Fußzeilenplatzhalter 2"/>
           <p:cNvSpPr>
             <a:spLocks noGrp="1"/>
@@ -28781,10 +28867,10 @@
       </p:sp>
       <p:pic>
         <p:nvPicPr>
-          <p:cNvPr id="7" name="Picture 6" descr="A close up of a logo&#10;&#10;Description automatically generated">
+          <p:cNvPr id="7" name="Picture 6">
             <a:extLst>
               <a:ext uri="{FF2B5EF4-FFF2-40B4-BE49-F238E27FC236}">
-                <a16:creationId xmlns:a16="http://schemas.microsoft.com/office/drawing/2014/main" id="{8269BFC5-F04C-47E7-A8B1-51CDB2571100}"/>
+                <a16:creationId xmlns:a16="http://schemas.microsoft.com/office/drawing/2014/main" id="{890F7F07-D436-49DB-921B-7C41A16477AE}"/>
               </a:ext>
             </a:extLst>
           </p:cNvPr>
@@ -28807,18 +28893,69 @@
         </p:blipFill>
         <p:spPr>
           <a:xfrm>
-            <a:off x="1928664" y="1014169"/>
-            <a:ext cx="5677290" cy="4829661"/>
+            <a:off x="1064568" y="1731687"/>
+            <a:ext cx="7406638" cy="3769978"/>
           </a:xfrm>
           <a:prstGeom prst="rect">
             <a:avLst/>
           </a:prstGeom>
         </p:spPr>
       </p:pic>
+      <p:sp>
+        <p:nvSpPr>
+          <p:cNvPr id="8" name="TextBox 7">
+            <a:extLst>
+              <a:ext uri="{FF2B5EF4-FFF2-40B4-BE49-F238E27FC236}">
+                <a16:creationId xmlns:a16="http://schemas.microsoft.com/office/drawing/2014/main" id="{E5019D44-16E4-46A4-B490-3160E0CDF620}"/>
+              </a:ext>
+            </a:extLst>
+          </p:cNvPr>
+          <p:cNvSpPr txBox="1"/>
+          <p:nvPr/>
+        </p:nvSpPr>
+        <p:spPr>
+          <a:xfrm>
+            <a:off x="304476" y="6135528"/>
+            <a:ext cx="4297330" cy="246221"/>
+          </a:xfrm>
+          <a:prstGeom prst="rect">
+            <a:avLst/>
+          </a:prstGeom>
+          <a:noFill/>
+        </p:spPr>
+        <p:txBody>
+          <a:bodyPr wrap="none" lIns="0" rIns="0" rtlCol="0">
+            <a:spAutoFit/>
+          </a:bodyPr>
+          <a:lstStyle/>
+          <a:p>
+            <a:pPr marL="360000" indent="-360000">
+              <a:spcAft>
+                <a:spcPts val="1000"/>
+              </a:spcAft>
+              <a:buClr>
+                <a:schemeClr val="tx2"/>
+              </a:buClr>
+              <a:buSzPct val="80000"/>
+              <a:buFont typeface="Wingdings" panose="05000000000000000000" pitchFamily="2" charset="2"/>
+              <a:buChar char="v"/>
+            </a:pPr>
+            <a:r>
+              <a:rPr lang="en-GB" sz="1000" dirty="0" err="1"/>
+              <a:t>Teamscale</a:t>
+            </a:r>
+            <a:r>
+              <a:rPr lang="en-GB" sz="1000" dirty="0"/>
+              <a:t>. url: https://www.cqse.eu/en/products/teamscale/features/.</a:t>
+            </a:r>
+            <a:endParaRPr lang="LID4096" sz="1000" dirty="0" err="1"/>
+          </a:p>
+        </p:txBody>
+      </p:sp>
     </p:spTree>
     <p:extLst>
       <p:ext uri="{BB962C8B-B14F-4D97-AF65-F5344CB8AC3E}">
-        <p14:creationId xmlns:p14="http://schemas.microsoft.com/office/powerpoint/2010/main" val="2449660059"/>
+        <p14:creationId xmlns:p14="http://schemas.microsoft.com/office/powerpoint/2010/main" val="287106929"/>
       </p:ext>
     </p:extLst>
   </p:cSld>
@@ -28897,118 +29034,6 @@
       </p:sp>
       <p:sp>
         <p:nvSpPr>
-          <p:cNvPr id="5" name="Textplatzhalter 4"/>
-          <p:cNvSpPr>
-            <a:spLocks noGrp="1"/>
-          </p:cNvSpPr>
-          <p:nvPr>
-            <p:ph type="body" sz="quarter" idx="12"/>
-          </p:nvPr>
-        </p:nvSpPr>
-        <p:spPr/>
-        <p:txBody>
-          <a:bodyPr/>
-          <a:lstStyle/>
-          <a:p>
-            <a:pPr marL="0" indent="0">
-              <a:buNone/>
-            </a:pPr>
-            <a:endParaRPr lang="de-DE" dirty="0"/>
-          </a:p>
-          <a:p>
-            <a:r>
-              <a:rPr lang="de-DE" dirty="0"/>
-              <a:t>Software Engineering disciplines:</a:t>
-            </a:r>
-            <a:br>
-              <a:rPr lang="de-DE" dirty="0"/>
-            </a:br>
-            <a:endParaRPr lang="de-DE" dirty="0"/>
-          </a:p>
-          <a:p>
-            <a:pPr lvl="4">
-              <a:buFont typeface="Wingdings" panose="05000000000000000000" pitchFamily="2" charset="2"/>
-              <a:buChar char="§"/>
-            </a:pPr>
-            <a:r>
-              <a:rPr lang="de-DE" dirty="0"/>
-              <a:t>Complex datasets</a:t>
-            </a:r>
-          </a:p>
-          <a:p>
-            <a:pPr lvl="4">
-              <a:buFont typeface="Wingdings" panose="05000000000000000000" pitchFamily="2" charset="2"/>
-              <a:buChar char="§"/>
-            </a:pPr>
-            <a:r>
-              <a:rPr lang="de-DE" dirty="0"/>
-              <a:t>Compiler reporting</a:t>
-            </a:r>
-          </a:p>
-          <a:p>
-            <a:pPr lvl="4">
-              <a:buFont typeface="Wingdings" panose="05000000000000000000" pitchFamily="2" charset="2"/>
-              <a:buChar char="§"/>
-            </a:pPr>
-            <a:r>
-              <a:rPr lang="de-DE" dirty="0"/>
-              <a:t>Continuous integration</a:t>
-            </a:r>
-          </a:p>
-          <a:p>
-            <a:pPr lvl="4">
-              <a:buFont typeface="Wingdings" panose="05000000000000000000" pitchFamily="2" charset="2"/>
-              <a:buChar char="§"/>
-            </a:pPr>
-            <a:r>
-              <a:rPr lang="de-DE" dirty="0"/>
-              <a:t>Refactoring tools</a:t>
-            </a:r>
-          </a:p>
-          <a:p>
-            <a:pPr lvl="4">
-              <a:buFont typeface="Wingdings" panose="05000000000000000000" pitchFamily="2" charset="2"/>
-              <a:buChar char="§"/>
-            </a:pPr>
-            <a:r>
-              <a:rPr lang="de-DE" dirty="0"/>
-              <a:t>Issue tracker</a:t>
-            </a:r>
-          </a:p>
-          <a:p>
-            <a:pPr lvl="4">
-              <a:buFont typeface="Wingdings" panose="05000000000000000000" pitchFamily="2" charset="2"/>
-              <a:buChar char="§"/>
-            </a:pPr>
-            <a:r>
-              <a:rPr lang="de-DE" dirty="0"/>
-              <a:t>Stack Overflow </a:t>
-            </a:r>
-          </a:p>
-          <a:p>
-            <a:pPr lvl="4">
-              <a:buFont typeface="Wingdings" panose="05000000000000000000" pitchFamily="2" charset="2"/>
-              <a:buChar char="§"/>
-            </a:pPr>
-            <a:r>
-              <a:rPr lang="de-DE" dirty="0"/>
-              <a:t>Gamification</a:t>
-            </a:r>
-          </a:p>
-          <a:p>
-            <a:pPr lvl="4">
-              <a:buFont typeface="Wingdings" panose="05000000000000000000" pitchFamily="2" charset="2"/>
-              <a:buChar char="§"/>
-            </a:pPr>
-            <a:r>
-              <a:rPr lang="de-DE" dirty="0"/>
-              <a:t>Usability Engineering</a:t>
-            </a:r>
-          </a:p>
-        </p:txBody>
-      </p:sp>
-      <p:sp>
-        <p:nvSpPr>
           <p:cNvPr id="3" name="Fußzeilenplatzhalter 2"/>
           <p:cNvSpPr>
             <a:spLocks noGrp="1"/>
@@ -29030,10 +29055,116 @@
           </a:p>
         </p:txBody>
       </p:sp>
+      <p:pic>
+        <p:nvPicPr>
+          <p:cNvPr id="7" name="Picture 6" descr="A close up of a logo&#10;&#10;Description automatically generated">
+            <a:extLst>
+              <a:ext uri="{FF2B5EF4-FFF2-40B4-BE49-F238E27FC236}">
+                <a16:creationId xmlns:a16="http://schemas.microsoft.com/office/drawing/2014/main" id="{8269BFC5-F04C-47E7-A8B1-51CDB2571100}"/>
+              </a:ext>
+            </a:extLst>
+          </p:cNvPr>
+          <p:cNvPicPr>
+            <a:picLocks noChangeAspect="1"/>
+          </p:cNvPicPr>
+          <p:nvPr/>
+        </p:nvPicPr>
+        <p:blipFill>
+          <a:blip r:embed="rId2">
+            <a:extLst>
+              <a:ext uri="{28A0092B-C50C-407E-A947-70E740481C1C}">
+                <a14:useLocalDpi xmlns:a14="http://schemas.microsoft.com/office/drawing/2010/main" val="0"/>
+              </a:ext>
+            </a:extLst>
+          </a:blip>
+          <a:stretch>
+            <a:fillRect/>
+          </a:stretch>
+        </p:blipFill>
+        <p:spPr>
+          <a:xfrm>
+            <a:off x="1928664" y="1014169"/>
+            <a:ext cx="5677290" cy="4829661"/>
+          </a:xfrm>
+          <a:prstGeom prst="rect">
+            <a:avLst/>
+          </a:prstGeom>
+        </p:spPr>
+      </p:pic>
+      <p:sp>
+        <p:nvSpPr>
+          <p:cNvPr id="6" name="TextBox 5">
+            <a:extLst>
+              <a:ext uri="{FF2B5EF4-FFF2-40B4-BE49-F238E27FC236}">
+                <a16:creationId xmlns:a16="http://schemas.microsoft.com/office/drawing/2014/main" id="{0516F378-FF87-4E1C-B4F2-BBCAC2091072}"/>
+              </a:ext>
+            </a:extLst>
+          </p:cNvPr>
+          <p:cNvSpPr txBox="1"/>
+          <p:nvPr/>
+        </p:nvSpPr>
+        <p:spPr>
+          <a:xfrm>
+            <a:off x="304476" y="6135528"/>
+            <a:ext cx="8752980" cy="400110"/>
+          </a:xfrm>
+          <a:prstGeom prst="rect">
+            <a:avLst/>
+          </a:prstGeom>
+          <a:noFill/>
+        </p:spPr>
+        <p:txBody>
+          <a:bodyPr wrap="square" lIns="0" rIns="0" rtlCol="0">
+            <a:spAutoFit/>
+          </a:bodyPr>
+          <a:lstStyle/>
+          <a:p>
+            <a:pPr marL="360000" indent="-360000">
+              <a:spcAft>
+                <a:spcPts val="1000"/>
+              </a:spcAft>
+              <a:buClr>
+                <a:schemeClr val="tx2"/>
+              </a:buClr>
+              <a:buSzPct val="80000"/>
+              <a:buFont typeface="Wingdings" panose="05000000000000000000" pitchFamily="2" charset="2"/>
+              <a:buChar char="v"/>
+            </a:pPr>
+            <a:r>
+              <a:rPr lang="en-GB" sz="1000" dirty="0"/>
+              <a:t>How to Change Your Career from Graphic Design to UX Design. url: https://www.interaction-design.org/literature/article/</a:t>
+            </a:r>
+            <a:br>
+              <a:rPr lang="en-GB" sz="1000" dirty="0"/>
+            </a:br>
+            <a:r>
+              <a:rPr lang="en-GB" sz="1000" dirty="0"/>
+              <a:t>how-to-change-your-career-</a:t>
+            </a:r>
+            <a:r>
+              <a:rPr lang="en-GB" sz="1000" dirty="0" err="1"/>
+              <a:t>fromgraphic</a:t>
+            </a:r>
+            <a:r>
+              <a:rPr lang="en-GB" sz="1000" dirty="0"/>
+              <a:t>-design-to-</a:t>
+            </a:r>
+            <a:r>
+              <a:rPr lang="en-GB" sz="1000" dirty="0" err="1"/>
+              <a:t>ux</a:t>
+            </a:r>
+            <a:r>
+              <a:rPr lang="en-GB" sz="1000" dirty="0"/>
+              <a:t>-design.</a:t>
+            </a:r>
+            <a:endParaRPr lang="LID4096" sz="1000" dirty="0" err="1"/>
+          </a:p>
+        </p:txBody>
+      </p:sp>
     </p:spTree>
     <p:extLst>
       <p:ext uri="{BB962C8B-B14F-4D97-AF65-F5344CB8AC3E}">
-        <p14:creationId xmlns:p14="http://schemas.microsoft.com/office/powerpoint/2010/main" val="4265672591"/>
+        <p14:creationId xmlns:p14="http://schemas.microsoft.com/office/powerpoint/2010/main" val="2449660059"/>
       </p:ext>
     </p:extLst>
   </p:cSld>
@@ -29125,101 +29256,100 @@
           <a:bodyPr/>
           <a:lstStyle/>
           <a:p>
+            <a:pPr marL="0" indent="0">
+              <a:buNone/>
+            </a:pPr>
+            <a:endParaRPr lang="de-DE" dirty="0"/>
+          </a:p>
+          <a:p>
             <a:r>
               <a:rPr lang="de-DE" dirty="0"/>
-              <a:t>Complex datasets:</a:t>
-            </a:r>
-          </a:p>
-          <a:p>
+              <a:t>Software Engineering disciplines:</a:t>
+            </a:r>
+            <a:br>
+              <a:rPr lang="de-DE" dirty="0"/>
+            </a:br>
             <a:endParaRPr lang="de-DE" dirty="0"/>
           </a:p>
           <a:p>
-            <a:pPr lvl="1">
+            <a:pPr lvl="4">
               <a:buFont typeface="Wingdings" panose="05000000000000000000" pitchFamily="2" charset="2"/>
               <a:buChar char="§"/>
             </a:pPr>
             <a:r>
-              <a:rPr lang="en-GB" dirty="0"/>
-              <a:t>Dix et. al. - complex grouping and linking of datasets for Spreadsheets application </a:t>
-            </a:r>
-          </a:p>
-          <a:p>
-            <a:pPr lvl="1">
+              <a:rPr lang="de-DE" dirty="0"/>
+              <a:t>Complex datasets</a:t>
+            </a:r>
+          </a:p>
+          <a:p>
+            <a:pPr lvl="4">
               <a:buFont typeface="Wingdings" panose="05000000000000000000" pitchFamily="2" charset="2"/>
               <a:buChar char="§"/>
             </a:pPr>
-            <a:endParaRPr lang="en-GB" dirty="0"/>
-          </a:p>
-          <a:p>
-            <a:pPr marL="466362" lvl="1" indent="0">
-              <a:buNone/>
-            </a:pPr>
-            <a:r>
-              <a:rPr lang="en-GB" dirty="0"/>
-              <a:t>	Design lesson : extensibility of columns</a:t>
-            </a:r>
-          </a:p>
-          <a:p>
-            <a:pPr marL="466362" lvl="1" indent="0">
-              <a:buNone/>
-            </a:pPr>
-            <a:endParaRPr lang="en-GB" dirty="0"/>
-          </a:p>
-          <a:p>
             <a:r>
               <a:rPr lang="de-DE" dirty="0"/>
-              <a:t>Issue tracker</a:t>
-            </a:r>
-          </a:p>
-          <a:p>
-            <a:endParaRPr lang="de-DE" dirty="0"/>
-          </a:p>
-          <a:p>
-            <a:pPr lvl="1">
+              <a:t>Compiler reporting</a:t>
+            </a:r>
+          </a:p>
+          <a:p>
+            <a:pPr lvl="4">
               <a:buFont typeface="Wingdings" panose="05000000000000000000" pitchFamily="2" charset="2"/>
               <a:buChar char="§"/>
             </a:pPr>
             <a:r>
-              <a:rPr lang="en-GB" dirty="0" err="1"/>
-              <a:t>Baysal</a:t>
-            </a:r>
-            <a:r>
-              <a:rPr lang="en-GB" dirty="0"/>
-              <a:t> et. al. :</a:t>
-            </a:r>
-          </a:p>
-          <a:p>
-            <a:pPr lvl="1">
+              <a:rPr lang="de-DE" dirty="0"/>
+              <a:t>Continuous integration</a:t>
+            </a:r>
+          </a:p>
+          <a:p>
+            <a:pPr lvl="4">
               <a:buFont typeface="Wingdings" panose="05000000000000000000" pitchFamily="2" charset="2"/>
               <a:buChar char="§"/>
             </a:pPr>
-            <a:endParaRPr lang="en-GB" dirty="0"/>
-          </a:p>
-          <a:p>
-            <a:pPr lvl="2">
+            <a:r>
+              <a:rPr lang="de-DE" dirty="0"/>
+              <a:t>Refactoring tools</a:t>
+            </a:r>
+          </a:p>
+          <a:p>
+            <a:pPr lvl="4">
               <a:buFont typeface="Wingdings" panose="05000000000000000000" pitchFamily="2" charset="2"/>
-              <a:buChar char="v"/>
+              <a:buChar char="§"/>
             </a:pPr>
             <a:r>
-              <a:rPr lang="en-GB" dirty="0"/>
-              <a:t>Information overload </a:t>
-            </a:r>
-          </a:p>
-          <a:p>
-            <a:pPr lvl="2">
+              <a:rPr lang="de-DE" dirty="0"/>
+              <a:t>Issue tracker</a:t>
+            </a:r>
+          </a:p>
+          <a:p>
+            <a:pPr lvl="4">
               <a:buFont typeface="Wingdings" panose="05000000000000000000" pitchFamily="2" charset="2"/>
-              <a:buChar char="v"/>
+              <a:buChar char="§"/>
             </a:pPr>
             <a:r>
-              <a:rPr lang="en-GB" dirty="0"/>
-              <a:t>Expressiveness  </a:t>
-            </a:r>
-          </a:p>
-          <a:p>
-            <a:pPr marL="466362" lvl="1" indent="0">
-              <a:buNone/>
+              <a:rPr lang="de-DE" dirty="0"/>
+              <a:t>Stack Overflow </a:t>
+            </a:r>
+          </a:p>
+          <a:p>
+            <a:pPr lvl="4">
+              <a:buFont typeface="Wingdings" panose="05000000000000000000" pitchFamily="2" charset="2"/>
+              <a:buChar char="§"/>
             </a:pPr>
-            <a:endParaRPr lang="en-GB" dirty="0"/>
+            <a:r>
+              <a:rPr lang="de-DE" dirty="0"/>
+              <a:t>Gamification</a:t>
+            </a:r>
+          </a:p>
+          <a:p>
+            <a:pPr lvl="4">
+              <a:buFont typeface="Wingdings" panose="05000000000000000000" pitchFamily="2" charset="2"/>
+              <a:buChar char="§"/>
+            </a:pPr>
+            <a:r>
+              <a:rPr lang="de-DE" dirty="0"/>
+              <a:t>Usability Engineering</a:t>
+            </a:r>
           </a:p>
         </p:txBody>
       </p:sp>
@@ -29246,82 +29376,10 @@
           </a:p>
         </p:txBody>
       </p:sp>
-      <p:pic>
-        <p:nvPicPr>
-          <p:cNvPr id="7" name="Picture 6" descr="A close up of a logo&#10;&#10;Description automatically generated">
-            <a:extLst>
-              <a:ext uri="{FF2B5EF4-FFF2-40B4-BE49-F238E27FC236}">
-                <a16:creationId xmlns:a16="http://schemas.microsoft.com/office/drawing/2014/main" id="{BF7E2933-73C9-4A75-BA01-CAE65C93E87A}"/>
-              </a:ext>
-            </a:extLst>
-          </p:cNvPr>
-          <p:cNvPicPr>
-            <a:picLocks noChangeAspect="1"/>
-          </p:cNvPicPr>
-          <p:nvPr/>
-        </p:nvPicPr>
-        <p:blipFill>
-          <a:blip r:embed="rId2" cstate="print">
-            <a:extLst>
-              <a:ext uri="{28A0092B-C50C-407E-A947-70E740481C1C}">
-                <a14:useLocalDpi xmlns:a14="http://schemas.microsoft.com/office/drawing/2010/main" val="0"/>
-              </a:ext>
-            </a:extLst>
-          </a:blip>
-          <a:stretch>
-            <a:fillRect/>
-          </a:stretch>
-        </p:blipFill>
-        <p:spPr>
-          <a:xfrm>
-            <a:off x="5241032" y="2406920"/>
-            <a:ext cx="863735" cy="1022080"/>
-          </a:xfrm>
-          <a:prstGeom prst="rect">
-            <a:avLst/>
-          </a:prstGeom>
-        </p:spPr>
-      </p:pic>
-      <p:pic>
-        <p:nvPicPr>
-          <p:cNvPr id="11" name="Picture 10" descr="A close up of a logo&#10;&#10;Description automatically generated">
-            <a:extLst>
-              <a:ext uri="{FF2B5EF4-FFF2-40B4-BE49-F238E27FC236}">
-                <a16:creationId xmlns:a16="http://schemas.microsoft.com/office/drawing/2014/main" id="{E1C50C8A-5433-4F71-AF7A-8449CCEEBB1D}"/>
-              </a:ext>
-            </a:extLst>
-          </p:cNvPr>
-          <p:cNvPicPr>
-            <a:picLocks noChangeAspect="1"/>
-          </p:cNvPicPr>
-          <p:nvPr/>
-        </p:nvPicPr>
-        <p:blipFill>
-          <a:blip r:embed="rId2" cstate="print">
-            <a:extLst>
-              <a:ext uri="{28A0092B-C50C-407E-A947-70E740481C1C}">
-                <a14:useLocalDpi xmlns:a14="http://schemas.microsoft.com/office/drawing/2010/main" val="0"/>
-              </a:ext>
-            </a:extLst>
-          </a:blip>
-          <a:stretch>
-            <a:fillRect/>
-          </a:stretch>
-        </p:blipFill>
-        <p:spPr>
-          <a:xfrm>
-            <a:off x="3800872" y="5078548"/>
-            <a:ext cx="863735" cy="1022080"/>
-          </a:xfrm>
-          <a:prstGeom prst="rect">
-            <a:avLst/>
-          </a:prstGeom>
-        </p:spPr>
-      </p:pic>
     </p:spTree>
     <p:extLst>
       <p:ext uri="{BB962C8B-B14F-4D97-AF65-F5344CB8AC3E}">
-        <p14:creationId xmlns:p14="http://schemas.microsoft.com/office/powerpoint/2010/main" val="693282793"/>
+        <p14:creationId xmlns:p14="http://schemas.microsoft.com/office/powerpoint/2010/main" val="4265672591"/>
       </p:ext>
     </p:extLst>
   </p:cSld>
@@ -29369,7 +29427,7 @@
                   <a:schemeClr val="tx2"/>
                 </a:solidFill>
               </a:rPr>
-              <a:t>Example: RQ 1</a:t>
+              <a:t>Our Approaches – research existing scenarios!</a:t>
             </a:r>
           </a:p>
         </p:txBody>
@@ -29393,6 +29451,587 @@
               <a:rPr lang="de-DE" smtClean="0"/>
               <a:pPr/>
               <a:t>19</a:t>
+            </a:fld>
+            <a:endParaRPr lang="de-DE" dirty="0"/>
+          </a:p>
+        </p:txBody>
+      </p:sp>
+      <p:sp>
+        <p:nvSpPr>
+          <p:cNvPr id="5" name="Textplatzhalter 4"/>
+          <p:cNvSpPr>
+            <a:spLocks noGrp="1"/>
+          </p:cNvSpPr>
+          <p:nvPr>
+            <p:ph type="body" sz="quarter" idx="12"/>
+          </p:nvPr>
+        </p:nvSpPr>
+        <p:spPr/>
+        <p:txBody>
+          <a:bodyPr/>
+          <a:lstStyle/>
+          <a:p>
+            <a:r>
+              <a:rPr lang="de-DE" dirty="0"/>
+              <a:t>Complex datasets:</a:t>
+            </a:r>
+            <a:br>
+              <a:rPr lang="de-DE" dirty="0"/>
+            </a:br>
+            <a:endParaRPr lang="de-DE" dirty="0"/>
+          </a:p>
+          <a:p>
+            <a:pPr lvl="1">
+              <a:buFont typeface="Wingdings" panose="05000000000000000000" pitchFamily="2" charset="2"/>
+              <a:buChar char="§"/>
+            </a:pPr>
+            <a:r>
+              <a:rPr lang="en-GB" dirty="0"/>
+              <a:t>Dix et. al. - complex grouping and linking of datasets for Spreadsheets application </a:t>
+            </a:r>
+          </a:p>
+          <a:p>
+            <a:pPr marL="466362" lvl="1" indent="0">
+              <a:buNone/>
+            </a:pPr>
+            <a:r>
+              <a:rPr lang="en-GB" dirty="0"/>
+              <a:t>	Design lesson : extensibility of columns</a:t>
+            </a:r>
+            <a:br>
+              <a:rPr lang="en-GB" dirty="0"/>
+            </a:br>
+            <a:endParaRPr lang="en-GB" dirty="0"/>
+          </a:p>
+          <a:p>
+            <a:r>
+              <a:rPr lang="de-DE" dirty="0"/>
+              <a:t>Issue tracker</a:t>
+            </a:r>
+            <a:br>
+              <a:rPr lang="de-DE" dirty="0"/>
+            </a:br>
+            <a:endParaRPr lang="de-DE" dirty="0"/>
+          </a:p>
+          <a:p>
+            <a:pPr lvl="1">
+              <a:buFont typeface="Wingdings" panose="05000000000000000000" pitchFamily="2" charset="2"/>
+              <a:buChar char="§"/>
+            </a:pPr>
+            <a:r>
+              <a:rPr lang="en-GB" dirty="0" err="1"/>
+              <a:t>Baysal</a:t>
+            </a:r>
+            <a:r>
+              <a:rPr lang="en-GB" dirty="0"/>
+              <a:t> et. al. :</a:t>
+            </a:r>
+          </a:p>
+          <a:p>
+            <a:pPr lvl="4">
+              <a:buFont typeface="Wingdings" panose="05000000000000000000" pitchFamily="2" charset="2"/>
+              <a:buChar char="v"/>
+            </a:pPr>
+            <a:r>
+              <a:rPr lang="en-GB" dirty="0"/>
+              <a:t>Information overload </a:t>
+            </a:r>
+          </a:p>
+          <a:p>
+            <a:pPr lvl="4">
+              <a:buFont typeface="Wingdings" panose="05000000000000000000" pitchFamily="2" charset="2"/>
+              <a:buChar char="v"/>
+            </a:pPr>
+            <a:r>
+              <a:rPr lang="en-GB" dirty="0"/>
+              <a:t>Expressiveness  </a:t>
+            </a:r>
+          </a:p>
+          <a:p>
+            <a:pPr marL="466362" lvl="1" indent="0">
+              <a:buNone/>
+            </a:pPr>
+            <a:endParaRPr lang="en-GB" dirty="0"/>
+          </a:p>
+        </p:txBody>
+      </p:sp>
+      <p:sp>
+        <p:nvSpPr>
+          <p:cNvPr id="3" name="Fußzeilenplatzhalter 2"/>
+          <p:cNvSpPr>
+            <a:spLocks noGrp="1"/>
+          </p:cNvSpPr>
+          <p:nvPr>
+            <p:ph type="ftr" sz="quarter" idx="10"/>
+          </p:nvPr>
+        </p:nvSpPr>
+        <p:spPr/>
+        <p:txBody>
+          <a:bodyPr/>
+          <a:lstStyle/>
+          <a:p>
+            <a:r>
+              <a:rPr lang="de-DE"/>
+              <a:t>Software Engineering</a:t>
+            </a:r>
+            <a:endParaRPr lang="de-DE" dirty="0"/>
+          </a:p>
+        </p:txBody>
+      </p:sp>
+      <p:pic>
+        <p:nvPicPr>
+          <p:cNvPr id="7" name="Picture 6" descr="A close up of a logo&#10;&#10;Description automatically generated">
+            <a:extLst>
+              <a:ext uri="{FF2B5EF4-FFF2-40B4-BE49-F238E27FC236}">
+                <a16:creationId xmlns:a16="http://schemas.microsoft.com/office/drawing/2014/main" id="{BF7E2933-73C9-4A75-BA01-CAE65C93E87A}"/>
+              </a:ext>
+            </a:extLst>
+          </p:cNvPr>
+          <p:cNvPicPr>
+            <a:picLocks noChangeAspect="1"/>
+          </p:cNvPicPr>
+          <p:nvPr/>
+        </p:nvPicPr>
+        <p:blipFill>
+          <a:blip r:embed="rId2" cstate="print">
+            <a:extLst>
+              <a:ext uri="{28A0092B-C50C-407E-A947-70E740481C1C}">
+                <a14:useLocalDpi xmlns:a14="http://schemas.microsoft.com/office/drawing/2010/main" val="0"/>
+              </a:ext>
+            </a:extLst>
+          </a:blip>
+          <a:stretch>
+            <a:fillRect/>
+          </a:stretch>
+        </p:blipFill>
+        <p:spPr>
+          <a:xfrm>
+            <a:off x="5140620" y="2114622"/>
+            <a:ext cx="863735" cy="1022080"/>
+          </a:xfrm>
+          <a:prstGeom prst="rect">
+            <a:avLst/>
+          </a:prstGeom>
+        </p:spPr>
+      </p:pic>
+      <p:pic>
+        <p:nvPicPr>
+          <p:cNvPr id="11" name="Picture 10" descr="A close up of a logo&#10;&#10;Description automatically generated">
+            <a:extLst>
+              <a:ext uri="{FF2B5EF4-FFF2-40B4-BE49-F238E27FC236}">
+                <a16:creationId xmlns:a16="http://schemas.microsoft.com/office/drawing/2014/main" id="{E1C50C8A-5433-4F71-AF7A-8449CCEEBB1D}"/>
+              </a:ext>
+            </a:extLst>
+          </p:cNvPr>
+          <p:cNvPicPr>
+            <a:picLocks noChangeAspect="1"/>
+          </p:cNvPicPr>
+          <p:nvPr/>
+        </p:nvPicPr>
+        <p:blipFill>
+          <a:blip r:embed="rId2" cstate="print">
+            <a:extLst>
+              <a:ext uri="{28A0092B-C50C-407E-A947-70E740481C1C}">
+                <a14:useLocalDpi xmlns:a14="http://schemas.microsoft.com/office/drawing/2010/main" val="0"/>
+              </a:ext>
+            </a:extLst>
+          </a:blip>
+          <a:stretch>
+            <a:fillRect/>
+          </a:stretch>
+        </p:blipFill>
+        <p:spPr>
+          <a:xfrm>
+            <a:off x="4708753" y="3997730"/>
+            <a:ext cx="863735" cy="1022080"/>
+          </a:xfrm>
+          <a:prstGeom prst="rect">
+            <a:avLst/>
+          </a:prstGeom>
+        </p:spPr>
+      </p:pic>
+      <p:sp>
+        <p:nvSpPr>
+          <p:cNvPr id="8" name="TextBox 7">
+            <a:extLst>
+              <a:ext uri="{FF2B5EF4-FFF2-40B4-BE49-F238E27FC236}">
+                <a16:creationId xmlns:a16="http://schemas.microsoft.com/office/drawing/2014/main" id="{0BD762A4-6F7F-4702-97BD-EDFD4776D007}"/>
+              </a:ext>
+            </a:extLst>
+          </p:cNvPr>
+          <p:cNvSpPr txBox="1"/>
+          <p:nvPr/>
+        </p:nvSpPr>
+        <p:spPr>
+          <a:xfrm>
+            <a:off x="270900" y="5373216"/>
+            <a:ext cx="8845050" cy="1143903"/>
+          </a:xfrm>
+          <a:prstGeom prst="rect">
+            <a:avLst/>
+          </a:prstGeom>
+          <a:noFill/>
+        </p:spPr>
+        <p:txBody>
+          <a:bodyPr wrap="none" lIns="0" rIns="0" rtlCol="0">
+            <a:spAutoFit/>
+          </a:bodyPr>
+          <a:lstStyle/>
+          <a:p>
+            <a:pPr marL="360000" indent="-360000">
+              <a:spcAft>
+                <a:spcPts val="1000"/>
+              </a:spcAft>
+              <a:buClr>
+                <a:schemeClr val="tx2"/>
+              </a:buClr>
+              <a:buSzPct val="80000"/>
+              <a:buFont typeface="Wingdings" panose="05000000000000000000" pitchFamily="2" charset="2"/>
+              <a:buChar char="v"/>
+            </a:pPr>
+            <a:r>
+              <a:rPr lang="en-GB" sz="1000" dirty="0"/>
+              <a:t>Alan Dix, Rachel Cowgill, Christina Bashford, Simon McVeigh, and Rupert </a:t>
+            </a:r>
+            <a:r>
+              <a:rPr lang="en-GB" sz="1000" dirty="0" err="1"/>
+              <a:t>Ridgewell</a:t>
+            </a:r>
+            <a:r>
+              <a:rPr lang="en-GB" sz="1000" dirty="0"/>
+              <a:t>. 2016. Spreadsheets as User Interfaces. In </a:t>
+            </a:r>
+            <a:r>
+              <a:rPr lang="en-GB" sz="1000" i="1" dirty="0"/>
+              <a:t>Proceedings of the </a:t>
+            </a:r>
+            <a:br>
+              <a:rPr lang="en-GB" sz="1000" i="1" dirty="0"/>
+            </a:br>
+            <a:r>
+              <a:rPr lang="en-GB" sz="1000" i="1" dirty="0"/>
+              <a:t>International Working Conference on Advanced Visual Interfaces</a:t>
+            </a:r>
+            <a:r>
+              <a:rPr lang="en-GB" sz="1000" dirty="0"/>
+              <a:t> (AVI '16), Paolo </a:t>
+            </a:r>
+            <a:r>
+              <a:rPr lang="en-GB" sz="1000" dirty="0" err="1"/>
+              <a:t>Buono</a:t>
+            </a:r>
+            <a:r>
+              <a:rPr lang="en-GB" sz="1000" dirty="0"/>
+              <a:t>, Rosa </a:t>
+            </a:r>
+            <a:r>
+              <a:rPr lang="en-GB" sz="1000" dirty="0" err="1"/>
+              <a:t>Lanzilotti</a:t>
+            </a:r>
+            <a:r>
+              <a:rPr lang="en-GB" sz="1000" dirty="0"/>
+              <a:t>, and </a:t>
+            </a:r>
+            <a:r>
+              <a:rPr lang="en-GB" sz="1000" dirty="0" err="1"/>
+              <a:t>Maristella</a:t>
+            </a:r>
+            <a:r>
+              <a:rPr lang="en-GB" sz="1000" dirty="0"/>
+              <a:t> Matera (Eds.). ACM, New </a:t>
+            </a:r>
+            <a:br>
+              <a:rPr lang="en-GB" sz="1000" dirty="0"/>
+            </a:br>
+            <a:r>
+              <a:rPr lang="en-GB" sz="1000" dirty="0"/>
+              <a:t>York, NY, USA, 192-195. DOI: https://doi.org/10.1145/2909132.2909271  </a:t>
+            </a:r>
+          </a:p>
+          <a:p>
+            <a:pPr marL="360000" indent="-360000">
+              <a:spcAft>
+                <a:spcPts val="1000"/>
+              </a:spcAft>
+              <a:buClr>
+                <a:schemeClr val="tx2"/>
+              </a:buClr>
+              <a:buSzPct val="80000"/>
+              <a:buFont typeface="Wingdings" panose="05000000000000000000" pitchFamily="2" charset="2"/>
+              <a:buChar char="v"/>
+            </a:pPr>
+            <a:r>
+              <a:rPr lang="en-GB" sz="1000" dirty="0"/>
+              <a:t>Olga </a:t>
+            </a:r>
+            <a:r>
+              <a:rPr lang="en-GB" sz="1000" dirty="0" err="1"/>
+              <a:t>Baysal</a:t>
+            </a:r>
+            <a:r>
+              <a:rPr lang="en-GB" sz="1000" dirty="0"/>
+              <a:t>, Reid Holmes, and Michael W. Godfrey. 2014. No issue left behind: reducing information overload in issue tracking. In </a:t>
+            </a:r>
+            <a:r>
+              <a:rPr lang="en-GB" sz="1000" i="1" dirty="0"/>
+              <a:t>Proceedings of the </a:t>
+            </a:r>
+            <a:br>
+              <a:rPr lang="en-GB" sz="1000" i="1" dirty="0"/>
+            </a:br>
+            <a:r>
+              <a:rPr lang="en-GB" sz="1000" i="1" dirty="0"/>
+              <a:t>22nd ACM SIGSOFT International Symposium on Foundations of Software Engineering</a:t>
+            </a:r>
+            <a:r>
+              <a:rPr lang="en-GB" sz="1000" dirty="0"/>
+              <a:t> (FSE 2014). ACM, New York, NY, USA, 666-677. </a:t>
+            </a:r>
+            <a:br>
+              <a:rPr lang="en-GB" sz="1000" dirty="0"/>
+            </a:br>
+            <a:r>
+              <a:rPr lang="en-GB" sz="1000" dirty="0"/>
+              <a:t>DOI: https://doi.org/10.1145/2635868.2635887 </a:t>
+            </a:r>
+            <a:endParaRPr lang="LID4096" sz="1000" dirty="0" err="1"/>
+          </a:p>
+        </p:txBody>
+      </p:sp>
+    </p:spTree>
+    <p:extLst>
+      <p:ext uri="{BB962C8B-B14F-4D97-AF65-F5344CB8AC3E}">
+        <p14:creationId xmlns:p14="http://schemas.microsoft.com/office/powerpoint/2010/main" val="693282793"/>
+      </p:ext>
+    </p:extLst>
+  </p:cSld>
+  <p:clrMapOvr>
+    <a:masterClrMapping/>
+  </p:clrMapOvr>
+</p:sld>
+</file>
+
+<file path=ppt/slides/slide2.xml><?xml version="1.0" encoding="utf-8"?>
+<p:sld xmlns:a="http://schemas.openxmlformats.org/drawingml/2006/main" xmlns:r="http://schemas.openxmlformats.org/officeDocument/2006/relationships" xmlns:p="http://schemas.openxmlformats.org/presentationml/2006/main">
+  <p:cSld>
+    <p:spTree>
+      <p:nvGrpSpPr>
+        <p:cNvPr id="1" name=""/>
+        <p:cNvGrpSpPr/>
+        <p:nvPr/>
+      </p:nvGrpSpPr>
+      <p:grpSpPr>
+        <a:xfrm>
+          <a:off x="0" y="0"/>
+          <a:ext cx="0" cy="0"/>
+          <a:chOff x="0" y="0"/>
+          <a:chExt cx="0" cy="0"/>
+        </a:xfrm>
+      </p:grpSpPr>
+      <p:sp>
+        <p:nvSpPr>
+          <p:cNvPr id="4" name="Foliennummernplatzhalter 3"/>
+          <p:cNvSpPr>
+            <a:spLocks noGrp="1"/>
+          </p:cNvSpPr>
+          <p:nvPr>
+            <p:ph type="sldNum" sz="quarter" idx="11"/>
+          </p:nvPr>
+        </p:nvSpPr>
+        <p:spPr/>
+        <p:txBody>
+          <a:bodyPr/>
+          <a:lstStyle/>
+          <a:p>
+            <a:fld id="{815DB69B-0A2B-4D0B-A3BD-360AAA24381D}" type="slidenum">
+              <a:rPr lang="de-DE" smtClean="0"/>
+              <a:pPr/>
+              <a:t>2</a:t>
+            </a:fld>
+            <a:endParaRPr lang="de-DE" dirty="0"/>
+          </a:p>
+        </p:txBody>
+      </p:sp>
+      <p:sp>
+        <p:nvSpPr>
+          <p:cNvPr id="3" name="Fußzeilenplatzhalter 2"/>
+          <p:cNvSpPr>
+            <a:spLocks noGrp="1"/>
+          </p:cNvSpPr>
+          <p:nvPr>
+            <p:ph type="ftr" sz="quarter" idx="10"/>
+          </p:nvPr>
+        </p:nvSpPr>
+        <p:spPr/>
+        <p:txBody>
+          <a:bodyPr/>
+          <a:lstStyle/>
+          <a:p>
+            <a:r>
+              <a:rPr lang="de-DE"/>
+              <a:t>Software Engineering</a:t>
+            </a:r>
+            <a:endParaRPr lang="de-DE" dirty="0"/>
+          </a:p>
+        </p:txBody>
+      </p:sp>
+      <p:pic>
+        <p:nvPicPr>
+          <p:cNvPr id="7" name="Picture 6">
+            <a:extLst>
+              <a:ext uri="{FF2B5EF4-FFF2-40B4-BE49-F238E27FC236}">
+                <a16:creationId xmlns:a16="http://schemas.microsoft.com/office/drawing/2014/main" id="{16866D7D-AD1E-4867-8D87-D3C3B16C2A79}"/>
+              </a:ext>
+            </a:extLst>
+          </p:cNvPr>
+          <p:cNvPicPr>
+            <a:picLocks noChangeAspect="1"/>
+          </p:cNvPicPr>
+          <p:nvPr/>
+        </p:nvPicPr>
+        <p:blipFill>
+          <a:blip r:embed="rId2">
+            <a:extLst>
+              <a:ext uri="{28A0092B-C50C-407E-A947-70E740481C1C}">
+                <a14:useLocalDpi xmlns:a14="http://schemas.microsoft.com/office/drawing/2010/main" val="0"/>
+              </a:ext>
+            </a:extLst>
+          </a:blip>
+          <a:stretch>
+            <a:fillRect/>
+          </a:stretch>
+        </p:blipFill>
+        <p:spPr>
+          <a:xfrm>
+            <a:off x="415236" y="876507"/>
+            <a:ext cx="9075528" cy="5104985"/>
+          </a:xfrm>
+          <a:prstGeom prst="rect">
+            <a:avLst/>
+          </a:prstGeom>
+        </p:spPr>
+      </p:pic>
+      <p:sp>
+        <p:nvSpPr>
+          <p:cNvPr id="5" name="TextBox 4">
+            <a:extLst>
+              <a:ext uri="{FF2B5EF4-FFF2-40B4-BE49-F238E27FC236}">
+                <a16:creationId xmlns:a16="http://schemas.microsoft.com/office/drawing/2014/main" id="{51A2F3CA-AE61-476D-9F7A-BB8938610A4B}"/>
+              </a:ext>
+            </a:extLst>
+          </p:cNvPr>
+          <p:cNvSpPr txBox="1"/>
+          <p:nvPr/>
+        </p:nvSpPr>
+        <p:spPr>
+          <a:xfrm>
+            <a:off x="272228" y="6114201"/>
+            <a:ext cx="2838598" cy="246221"/>
+          </a:xfrm>
+          <a:prstGeom prst="rect">
+            <a:avLst/>
+          </a:prstGeom>
+          <a:noFill/>
+        </p:spPr>
+        <p:txBody>
+          <a:bodyPr wrap="none" lIns="0" rIns="0" rtlCol="0">
+            <a:spAutoFit/>
+          </a:bodyPr>
+          <a:lstStyle/>
+          <a:p>
+            <a:pPr marL="360000" indent="-360000">
+              <a:spcAft>
+                <a:spcPts val="1000"/>
+              </a:spcAft>
+              <a:buClr>
+                <a:schemeClr val="tx2"/>
+              </a:buClr>
+              <a:buSzPct val="80000"/>
+              <a:buFont typeface="Wingdings" panose="05000000000000000000" pitchFamily="2" charset="2"/>
+              <a:buChar char="v"/>
+            </a:pPr>
+            <a:r>
+              <a:rPr lang="en-GB" sz="1000" dirty="0"/>
+              <a:t>https://unicorn.com/en/software-everywhere</a:t>
+            </a:r>
+          </a:p>
+        </p:txBody>
+      </p:sp>
+    </p:spTree>
+    <p:extLst>
+      <p:ext uri="{BB962C8B-B14F-4D97-AF65-F5344CB8AC3E}">
+        <p14:creationId xmlns:p14="http://schemas.microsoft.com/office/powerpoint/2010/main" val="269010616"/>
+      </p:ext>
+    </p:extLst>
+  </p:cSld>
+  <p:clrMapOvr>
+    <a:masterClrMapping/>
+  </p:clrMapOvr>
+</p:sld>
+</file>
+
+<file path=ppt/slides/slide20.xml><?xml version="1.0" encoding="utf-8"?>
+<p:sld xmlns:a="http://schemas.openxmlformats.org/drawingml/2006/main" xmlns:r="http://schemas.openxmlformats.org/officeDocument/2006/relationships" xmlns:p="http://schemas.openxmlformats.org/presentationml/2006/main">
+  <p:cSld>
+    <p:spTree>
+      <p:nvGrpSpPr>
+        <p:cNvPr id="1" name=""/>
+        <p:cNvGrpSpPr/>
+        <p:nvPr/>
+      </p:nvGrpSpPr>
+      <p:grpSpPr>
+        <a:xfrm>
+          <a:off x="0" y="0"/>
+          <a:ext cx="0" cy="0"/>
+          <a:chOff x="0" y="0"/>
+          <a:chExt cx="0" cy="0"/>
+        </a:xfrm>
+      </p:grpSpPr>
+      <p:sp>
+        <p:nvSpPr>
+          <p:cNvPr id="2" name="Titel 1"/>
+          <p:cNvSpPr>
+            <a:spLocks noGrp="1"/>
+          </p:cNvSpPr>
+          <p:nvPr>
+            <p:ph type="title"/>
+          </p:nvPr>
+        </p:nvSpPr>
+        <p:spPr/>
+        <p:txBody>
+          <a:bodyPr/>
+          <a:lstStyle/>
+          <a:p>
+            <a:r>
+              <a:rPr lang="de-DE" dirty="0">
+                <a:solidFill>
+                  <a:schemeClr val="tx2"/>
+                </a:solidFill>
+              </a:rPr>
+              <a:t>Example: RQ 1 - .. display results!</a:t>
+            </a:r>
+          </a:p>
+        </p:txBody>
+      </p:sp>
+      <p:sp>
+        <p:nvSpPr>
+          <p:cNvPr id="4" name="Foliennummernplatzhalter 3"/>
+          <p:cNvSpPr>
+            <a:spLocks noGrp="1"/>
+          </p:cNvSpPr>
+          <p:nvPr>
+            <p:ph type="sldNum" sz="quarter" idx="11"/>
+          </p:nvPr>
+        </p:nvSpPr>
+        <p:spPr/>
+        <p:txBody>
+          <a:bodyPr/>
+          <a:lstStyle/>
+          <a:p>
+            <a:fld id="{815DB69B-0A2B-4D0B-A3BD-360AAA24381D}" type="slidenum">
+              <a:rPr lang="de-DE" smtClean="0"/>
+              <a:pPr/>
+              <a:t>20</a:t>
             </a:fld>
             <a:endParaRPr lang="de-DE" dirty="0"/>
           </a:p>
@@ -29492,120 +30131,7 @@
 </p:sld>
 </file>
 
-<file path=ppt/slides/slide2.xml><?xml version="1.0" encoding="utf-8"?>
-<p:sld xmlns:a="http://schemas.openxmlformats.org/drawingml/2006/main" xmlns:r="http://schemas.openxmlformats.org/officeDocument/2006/relationships" xmlns:p="http://schemas.openxmlformats.org/presentationml/2006/main">
-  <p:cSld>
-    <p:spTree>
-      <p:nvGrpSpPr>
-        <p:cNvPr id="1" name=""/>
-        <p:cNvGrpSpPr/>
-        <p:nvPr/>
-      </p:nvGrpSpPr>
-      <p:grpSpPr>
-        <a:xfrm>
-          <a:off x="0" y="0"/>
-          <a:ext cx="0" cy="0"/>
-          <a:chOff x="0" y="0"/>
-          <a:chExt cx="0" cy="0"/>
-        </a:xfrm>
-      </p:grpSpPr>
-      <p:sp>
-        <p:nvSpPr>
-          <p:cNvPr id="4" name="Foliennummernplatzhalter 3"/>
-          <p:cNvSpPr>
-            <a:spLocks noGrp="1"/>
-          </p:cNvSpPr>
-          <p:nvPr>
-            <p:ph type="sldNum" sz="quarter" idx="11"/>
-          </p:nvPr>
-        </p:nvSpPr>
-        <p:spPr/>
-        <p:txBody>
-          <a:bodyPr/>
-          <a:lstStyle/>
-          <a:p>
-            <a:fld id="{815DB69B-0A2B-4D0B-A3BD-360AAA24381D}" type="slidenum">
-              <a:rPr lang="de-DE" smtClean="0"/>
-              <a:pPr/>
-              <a:t>2</a:t>
-            </a:fld>
-            <a:endParaRPr lang="de-DE" dirty="0"/>
-          </a:p>
-        </p:txBody>
-      </p:sp>
-      <p:sp>
-        <p:nvSpPr>
-          <p:cNvPr id="3" name="Fußzeilenplatzhalter 2"/>
-          <p:cNvSpPr>
-            <a:spLocks noGrp="1"/>
-          </p:cNvSpPr>
-          <p:nvPr>
-            <p:ph type="ftr" sz="quarter" idx="10"/>
-          </p:nvPr>
-        </p:nvSpPr>
-        <p:spPr/>
-        <p:txBody>
-          <a:bodyPr/>
-          <a:lstStyle/>
-          <a:p>
-            <a:r>
-              <a:rPr lang="de-DE"/>
-              <a:t>Software Engineering</a:t>
-            </a:r>
-            <a:endParaRPr lang="de-DE" dirty="0"/>
-          </a:p>
-        </p:txBody>
-      </p:sp>
-      <p:pic>
-        <p:nvPicPr>
-          <p:cNvPr id="7" name="Picture 6">
-            <a:extLst>
-              <a:ext uri="{FF2B5EF4-FFF2-40B4-BE49-F238E27FC236}">
-                <a16:creationId xmlns:a16="http://schemas.microsoft.com/office/drawing/2014/main" id="{16866D7D-AD1E-4867-8D87-D3C3B16C2A79}"/>
-              </a:ext>
-            </a:extLst>
-          </p:cNvPr>
-          <p:cNvPicPr>
-            <a:picLocks noChangeAspect="1"/>
-          </p:cNvPicPr>
-          <p:nvPr/>
-        </p:nvPicPr>
-        <p:blipFill>
-          <a:blip r:embed="rId2">
-            <a:extLst>
-              <a:ext uri="{28A0092B-C50C-407E-A947-70E740481C1C}">
-                <a14:useLocalDpi xmlns:a14="http://schemas.microsoft.com/office/drawing/2010/main" val="0"/>
-              </a:ext>
-            </a:extLst>
-          </a:blip>
-          <a:stretch>
-            <a:fillRect/>
-          </a:stretch>
-        </p:blipFill>
-        <p:spPr>
-          <a:xfrm>
-            <a:off x="415236" y="876507"/>
-            <a:ext cx="9075528" cy="5104985"/>
-          </a:xfrm>
-          <a:prstGeom prst="rect">
-            <a:avLst/>
-          </a:prstGeom>
-        </p:spPr>
-      </p:pic>
-    </p:spTree>
-    <p:extLst>
-      <p:ext uri="{BB962C8B-B14F-4D97-AF65-F5344CB8AC3E}">
-        <p14:creationId xmlns:p14="http://schemas.microsoft.com/office/powerpoint/2010/main" val="269010616"/>
-      </p:ext>
-    </p:extLst>
-  </p:cSld>
-  <p:clrMapOvr>
-    <a:masterClrMapping/>
-  </p:clrMapOvr>
-</p:sld>
-</file>
-
-<file path=ppt/slides/slide20.xml><?xml version="1.0" encoding="utf-8"?>
+<file path=ppt/slides/slide21.xml><?xml version="1.0" encoding="utf-8"?>
 <p:sld xmlns:a="http://schemas.openxmlformats.org/drawingml/2006/main" xmlns:r="http://schemas.openxmlformats.org/officeDocument/2006/relationships" xmlns:p="http://schemas.openxmlformats.org/presentationml/2006/main">
   <p:cSld>
     <p:spTree>
@@ -29643,7 +30169,7 @@
                   <a:schemeClr val="tx2"/>
                 </a:solidFill>
               </a:rPr>
-              <a:t>Example: RQ 1</a:t>
+              <a:t>Example: RQ 1 - .. display results!</a:t>
             </a:r>
           </a:p>
         </p:txBody>
@@ -29666,7 +30192,7 @@
             <a:fld id="{815DB69B-0A2B-4D0B-A3BD-360AAA24381D}" type="slidenum">
               <a:rPr lang="de-DE" smtClean="0"/>
               <a:pPr/>
-              <a:t>20</a:t>
+              <a:t>21</a:t>
             </a:fld>
             <a:endParaRPr lang="de-DE" dirty="0"/>
           </a:p>
@@ -29766,197 +30292,6 @@
 </p:sld>
 </file>
 
-<file path=ppt/slides/slide21.xml><?xml version="1.0" encoding="utf-8"?>
-<p:sld xmlns:a="http://schemas.openxmlformats.org/drawingml/2006/main" xmlns:r="http://schemas.openxmlformats.org/officeDocument/2006/relationships" xmlns:p="http://schemas.openxmlformats.org/presentationml/2006/main">
-  <p:cSld>
-    <p:spTree>
-      <p:nvGrpSpPr>
-        <p:cNvPr id="1" name=""/>
-        <p:cNvGrpSpPr/>
-        <p:nvPr/>
-      </p:nvGrpSpPr>
-      <p:grpSpPr>
-        <a:xfrm>
-          <a:off x="0" y="0"/>
-          <a:ext cx="0" cy="0"/>
-          <a:chOff x="0" y="0"/>
-          <a:chExt cx="0" cy="0"/>
-        </a:xfrm>
-      </p:grpSpPr>
-      <p:sp>
-        <p:nvSpPr>
-          <p:cNvPr id="2" name="Titel 1"/>
-          <p:cNvSpPr>
-            <a:spLocks noGrp="1"/>
-          </p:cNvSpPr>
-          <p:nvPr>
-            <p:ph type="title"/>
-          </p:nvPr>
-        </p:nvSpPr>
-        <p:spPr/>
-        <p:txBody>
-          <a:bodyPr/>
-          <a:lstStyle/>
-          <a:p>
-            <a:r>
-              <a:rPr lang="de-DE" dirty="0">
-                <a:solidFill>
-                  <a:schemeClr val="tx2"/>
-                </a:solidFill>
-              </a:rPr>
-              <a:t>Evaluation</a:t>
-            </a:r>
-          </a:p>
-        </p:txBody>
-      </p:sp>
-      <p:sp>
-        <p:nvSpPr>
-          <p:cNvPr id="4" name="Foliennummernplatzhalter 3"/>
-          <p:cNvSpPr>
-            <a:spLocks noGrp="1"/>
-          </p:cNvSpPr>
-          <p:nvPr>
-            <p:ph type="sldNum" sz="quarter" idx="11"/>
-          </p:nvPr>
-        </p:nvSpPr>
-        <p:spPr/>
-        <p:txBody>
-          <a:bodyPr/>
-          <a:lstStyle/>
-          <a:p>
-            <a:fld id="{815DB69B-0A2B-4D0B-A3BD-360AAA24381D}" type="slidenum">
-              <a:rPr lang="de-DE" smtClean="0"/>
-              <a:pPr/>
-              <a:t>21</a:t>
-            </a:fld>
-            <a:endParaRPr lang="de-DE" dirty="0"/>
-          </a:p>
-        </p:txBody>
-      </p:sp>
-      <p:sp>
-        <p:nvSpPr>
-          <p:cNvPr id="5" name="Textplatzhalter 4"/>
-          <p:cNvSpPr>
-            <a:spLocks noGrp="1"/>
-          </p:cNvSpPr>
-          <p:nvPr>
-            <p:ph type="body" sz="quarter" idx="12"/>
-          </p:nvPr>
-        </p:nvSpPr>
-        <p:spPr>
-          <a:xfrm>
-            <a:off x="273050" y="1268412"/>
-            <a:ext cx="9361488" cy="5113337"/>
-          </a:xfrm>
-        </p:spPr>
-        <p:txBody>
-          <a:bodyPr/>
-          <a:lstStyle/>
-          <a:p>
-            <a:endParaRPr lang="de-DE" dirty="0"/>
-          </a:p>
-          <a:p>
-            <a:r>
-              <a:rPr lang="de-DE" dirty="0"/>
-              <a:t>Experimental Design</a:t>
-            </a:r>
-          </a:p>
-          <a:p>
-            <a:endParaRPr lang="de-DE" dirty="0"/>
-          </a:p>
-          <a:p>
-            <a:pPr lvl="1">
-              <a:buFont typeface="Wingdings" panose="05000000000000000000" pitchFamily="2" charset="2"/>
-              <a:buChar char="§"/>
-            </a:pPr>
-            <a:r>
-              <a:rPr lang="de-DE" dirty="0"/>
-              <a:t>Recruit Test Users</a:t>
-            </a:r>
-            <a:br>
-              <a:rPr lang="de-DE" dirty="0"/>
-            </a:br>
-            <a:endParaRPr lang="de-DE" dirty="0"/>
-          </a:p>
-          <a:p>
-            <a:pPr lvl="1">
-              <a:buFont typeface="Wingdings" panose="05000000000000000000" pitchFamily="2" charset="2"/>
-              <a:buChar char="§"/>
-            </a:pPr>
-            <a:r>
-              <a:rPr lang="de-DE" dirty="0"/>
-              <a:t>Order of evaluation altered</a:t>
-            </a:r>
-          </a:p>
-          <a:p>
-            <a:pPr lvl="1">
-              <a:buFont typeface="Wingdings" panose="05000000000000000000" pitchFamily="2" charset="2"/>
-              <a:buChar char="§"/>
-            </a:pPr>
-            <a:endParaRPr lang="de-DE" dirty="0"/>
-          </a:p>
-          <a:p>
-            <a:pPr lvl="1">
-              <a:buFont typeface="Wingdings" panose="05000000000000000000" pitchFamily="2" charset="2"/>
-              <a:buChar char="§"/>
-            </a:pPr>
-            <a:r>
-              <a:rPr lang="de-DE" dirty="0"/>
-              <a:t>Perform Tasks</a:t>
-            </a:r>
-            <a:br>
-              <a:rPr lang="de-DE" dirty="0"/>
-            </a:br>
-            <a:endParaRPr lang="de-DE" dirty="0"/>
-          </a:p>
-          <a:p>
-            <a:pPr lvl="2">
-              <a:buFont typeface="Wingdings" panose="05000000000000000000" pitchFamily="2" charset="2"/>
-              <a:buChar char="§"/>
-            </a:pPr>
-            <a:r>
-              <a:rPr lang="de-DE" dirty="0"/>
-              <a:t>Example: Find a bug which is reported in common by available tools.</a:t>
-            </a:r>
-          </a:p>
-        </p:txBody>
-      </p:sp>
-      <p:sp>
-        <p:nvSpPr>
-          <p:cNvPr id="3" name="Fußzeilenplatzhalter 2"/>
-          <p:cNvSpPr>
-            <a:spLocks noGrp="1"/>
-          </p:cNvSpPr>
-          <p:nvPr>
-            <p:ph type="ftr" sz="quarter" idx="10"/>
-          </p:nvPr>
-        </p:nvSpPr>
-        <p:spPr/>
-        <p:txBody>
-          <a:bodyPr/>
-          <a:lstStyle/>
-          <a:p>
-            <a:r>
-              <a:rPr lang="de-DE"/>
-              <a:t>Software Engineering</a:t>
-            </a:r>
-            <a:endParaRPr lang="de-DE" dirty="0"/>
-          </a:p>
-        </p:txBody>
-      </p:sp>
-    </p:spTree>
-    <p:extLst>
-      <p:ext uri="{BB962C8B-B14F-4D97-AF65-F5344CB8AC3E}">
-        <p14:creationId xmlns:p14="http://schemas.microsoft.com/office/powerpoint/2010/main" val="3338934910"/>
-      </p:ext>
-    </p:extLst>
-  </p:cSld>
-  <p:clrMapOvr>
-    <a:masterClrMapping/>
-  </p:clrMapOvr>
-</p:sld>
-</file>
-
 <file path=ppt/slides/slide22.xml><?xml version="1.0" encoding="utf-8"?>
 <p:sld xmlns:a="http://schemas.openxmlformats.org/drawingml/2006/main" xmlns:r="http://schemas.openxmlformats.org/officeDocument/2006/relationships" xmlns:p="http://schemas.openxmlformats.org/presentationml/2006/main">
   <p:cSld>
@@ -29995,7 +30330,7 @@
                   <a:schemeClr val="tx2"/>
                 </a:solidFill>
               </a:rPr>
-              <a:t>Evaluation – Usability Inspection Methods </a:t>
+              <a:t>Evaluation</a:t>
             </a:r>
           </a:p>
         </p:txBody>
@@ -30034,89 +30369,81 @@
             <p:ph type="body" sz="quarter" idx="12"/>
           </p:nvPr>
         </p:nvSpPr>
-        <p:spPr/>
+        <p:spPr>
+          <a:xfrm>
+            <a:off x="273050" y="1268412"/>
+            <a:ext cx="9361488" cy="5113337"/>
+          </a:xfrm>
+        </p:spPr>
         <p:txBody>
           <a:bodyPr/>
           <a:lstStyle/>
           <a:p>
+            <a:endParaRPr lang="de-DE" dirty="0"/>
+          </a:p>
+          <a:p>
             <a:r>
               <a:rPr lang="de-DE" dirty="0"/>
-              <a:t>Cognitive Walkthrough</a:t>
-            </a:r>
-          </a:p>
-          <a:p>
-            <a:pPr marL="0" indent="0">
-              <a:buNone/>
-            </a:pPr>
+              <a:t>Experimental Design</a:t>
+            </a:r>
+          </a:p>
+          <a:p>
             <a:endParaRPr lang="de-DE" dirty="0"/>
           </a:p>
           <a:p>
-            <a:pPr marL="0" indent="0">
-              <a:buNone/>
-            </a:pPr>
-            <a:r>
-              <a:rPr lang="de-DE" dirty="0"/>
-              <a:t>For each step to a predefined task, the following aspects are analysed.</a:t>
-            </a:r>
-          </a:p>
-          <a:p>
-            <a:pPr marL="0" indent="0">
-              <a:buNone/>
-            </a:pPr>
-            <a:endParaRPr lang="de-DE" dirty="0"/>
-          </a:p>
-          <a:p>
-            <a:pPr>
+            <a:pPr lvl="1">
               <a:buFont typeface="Wingdings" panose="05000000000000000000" pitchFamily="2" charset="2"/>
               <a:buChar char="§"/>
             </a:pPr>
             <a:r>
-              <a:rPr lang="en-GB" dirty="0"/>
-              <a:t>Will the user try and achieve the right outcome?	</a:t>
+              <a:rPr lang="de-DE" dirty="0"/>
+              <a:t>Recruit Test Users</a:t>
             </a:r>
             <a:br>
-              <a:rPr lang="en-GB" dirty="0"/>
+              <a:rPr lang="de-DE" dirty="0"/>
             </a:br>
-            <a:endParaRPr lang="en-GB" dirty="0"/>
-          </a:p>
-          <a:p>
-            <a:pPr>
+            <a:endParaRPr lang="de-DE" dirty="0"/>
+          </a:p>
+          <a:p>
+            <a:pPr lvl="1">
               <a:buFont typeface="Wingdings" panose="05000000000000000000" pitchFamily="2" charset="2"/>
               <a:buChar char="§"/>
             </a:pPr>
             <a:r>
-              <a:rPr lang="en-GB" dirty="0"/>
-              <a:t>Will the user notice that the correct action is available to them?</a:t>
-            </a:r>
-            <a:br>
-              <a:rPr lang="en-GB" dirty="0"/>
-            </a:br>
-            <a:endParaRPr lang="en-GB" dirty="0"/>
-          </a:p>
-          <a:p>
-            <a:pPr>
+              <a:rPr lang="de-DE" dirty="0"/>
+              <a:t>Order of evaluation altered</a:t>
+            </a:r>
+          </a:p>
+          <a:p>
+            <a:pPr lvl="1">
               <a:buFont typeface="Wingdings" panose="05000000000000000000" pitchFamily="2" charset="2"/>
               <a:buChar char="§"/>
             </a:pPr>
-            <a:r>
-              <a:rPr lang="en-GB" dirty="0"/>
-              <a:t>Will the user associate the correct action with the outcome they expect to achieve?</a:t>
-            </a:r>
-            <a:br>
-              <a:rPr lang="en-GB" dirty="0"/>
-            </a:br>
-            <a:endParaRPr lang="en-GB" dirty="0"/>
-          </a:p>
-          <a:p>
-            <a:pPr>
+            <a:endParaRPr lang="de-DE" dirty="0"/>
+          </a:p>
+          <a:p>
+            <a:pPr lvl="1">
               <a:buFont typeface="Wingdings" panose="05000000000000000000" pitchFamily="2" charset="2"/>
               <a:buChar char="§"/>
             </a:pPr>
             <a:r>
-              <a:rPr lang="en-GB" dirty="0"/>
-              <a:t>If the correct action is performed; will the user see that progress is being made towards their intended outcome?</a:t>
-            </a:r>
+              <a:rPr lang="de-DE" dirty="0"/>
+              <a:t>Perform Tasks</a:t>
+            </a:r>
+            <a:br>
+              <a:rPr lang="de-DE" dirty="0"/>
+            </a:br>
             <a:endParaRPr lang="de-DE" dirty="0"/>
+          </a:p>
+          <a:p>
+            <a:pPr lvl="2">
+              <a:buFont typeface="Wingdings" panose="05000000000000000000" pitchFamily="2" charset="2"/>
+              <a:buChar char="§"/>
+            </a:pPr>
+            <a:r>
+              <a:rPr lang="de-DE" dirty="0"/>
+              <a:t>Example: Find a bug which is reported in common by available tools.</a:t>
+            </a:r>
           </a:p>
         </p:txBody>
       </p:sp>
@@ -30146,7 +30473,7 @@
     </p:spTree>
     <p:extLst>
       <p:ext uri="{BB962C8B-B14F-4D97-AF65-F5344CB8AC3E}">
-        <p14:creationId xmlns:p14="http://schemas.microsoft.com/office/powerpoint/2010/main" val="2950414662"/>
+        <p14:creationId xmlns:p14="http://schemas.microsoft.com/office/powerpoint/2010/main" val="3338934910"/>
       </p:ext>
     </p:extLst>
   </p:cSld>
@@ -30240,8 +30567,82 @@
           <a:p>
             <a:r>
               <a:rPr lang="de-DE" dirty="0"/>
-              <a:t>Heuristic Evaluation</a:t>
-            </a:r>
+              <a:t>Cognitive Walkthrough</a:t>
+            </a:r>
+          </a:p>
+          <a:p>
+            <a:pPr marL="0" indent="0">
+              <a:buNone/>
+            </a:pPr>
+            <a:endParaRPr lang="de-DE" dirty="0"/>
+          </a:p>
+          <a:p>
+            <a:pPr marL="0" indent="0">
+              <a:buNone/>
+            </a:pPr>
+            <a:r>
+              <a:rPr lang="de-DE" dirty="0"/>
+              <a:t>For each step to a predefined task, the following aspects are analysed.</a:t>
+            </a:r>
+          </a:p>
+          <a:p>
+            <a:pPr marL="0" indent="0">
+              <a:buNone/>
+            </a:pPr>
+            <a:endParaRPr lang="de-DE" dirty="0"/>
+          </a:p>
+          <a:p>
+            <a:pPr>
+              <a:buFont typeface="Wingdings" panose="05000000000000000000" pitchFamily="2" charset="2"/>
+              <a:buChar char="§"/>
+            </a:pPr>
+            <a:r>
+              <a:rPr lang="en-GB" dirty="0"/>
+              <a:t>Will the user try and achieve the right outcome?	</a:t>
+            </a:r>
+            <a:br>
+              <a:rPr lang="en-GB" dirty="0"/>
+            </a:br>
+            <a:endParaRPr lang="en-GB" dirty="0"/>
+          </a:p>
+          <a:p>
+            <a:pPr>
+              <a:buFont typeface="Wingdings" panose="05000000000000000000" pitchFamily="2" charset="2"/>
+              <a:buChar char="§"/>
+            </a:pPr>
+            <a:r>
+              <a:rPr lang="en-GB" dirty="0"/>
+              <a:t>Will the user notice that the correct action is available to them?</a:t>
+            </a:r>
+            <a:br>
+              <a:rPr lang="en-GB" dirty="0"/>
+            </a:br>
+            <a:endParaRPr lang="en-GB" dirty="0"/>
+          </a:p>
+          <a:p>
+            <a:pPr>
+              <a:buFont typeface="Wingdings" panose="05000000000000000000" pitchFamily="2" charset="2"/>
+              <a:buChar char="§"/>
+            </a:pPr>
+            <a:r>
+              <a:rPr lang="en-GB" dirty="0"/>
+              <a:t>Will the user associate the correct action with the outcome they expect to achieve?</a:t>
+            </a:r>
+            <a:br>
+              <a:rPr lang="en-GB" dirty="0"/>
+            </a:br>
+            <a:endParaRPr lang="en-GB" dirty="0"/>
+          </a:p>
+          <a:p>
+            <a:pPr>
+              <a:buFont typeface="Wingdings" panose="05000000000000000000" pitchFamily="2" charset="2"/>
+              <a:buChar char="§"/>
+            </a:pPr>
+            <a:r>
+              <a:rPr lang="en-GB" dirty="0"/>
+              <a:t>If the correct action is performed; will the user see that progress is being made towards their intended outcome?</a:t>
+            </a:r>
+            <a:endParaRPr lang="de-DE" dirty="0"/>
           </a:p>
         </p:txBody>
       </p:sp>
@@ -30268,46 +30669,57 @@
           </a:p>
         </p:txBody>
       </p:sp>
-      <p:pic>
-        <p:nvPicPr>
-          <p:cNvPr id="7" name="Picture 6" descr="A close up of text on a white background&#10;&#10;Description automatically generated">
+      <p:sp>
+        <p:nvSpPr>
+          <p:cNvPr id="6" name="TextBox 5">
             <a:extLst>
               <a:ext uri="{FF2B5EF4-FFF2-40B4-BE49-F238E27FC236}">
-                <a16:creationId xmlns:a16="http://schemas.microsoft.com/office/drawing/2014/main" id="{63379AA9-F461-46A4-9656-14AC5AEA7931}"/>
+                <a16:creationId xmlns:a16="http://schemas.microsoft.com/office/drawing/2014/main" id="{1DCB0CB5-6D34-40A5-B2C4-4B05B3BF41B9}"/>
               </a:ext>
             </a:extLst>
           </p:cNvPr>
-          <p:cNvPicPr>
-            <a:picLocks noChangeAspect="1"/>
-          </p:cNvPicPr>
+          <p:cNvSpPr txBox="1"/>
           <p:nvPr/>
-        </p:nvPicPr>
-        <p:blipFill>
-          <a:blip r:embed="rId2">
-            <a:extLst>
-              <a:ext uri="{28A0092B-C50C-407E-A947-70E740481C1C}">
-                <a14:useLocalDpi xmlns:a14="http://schemas.microsoft.com/office/drawing/2010/main" val="0"/>
-              </a:ext>
-            </a:extLst>
-          </a:blip>
-          <a:stretch>
-            <a:fillRect/>
-          </a:stretch>
-        </p:blipFill>
+        </p:nvSpPr>
         <p:spPr>
           <a:xfrm>
-            <a:off x="1211784" y="1582300"/>
-            <a:ext cx="7481867" cy="4686917"/>
+            <a:off x="304476" y="6135528"/>
+            <a:ext cx="8752980" cy="246221"/>
           </a:xfrm>
           <a:prstGeom prst="rect">
             <a:avLst/>
           </a:prstGeom>
+          <a:noFill/>
         </p:spPr>
-      </p:pic>
+        <p:txBody>
+          <a:bodyPr wrap="square" lIns="0" rIns="0" rtlCol="0">
+            <a:spAutoFit/>
+          </a:bodyPr>
+          <a:lstStyle/>
+          <a:p>
+            <a:pPr marL="360000" indent="-360000">
+              <a:spcAft>
+                <a:spcPts val="1000"/>
+              </a:spcAft>
+              <a:buClr>
+                <a:schemeClr val="tx2"/>
+              </a:buClr>
+              <a:buSzPct val="80000"/>
+              <a:buFont typeface="Wingdings" panose="05000000000000000000" pitchFamily="2" charset="2"/>
+              <a:buChar char="v"/>
+            </a:pPr>
+            <a:r>
+              <a:rPr lang="en-GB" sz="1000" dirty="0"/>
+              <a:t>Jakob Nielsen. “Usability inspection methods”. In: Conference companion on Human factors in computing systems. ACM. 1994, pp. 413–414.</a:t>
+            </a:r>
+            <a:endParaRPr lang="LID4096" sz="1000" dirty="0" err="1"/>
+          </a:p>
+        </p:txBody>
+      </p:sp>
     </p:spTree>
     <p:extLst>
       <p:ext uri="{BB962C8B-B14F-4D97-AF65-F5344CB8AC3E}">
-        <p14:creationId xmlns:p14="http://schemas.microsoft.com/office/powerpoint/2010/main" val="1722979409"/>
+        <p14:creationId xmlns:p14="http://schemas.microsoft.com/office/powerpoint/2010/main" val="2950414662"/>
       </p:ext>
     </p:extLst>
   </p:cSld>
@@ -30404,96 +30816,6 @@
               <a:t>Heuristic Evaluation</a:t>
             </a:r>
           </a:p>
-          <a:p>
-            <a:endParaRPr lang="de-DE" dirty="0"/>
-          </a:p>
-          <a:p>
-            <a:pPr marL="0" indent="0">
-              <a:buNone/>
-            </a:pPr>
-            <a:endParaRPr lang="de-DE" dirty="0"/>
-          </a:p>
-          <a:p>
-            <a:pPr marL="0" indent="0">
-              <a:buNone/>
-            </a:pPr>
-            <a:r>
-              <a:rPr lang="de-DE" dirty="0"/>
-              <a:t>Each problem w.r.t. a heuristic is rated accordingly; 0 – 4</a:t>
-            </a:r>
-          </a:p>
-          <a:p>
-            <a:pPr marL="0" indent="0">
-              <a:buNone/>
-            </a:pPr>
-            <a:endParaRPr lang="de-DE" dirty="0"/>
-          </a:p>
-          <a:p>
-            <a:pPr marL="0" indent="0">
-              <a:buNone/>
-            </a:pPr>
-            <a:r>
-              <a:rPr lang="en-GB" b="1" dirty="0"/>
-              <a:t>0</a:t>
-            </a:r>
-            <a:r>
-              <a:rPr lang="en-GB" dirty="0"/>
-              <a:t> - do not agree this is a usability problem </a:t>
-            </a:r>
-          </a:p>
-          <a:p>
-            <a:pPr marL="0" indent="0">
-              <a:buNone/>
-            </a:pPr>
-            <a:r>
-              <a:rPr lang="en-GB" b="1" dirty="0"/>
-              <a:t>1</a:t>
-            </a:r>
-            <a:r>
-              <a:rPr lang="en-GB" dirty="0"/>
-              <a:t> - cosmetic problem</a:t>
-            </a:r>
-          </a:p>
-          <a:p>
-            <a:pPr marL="0" indent="0">
-              <a:buNone/>
-            </a:pPr>
-            <a:r>
-              <a:rPr lang="en-GB" b="1" dirty="0"/>
-              <a:t>2</a:t>
-            </a:r>
-            <a:r>
-              <a:rPr lang="en-GB" dirty="0"/>
-              <a:t> - minor usability problem</a:t>
-            </a:r>
-          </a:p>
-          <a:p>
-            <a:pPr marL="0" indent="0">
-              <a:buNone/>
-            </a:pPr>
-            <a:r>
-              <a:rPr lang="en-GB" b="1" dirty="0"/>
-              <a:t>3</a:t>
-            </a:r>
-            <a:r>
-              <a:rPr lang="en-GB" dirty="0"/>
-              <a:t> - major usability problem ( important to fix ) </a:t>
-            </a:r>
-          </a:p>
-          <a:p>
-            <a:pPr marL="0" indent="0">
-              <a:buNone/>
-            </a:pPr>
-            <a:r>
-              <a:rPr lang="en-GB" b="1" dirty="0"/>
-              <a:t>4</a:t>
-            </a:r>
-            <a:r>
-              <a:rPr lang="en-GB" dirty="0"/>
-              <a:t> - usability catastrophe ( imperative to fix )</a:t>
-            </a:r>
-            <a:endParaRPr lang="de-DE" dirty="0"/>
-          </a:p>
         </p:txBody>
       </p:sp>
       <p:sp>
@@ -30519,12 +30841,48 @@
           </a:p>
         </p:txBody>
       </p:sp>
+      <p:pic>
+        <p:nvPicPr>
+          <p:cNvPr id="7" name="Picture 6" descr="A close up of text on a white background&#10;&#10;Description automatically generated">
+            <a:extLst>
+              <a:ext uri="{FF2B5EF4-FFF2-40B4-BE49-F238E27FC236}">
+                <a16:creationId xmlns:a16="http://schemas.microsoft.com/office/drawing/2014/main" id="{63379AA9-F461-46A4-9656-14AC5AEA7931}"/>
+              </a:ext>
+            </a:extLst>
+          </p:cNvPr>
+          <p:cNvPicPr>
+            <a:picLocks noChangeAspect="1"/>
+          </p:cNvPicPr>
+          <p:nvPr/>
+        </p:nvPicPr>
+        <p:blipFill>
+          <a:blip r:embed="rId2">
+            <a:extLst>
+              <a:ext uri="{28A0092B-C50C-407E-A947-70E740481C1C}">
+                <a14:useLocalDpi xmlns:a14="http://schemas.microsoft.com/office/drawing/2010/main" val="0"/>
+              </a:ext>
+            </a:extLst>
+          </a:blip>
+          <a:stretch>
+            <a:fillRect/>
+          </a:stretch>
+        </p:blipFill>
+        <p:spPr>
+          <a:xfrm>
+            <a:off x="1211784" y="1582300"/>
+            <a:ext cx="7481867" cy="4686917"/>
+          </a:xfrm>
+          <a:prstGeom prst="rect">
+            <a:avLst/>
+          </a:prstGeom>
+        </p:spPr>
+      </p:pic>
       <p:sp>
         <p:nvSpPr>
-          <p:cNvPr id="6" name="TextBox 5">
+          <p:cNvPr id="8" name="TextBox 7">
             <a:extLst>
               <a:ext uri="{FF2B5EF4-FFF2-40B4-BE49-F238E27FC236}">
-                <a16:creationId xmlns:a16="http://schemas.microsoft.com/office/drawing/2014/main" id="{2BF7B2BA-669C-40D9-9469-E11D62866F00}"/>
+                <a16:creationId xmlns:a16="http://schemas.microsoft.com/office/drawing/2014/main" id="{B1FECA8D-10C0-4831-AC0B-8973651E89DB}"/>
               </a:ext>
             </a:extLst>
           </p:cNvPr>
@@ -30532,9 +30890,9 @@
           <p:nvPr/>
         </p:nvSpPr>
         <p:spPr>
-          <a:xfrm rot="20466419">
-            <a:off x="5675400" y="5062213"/>
-            <a:ext cx="3058530" cy="523220"/>
+          <a:xfrm>
+            <a:off x="304476" y="6135528"/>
+            <a:ext cx="8752980" cy="400110"/>
           </a:xfrm>
           <a:prstGeom prst="rect">
             <a:avLst/>
@@ -30542,12 +30900,12 @@
           <a:noFill/>
         </p:spPr>
         <p:txBody>
-          <a:bodyPr wrap="none" lIns="0" rIns="0" rtlCol="0">
+          <a:bodyPr wrap="square" lIns="0" rIns="0" rtlCol="0">
             <a:spAutoFit/>
           </a:bodyPr>
           <a:lstStyle/>
           <a:p>
-            <a:pPr>
+            <a:pPr marL="360000" indent="-360000">
               <a:spcAft>
                 <a:spcPts val="1000"/>
               </a:spcAft>
@@ -30555,27 +30913,33 @@
                 <a:schemeClr val="tx2"/>
               </a:buClr>
               <a:buSzPct val="80000"/>
+              <a:buFont typeface="Wingdings" panose="05000000000000000000" pitchFamily="2" charset="2"/>
+              <a:buChar char="v"/>
             </a:pPr>
             <a:r>
-              <a:rPr lang="en-GB" sz="2800" dirty="0">
-                <a:solidFill>
-                  <a:srgbClr val="00B050"/>
-                </a:solidFill>
-              </a:rPr>
-              <a:t>Comparative Study</a:t>
-            </a:r>
-            <a:endParaRPr lang="LID4096" sz="2800" dirty="0" err="1">
-              <a:solidFill>
-                <a:srgbClr val="00B050"/>
-              </a:solidFill>
-            </a:endParaRPr>
+              <a:rPr lang="en-GB" sz="1000" dirty="0"/>
+              <a:t>10 Heuristics for User Interface Design: Article by Jakob Nielsen. Available online at https://www.nngroup.com/articles/ten-usability-heuristics/, checked on 5/1/2019. Image credits: </a:t>
+            </a:r>
+            <a:r>
+              <a:rPr lang="en-GB" sz="1000" dirty="0" err="1"/>
+              <a:t>Miran</a:t>
+            </a:r>
+            <a:r>
+              <a:rPr lang="en-GB" sz="1000" dirty="0"/>
+              <a:t> </a:t>
+            </a:r>
+            <a:r>
+              <a:rPr lang="en-GB" sz="1000" dirty="0" err="1"/>
+              <a:t>Janezic</a:t>
+            </a:r>
+            <a:endParaRPr lang="LID4096" sz="1000" dirty="0" err="1"/>
           </a:p>
         </p:txBody>
       </p:sp>
     </p:spTree>
     <p:extLst>
       <p:ext uri="{BB962C8B-B14F-4D97-AF65-F5344CB8AC3E}">
-        <p14:creationId xmlns:p14="http://schemas.microsoft.com/office/powerpoint/2010/main" val="3297951378"/>
+        <p14:creationId xmlns:p14="http://schemas.microsoft.com/office/powerpoint/2010/main" val="1722979409"/>
       </p:ext>
     </p:extLst>
   </p:cSld>
@@ -30623,7 +30987,7 @@
                   <a:schemeClr val="tx2"/>
                 </a:solidFill>
               </a:rPr>
-              <a:t>Time Plan</a:t>
+              <a:t>Evaluation – Usability Inspection Methods </a:t>
             </a:r>
           </a:p>
         </p:txBody>
@@ -30647,6 +31011,274 @@
               <a:rPr lang="de-DE" smtClean="0"/>
               <a:pPr/>
               <a:t>25</a:t>
+            </a:fld>
+            <a:endParaRPr lang="de-DE" dirty="0"/>
+          </a:p>
+        </p:txBody>
+      </p:sp>
+      <p:sp>
+        <p:nvSpPr>
+          <p:cNvPr id="5" name="Textplatzhalter 4"/>
+          <p:cNvSpPr>
+            <a:spLocks noGrp="1"/>
+          </p:cNvSpPr>
+          <p:nvPr>
+            <p:ph type="body" sz="quarter" idx="12"/>
+          </p:nvPr>
+        </p:nvSpPr>
+        <p:spPr/>
+        <p:txBody>
+          <a:bodyPr/>
+          <a:lstStyle/>
+          <a:p>
+            <a:r>
+              <a:rPr lang="de-DE" dirty="0"/>
+              <a:t>Heuristic Evaluation</a:t>
+            </a:r>
+          </a:p>
+          <a:p>
+            <a:endParaRPr lang="de-DE" dirty="0"/>
+          </a:p>
+          <a:p>
+            <a:pPr marL="0" indent="0">
+              <a:buNone/>
+            </a:pPr>
+            <a:endParaRPr lang="de-DE" dirty="0"/>
+          </a:p>
+          <a:p>
+            <a:pPr marL="0" indent="0">
+              <a:buNone/>
+            </a:pPr>
+            <a:r>
+              <a:rPr lang="de-DE" dirty="0"/>
+              <a:t>Each problem w.r.t. a heuristic is rated accordingly; 0 – 4</a:t>
+            </a:r>
+          </a:p>
+          <a:p>
+            <a:pPr marL="0" indent="0">
+              <a:buNone/>
+            </a:pPr>
+            <a:endParaRPr lang="de-DE" dirty="0"/>
+          </a:p>
+          <a:p>
+            <a:pPr marL="0" indent="0">
+              <a:buNone/>
+            </a:pPr>
+            <a:r>
+              <a:rPr lang="en-GB" b="1" dirty="0"/>
+              <a:t>0</a:t>
+            </a:r>
+            <a:r>
+              <a:rPr lang="en-GB" dirty="0"/>
+              <a:t> - do not agree this is a usability problem </a:t>
+            </a:r>
+          </a:p>
+          <a:p>
+            <a:pPr marL="0" indent="0">
+              <a:buNone/>
+            </a:pPr>
+            <a:r>
+              <a:rPr lang="en-GB" b="1" dirty="0"/>
+              <a:t>1</a:t>
+            </a:r>
+            <a:r>
+              <a:rPr lang="en-GB" dirty="0"/>
+              <a:t> - cosmetic problem</a:t>
+            </a:r>
+          </a:p>
+          <a:p>
+            <a:pPr marL="0" indent="0">
+              <a:buNone/>
+            </a:pPr>
+            <a:r>
+              <a:rPr lang="en-GB" b="1" dirty="0"/>
+              <a:t>2</a:t>
+            </a:r>
+            <a:r>
+              <a:rPr lang="en-GB" dirty="0"/>
+              <a:t> - minor usability problem</a:t>
+            </a:r>
+          </a:p>
+          <a:p>
+            <a:pPr marL="0" indent="0">
+              <a:buNone/>
+            </a:pPr>
+            <a:r>
+              <a:rPr lang="en-GB" b="1" dirty="0"/>
+              <a:t>3</a:t>
+            </a:r>
+            <a:r>
+              <a:rPr lang="en-GB" dirty="0"/>
+              <a:t> - major usability problem ( important to fix ) </a:t>
+            </a:r>
+          </a:p>
+          <a:p>
+            <a:pPr marL="0" indent="0">
+              <a:buNone/>
+            </a:pPr>
+            <a:r>
+              <a:rPr lang="en-GB" b="1" dirty="0"/>
+              <a:t>4</a:t>
+            </a:r>
+            <a:r>
+              <a:rPr lang="en-GB" dirty="0"/>
+              <a:t> - usability catastrophe ( imperative to fix )</a:t>
+            </a:r>
+            <a:endParaRPr lang="de-DE" dirty="0"/>
+          </a:p>
+        </p:txBody>
+      </p:sp>
+      <p:sp>
+        <p:nvSpPr>
+          <p:cNvPr id="3" name="Fußzeilenplatzhalter 2"/>
+          <p:cNvSpPr>
+            <a:spLocks noGrp="1"/>
+          </p:cNvSpPr>
+          <p:nvPr>
+            <p:ph type="ftr" sz="quarter" idx="10"/>
+          </p:nvPr>
+        </p:nvSpPr>
+        <p:spPr/>
+        <p:txBody>
+          <a:bodyPr/>
+          <a:lstStyle/>
+          <a:p>
+            <a:r>
+              <a:rPr lang="de-DE"/>
+              <a:t>Software Engineering</a:t>
+            </a:r>
+            <a:endParaRPr lang="de-DE" dirty="0"/>
+          </a:p>
+        </p:txBody>
+      </p:sp>
+      <p:sp>
+        <p:nvSpPr>
+          <p:cNvPr id="6" name="TextBox 5">
+            <a:extLst>
+              <a:ext uri="{FF2B5EF4-FFF2-40B4-BE49-F238E27FC236}">
+                <a16:creationId xmlns:a16="http://schemas.microsoft.com/office/drawing/2014/main" id="{2BF7B2BA-669C-40D9-9469-E11D62866F00}"/>
+              </a:ext>
+            </a:extLst>
+          </p:cNvPr>
+          <p:cNvSpPr txBox="1"/>
+          <p:nvPr/>
+        </p:nvSpPr>
+        <p:spPr>
+          <a:xfrm rot="20466419">
+            <a:off x="5675400" y="5062213"/>
+            <a:ext cx="3058530" cy="523220"/>
+          </a:xfrm>
+          <a:prstGeom prst="rect">
+            <a:avLst/>
+          </a:prstGeom>
+          <a:noFill/>
+        </p:spPr>
+        <p:txBody>
+          <a:bodyPr wrap="none" lIns="0" rIns="0" rtlCol="0">
+            <a:spAutoFit/>
+          </a:bodyPr>
+          <a:lstStyle/>
+          <a:p>
+            <a:pPr>
+              <a:spcAft>
+                <a:spcPts val="1000"/>
+              </a:spcAft>
+              <a:buClr>
+                <a:schemeClr val="tx2"/>
+              </a:buClr>
+              <a:buSzPct val="80000"/>
+            </a:pPr>
+            <a:r>
+              <a:rPr lang="en-GB" sz="2800" dirty="0">
+                <a:solidFill>
+                  <a:srgbClr val="00B050"/>
+                </a:solidFill>
+              </a:rPr>
+              <a:t>Comparative Study</a:t>
+            </a:r>
+            <a:endParaRPr lang="LID4096" sz="2800" dirty="0" err="1">
+              <a:solidFill>
+                <a:srgbClr val="00B050"/>
+              </a:solidFill>
+            </a:endParaRPr>
+          </a:p>
+        </p:txBody>
+      </p:sp>
+    </p:spTree>
+    <p:extLst>
+      <p:ext uri="{BB962C8B-B14F-4D97-AF65-F5344CB8AC3E}">
+        <p14:creationId xmlns:p14="http://schemas.microsoft.com/office/powerpoint/2010/main" val="3297951378"/>
+      </p:ext>
+    </p:extLst>
+  </p:cSld>
+  <p:clrMapOvr>
+    <a:masterClrMapping/>
+  </p:clrMapOvr>
+</p:sld>
+</file>
+
+<file path=ppt/slides/slide26.xml><?xml version="1.0" encoding="utf-8"?>
+<p:sld xmlns:a="http://schemas.openxmlformats.org/drawingml/2006/main" xmlns:r="http://schemas.openxmlformats.org/officeDocument/2006/relationships" xmlns:p="http://schemas.openxmlformats.org/presentationml/2006/main">
+  <p:cSld>
+    <p:spTree>
+      <p:nvGrpSpPr>
+        <p:cNvPr id="1" name=""/>
+        <p:cNvGrpSpPr/>
+        <p:nvPr/>
+      </p:nvGrpSpPr>
+      <p:grpSpPr>
+        <a:xfrm>
+          <a:off x="0" y="0"/>
+          <a:ext cx="0" cy="0"/>
+          <a:chOff x="0" y="0"/>
+          <a:chExt cx="0" cy="0"/>
+        </a:xfrm>
+      </p:grpSpPr>
+      <p:sp>
+        <p:nvSpPr>
+          <p:cNvPr id="2" name="Titel 1"/>
+          <p:cNvSpPr>
+            <a:spLocks noGrp="1"/>
+          </p:cNvSpPr>
+          <p:nvPr>
+            <p:ph type="title"/>
+          </p:nvPr>
+        </p:nvSpPr>
+        <p:spPr/>
+        <p:txBody>
+          <a:bodyPr/>
+          <a:lstStyle/>
+          <a:p>
+            <a:r>
+              <a:rPr lang="de-DE" dirty="0">
+                <a:solidFill>
+                  <a:schemeClr val="tx2"/>
+                </a:solidFill>
+              </a:rPr>
+              <a:t>Time Plan</a:t>
+            </a:r>
+          </a:p>
+        </p:txBody>
+      </p:sp>
+      <p:sp>
+        <p:nvSpPr>
+          <p:cNvPr id="4" name="Foliennummernplatzhalter 3"/>
+          <p:cNvSpPr>
+            <a:spLocks noGrp="1"/>
+          </p:cNvSpPr>
+          <p:nvPr>
+            <p:ph type="sldNum" sz="quarter" idx="11"/>
+          </p:nvPr>
+        </p:nvSpPr>
+        <p:spPr/>
+        <p:txBody>
+          <a:bodyPr/>
+          <a:lstStyle/>
+          <a:p>
+            <a:fld id="{815DB69B-0A2B-4D0B-A3BD-360AAA24381D}" type="slidenum">
+              <a:rPr lang="de-DE" smtClean="0"/>
+              <a:pPr/>
+              <a:t>26</a:t>
             </a:fld>
             <a:endParaRPr lang="de-DE" dirty="0"/>
           </a:p>
@@ -30776,7 +31408,7 @@
 </p:sld>
 </file>
 
-<file path=ppt/slides/slide26.xml><?xml version="1.0" encoding="utf-8"?>
+<file path=ppt/slides/slide27.xml><?xml version="1.0" encoding="utf-8"?>
 <p:sld xmlns:a="http://schemas.openxmlformats.org/drawingml/2006/main" xmlns:r="http://schemas.openxmlformats.org/officeDocument/2006/relationships" xmlns:p="http://schemas.openxmlformats.org/presentationml/2006/main">
   <p:cSld>
     <p:spTree>
@@ -30873,7 +31505,7 @@
             <a:fld id="{815DB69B-0A2B-4D0B-A3BD-360AAA24381D}" type="slidenum">
               <a:rPr lang="de-DE" smtClean="0"/>
               <a:pPr/>
-              <a:t>26</a:t>
+              <a:t>27</a:t>
             </a:fld>
             <a:endParaRPr lang="de-DE" dirty="0"/>
           </a:p>
@@ -30949,7 +31581,7 @@
 </p:sld>
 </file>
 
-<file path=ppt/slides/slide27.xml><?xml version="1.0" encoding="utf-8"?>
+<file path=ppt/slides/slide28.xml><?xml version="1.0" encoding="utf-8"?>
 <p:sld xmlns:a="http://schemas.openxmlformats.org/drawingml/2006/main" xmlns:r="http://schemas.openxmlformats.org/officeDocument/2006/relationships" xmlns:p="http://schemas.openxmlformats.org/presentationml/2006/main">
   <p:cSld>
     <p:spTree>
@@ -31010,7 +31642,7 @@
             <a:fld id="{815DB69B-0A2B-4D0B-A3BD-360AAA24381D}" type="slidenum">
               <a:rPr lang="de-DE" smtClean="0"/>
               <a:pPr/>
-              <a:t>27</a:t>
+              <a:t>28</a:t>
             </a:fld>
             <a:endParaRPr lang="de-DE" dirty="0"/>
           </a:p>
@@ -31088,7 +31720,7 @@
 </p:sld>
 </file>
 
-<file path=ppt/slides/slide28.xml><?xml version="1.0" encoding="utf-8"?>
+<file path=ppt/slides/slide29.xml><?xml version="1.0" encoding="utf-8"?>
 <p:sld xmlns:a="http://schemas.openxmlformats.org/drawingml/2006/main" xmlns:r="http://schemas.openxmlformats.org/officeDocument/2006/relationships" xmlns:p="http://schemas.openxmlformats.org/presentationml/2006/main">
   <p:cSld>
     <p:spTree>
@@ -31149,7 +31781,7 @@
             <a:fld id="{815DB69B-0A2B-4D0B-A3BD-360AAA24381D}" type="slidenum">
               <a:rPr lang="de-DE" smtClean="0"/>
               <a:pPr/>
-              <a:t>28</a:t>
+              <a:t>29</a:t>
             </a:fld>
             <a:endParaRPr lang="de-DE" dirty="0"/>
           </a:p>
@@ -31536,6 +32168,52 @@
           </a:prstGeom>
         </p:spPr>
       </p:pic>
+      <p:sp>
+        <p:nvSpPr>
+          <p:cNvPr id="6" name="TextBox 5">
+            <a:extLst>
+              <a:ext uri="{FF2B5EF4-FFF2-40B4-BE49-F238E27FC236}">
+                <a16:creationId xmlns:a16="http://schemas.microsoft.com/office/drawing/2014/main" id="{82CE91C0-746E-46D9-AA75-335DFBB3612B}"/>
+              </a:ext>
+            </a:extLst>
+          </p:cNvPr>
+          <p:cNvSpPr txBox="1"/>
+          <p:nvPr/>
+        </p:nvSpPr>
+        <p:spPr>
+          <a:xfrm>
+            <a:off x="272228" y="6114201"/>
+            <a:ext cx="6700232" cy="246221"/>
+          </a:xfrm>
+          <a:prstGeom prst="rect">
+            <a:avLst/>
+          </a:prstGeom>
+          <a:noFill/>
+        </p:spPr>
+        <p:txBody>
+          <a:bodyPr wrap="none" lIns="0" rIns="0" rtlCol="0">
+            <a:spAutoFit/>
+          </a:bodyPr>
+          <a:lstStyle/>
+          <a:p>
+            <a:pPr marL="360000" indent="-360000">
+              <a:spcAft>
+                <a:spcPts val="1000"/>
+              </a:spcAft>
+              <a:buClr>
+                <a:schemeClr val="tx2"/>
+              </a:buClr>
+              <a:buSzPct val="80000"/>
+              <a:buFont typeface="Wingdings" panose="05000000000000000000" pitchFamily="2" charset="2"/>
+              <a:buChar char="v"/>
+            </a:pPr>
+            <a:r>
+              <a:rPr lang="en-GB" sz="1000" dirty="0"/>
+              <a:t>https://www.tricentis.com/news/software-fail-watch-says-1-1-trillion-in-assets-affected-by-software-bugs-in-2016/</a:t>
+            </a:r>
+          </a:p>
+        </p:txBody>
+      </p:sp>
     </p:spTree>
     <p:extLst>
       <p:ext uri="{BB962C8B-B14F-4D97-AF65-F5344CB8AC3E}">
@@ -31654,7 +32332,7 @@
           <a:p>
             <a:r>
               <a:rPr lang="de-DE" dirty="0"/>
-              <a:t>Detects Vulnerabilities :</a:t>
+              <a:t>Detects vulnerabilities :</a:t>
             </a:r>
           </a:p>
           <a:p>
@@ -31771,6 +32449,52 @@
           </a:prstGeom>
         </p:spPr>
       </p:pic>
+      <p:sp>
+        <p:nvSpPr>
+          <p:cNvPr id="8" name="TextBox 7">
+            <a:extLst>
+              <a:ext uri="{FF2B5EF4-FFF2-40B4-BE49-F238E27FC236}">
+                <a16:creationId xmlns:a16="http://schemas.microsoft.com/office/drawing/2014/main" id="{1DEE17E7-41CB-4954-B447-6724248AAD9D}"/>
+              </a:ext>
+            </a:extLst>
+          </p:cNvPr>
+          <p:cNvSpPr txBox="1"/>
+          <p:nvPr/>
+        </p:nvSpPr>
+        <p:spPr>
+          <a:xfrm>
+            <a:off x="272228" y="6114201"/>
+            <a:ext cx="7993140" cy="246221"/>
+          </a:xfrm>
+          <a:prstGeom prst="rect">
+            <a:avLst/>
+          </a:prstGeom>
+          <a:noFill/>
+        </p:spPr>
+        <p:txBody>
+          <a:bodyPr wrap="square" lIns="0" rIns="0" rtlCol="0">
+            <a:spAutoFit/>
+          </a:bodyPr>
+          <a:lstStyle/>
+          <a:p>
+            <a:pPr marL="360000" indent="-360000">
+              <a:spcAft>
+                <a:spcPts val="1000"/>
+              </a:spcAft>
+              <a:buClr>
+                <a:schemeClr val="tx2"/>
+              </a:buClr>
+              <a:buSzPct val="80000"/>
+              <a:buFont typeface="Wingdings" panose="05000000000000000000" pitchFamily="2" charset="2"/>
+              <a:buChar char="v"/>
+            </a:pPr>
+            <a:r>
+              <a:rPr lang="en-GB" sz="1000" dirty="0"/>
+              <a:t>Designing code analyses for Large Software Systems (DECA). url: https://www.hni.uni-paderborn.de/swt/lehre/deca/.</a:t>
+            </a:r>
+          </a:p>
+        </p:txBody>
+      </p:sp>
     </p:spTree>
     <p:extLst>
       <p:ext uri="{BB962C8B-B14F-4D97-AF65-F5344CB8AC3E}">
@@ -31887,7 +32611,7 @@
             </a:pPr>
             <a:r>
               <a:rPr lang="en-GB" dirty="0"/>
-              <a:t>IDE Notifications </a:t>
+              <a:t>IDE notifications </a:t>
             </a:r>
           </a:p>
           <a:p>
@@ -31989,7 +32713,7 @@
         </p:blipFill>
         <p:spPr>
           <a:xfrm>
-            <a:off x="4968540" y="2638385"/>
+            <a:off x="4808984" y="1268412"/>
             <a:ext cx="4416962" cy="1186695"/>
           </a:xfrm>
           <a:prstGeom prst="rect">
@@ -32025,7 +32749,7 @@
         </p:blipFill>
         <p:spPr>
           <a:xfrm>
-            <a:off x="5385048" y="4293096"/>
+            <a:off x="5812384" y="2612524"/>
             <a:ext cx="2410161" cy="1829055"/>
           </a:xfrm>
           <a:prstGeom prst="rect">
@@ -32033,6 +32757,78 @@
           </a:prstGeom>
         </p:spPr>
       </p:pic>
+      <p:sp>
+        <p:nvSpPr>
+          <p:cNvPr id="8" name="TextBox 7">
+            <a:extLst>
+              <a:ext uri="{FF2B5EF4-FFF2-40B4-BE49-F238E27FC236}">
+                <a16:creationId xmlns:a16="http://schemas.microsoft.com/office/drawing/2014/main" id="{F2D8F656-228B-4194-9095-C1724E24E118}"/>
+              </a:ext>
+            </a:extLst>
+          </p:cNvPr>
+          <p:cNvSpPr txBox="1"/>
+          <p:nvPr/>
+        </p:nvSpPr>
+        <p:spPr>
+          <a:xfrm>
+            <a:off x="270900" y="5773707"/>
+            <a:ext cx="6124754" cy="528350"/>
+          </a:xfrm>
+          <a:prstGeom prst="rect">
+            <a:avLst/>
+          </a:prstGeom>
+          <a:noFill/>
+        </p:spPr>
+        <p:txBody>
+          <a:bodyPr wrap="none" lIns="0" rIns="0" rtlCol="0">
+            <a:spAutoFit/>
+          </a:bodyPr>
+          <a:lstStyle/>
+          <a:p>
+            <a:pPr marL="360000" indent="-360000">
+              <a:spcAft>
+                <a:spcPts val="1000"/>
+              </a:spcAft>
+              <a:buClr>
+                <a:schemeClr val="tx2"/>
+              </a:buClr>
+              <a:buSzPct val="80000"/>
+              <a:buFont typeface="Wingdings" panose="05000000000000000000" pitchFamily="2" charset="2"/>
+              <a:buChar char="v"/>
+            </a:pPr>
+            <a:r>
+              <a:rPr lang="en-GB" sz="1000" dirty="0" err="1"/>
+              <a:t>Checkmarx</a:t>
+            </a:r>
+            <a:r>
+              <a:rPr lang="en-GB" sz="1000" dirty="0"/>
+              <a:t> – Application Security Testing and Static Code Analysis. url: https://www.checkmarx.com/.</a:t>
+            </a:r>
+          </a:p>
+          <a:p>
+            <a:pPr marL="360000" indent="-360000">
+              <a:spcAft>
+                <a:spcPts val="1000"/>
+              </a:spcAft>
+              <a:buClr>
+                <a:schemeClr val="tx2"/>
+              </a:buClr>
+              <a:buSzPct val="80000"/>
+              <a:buFont typeface="Wingdings" panose="05000000000000000000" pitchFamily="2" charset="2"/>
+              <a:buChar char="v"/>
+            </a:pPr>
+            <a:r>
+              <a:rPr lang="en-GB" sz="1000" dirty="0" err="1"/>
+              <a:t>FindBugs</a:t>
+            </a:r>
+            <a:r>
+              <a:rPr lang="en-GB" sz="1000" dirty="0"/>
+              <a:t>™ - Find Bugs in Java Programs. url: http://findbugs.sourceforge.net/.</a:t>
+            </a:r>
+            <a:endParaRPr lang="LID4096" sz="1000" dirty="0" err="1"/>
+          </a:p>
+        </p:txBody>
+      </p:sp>
     </p:spTree>
     <p:extLst>
       <p:ext uri="{BB962C8B-B14F-4D97-AF65-F5344CB8AC3E}">
@@ -32078,7 +32874,7 @@
           <p:nvPr/>
         </p:nvPicPr>
         <p:blipFill>
-          <a:blip r:embed="rId2">
+          <a:blip r:embed="rId3">
             <a:extLst>
               <a:ext uri="{28A0092B-C50C-407E-A947-70E740481C1C}">
                 <a14:useLocalDpi xmlns:a14="http://schemas.microsoft.com/office/drawing/2010/main" val="0"/>
@@ -32091,7 +32887,7 @@
         </p:blipFill>
         <p:spPr>
           <a:xfrm>
-            <a:off x="3321786" y="44496"/>
+            <a:off x="3321786" y="193789"/>
             <a:ext cx="6458997" cy="4963403"/>
           </a:xfrm>
           <a:prstGeom prst="rect">
@@ -32145,7 +32941,7 @@
           <a:p>
             <a:r>
               <a:rPr lang="en-GB" dirty="0"/>
-              <a:t>Christakis et. al.</a:t>
+              <a:t>Johnson et. al.</a:t>
             </a:r>
             <a:br>
               <a:rPr lang="en-GB" dirty="0"/>
@@ -32153,12 +32949,6 @@
             <a:endParaRPr lang="en-GB" dirty="0"/>
           </a:p>
           <a:p>
-            <a:r>
-              <a:rPr lang="en-GB" dirty="0"/>
-              <a:t>Brittany et. al.</a:t>
-            </a:r>
-          </a:p>
-          <a:p>
             <a:pPr lvl="1">
               <a:buFontTx/>
               <a:buChar char="-"/>
@@ -32177,6 +32967,440 @@
               <a:rPr lang="en-GB" sz="1600" dirty="0"/>
               <a:t>Result understandability</a:t>
             </a:r>
+          </a:p>
+          <a:p>
+            <a:pPr marL="466362" lvl="1" indent="0">
+              <a:buNone/>
+            </a:pPr>
+            <a:endParaRPr lang="en-GB" sz="1600" dirty="0"/>
+          </a:p>
+          <a:p>
+            <a:pPr marL="466362" lvl="1" indent="0">
+              <a:buNone/>
+            </a:pPr>
+            <a:endParaRPr lang="en-GB" sz="1600" dirty="0"/>
+          </a:p>
+          <a:p>
+            <a:pPr marL="360000" lvl="1" indent="-360000"/>
+            <a:r>
+              <a:rPr lang="en-GB" dirty="0"/>
+              <a:t>Christakis et. al.</a:t>
+            </a:r>
+            <a:br>
+              <a:rPr lang="en-GB" dirty="0"/>
+            </a:br>
+            <a:endParaRPr lang="en-GB" dirty="0"/>
+          </a:p>
+          <a:p>
+            <a:pPr lvl="1">
+              <a:buFontTx/>
+              <a:buChar char="-"/>
+            </a:pPr>
+            <a:endParaRPr lang="en-GB" sz="1600" dirty="0"/>
+          </a:p>
+          <a:p>
+            <a:pPr>
+              <a:buFontTx/>
+              <a:buChar char="-"/>
+            </a:pPr>
+            <a:endParaRPr lang="de-DE" dirty="0"/>
+          </a:p>
+          <a:p>
+            <a:pPr>
+              <a:buFontTx/>
+              <a:buChar char="-"/>
+            </a:pPr>
+            <a:endParaRPr lang="de-DE" dirty="0"/>
+          </a:p>
+        </p:txBody>
+      </p:sp>
+      <p:sp>
+        <p:nvSpPr>
+          <p:cNvPr id="3" name="Fußzeilenplatzhalter 2"/>
+          <p:cNvSpPr>
+            <a:spLocks noGrp="1"/>
+          </p:cNvSpPr>
+          <p:nvPr>
+            <p:ph type="ftr" sz="quarter" idx="10"/>
+          </p:nvPr>
+        </p:nvSpPr>
+        <p:spPr/>
+        <p:txBody>
+          <a:bodyPr/>
+          <a:lstStyle/>
+          <a:p>
+            <a:r>
+              <a:rPr lang="de-DE"/>
+              <a:t>Software Engineering</a:t>
+            </a:r>
+            <a:endParaRPr lang="de-DE" dirty="0"/>
+          </a:p>
+        </p:txBody>
+      </p:sp>
+      <p:sp>
+        <p:nvSpPr>
+          <p:cNvPr id="8" name="Titel 1">
+            <a:extLst>
+              <a:ext uri="{FF2B5EF4-FFF2-40B4-BE49-F238E27FC236}">
+                <a16:creationId xmlns:a16="http://schemas.microsoft.com/office/drawing/2014/main" id="{8F3356E1-DF59-4BA5-8E40-09958117AED1}"/>
+              </a:ext>
+            </a:extLst>
+          </p:cNvPr>
+          <p:cNvSpPr>
+            <a:spLocks noGrp="1"/>
+          </p:cNvSpPr>
+          <p:nvPr>
+            <p:ph type="title"/>
+          </p:nvPr>
+        </p:nvSpPr>
+        <p:spPr>
+          <a:xfrm>
+            <a:off x="270900" y="188642"/>
+            <a:ext cx="9363637" cy="1079772"/>
+          </a:xfrm>
+        </p:spPr>
+        <p:txBody>
+          <a:bodyPr/>
+          <a:lstStyle/>
+          <a:p>
+            <a:r>
+              <a:rPr lang="de-DE" dirty="0">
+                <a:solidFill>
+                  <a:schemeClr val="tx2"/>
+                </a:solidFill>
+              </a:rPr>
+              <a:t>Static Code Analysis</a:t>
+            </a:r>
+          </a:p>
+        </p:txBody>
+      </p:sp>
+      <p:sp>
+        <p:nvSpPr>
+          <p:cNvPr id="6" name="Rectangle 5">
+            <a:extLst>
+              <a:ext uri="{FF2B5EF4-FFF2-40B4-BE49-F238E27FC236}">
+                <a16:creationId xmlns:a16="http://schemas.microsoft.com/office/drawing/2014/main" id="{DDFAA2B6-4D61-4CED-ACEF-6473307B202E}"/>
+              </a:ext>
+            </a:extLst>
+          </p:cNvPr>
+          <p:cNvSpPr/>
+          <p:nvPr/>
+        </p:nvSpPr>
+        <p:spPr>
+          <a:xfrm>
+            <a:off x="452374" y="1268414"/>
+            <a:ext cx="1787669" cy="369332"/>
+          </a:xfrm>
+          <a:prstGeom prst="rect">
+            <a:avLst/>
+          </a:prstGeom>
+        </p:spPr>
+        <p:txBody>
+          <a:bodyPr wrap="none">
+            <a:spAutoFit/>
+          </a:bodyPr>
+          <a:lstStyle/>
+          <a:p>
+            <a:r>
+              <a:rPr lang="de-DE" dirty="0">
+                <a:solidFill>
+                  <a:srgbClr val="00B050"/>
+                </a:solidFill>
+              </a:rPr>
+              <a:t>Usability Issues</a:t>
+            </a:r>
+            <a:endParaRPr lang="LID4096" dirty="0">
+              <a:solidFill>
+                <a:srgbClr val="00B050"/>
+              </a:solidFill>
+            </a:endParaRPr>
+          </a:p>
+        </p:txBody>
+      </p:sp>
+      <p:cxnSp>
+        <p:nvCxnSpPr>
+          <p:cNvPr id="9" name="Straight Arrow Connector 8">
+            <a:extLst>
+              <a:ext uri="{FF2B5EF4-FFF2-40B4-BE49-F238E27FC236}">
+                <a16:creationId xmlns:a16="http://schemas.microsoft.com/office/drawing/2014/main" id="{210B974A-706F-443C-B99B-98D539EC8CCD}"/>
+              </a:ext>
+            </a:extLst>
+          </p:cNvPr>
+          <p:cNvCxnSpPr/>
+          <p:nvPr/>
+        </p:nvCxnSpPr>
+        <p:spPr>
+          <a:xfrm>
+            <a:off x="6551284" y="5085184"/>
+            <a:ext cx="2520280" cy="0"/>
+          </a:xfrm>
+          <a:prstGeom prst="straightConnector1">
+            <a:avLst/>
+          </a:prstGeom>
+          <a:ln>
+            <a:tailEnd type="triangle"/>
+          </a:ln>
+        </p:spPr>
+        <p:style>
+          <a:lnRef idx="1">
+            <a:schemeClr val="accent2"/>
+          </a:lnRef>
+          <a:fillRef idx="0">
+            <a:schemeClr val="accent2"/>
+          </a:fillRef>
+          <a:effectRef idx="0">
+            <a:schemeClr val="accent2"/>
+          </a:effectRef>
+          <a:fontRef idx="minor">
+            <a:schemeClr val="tx1"/>
+          </a:fontRef>
+        </p:style>
+      </p:cxnSp>
+      <p:sp>
+        <p:nvSpPr>
+          <p:cNvPr id="10" name="TextBox 9">
+            <a:extLst>
+              <a:ext uri="{FF2B5EF4-FFF2-40B4-BE49-F238E27FC236}">
+                <a16:creationId xmlns:a16="http://schemas.microsoft.com/office/drawing/2014/main" id="{FC32CC40-E826-4236-8E02-A0D2FC5387C2}"/>
+              </a:ext>
+            </a:extLst>
+          </p:cNvPr>
+          <p:cNvSpPr txBox="1"/>
+          <p:nvPr/>
+        </p:nvSpPr>
+        <p:spPr>
+          <a:xfrm>
+            <a:off x="7904578" y="5157192"/>
+            <a:ext cx="1166986" cy="261610"/>
+          </a:xfrm>
+          <a:prstGeom prst="rect">
+            <a:avLst/>
+          </a:prstGeom>
+          <a:noFill/>
+        </p:spPr>
+        <p:txBody>
+          <a:bodyPr wrap="none" lIns="0" rIns="0" rtlCol="0">
+            <a:spAutoFit/>
+          </a:bodyPr>
+          <a:lstStyle/>
+          <a:p>
+            <a:pPr>
+              <a:spcAft>
+                <a:spcPts val="1000"/>
+              </a:spcAft>
+              <a:buClr>
+                <a:schemeClr val="tx2"/>
+              </a:buClr>
+              <a:buSzPct val="80000"/>
+            </a:pPr>
+            <a:r>
+              <a:rPr lang="en-GB" sz="1100" dirty="0">
+                <a:solidFill>
+                  <a:srgbClr val="7030A0"/>
+                </a:solidFill>
+              </a:rPr>
+              <a:t>Survey responses </a:t>
+            </a:r>
+            <a:endParaRPr lang="LID4096" sz="1100" dirty="0" err="1">
+              <a:solidFill>
+                <a:srgbClr val="7030A0"/>
+              </a:solidFill>
+            </a:endParaRPr>
+          </a:p>
+        </p:txBody>
+      </p:sp>
+      <p:sp>
+        <p:nvSpPr>
+          <p:cNvPr id="13" name="TextBox 12">
+            <a:extLst>
+              <a:ext uri="{FF2B5EF4-FFF2-40B4-BE49-F238E27FC236}">
+                <a16:creationId xmlns:a16="http://schemas.microsoft.com/office/drawing/2014/main" id="{8573BD47-F90D-4FA1-8B25-00A8EA62085C}"/>
+              </a:ext>
+            </a:extLst>
+          </p:cNvPr>
+          <p:cNvSpPr txBox="1"/>
+          <p:nvPr/>
+        </p:nvSpPr>
+        <p:spPr>
+          <a:xfrm>
+            <a:off x="270900" y="5661390"/>
+            <a:ext cx="9324347" cy="836126"/>
+          </a:xfrm>
+          <a:prstGeom prst="rect">
+            <a:avLst/>
+          </a:prstGeom>
+          <a:noFill/>
+        </p:spPr>
+        <p:txBody>
+          <a:bodyPr wrap="none" lIns="0" rIns="0" rtlCol="0">
+            <a:spAutoFit/>
+          </a:bodyPr>
+          <a:lstStyle/>
+          <a:p>
+            <a:pPr marL="360000" indent="-360000">
+              <a:spcAft>
+                <a:spcPts val="1000"/>
+              </a:spcAft>
+              <a:buClr>
+                <a:schemeClr val="tx2"/>
+              </a:buClr>
+              <a:buSzPct val="80000"/>
+              <a:buFont typeface="Wingdings" panose="05000000000000000000" pitchFamily="2" charset="2"/>
+              <a:buChar char="v"/>
+            </a:pPr>
+            <a:r>
+              <a:rPr lang="en-GB" sz="1000" dirty="0"/>
+              <a:t>Brittany Johnson, </a:t>
+            </a:r>
+            <a:r>
+              <a:rPr lang="en-GB" sz="1000" dirty="0" err="1"/>
+              <a:t>Yoonki</a:t>
+            </a:r>
+            <a:r>
+              <a:rPr lang="en-GB" sz="1000" dirty="0"/>
+              <a:t> Song, Emerson Murphy-Hill, and Robert </a:t>
+            </a:r>
+            <a:r>
+              <a:rPr lang="en-GB" sz="1000" dirty="0" err="1"/>
+              <a:t>Bowdidge</a:t>
+            </a:r>
+            <a:r>
+              <a:rPr lang="en-GB" sz="1000" dirty="0"/>
+              <a:t>. 2013. Why don't software developers use static analysis tools to find bugs?. </a:t>
+            </a:r>
+            <a:br>
+              <a:rPr lang="en-GB" sz="1000" dirty="0"/>
+            </a:br>
+            <a:r>
+              <a:rPr lang="en-GB" sz="1000" dirty="0"/>
+              <a:t>In </a:t>
+            </a:r>
+            <a:r>
+              <a:rPr lang="en-GB" sz="1000" i="1" dirty="0"/>
+              <a:t>Proceedings of the 2013 International Conference on Software Engineering</a:t>
+            </a:r>
+            <a:r>
+              <a:rPr lang="en-GB" sz="1000" dirty="0"/>
+              <a:t> (ICSE '13). IEEE Press, Piscataway, NJ, USA, 672-681.</a:t>
+            </a:r>
+          </a:p>
+          <a:p>
+            <a:pPr marL="360000" indent="-360000">
+              <a:spcAft>
+                <a:spcPts val="1000"/>
+              </a:spcAft>
+              <a:buClr>
+                <a:schemeClr val="tx2"/>
+              </a:buClr>
+              <a:buSzPct val="80000"/>
+              <a:buFont typeface="Wingdings" panose="05000000000000000000" pitchFamily="2" charset="2"/>
+              <a:buChar char="v"/>
+            </a:pPr>
+            <a:r>
+              <a:rPr lang="en-GB" sz="1000" dirty="0"/>
+              <a:t>Maria Christakis and Christian Bird. 2016. What developers want and need from program analysis: an empirical study. In </a:t>
+            </a:r>
+            <a:r>
+              <a:rPr lang="en-GB" sz="1000" i="1" dirty="0"/>
+              <a:t>Proceedings of the 31st IEEE/ACM </a:t>
+            </a:r>
+            <a:br>
+              <a:rPr lang="en-GB" sz="1000" i="1" dirty="0"/>
+            </a:br>
+            <a:r>
+              <a:rPr lang="en-GB" sz="1000" i="1" dirty="0"/>
+              <a:t>International Conference on Automated Software Engineering</a:t>
+            </a:r>
+            <a:r>
+              <a:rPr lang="en-GB" sz="1000" dirty="0"/>
+              <a:t> (ASE 2016). ACM, New York, NY, USA, 332-343. DOI: https://doi.org/10.1145/2970276.2970347</a:t>
+            </a:r>
+            <a:endParaRPr lang="LID4096" sz="1000" dirty="0" err="1"/>
+          </a:p>
+        </p:txBody>
+      </p:sp>
+    </p:spTree>
+    <p:extLst>
+      <p:ext uri="{BB962C8B-B14F-4D97-AF65-F5344CB8AC3E}">
+        <p14:creationId xmlns:p14="http://schemas.microsoft.com/office/powerpoint/2010/main" val="2155070845"/>
+      </p:ext>
+    </p:extLst>
+  </p:cSld>
+  <p:clrMapOvr>
+    <a:masterClrMapping/>
+  </p:clrMapOvr>
+</p:sld>
+</file>
+
+<file path=ppt/slides/slide7.xml><?xml version="1.0" encoding="utf-8"?>
+<p:sld xmlns:a="http://schemas.openxmlformats.org/drawingml/2006/main" xmlns:r="http://schemas.openxmlformats.org/officeDocument/2006/relationships" xmlns:p="http://schemas.openxmlformats.org/presentationml/2006/main">
+  <p:cSld>
+    <p:spTree>
+      <p:nvGrpSpPr>
+        <p:cNvPr id="1" name=""/>
+        <p:cNvGrpSpPr/>
+        <p:nvPr/>
+      </p:nvGrpSpPr>
+      <p:grpSpPr>
+        <a:xfrm>
+          <a:off x="0" y="0"/>
+          <a:ext cx="0" cy="0"/>
+          <a:chOff x="0" y="0"/>
+          <a:chExt cx="0" cy="0"/>
+        </a:xfrm>
+      </p:grpSpPr>
+      <p:sp>
+        <p:nvSpPr>
+          <p:cNvPr id="4" name="Foliennummernplatzhalter 3"/>
+          <p:cNvSpPr>
+            <a:spLocks noGrp="1"/>
+          </p:cNvSpPr>
+          <p:nvPr>
+            <p:ph type="sldNum" sz="quarter" idx="11"/>
+          </p:nvPr>
+        </p:nvSpPr>
+        <p:spPr/>
+        <p:txBody>
+          <a:bodyPr/>
+          <a:lstStyle/>
+          <a:p>
+            <a:fld id="{815DB69B-0A2B-4D0B-A3BD-360AAA24381D}" type="slidenum">
+              <a:rPr lang="de-DE" smtClean="0"/>
+              <a:pPr/>
+              <a:t>7</a:t>
+            </a:fld>
+            <a:endParaRPr lang="de-DE" dirty="0"/>
+          </a:p>
+        </p:txBody>
+      </p:sp>
+      <p:sp>
+        <p:nvSpPr>
+          <p:cNvPr id="5" name="Textplatzhalter 4"/>
+          <p:cNvSpPr>
+            <a:spLocks noGrp="1"/>
+          </p:cNvSpPr>
+          <p:nvPr>
+            <p:ph type="body" sz="quarter" idx="12"/>
+          </p:nvPr>
+        </p:nvSpPr>
+        <p:spPr>
+          <a:xfrm>
+            <a:off x="462823" y="2112463"/>
+            <a:ext cx="3626081" cy="2096235"/>
+          </a:xfrm>
+        </p:spPr>
+        <p:txBody>
+          <a:bodyPr/>
+          <a:lstStyle/>
+          <a:p>
+            <a:r>
+              <a:rPr lang="en-GB" dirty="0"/>
+              <a:t>Christakis et. al.</a:t>
+            </a:r>
+            <a:br>
+              <a:rPr lang="en-GB" dirty="0"/>
+            </a:br>
+            <a:endParaRPr lang="en-GB" dirty="0"/>
           </a:p>
           <a:p>
             <a:pPr>
@@ -32404,7 +33628,7 @@
           <p:nvPr/>
         </p:nvPicPr>
         <p:blipFill>
-          <a:blip r:embed="rId3">
+          <a:blip r:embed="rId2">
             <a:extLst>
               <a:ext uri="{28A0092B-C50C-407E-A947-70E740481C1C}">
                 <a14:useLocalDpi xmlns:a14="http://schemas.microsoft.com/office/drawing/2010/main" val="0"/>
@@ -32417,7 +33641,7 @@
         </p:blipFill>
         <p:spPr>
           <a:xfrm>
-            <a:off x="270900" y="4300807"/>
+            <a:off x="4308120" y="2594702"/>
             <a:ext cx="5301588" cy="2096235"/>
           </a:xfrm>
           <a:prstGeom prst="rect">
@@ -32425,198 +33649,72 @@
           </a:prstGeom>
         </p:spPr>
       </p:pic>
-    </p:spTree>
-    <p:extLst>
-      <p:ext uri="{BB962C8B-B14F-4D97-AF65-F5344CB8AC3E}">
-        <p14:creationId xmlns:p14="http://schemas.microsoft.com/office/powerpoint/2010/main" val="2155070845"/>
-      </p:ext>
-    </p:extLst>
-  </p:cSld>
-  <p:clrMapOvr>
-    <a:masterClrMapping/>
-  </p:clrMapOvr>
-</p:sld>
-</file>
-
-<file path=ppt/slides/slide7.xml><?xml version="1.0" encoding="utf-8"?>
-<p:sld xmlns:a="http://schemas.openxmlformats.org/drawingml/2006/main" xmlns:r="http://schemas.openxmlformats.org/officeDocument/2006/relationships" xmlns:p="http://schemas.openxmlformats.org/presentationml/2006/main">
-  <p:cSld>
-    <p:spTree>
-      <p:nvGrpSpPr>
-        <p:cNvPr id="1" name=""/>
-        <p:cNvGrpSpPr/>
-        <p:nvPr/>
-      </p:nvGrpSpPr>
-      <p:grpSpPr>
-        <a:xfrm>
-          <a:off x="0" y="0"/>
-          <a:ext cx="0" cy="0"/>
-          <a:chOff x="0" y="0"/>
-          <a:chExt cx="0" cy="0"/>
-        </a:xfrm>
-      </p:grpSpPr>
       <p:sp>
         <p:nvSpPr>
-          <p:cNvPr id="2" name="Titel 1"/>
-          <p:cNvSpPr>
-            <a:spLocks noGrp="1"/>
-          </p:cNvSpPr>
-          <p:nvPr>
-            <p:ph type="title"/>
-          </p:nvPr>
+          <p:cNvPr id="11" name="TextBox 10">
+            <a:extLst>
+              <a:ext uri="{FF2B5EF4-FFF2-40B4-BE49-F238E27FC236}">
+                <a16:creationId xmlns:a16="http://schemas.microsoft.com/office/drawing/2014/main" id="{98EDD8D3-AB6D-4CDA-AEF5-7195714C51A1}"/>
+              </a:ext>
+            </a:extLst>
+          </p:cNvPr>
+          <p:cNvSpPr txBox="1"/>
+          <p:nvPr/>
         </p:nvSpPr>
-        <p:spPr/>
+        <p:spPr>
+          <a:xfrm>
+            <a:off x="285361" y="5869571"/>
+            <a:ext cx="9324347" cy="400110"/>
+          </a:xfrm>
+          <a:prstGeom prst="rect">
+            <a:avLst/>
+          </a:prstGeom>
+          <a:noFill/>
+        </p:spPr>
         <p:txBody>
-          <a:bodyPr/>
+          <a:bodyPr wrap="none" lIns="0" rIns="0" rtlCol="0">
+            <a:spAutoFit/>
+          </a:bodyPr>
           <a:lstStyle/>
           <a:p>
-            <a:r>
-              <a:rPr lang="de-DE" dirty="0">
-                <a:solidFill>
-                  <a:schemeClr val="tx2"/>
-                </a:solidFill>
-              </a:rPr>
-              <a:t>Multiple Tools</a:t>
-            </a:r>
-          </a:p>
-        </p:txBody>
-      </p:sp>
-      <p:sp>
-        <p:nvSpPr>
-          <p:cNvPr id="4" name="Foliennummernplatzhalter 3"/>
-          <p:cNvSpPr>
-            <a:spLocks noGrp="1"/>
-          </p:cNvSpPr>
-          <p:nvPr>
-            <p:ph type="sldNum" sz="quarter" idx="11"/>
-          </p:nvPr>
-        </p:nvSpPr>
-        <p:spPr/>
-        <p:txBody>
-          <a:bodyPr/>
-          <a:lstStyle/>
-          <a:p>
-            <a:fld id="{815DB69B-0A2B-4D0B-A3BD-360AAA24381D}" type="slidenum">
-              <a:rPr lang="de-DE" smtClean="0"/>
-              <a:pPr/>
-              <a:t>7</a:t>
-            </a:fld>
-            <a:endParaRPr lang="de-DE" dirty="0"/>
-          </a:p>
-        </p:txBody>
-      </p:sp>
-      <p:sp>
-        <p:nvSpPr>
-          <p:cNvPr id="5" name="Textplatzhalter 4"/>
-          <p:cNvSpPr>
-            <a:spLocks noGrp="1"/>
-          </p:cNvSpPr>
-          <p:nvPr>
-            <p:ph type="body" sz="quarter" idx="12"/>
-          </p:nvPr>
-        </p:nvSpPr>
-        <p:spPr/>
-        <p:txBody>
-          <a:bodyPr/>
-          <a:lstStyle/>
-          <a:p>
-            <a:pPr marL="0" indent="0">
-              <a:buNone/>
+            <a:pPr marL="360000" indent="-360000">
+              <a:spcAft>
+                <a:spcPts val="1000"/>
+              </a:spcAft>
+              <a:buClr>
+                <a:schemeClr val="tx2"/>
+              </a:buClr>
+              <a:buSzPct val="80000"/>
+              <a:buFont typeface="Wingdings" panose="05000000000000000000" pitchFamily="2" charset="2"/>
+              <a:buChar char="v"/>
             </a:pPr>
-            <a:endParaRPr lang="de-DE" dirty="0"/>
-          </a:p>
-          <a:p>
-            <a:r>
-              <a:rPr lang="de-DE" dirty="0"/>
-              <a:t>Developers use multiple static analysis tools each having own coverage.</a:t>
-            </a:r>
-          </a:p>
-          <a:p>
-            <a:endParaRPr lang="de-DE" dirty="0"/>
-          </a:p>
-          <a:p>
-            <a:r>
-              <a:rPr lang="de-DE" dirty="0"/>
-              <a:t>Research trends:</a:t>
-            </a:r>
-          </a:p>
-          <a:p>
-            <a:endParaRPr lang="de-DE" dirty="0"/>
-          </a:p>
-          <a:p>
-            <a:pPr>
-              <a:buFont typeface="Arial" panose="020B0604020202020204" pitchFamily="34" charset="0"/>
-              <a:buChar char="•"/>
-            </a:pPr>
-            <a:r>
-              <a:rPr lang="en-GB" dirty="0"/>
-              <a:t>Prioritise the bug warning alerts</a:t>
-            </a:r>
-          </a:p>
-          <a:p>
-            <a:pPr marL="0" indent="0" algn="r">
-              <a:buNone/>
-            </a:pPr>
-            <a:r>
-              <a:rPr lang="en-GB" dirty="0"/>
-              <a:t>( Lori et. al. )</a:t>
-            </a:r>
-          </a:p>
-          <a:p>
-            <a:pPr>
-              <a:buFont typeface="Arial" panose="020B0604020202020204" pitchFamily="34" charset="0"/>
-              <a:buChar char="•"/>
-            </a:pPr>
-            <a:endParaRPr lang="en-GB" dirty="0"/>
-          </a:p>
-          <a:p>
-            <a:pPr>
-              <a:buFont typeface="Arial" panose="020B0604020202020204" pitchFamily="34" charset="0"/>
-              <a:buChar char="•"/>
-            </a:pPr>
-            <a:r>
-              <a:rPr lang="en-GB" dirty="0"/>
-              <a:t>Merges 3 tools for Java to show warnings </a:t>
-            </a:r>
-          </a:p>
-          <a:p>
-            <a:pPr marL="0" indent="0" algn="r">
-              <a:buNone/>
-            </a:pPr>
-            <a:r>
-              <a:rPr lang="en-GB" dirty="0"/>
-              <a:t>( Na Meng et. al. )</a:t>
-            </a:r>
-          </a:p>
-        </p:txBody>
-      </p:sp>
-      <p:sp>
-        <p:nvSpPr>
-          <p:cNvPr id="3" name="Fußzeilenplatzhalter 2"/>
-          <p:cNvSpPr>
-            <a:spLocks noGrp="1"/>
-          </p:cNvSpPr>
-          <p:nvPr>
-            <p:ph type="ftr" sz="quarter" idx="10"/>
-          </p:nvPr>
-        </p:nvSpPr>
-        <p:spPr/>
-        <p:txBody>
-          <a:bodyPr/>
-          <a:lstStyle/>
-          <a:p>
-            <a:r>
-              <a:rPr lang="de-DE"/>
-              <a:t>Software Engineering</a:t>
-            </a:r>
-            <a:endParaRPr lang="de-DE" dirty="0"/>
+            <a:r>
+              <a:rPr lang="en-GB" sz="1000" dirty="0"/>
+              <a:t>Maria Christakis and Christian Bird. 2016. What developers want and need from program analysis: an empirical study. In </a:t>
+            </a:r>
+            <a:r>
+              <a:rPr lang="en-GB" sz="1000" i="1" dirty="0"/>
+              <a:t>Proceedings of the 31st IEEE/ACM </a:t>
+            </a:r>
+            <a:br>
+              <a:rPr lang="en-GB" sz="1000" i="1" dirty="0"/>
+            </a:br>
+            <a:r>
+              <a:rPr lang="en-GB" sz="1000" i="1" dirty="0"/>
+              <a:t>International Conference on Automated Software Engineering</a:t>
+            </a:r>
+            <a:r>
+              <a:rPr lang="en-GB" sz="1000" dirty="0"/>
+              <a:t> (ASE 2016). ACM, New York, NY, USA, 332-343. DOI: https://doi.org/10.1145/2970276.2970347</a:t>
+            </a:r>
+            <a:endParaRPr lang="LID4096" sz="1000" dirty="0" err="1"/>
           </a:p>
         </p:txBody>
       </p:sp>
     </p:spTree>
     <p:extLst>
       <p:ext uri="{BB962C8B-B14F-4D97-AF65-F5344CB8AC3E}">
-        <p14:creationId xmlns:p14="http://schemas.microsoft.com/office/powerpoint/2010/main" val="3993522925"/>
+        <p14:creationId xmlns:p14="http://schemas.microsoft.com/office/powerpoint/2010/main" val="1743097999"/>
       </p:ext>
     </p:extLst>
   </p:cSld>
@@ -32708,61 +33806,47 @@
           <a:bodyPr/>
           <a:lstStyle/>
           <a:p>
-            <a:pPr>
-              <a:buFont typeface="Wingdings" panose="05000000000000000000" pitchFamily="2" charset="2"/>
-              <a:buChar char="§"/>
-            </a:pPr>
-            <a:r>
-              <a:rPr lang="en-GB" dirty="0"/>
-              <a:t>Tricorder</a:t>
-            </a:r>
-          </a:p>
-          <a:p>
-            <a:pPr lvl="1">
-              <a:buFont typeface="Arial" panose="020B0604020202020204" pitchFamily="34" charset="0"/>
-              <a:buChar char="•"/>
-            </a:pPr>
-            <a:r>
-              <a:rPr lang="en-GB" sz="1600" dirty="0" err="1"/>
-              <a:t>ReviewBot</a:t>
-            </a:r>
-            <a:endParaRPr lang="en-GB" sz="1600" dirty="0"/>
-          </a:p>
-          <a:p>
-            <a:pPr lvl="1">
-              <a:buFont typeface="Arial" panose="020B0604020202020204" pitchFamily="34" charset="0"/>
-              <a:buChar char="•"/>
-            </a:pPr>
-            <a:r>
-              <a:rPr lang="en-GB" sz="1600" dirty="0"/>
-              <a:t>Separate bug coverage by separate tool </a:t>
-            </a:r>
-          </a:p>
-          <a:p>
-            <a:pPr lvl="1">
-              <a:buFont typeface="Arial" panose="020B0604020202020204" pitchFamily="34" charset="0"/>
-              <a:buChar char="•"/>
-            </a:pPr>
-            <a:r>
-              <a:rPr lang="en-GB" sz="1600" dirty="0"/>
-              <a:t>Evaluation: Summative – Click rates</a:t>
-            </a:r>
-          </a:p>
-          <a:p>
-            <a:pPr marL="0" indent="0" algn="r">
+            <a:pPr marL="0" indent="0">
               <a:buNone/>
             </a:pPr>
-            <a:r>
-              <a:rPr lang="en-GB" dirty="0"/>
-              <a:t>(Caitlin et. al. )</a:t>
-            </a:r>
+            <a:endParaRPr lang="de-DE" dirty="0"/>
+          </a:p>
+          <a:p>
+            <a:r>
+              <a:rPr lang="de-DE" dirty="0"/>
+              <a:t>Developers use multiple static analysis tools each having own coverage.</a:t>
+            </a:r>
+          </a:p>
+          <a:p>
+            <a:endParaRPr lang="de-DE" dirty="0"/>
+          </a:p>
+          <a:p>
+            <a:r>
+              <a:rPr lang="de-DE" dirty="0"/>
+              <a:t>Research trends:</a:t>
+            </a:r>
+          </a:p>
+          <a:p>
+            <a:endParaRPr lang="de-DE" dirty="0"/>
           </a:p>
           <a:p>
             <a:pPr>
               <a:buFont typeface="Arial" panose="020B0604020202020204" pitchFamily="34" charset="0"/>
               <a:buChar char="•"/>
             </a:pPr>
-            <a:endParaRPr lang="en-GB" dirty="0"/>
+            <a:r>
+              <a:rPr lang="en-GB" dirty="0"/>
+              <a:t>Prioritise the bug warning alerts</a:t>
+            </a:r>
+          </a:p>
+          <a:p>
+            <a:pPr marL="0" indent="0" algn="r">
+              <a:buNone/>
+            </a:pPr>
+            <a:r>
+              <a:rPr lang="en-GB" dirty="0"/>
+              <a:t>( Flynn et. al. )</a:t>
+            </a:r>
           </a:p>
           <a:p>
             <a:pPr>
@@ -32771,27 +33855,7 @@
             </a:pPr>
             <a:r>
               <a:rPr lang="en-GB" dirty="0"/>
-              <a:t>Parfait</a:t>
-            </a:r>
-          </a:p>
-          <a:p>
-            <a:pPr lvl="1">
-              <a:buFont typeface="Arial" panose="020B0604020202020204" pitchFamily="34" charset="0"/>
-              <a:buChar char="•"/>
-            </a:pPr>
-            <a:r>
-              <a:rPr lang="en-GB" sz="1600" dirty="0"/>
-              <a:t>Scalability ( easy , expensive analysis )</a:t>
-            </a:r>
-          </a:p>
-          <a:p>
-            <a:pPr lvl="1">
-              <a:buFont typeface="Arial" panose="020B0604020202020204" pitchFamily="34" charset="0"/>
-              <a:buChar char="•"/>
-            </a:pPr>
-            <a:r>
-              <a:rPr lang="en-GB" sz="1600" dirty="0"/>
-              <a:t>Precision ( bug track – real, no, potential ) </a:t>
+              <a:t>Merges 3 tools for Java to show warnings </a:t>
             </a:r>
           </a:p>
           <a:p>
@@ -32800,36 +33864,8 @@
             </a:pPr>
             <a:r>
               <a:rPr lang="en-GB" dirty="0"/>
-              <a:t>(Cristina et. al. )</a:t>
-            </a:r>
-          </a:p>
-          <a:p>
-            <a:pPr marL="0" indent="0">
-              <a:buNone/>
-            </a:pPr>
-            <a:endParaRPr lang="en-GB" dirty="0"/>
-          </a:p>
-          <a:p>
-            <a:pPr marL="0" indent="0">
-              <a:buNone/>
-            </a:pPr>
-            <a:r>
-              <a:rPr lang="en-GB" dirty="0"/>
-              <a:t>							But </a:t>
-            </a:r>
-            <a:r>
-              <a:rPr lang="en-GB" dirty="0">
-                <a:solidFill>
-                  <a:srgbClr val="00B050"/>
-                </a:solidFill>
-              </a:rPr>
-              <a:t>USABILITY</a:t>
-            </a:r>
-            <a:r>
-              <a:rPr lang="en-GB" dirty="0"/>
-              <a:t> is not addressed…</a:t>
-            </a:r>
-            <a:endParaRPr lang="de-DE" dirty="0"/>
+              <a:t>( Meng et. al. )</a:t>
+            </a:r>
           </a:p>
         </p:txBody>
       </p:sp>
@@ -32858,52 +33894,133 @@
       </p:sp>
       <p:sp>
         <p:nvSpPr>
-          <p:cNvPr id="6" name="Rectangle: Rounded Corners 5">
+          <p:cNvPr id="6" name="TextBox 5">
             <a:extLst>
               <a:ext uri="{FF2B5EF4-FFF2-40B4-BE49-F238E27FC236}">
-                <a16:creationId xmlns:a16="http://schemas.microsoft.com/office/drawing/2014/main" id="{7B1A95CE-58D3-4A2F-96D9-3FCCC8DB722D}"/>
+                <a16:creationId xmlns:a16="http://schemas.microsoft.com/office/drawing/2014/main" id="{BE000176-FB64-494D-85BE-2C0B58A1CB46}"/>
               </a:ext>
             </a:extLst>
           </p:cNvPr>
-          <p:cNvSpPr/>
+          <p:cNvSpPr txBox="1"/>
           <p:nvPr/>
         </p:nvSpPr>
-        <p:spPr bwMode="auto">
+        <p:spPr>
           <a:xfrm>
-            <a:off x="3152800" y="5445224"/>
-            <a:ext cx="3672408" cy="432048"/>
+            <a:off x="270900" y="5492411"/>
+            <a:ext cx="9433352" cy="990015"/>
           </a:xfrm>
-          <a:prstGeom prst="roundRect">
+          <a:prstGeom prst="rect">
             <a:avLst/>
           </a:prstGeom>
           <a:noFill/>
-          <a:ln w="12700">
-            <a:solidFill>
-              <a:srgbClr val="FF0000"/>
-            </a:solidFill>
-            <a:miter lim="800000"/>
-            <a:headEnd/>
-            <a:tailEnd/>
-          </a:ln>
-          <a:effectLst/>
         </p:spPr>
         <p:txBody>
-          <a:bodyPr wrap="none" rtlCol="0" anchor="ctr"/>
+          <a:bodyPr wrap="none" lIns="0" rIns="0" rtlCol="0">
+            <a:spAutoFit/>
+          </a:bodyPr>
           <a:lstStyle/>
           <a:p>
-            <a:pPr algn="ctr"/>
-            <a:endParaRPr lang="LID4096" sz="1600" b="1" dirty="0">
-              <a:solidFill>
-                <a:schemeClr val="bg1"/>
-              </a:solidFill>
-            </a:endParaRPr>
+            <a:pPr marL="360000" indent="-360000">
+              <a:spcAft>
+                <a:spcPts val="1000"/>
+              </a:spcAft>
+              <a:buClr>
+                <a:schemeClr val="tx2"/>
+              </a:buClr>
+              <a:buSzPct val="80000"/>
+              <a:buFont typeface="Wingdings" panose="05000000000000000000" pitchFamily="2" charset="2"/>
+              <a:buChar char="v"/>
+            </a:pPr>
+            <a:r>
+              <a:rPr lang="en-GB" sz="1000" dirty="0"/>
+              <a:t>Lori Flynn, William Snavely, David Svoboda, Nathan </a:t>
+            </a:r>
+            <a:r>
+              <a:rPr lang="en-GB" sz="1000" dirty="0" err="1"/>
+              <a:t>VanHoudnos</a:t>
+            </a:r>
+            <a:r>
+              <a:rPr lang="en-GB" sz="1000" dirty="0"/>
+              <a:t>, Richard Qin, Jennifer Burns, David </a:t>
+            </a:r>
+            <a:r>
+              <a:rPr lang="en-GB" sz="1000" dirty="0" err="1"/>
+              <a:t>Zubrow</a:t>
+            </a:r>
+            <a:r>
+              <a:rPr lang="en-GB" sz="1000" dirty="0"/>
+              <a:t>, Robert Stoddard, and Guillermo </a:t>
+            </a:r>
+            <a:r>
+              <a:rPr lang="en-GB" sz="1000" dirty="0" err="1"/>
+              <a:t>Marce-Santurio</a:t>
+            </a:r>
+            <a:r>
+              <a:rPr lang="en-GB" sz="1000" dirty="0"/>
+              <a:t>. </a:t>
+            </a:r>
+            <a:br>
+              <a:rPr lang="en-GB" sz="1000" dirty="0"/>
+            </a:br>
+            <a:r>
+              <a:rPr lang="en-GB" sz="1000" dirty="0"/>
+              <a:t>2018. Prioritizing alerts from multiple static analysis tools, using classification models. In </a:t>
+            </a:r>
+            <a:r>
+              <a:rPr lang="en-GB" sz="1000" i="1" dirty="0"/>
+              <a:t>Proceedings of the 1st International Workshop on Software Qualities </a:t>
+            </a:r>
+            <a:br>
+              <a:rPr lang="en-GB" sz="1000" i="1" dirty="0"/>
+            </a:br>
+            <a:r>
+              <a:rPr lang="en-GB" sz="1000" i="1" dirty="0"/>
+              <a:t>and Their Dependencies</a:t>
+            </a:r>
+            <a:r>
+              <a:rPr lang="en-GB" sz="1000" dirty="0"/>
+              <a:t> (SQUADE '18). ACM, New York, NY, USA, 13-20. DOI: https://doi.org/10.1145/3194095.3194100 </a:t>
+            </a:r>
+          </a:p>
+          <a:p>
+            <a:pPr marL="360000" indent="-360000">
+              <a:spcAft>
+                <a:spcPts val="1000"/>
+              </a:spcAft>
+              <a:buClr>
+                <a:schemeClr val="tx2"/>
+              </a:buClr>
+              <a:buSzPct val="80000"/>
+              <a:buFont typeface="Wingdings" panose="05000000000000000000" pitchFamily="2" charset="2"/>
+              <a:buChar char="v"/>
+            </a:pPr>
+            <a:r>
+              <a:rPr lang="en-GB" sz="1000" dirty="0"/>
+              <a:t>N. Meng, Q. Wang, Q. Wu and H. Mei, "An Approach to Merge Results of Multiple Static Analysis Tools (Short Paper)," </a:t>
+            </a:r>
+            <a:r>
+              <a:rPr lang="en-GB" sz="1000" i="1" dirty="0"/>
+              <a:t>2008 The Eighth International </a:t>
+            </a:r>
+            <a:br>
+              <a:rPr lang="en-GB" sz="1000" i="1" dirty="0"/>
+            </a:br>
+            <a:r>
+              <a:rPr lang="en-GB" sz="1000" i="1" dirty="0"/>
+              <a:t>Conference on Quality Software</a:t>
+            </a:r>
+            <a:r>
+              <a:rPr lang="en-GB" sz="1000" dirty="0"/>
+              <a:t>, Oxford, 2008, pp. 169-174.doi: 10.1109/QSIC.2008.30</a:t>
+            </a:r>
+            <a:endParaRPr lang="LID4096" sz="1000" dirty="0" err="1"/>
           </a:p>
         </p:txBody>
       </p:sp>
     </p:spTree>
     <p:extLst>
       <p:ext uri="{BB962C8B-B14F-4D97-AF65-F5344CB8AC3E}">
-        <p14:creationId xmlns:p14="http://schemas.microsoft.com/office/powerpoint/2010/main" val="1143630792"/>
+        <p14:creationId xmlns:p14="http://schemas.microsoft.com/office/powerpoint/2010/main" val="3993522925"/>
       </p:ext>
     </p:extLst>
   </p:cSld>
@@ -32951,7 +34068,7 @@
                   <a:schemeClr val="tx2"/>
                 </a:solidFill>
               </a:rPr>
-              <a:t> Problem Statement</a:t>
+              <a:t>Multiple Tools</a:t>
             </a:r>
           </a:p>
         </p:txBody>
@@ -32995,48 +34112,118 @@
           <a:bodyPr/>
           <a:lstStyle/>
           <a:p>
-            <a:endParaRPr lang="en-GB" dirty="0"/>
-          </a:p>
-          <a:p>
-            <a:endParaRPr lang="en-GB" dirty="0"/>
-          </a:p>
-          <a:p>
-            <a:endParaRPr lang="en-GB" dirty="0"/>
-          </a:p>
-          <a:p>
-            <a:r>
-              <a:rPr lang="en-GB" sz="2400" dirty="0"/>
-              <a:t>How to integrate the results of multiple static analysis tools </a:t>
-            </a:r>
-            <a:br>
-              <a:rPr lang="en-GB" sz="2400" dirty="0"/>
-            </a:br>
-            <a:endParaRPr lang="en-GB" sz="2400" dirty="0"/>
-          </a:p>
-          <a:p>
-            <a:pPr marL="0" indent="0">
+            <a:pPr>
+              <a:buFont typeface="Wingdings" panose="05000000000000000000" pitchFamily="2" charset="2"/>
+              <a:buChar char="§"/>
+            </a:pPr>
+            <a:r>
+              <a:rPr lang="en-GB" dirty="0"/>
+              <a:t>Tricorder</a:t>
+            </a:r>
+          </a:p>
+          <a:p>
+            <a:pPr lvl="1">
+              <a:buFont typeface="Arial" panose="020B0604020202020204" pitchFamily="34" charset="0"/>
+              <a:buChar char="•"/>
+            </a:pPr>
+            <a:r>
+              <a:rPr lang="en-GB" sz="1600" dirty="0" err="1"/>
+              <a:t>ReviewBot</a:t>
+            </a:r>
+            <a:endParaRPr lang="en-GB" sz="1600" dirty="0"/>
+          </a:p>
+          <a:p>
+            <a:pPr lvl="1">
+              <a:buFont typeface="Arial" panose="020B0604020202020204" pitchFamily="34" charset="0"/>
+              <a:buChar char="•"/>
+            </a:pPr>
+            <a:r>
+              <a:rPr lang="en-GB" sz="1600" dirty="0"/>
+              <a:t>Separate bug coverage by separate tool </a:t>
+            </a:r>
+          </a:p>
+          <a:p>
+            <a:pPr lvl="1">
+              <a:buFont typeface="Arial" panose="020B0604020202020204" pitchFamily="34" charset="0"/>
+              <a:buChar char="•"/>
+            </a:pPr>
+            <a:r>
+              <a:rPr lang="en-GB" sz="1600" dirty="0"/>
+              <a:t>Evaluation: Summative – Click rates</a:t>
+            </a:r>
+          </a:p>
+          <a:p>
+            <a:pPr marL="0" indent="0" algn="r">
               <a:buNone/>
             </a:pPr>
             <a:r>
-              <a:rPr lang="en-GB" sz="2400" dirty="0"/>
-              <a:t>													in a unified user interface?</a:t>
-            </a:r>
-          </a:p>
-          <a:p>
+              <a:rPr lang="en-GB" dirty="0"/>
+              <a:t>(Sadowski et. al. )</a:t>
+            </a:r>
+          </a:p>
+          <a:p>
+            <a:pPr>
+              <a:buFont typeface="Arial" panose="020B0604020202020204" pitchFamily="34" charset="0"/>
+              <a:buChar char="•"/>
+            </a:pPr>
+            <a:r>
+              <a:rPr lang="en-GB" dirty="0"/>
+              <a:t>Parfait</a:t>
+            </a:r>
+          </a:p>
+          <a:p>
+            <a:pPr lvl="1">
+              <a:buFont typeface="Arial" panose="020B0604020202020204" pitchFamily="34" charset="0"/>
+              <a:buChar char="•"/>
+            </a:pPr>
+            <a:r>
+              <a:rPr lang="en-GB" sz="1600" dirty="0"/>
+              <a:t>Scalability ( easy , expensive analysis )</a:t>
+            </a:r>
+          </a:p>
+          <a:p>
+            <a:pPr lvl="1">
+              <a:buFont typeface="Arial" panose="020B0604020202020204" pitchFamily="34" charset="0"/>
+              <a:buChar char="•"/>
+            </a:pPr>
+            <a:r>
+              <a:rPr lang="en-GB" sz="1600" dirty="0"/>
+              <a:t>Precision ( bug track – real, no, potential ) </a:t>
+            </a:r>
+          </a:p>
+          <a:p>
+            <a:pPr marL="0" indent="0" algn="r">
+              <a:buNone/>
+            </a:pPr>
+            <a:r>
+              <a:rPr lang="en-GB" dirty="0"/>
+              <a:t>(Cifuentes et. al. )</a:t>
+            </a:r>
+          </a:p>
+          <a:p>
+            <a:pPr marL="0" indent="0" algn="ctr">
+              <a:buNone/>
+            </a:pPr>
+            <a:br>
+              <a:rPr lang="en-GB" dirty="0"/>
+            </a:br>
+            <a:r>
+              <a:rPr lang="en-GB" dirty="0"/>
+              <a:t>But </a:t>
+            </a:r>
+            <a:r>
+              <a:rPr lang="en-GB" dirty="0">
+                <a:solidFill>
+                  <a:srgbClr val="00B050"/>
+                </a:solidFill>
+              </a:rPr>
+              <a:t>USABILITY</a:t>
+            </a:r>
+            <a:r>
+              <a:rPr lang="en-GB" dirty="0"/>
+              <a:t> is not addressed…</a:t>
+            </a:r>
             <a:endParaRPr lang="de-DE" dirty="0"/>
-          </a:p>
-          <a:p>
-            <a:endParaRPr lang="de-DE" dirty="0"/>
-          </a:p>
-          <a:p>
-            <a:pPr lvl="1">
-              <a:buFont typeface="Wingdings" panose="05000000000000000000" pitchFamily="2" charset="2"/>
-              <a:buChar char="v"/>
-            </a:pPr>
-            <a:r>
-              <a:rPr lang="de-DE" dirty="0"/>
-              <a:t>3 Research Questions</a:t>
-            </a:r>
           </a:p>
         </p:txBody>
       </p:sp>
@@ -33063,10 +34250,164 @@
           </a:p>
         </p:txBody>
       </p:sp>
+      <p:sp>
+        <p:nvSpPr>
+          <p:cNvPr id="6" name="Rectangle: Rounded Corners 5">
+            <a:extLst>
+              <a:ext uri="{FF2B5EF4-FFF2-40B4-BE49-F238E27FC236}">
+                <a16:creationId xmlns:a16="http://schemas.microsoft.com/office/drawing/2014/main" id="{7B1A95CE-58D3-4A2F-96D9-3FCCC8DB722D}"/>
+              </a:ext>
+            </a:extLst>
+          </p:cNvPr>
+          <p:cNvSpPr/>
+          <p:nvPr/>
+        </p:nvSpPr>
+        <p:spPr bwMode="auto">
+          <a:xfrm>
+            <a:off x="3152800" y="4941168"/>
+            <a:ext cx="3672408" cy="432048"/>
+          </a:xfrm>
+          <a:prstGeom prst="roundRect">
+            <a:avLst/>
+          </a:prstGeom>
+          <a:noFill/>
+          <a:ln w="12700">
+            <a:solidFill>
+              <a:srgbClr val="FF0000"/>
+            </a:solidFill>
+            <a:miter lim="800000"/>
+            <a:headEnd/>
+            <a:tailEnd/>
+          </a:ln>
+          <a:effectLst/>
+        </p:spPr>
+        <p:txBody>
+          <a:bodyPr wrap="none" rtlCol="0" anchor="ctr"/>
+          <a:lstStyle/>
+          <a:p>
+            <a:pPr algn="ctr"/>
+            <a:endParaRPr lang="LID4096" sz="1600" b="1" dirty="0">
+              <a:solidFill>
+                <a:schemeClr val="bg1"/>
+              </a:solidFill>
+            </a:endParaRPr>
+          </a:p>
+        </p:txBody>
+      </p:sp>
+      <p:sp>
+        <p:nvSpPr>
+          <p:cNvPr id="7" name="TextBox 6">
+            <a:extLst>
+              <a:ext uri="{FF2B5EF4-FFF2-40B4-BE49-F238E27FC236}">
+                <a16:creationId xmlns:a16="http://schemas.microsoft.com/office/drawing/2014/main" id="{69EF1288-A1A1-4D2C-91B6-7C4C1C4B12A1}"/>
+              </a:ext>
+            </a:extLst>
+          </p:cNvPr>
+          <p:cNvSpPr txBox="1"/>
+          <p:nvPr/>
+        </p:nvSpPr>
+        <p:spPr>
+          <a:xfrm>
+            <a:off x="270900" y="5646301"/>
+            <a:ext cx="9226565" cy="836126"/>
+          </a:xfrm>
+          <a:prstGeom prst="rect">
+            <a:avLst/>
+          </a:prstGeom>
+          <a:noFill/>
+        </p:spPr>
+        <p:txBody>
+          <a:bodyPr wrap="none" lIns="0" rIns="0" rtlCol="0">
+            <a:spAutoFit/>
+          </a:bodyPr>
+          <a:lstStyle/>
+          <a:p>
+            <a:pPr marL="360000" indent="-360000">
+              <a:spcAft>
+                <a:spcPts val="1000"/>
+              </a:spcAft>
+              <a:buClr>
+                <a:schemeClr val="tx2"/>
+              </a:buClr>
+              <a:buSzPct val="80000"/>
+              <a:buFont typeface="Wingdings" panose="05000000000000000000" pitchFamily="2" charset="2"/>
+              <a:buChar char="v"/>
+            </a:pPr>
+            <a:r>
+              <a:rPr lang="en-GB" sz="1000" dirty="0"/>
+              <a:t>Caitlin Sadowski, Jeffrey van Gogh, Ciera </a:t>
+            </a:r>
+            <a:r>
+              <a:rPr lang="en-GB" sz="1000" dirty="0" err="1"/>
+              <a:t>Jaspan</a:t>
+            </a:r>
+            <a:r>
+              <a:rPr lang="en-GB" sz="1000" dirty="0"/>
+              <a:t>, Emma </a:t>
+            </a:r>
+            <a:r>
+              <a:rPr lang="en-GB" sz="1000" dirty="0" err="1"/>
+              <a:t>Söderberg</a:t>
+            </a:r>
+            <a:r>
+              <a:rPr lang="en-GB" sz="1000" dirty="0"/>
+              <a:t>, and Collin Winter. 2015. Tricorder: building a program analysis ecosystem. </a:t>
+            </a:r>
+            <a:br>
+              <a:rPr lang="en-GB" sz="1000" dirty="0"/>
+            </a:br>
+            <a:r>
+              <a:rPr lang="en-GB" sz="1000" dirty="0"/>
+              <a:t>In </a:t>
+            </a:r>
+            <a:r>
+              <a:rPr lang="en-GB" sz="1000" i="1" dirty="0"/>
+              <a:t>Proceedings of the 37th International Conference on Software Engineering - Volume 1</a:t>
+            </a:r>
+            <a:r>
+              <a:rPr lang="en-GB" sz="1000" dirty="0"/>
+              <a:t> (ICSE '15), Vol. 1. IEEE Press, Piscataway, NJ, USA, 598-608.  </a:t>
+            </a:r>
+          </a:p>
+          <a:p>
+            <a:pPr marL="360000" indent="-360000">
+              <a:spcAft>
+                <a:spcPts val="1000"/>
+              </a:spcAft>
+              <a:buClr>
+                <a:schemeClr val="tx2"/>
+              </a:buClr>
+              <a:buSzPct val="80000"/>
+              <a:buFont typeface="Wingdings" panose="05000000000000000000" pitchFamily="2" charset="2"/>
+              <a:buChar char="v"/>
+            </a:pPr>
+            <a:r>
+              <a:rPr lang="en-GB" sz="1000" dirty="0"/>
+              <a:t>Cristina Cifuentes and Bernhard Scholz. 2008. Parfait: designing a scalable bug checker. In </a:t>
+            </a:r>
+            <a:r>
+              <a:rPr lang="en-GB" sz="1000" i="1" dirty="0"/>
+              <a:t>Proceedings of the 2008 workshop on Static analysis</a:t>
+            </a:r>
+            <a:r>
+              <a:rPr lang="en-GB" sz="1000" dirty="0"/>
+              <a:t> (SAW '08). </a:t>
+            </a:r>
+            <a:br>
+              <a:rPr lang="en-GB" sz="1000" dirty="0"/>
+            </a:br>
+            <a:r>
+              <a:rPr lang="en-GB" sz="1000" dirty="0"/>
+              <a:t>ACM, New York, NY, USA, 4-11. DOI=http://dx.doi.org/10.1145/1394504.1394505 </a:t>
+            </a:r>
+            <a:endParaRPr lang="LID4096" sz="1000" dirty="0" err="1"/>
+          </a:p>
+        </p:txBody>
+      </p:sp>
     </p:spTree>
     <p:extLst>
       <p:ext uri="{BB962C8B-B14F-4D97-AF65-F5344CB8AC3E}">
-        <p14:creationId xmlns:p14="http://schemas.microsoft.com/office/powerpoint/2010/main" val="4204401702"/>
+        <p14:creationId xmlns:p14="http://schemas.microsoft.com/office/powerpoint/2010/main" val="1143630792"/>
       </p:ext>
     </p:extLst>
   </p:cSld>

</xml_diff>

<commit_message>
Fixes typos in time plan
</commit_message>
<xml_diff>
--- a/docs/slides/Proposal_presentation_MSAT-UI.pptx
+++ b/docs/slides/Proposal_presentation_MSAT-UI.pptx
@@ -31387,8 +31387,8 @@
         </p:blipFill>
         <p:spPr>
           <a:xfrm>
-            <a:off x="4802035" y="188642"/>
-            <a:ext cx="4727954" cy="6185977"/>
+            <a:off x="4802035" y="202100"/>
+            <a:ext cx="4727954" cy="6159061"/>
           </a:xfrm>
           <a:prstGeom prst="rect">
             <a:avLst/>

</xml_diff>

<commit_message>
Removes the single tool usability issues diagram
</commit_message>
<xml_diff>
--- a/docs/slides/Proposal_presentation_MSAT-UI.pptx
+++ b/docs/slides/Proposal_presentation_MSAT-UI.pptx
@@ -5,10 +5,10 @@
     <p:sldMasterId id="2147483661" r:id="rId1"/>
   </p:sldMasterIdLst>
   <p:notesMasterIdLst>
-    <p:notesMasterId r:id="rId31"/>
+    <p:notesMasterId r:id="rId30"/>
   </p:notesMasterIdLst>
   <p:handoutMasterIdLst>
-    <p:handoutMasterId r:id="rId32"/>
+    <p:handoutMasterId r:id="rId31"/>
   </p:handoutMasterIdLst>
   <p:sldIdLst>
     <p:sldId id="259" r:id="rId2"/>
@@ -17,29 +17,28 @@
     <p:sldId id="269" r:id="rId5"/>
     <p:sldId id="270" r:id="rId6"/>
     <p:sldId id="274" r:id="rId7"/>
-    <p:sldId id="324" r:id="rId8"/>
-    <p:sldId id="273" r:id="rId9"/>
-    <p:sldId id="320" r:id="rId10"/>
-    <p:sldId id="284" r:id="rId11"/>
-    <p:sldId id="276" r:id="rId12"/>
-    <p:sldId id="283" r:id="rId13"/>
-    <p:sldId id="323" r:id="rId14"/>
-    <p:sldId id="321" r:id="rId15"/>
-    <p:sldId id="322" r:id="rId16"/>
-    <p:sldId id="286" r:id="rId17"/>
-    <p:sldId id="291" r:id="rId18"/>
-    <p:sldId id="288" r:id="rId19"/>
-    <p:sldId id="289" r:id="rId20"/>
-    <p:sldId id="302" r:id="rId21"/>
-    <p:sldId id="304" r:id="rId22"/>
-    <p:sldId id="292" r:id="rId23"/>
-    <p:sldId id="298" r:id="rId24"/>
-    <p:sldId id="300" r:id="rId25"/>
-    <p:sldId id="301" r:id="rId26"/>
-    <p:sldId id="262" r:id="rId27"/>
-    <p:sldId id="263" r:id="rId28"/>
-    <p:sldId id="266" r:id="rId29"/>
-    <p:sldId id="319" r:id="rId30"/>
+    <p:sldId id="273" r:id="rId8"/>
+    <p:sldId id="320" r:id="rId9"/>
+    <p:sldId id="284" r:id="rId10"/>
+    <p:sldId id="276" r:id="rId11"/>
+    <p:sldId id="283" r:id="rId12"/>
+    <p:sldId id="323" r:id="rId13"/>
+    <p:sldId id="321" r:id="rId14"/>
+    <p:sldId id="322" r:id="rId15"/>
+    <p:sldId id="286" r:id="rId16"/>
+    <p:sldId id="291" r:id="rId17"/>
+    <p:sldId id="288" r:id="rId18"/>
+    <p:sldId id="289" r:id="rId19"/>
+    <p:sldId id="302" r:id="rId20"/>
+    <p:sldId id="304" r:id="rId21"/>
+    <p:sldId id="292" r:id="rId22"/>
+    <p:sldId id="298" r:id="rId23"/>
+    <p:sldId id="300" r:id="rId24"/>
+    <p:sldId id="301" r:id="rId25"/>
+    <p:sldId id="262" r:id="rId26"/>
+    <p:sldId id="263" r:id="rId27"/>
+    <p:sldId id="266" r:id="rId28"/>
+    <p:sldId id="319" r:id="rId29"/>
   </p:sldIdLst>
   <p:sldSz cx="9906000" cy="6858000" type="A4"/>
   <p:notesSz cx="6669088" cy="9926638"/>
@@ -27814,7 +27813,7 @@
                   <a:schemeClr val="tx2"/>
                 </a:solidFill>
               </a:rPr>
-              <a:t> Problem Statement</a:t>
+              <a:t>Research Question 1</a:t>
             </a:r>
           </a:p>
         </p:txBody>
@@ -27858,48 +27857,62 @@
           <a:bodyPr/>
           <a:lstStyle/>
           <a:p>
-            <a:endParaRPr lang="en-GB" dirty="0"/>
-          </a:p>
-          <a:p>
-            <a:endParaRPr lang="en-GB" dirty="0"/>
-          </a:p>
-          <a:p>
-            <a:endParaRPr lang="en-GB" dirty="0"/>
-          </a:p>
-          <a:p>
-            <a:r>
-              <a:rPr lang="en-GB" sz="2400" dirty="0"/>
-              <a:t>How to integrate the results of multiple static analysis tools </a:t>
-            </a:r>
-            <a:br>
-              <a:rPr lang="en-GB" sz="2400" dirty="0"/>
-            </a:br>
-            <a:endParaRPr lang="en-GB" sz="2400" dirty="0"/>
-          </a:p>
-          <a:p>
             <a:pPr marL="0" indent="0">
+              <a:lnSpc>
+                <a:spcPct val="150000"/>
+              </a:lnSpc>
               <a:buNone/>
             </a:pPr>
+            <a:endParaRPr lang="en-GB" dirty="0"/>
+          </a:p>
+          <a:p>
+            <a:pPr marL="0" indent="0">
+              <a:lnSpc>
+                <a:spcPct val="150000"/>
+              </a:lnSpc>
+              <a:buNone/>
+            </a:pPr>
+            <a:endParaRPr lang="en-GB" dirty="0"/>
+          </a:p>
+          <a:p>
+            <a:pPr>
+              <a:lnSpc>
+                <a:spcPct val="150000"/>
+              </a:lnSpc>
+            </a:pPr>
             <a:r>
               <a:rPr lang="en-GB" sz="2400" dirty="0"/>
-              <a:t>													in a unified user interface?</a:t>
-            </a:r>
-          </a:p>
-          <a:p>
-            <a:endParaRPr lang="de-DE" dirty="0"/>
-          </a:p>
-          <a:p>
-            <a:endParaRPr lang="de-DE" dirty="0"/>
-          </a:p>
-          <a:p>
-            <a:pPr lvl="1">
-              <a:buFont typeface="Wingdings" panose="05000000000000000000" pitchFamily="2" charset="2"/>
-              <a:buChar char="v"/>
+              <a:t>How to display results of the same codebase from </a:t>
+            </a:r>
+          </a:p>
+          <a:p>
+            <a:pPr marL="0" indent="0" algn="r">
+              <a:lnSpc>
+                <a:spcPct val="150000"/>
+              </a:lnSpc>
+              <a:buNone/>
             </a:pPr>
             <a:r>
-              <a:rPr lang="de-DE" dirty="0"/>
-              <a:t>3 Research Questions</a:t>
-            </a:r>
+              <a:rPr lang="en-GB" sz="2400" dirty="0"/>
+              <a:t>different analysis tools? </a:t>
+            </a:r>
+          </a:p>
+          <a:p>
+            <a:pPr>
+              <a:lnSpc>
+                <a:spcPct val="150000"/>
+              </a:lnSpc>
+            </a:pPr>
+            <a:endParaRPr lang="en-GB" sz="2400" dirty="0"/>
+          </a:p>
+          <a:p>
+            <a:pPr marL="0" indent="0">
+              <a:lnSpc>
+                <a:spcPct val="150000"/>
+              </a:lnSpc>
+              <a:buNone/>
+            </a:pPr>
+            <a:endParaRPr lang="en-GB" dirty="0"/>
           </a:p>
         </p:txBody>
       </p:sp>
@@ -27929,7 +27942,7 @@
     </p:spTree>
     <p:extLst>
       <p:ext uri="{BB962C8B-B14F-4D97-AF65-F5344CB8AC3E}">
-        <p14:creationId xmlns:p14="http://schemas.microsoft.com/office/powerpoint/2010/main" val="4204401702"/>
+        <p14:creationId xmlns:p14="http://schemas.microsoft.com/office/powerpoint/2010/main" val="1386339837"/>
       </p:ext>
     </p:extLst>
   </p:cSld>
@@ -27977,7 +27990,7 @@
                   <a:schemeClr val="tx2"/>
                 </a:solidFill>
               </a:rPr>
-              <a:t>Research Question 1</a:t>
+              <a:t> What Current Tools do? - RQ 1: .. display results!</a:t>
             </a:r>
           </a:p>
         </p:txBody>
@@ -28001,183 +28014,6 @@
               <a:rPr lang="de-DE" smtClean="0"/>
               <a:pPr/>
               <a:t>11</a:t>
-            </a:fld>
-            <a:endParaRPr lang="de-DE" dirty="0"/>
-          </a:p>
-        </p:txBody>
-      </p:sp>
-      <p:sp>
-        <p:nvSpPr>
-          <p:cNvPr id="5" name="Textplatzhalter 4"/>
-          <p:cNvSpPr>
-            <a:spLocks noGrp="1"/>
-          </p:cNvSpPr>
-          <p:nvPr>
-            <p:ph type="body" sz="quarter" idx="12"/>
-          </p:nvPr>
-        </p:nvSpPr>
-        <p:spPr/>
-        <p:txBody>
-          <a:bodyPr/>
-          <a:lstStyle/>
-          <a:p>
-            <a:pPr marL="0" indent="0">
-              <a:lnSpc>
-                <a:spcPct val="150000"/>
-              </a:lnSpc>
-              <a:buNone/>
-            </a:pPr>
-            <a:endParaRPr lang="en-GB" dirty="0"/>
-          </a:p>
-          <a:p>
-            <a:pPr marL="0" indent="0">
-              <a:lnSpc>
-                <a:spcPct val="150000"/>
-              </a:lnSpc>
-              <a:buNone/>
-            </a:pPr>
-            <a:endParaRPr lang="en-GB" dirty="0"/>
-          </a:p>
-          <a:p>
-            <a:pPr>
-              <a:lnSpc>
-                <a:spcPct val="150000"/>
-              </a:lnSpc>
-            </a:pPr>
-            <a:r>
-              <a:rPr lang="en-GB" sz="2400" dirty="0"/>
-              <a:t>How to display results of the same codebase from </a:t>
-            </a:r>
-          </a:p>
-          <a:p>
-            <a:pPr marL="0" indent="0" algn="r">
-              <a:lnSpc>
-                <a:spcPct val="150000"/>
-              </a:lnSpc>
-              <a:buNone/>
-            </a:pPr>
-            <a:r>
-              <a:rPr lang="en-GB" sz="2400" dirty="0"/>
-              <a:t>different analysis tools? </a:t>
-            </a:r>
-          </a:p>
-          <a:p>
-            <a:pPr>
-              <a:lnSpc>
-                <a:spcPct val="150000"/>
-              </a:lnSpc>
-            </a:pPr>
-            <a:endParaRPr lang="en-GB" sz="2400" dirty="0"/>
-          </a:p>
-          <a:p>
-            <a:pPr marL="0" indent="0">
-              <a:lnSpc>
-                <a:spcPct val="150000"/>
-              </a:lnSpc>
-              <a:buNone/>
-            </a:pPr>
-            <a:endParaRPr lang="en-GB" dirty="0"/>
-          </a:p>
-        </p:txBody>
-      </p:sp>
-      <p:sp>
-        <p:nvSpPr>
-          <p:cNvPr id="3" name="Fußzeilenplatzhalter 2"/>
-          <p:cNvSpPr>
-            <a:spLocks noGrp="1"/>
-          </p:cNvSpPr>
-          <p:nvPr>
-            <p:ph type="ftr" sz="quarter" idx="10"/>
-          </p:nvPr>
-        </p:nvSpPr>
-        <p:spPr/>
-        <p:txBody>
-          <a:bodyPr/>
-          <a:lstStyle/>
-          <a:p>
-            <a:r>
-              <a:rPr lang="de-DE"/>
-              <a:t>Software Engineering</a:t>
-            </a:r>
-            <a:endParaRPr lang="de-DE" dirty="0"/>
-          </a:p>
-        </p:txBody>
-      </p:sp>
-    </p:spTree>
-    <p:extLst>
-      <p:ext uri="{BB962C8B-B14F-4D97-AF65-F5344CB8AC3E}">
-        <p14:creationId xmlns:p14="http://schemas.microsoft.com/office/powerpoint/2010/main" val="1386339837"/>
-      </p:ext>
-    </p:extLst>
-  </p:cSld>
-  <p:clrMapOvr>
-    <a:masterClrMapping/>
-  </p:clrMapOvr>
-</p:sld>
-</file>
-
-<file path=ppt/slides/slide12.xml><?xml version="1.0" encoding="utf-8"?>
-<p:sld xmlns:a="http://schemas.openxmlformats.org/drawingml/2006/main" xmlns:r="http://schemas.openxmlformats.org/officeDocument/2006/relationships" xmlns:p="http://schemas.openxmlformats.org/presentationml/2006/main">
-  <p:cSld>
-    <p:spTree>
-      <p:nvGrpSpPr>
-        <p:cNvPr id="1" name=""/>
-        <p:cNvGrpSpPr/>
-        <p:nvPr/>
-      </p:nvGrpSpPr>
-      <p:grpSpPr>
-        <a:xfrm>
-          <a:off x="0" y="0"/>
-          <a:ext cx="0" cy="0"/>
-          <a:chOff x="0" y="0"/>
-          <a:chExt cx="0" cy="0"/>
-        </a:xfrm>
-      </p:grpSpPr>
-      <p:sp>
-        <p:nvSpPr>
-          <p:cNvPr id="2" name="Titel 1"/>
-          <p:cNvSpPr>
-            <a:spLocks noGrp="1"/>
-          </p:cNvSpPr>
-          <p:nvPr>
-            <p:ph type="title"/>
-          </p:nvPr>
-        </p:nvSpPr>
-        <p:spPr/>
-        <p:txBody>
-          <a:bodyPr/>
-          <a:lstStyle/>
-          <a:p>
-            <a:r>
-              <a:rPr lang="de-DE" dirty="0">
-                <a:solidFill>
-                  <a:schemeClr val="tx2"/>
-                </a:solidFill>
-              </a:rPr>
-              <a:t> What Current Tools do? - RQ 1: .. display results!</a:t>
-            </a:r>
-          </a:p>
-        </p:txBody>
-      </p:sp>
-      <p:sp>
-        <p:nvSpPr>
-          <p:cNvPr id="4" name="Foliennummernplatzhalter 3"/>
-          <p:cNvSpPr>
-            <a:spLocks noGrp="1"/>
-          </p:cNvSpPr>
-          <p:nvPr>
-            <p:ph type="sldNum" sz="quarter" idx="11"/>
-          </p:nvPr>
-        </p:nvSpPr>
-        <p:spPr/>
-        <p:txBody>
-          <a:bodyPr/>
-          <a:lstStyle/>
-          <a:p>
-            <a:fld id="{815DB69B-0A2B-4D0B-A3BD-360AAA24381D}" type="slidenum">
-              <a:rPr lang="de-DE" smtClean="0"/>
-              <a:pPr/>
-              <a:t>12</a:t>
             </a:fld>
             <a:endParaRPr lang="de-DE" dirty="0"/>
           </a:p>
@@ -28277,7 +28113,7 @@
 </p:sld>
 </file>
 
-<file path=ppt/slides/slide13.xml><?xml version="1.0" encoding="utf-8"?>
+<file path=ppt/slides/slide12.xml><?xml version="1.0" encoding="utf-8"?>
 <p:sld xmlns:a="http://schemas.openxmlformats.org/drawingml/2006/main" xmlns:r="http://schemas.openxmlformats.org/officeDocument/2006/relationships" xmlns:p="http://schemas.openxmlformats.org/presentationml/2006/main">
   <p:cSld>
     <p:spTree>
@@ -28338,7 +28174,7 @@
             <a:fld id="{815DB69B-0A2B-4D0B-A3BD-360AAA24381D}" type="slidenum">
               <a:rPr lang="de-DE" smtClean="0"/>
               <a:pPr/>
-              <a:t>13</a:t>
+              <a:t>12</a:t>
             </a:fld>
             <a:endParaRPr lang="de-DE" dirty="0"/>
           </a:p>
@@ -28438,6 +28274,177 @@
 </p:sld>
 </file>
 
+<file path=ppt/slides/slide13.xml><?xml version="1.0" encoding="utf-8"?>
+<p:sld xmlns:a="http://schemas.openxmlformats.org/drawingml/2006/main" xmlns:r="http://schemas.openxmlformats.org/officeDocument/2006/relationships" xmlns:p="http://schemas.openxmlformats.org/presentationml/2006/main">
+  <p:cSld>
+    <p:spTree>
+      <p:nvGrpSpPr>
+        <p:cNvPr id="1" name=""/>
+        <p:cNvGrpSpPr/>
+        <p:nvPr/>
+      </p:nvGrpSpPr>
+      <p:grpSpPr>
+        <a:xfrm>
+          <a:off x="0" y="0"/>
+          <a:ext cx="0" cy="0"/>
+          <a:chOff x="0" y="0"/>
+          <a:chExt cx="0" cy="0"/>
+        </a:xfrm>
+      </p:grpSpPr>
+      <p:sp>
+        <p:nvSpPr>
+          <p:cNvPr id="2" name="Titel 1"/>
+          <p:cNvSpPr>
+            <a:spLocks noGrp="1"/>
+          </p:cNvSpPr>
+          <p:nvPr>
+            <p:ph type="title"/>
+          </p:nvPr>
+        </p:nvSpPr>
+        <p:spPr/>
+        <p:txBody>
+          <a:bodyPr/>
+          <a:lstStyle/>
+          <a:p>
+            <a:r>
+              <a:rPr lang="de-DE" dirty="0">
+                <a:solidFill>
+                  <a:schemeClr val="tx2"/>
+                </a:solidFill>
+              </a:rPr>
+              <a:t>Research Question 2</a:t>
+            </a:r>
+          </a:p>
+        </p:txBody>
+      </p:sp>
+      <p:sp>
+        <p:nvSpPr>
+          <p:cNvPr id="4" name="Foliennummernplatzhalter 3"/>
+          <p:cNvSpPr>
+            <a:spLocks noGrp="1"/>
+          </p:cNvSpPr>
+          <p:nvPr>
+            <p:ph type="sldNum" sz="quarter" idx="11"/>
+          </p:nvPr>
+        </p:nvSpPr>
+        <p:spPr/>
+        <p:txBody>
+          <a:bodyPr/>
+          <a:lstStyle/>
+          <a:p>
+            <a:fld id="{815DB69B-0A2B-4D0B-A3BD-360AAA24381D}" type="slidenum">
+              <a:rPr lang="de-DE" smtClean="0"/>
+              <a:pPr/>
+              <a:t>13</a:t>
+            </a:fld>
+            <a:endParaRPr lang="de-DE" dirty="0"/>
+          </a:p>
+        </p:txBody>
+      </p:sp>
+      <p:sp>
+        <p:nvSpPr>
+          <p:cNvPr id="5" name="Textplatzhalter 4"/>
+          <p:cNvSpPr>
+            <a:spLocks noGrp="1"/>
+          </p:cNvSpPr>
+          <p:nvPr>
+            <p:ph type="body" sz="quarter" idx="12"/>
+          </p:nvPr>
+        </p:nvSpPr>
+        <p:spPr/>
+        <p:txBody>
+          <a:bodyPr/>
+          <a:lstStyle/>
+          <a:p>
+            <a:pPr marL="0" indent="0">
+              <a:buNone/>
+            </a:pPr>
+            <a:endParaRPr lang="en-GB" dirty="0"/>
+          </a:p>
+          <a:p>
+            <a:pPr marL="0" indent="0">
+              <a:buNone/>
+            </a:pPr>
+            <a:endParaRPr lang="en-GB" dirty="0"/>
+          </a:p>
+          <a:p>
+            <a:r>
+              <a:rPr lang="en-GB" sz="2400" dirty="0"/>
+              <a:t>What feedback works to know that the bug fixing is on-going?</a:t>
+            </a:r>
+          </a:p>
+          <a:p>
+            <a:endParaRPr lang="en-GB" sz="2400" dirty="0"/>
+          </a:p>
+          <a:p>
+            <a:endParaRPr lang="en-GB" sz="2400" dirty="0"/>
+          </a:p>
+          <a:p>
+            <a:r>
+              <a:rPr lang="en-GB" dirty="0"/>
+              <a:t>What current tools do? </a:t>
+            </a:r>
+          </a:p>
+          <a:p>
+            <a:pPr marL="0" indent="0">
+              <a:buNone/>
+            </a:pPr>
+            <a:endParaRPr lang="en-GB" dirty="0"/>
+          </a:p>
+          <a:p>
+            <a:pPr lvl="2">
+              <a:buFont typeface="Wingdings" panose="05000000000000000000" pitchFamily="2" charset="2"/>
+              <a:buChar char="§"/>
+            </a:pPr>
+            <a:r>
+              <a:rPr lang="en-GB" dirty="0"/>
+              <a:t>Traditional approach – Nightly Builds</a:t>
+            </a:r>
+          </a:p>
+          <a:p>
+            <a:pPr marL="0" indent="0">
+              <a:buNone/>
+            </a:pPr>
+            <a:endParaRPr lang="en-GB" dirty="0"/>
+          </a:p>
+        </p:txBody>
+      </p:sp>
+      <p:sp>
+        <p:nvSpPr>
+          <p:cNvPr id="3" name="Fußzeilenplatzhalter 2"/>
+          <p:cNvSpPr>
+            <a:spLocks noGrp="1"/>
+          </p:cNvSpPr>
+          <p:nvPr>
+            <p:ph type="ftr" sz="quarter" idx="10"/>
+          </p:nvPr>
+        </p:nvSpPr>
+        <p:spPr/>
+        <p:txBody>
+          <a:bodyPr/>
+          <a:lstStyle/>
+          <a:p>
+            <a:r>
+              <a:rPr lang="de-DE"/>
+              <a:t>Software Engineering</a:t>
+            </a:r>
+            <a:endParaRPr lang="de-DE" dirty="0"/>
+          </a:p>
+        </p:txBody>
+      </p:sp>
+    </p:spTree>
+    <p:extLst>
+      <p:ext uri="{BB962C8B-B14F-4D97-AF65-F5344CB8AC3E}">
+        <p14:creationId xmlns:p14="http://schemas.microsoft.com/office/powerpoint/2010/main" val="1251747576"/>
+      </p:ext>
+    </p:extLst>
+  </p:cSld>
+  <p:clrMapOvr>
+    <a:masterClrMapping/>
+  </p:clrMapOvr>
+</p:sld>
+</file>
+
 <file path=ppt/slides/slide14.xml><?xml version="1.0" encoding="utf-8"?>
 <p:sld xmlns:a="http://schemas.openxmlformats.org/drawingml/2006/main" xmlns:r="http://schemas.openxmlformats.org/officeDocument/2006/relationships" xmlns:p="http://schemas.openxmlformats.org/presentationml/2006/main">
   <p:cSld>
@@ -28476,7 +28483,7 @@
                   <a:schemeClr val="tx2"/>
                 </a:solidFill>
               </a:rPr>
-              <a:t>Research Question 2</a:t>
+              <a:t>Research Question 3 </a:t>
             </a:r>
           </a:p>
         </p:txBody>
@@ -28532,44 +28539,17 @@
             <a:endParaRPr lang="en-GB" dirty="0"/>
           </a:p>
           <a:p>
-            <a:r>
-              <a:rPr lang="en-GB" sz="2400" dirty="0"/>
-              <a:t>What feedback works to know that the bug fixing is on-going?</a:t>
-            </a:r>
-          </a:p>
-          <a:p>
-            <a:endParaRPr lang="en-GB" sz="2400" dirty="0"/>
-          </a:p>
-          <a:p>
-            <a:endParaRPr lang="en-GB" sz="2400" dirty="0"/>
-          </a:p>
-          <a:p>
-            <a:r>
-              <a:rPr lang="en-GB" dirty="0"/>
-              <a:t>What current tools do? </a:t>
-            </a:r>
-          </a:p>
-          <a:p>
             <a:pPr marL="0" indent="0">
               <a:buNone/>
             </a:pPr>
             <a:endParaRPr lang="en-GB" dirty="0"/>
           </a:p>
           <a:p>
-            <a:pPr lvl="2">
-              <a:buFont typeface="Wingdings" panose="05000000000000000000" pitchFamily="2" charset="2"/>
-              <a:buChar char="§"/>
-            </a:pPr>
-            <a:r>
-              <a:rPr lang="en-GB" dirty="0"/>
-              <a:t>Traditional approach – Nightly Builds</a:t>
-            </a:r>
-          </a:p>
-          <a:p>
-            <a:pPr marL="0" indent="0">
-              <a:buNone/>
-            </a:pPr>
-            <a:endParaRPr lang="en-GB" dirty="0"/>
+            <a:r>
+              <a:rPr lang="en-GB" sz="2400" dirty="0"/>
+              <a:t>How to carry traceability of bug fixing? </a:t>
+            </a:r>
+            <a:endParaRPr lang="de-DE" sz="2400" dirty="0"/>
           </a:p>
         </p:txBody>
       </p:sp>
@@ -28599,7 +28579,7 @@
     </p:spTree>
     <p:extLst>
       <p:ext uri="{BB962C8B-B14F-4D97-AF65-F5344CB8AC3E}">
-        <p14:creationId xmlns:p14="http://schemas.microsoft.com/office/powerpoint/2010/main" val="1251747576"/>
+        <p14:creationId xmlns:p14="http://schemas.microsoft.com/office/powerpoint/2010/main" val="1029131241"/>
       </p:ext>
     </p:extLst>
   </p:cSld>
@@ -28647,7 +28627,7 @@
                   <a:schemeClr val="tx2"/>
                 </a:solidFill>
               </a:rPr>
-              <a:t>Research Question 3 </a:t>
+              <a:t> What Current Tools do? - RQ 3: .. traceability!</a:t>
             </a:r>
           </a:p>
         </p:txBody>
@@ -28671,150 +28651,6 @@
               <a:rPr lang="de-DE" smtClean="0"/>
               <a:pPr/>
               <a:t>15</a:t>
-            </a:fld>
-            <a:endParaRPr lang="de-DE" dirty="0"/>
-          </a:p>
-        </p:txBody>
-      </p:sp>
-      <p:sp>
-        <p:nvSpPr>
-          <p:cNvPr id="5" name="Textplatzhalter 4"/>
-          <p:cNvSpPr>
-            <a:spLocks noGrp="1"/>
-          </p:cNvSpPr>
-          <p:nvPr>
-            <p:ph type="body" sz="quarter" idx="12"/>
-          </p:nvPr>
-        </p:nvSpPr>
-        <p:spPr/>
-        <p:txBody>
-          <a:bodyPr/>
-          <a:lstStyle/>
-          <a:p>
-            <a:pPr marL="0" indent="0">
-              <a:buNone/>
-            </a:pPr>
-            <a:endParaRPr lang="en-GB" dirty="0"/>
-          </a:p>
-          <a:p>
-            <a:pPr marL="0" indent="0">
-              <a:buNone/>
-            </a:pPr>
-            <a:endParaRPr lang="en-GB" dirty="0"/>
-          </a:p>
-          <a:p>
-            <a:pPr marL="0" indent="0">
-              <a:buNone/>
-            </a:pPr>
-            <a:endParaRPr lang="en-GB" dirty="0"/>
-          </a:p>
-          <a:p>
-            <a:r>
-              <a:rPr lang="en-GB" sz="2400" dirty="0"/>
-              <a:t>How to carry traceability of bug fixing? </a:t>
-            </a:r>
-            <a:endParaRPr lang="de-DE" sz="2400" dirty="0"/>
-          </a:p>
-        </p:txBody>
-      </p:sp>
-      <p:sp>
-        <p:nvSpPr>
-          <p:cNvPr id="3" name="Fußzeilenplatzhalter 2"/>
-          <p:cNvSpPr>
-            <a:spLocks noGrp="1"/>
-          </p:cNvSpPr>
-          <p:nvPr>
-            <p:ph type="ftr" sz="quarter" idx="10"/>
-          </p:nvPr>
-        </p:nvSpPr>
-        <p:spPr/>
-        <p:txBody>
-          <a:bodyPr/>
-          <a:lstStyle/>
-          <a:p>
-            <a:r>
-              <a:rPr lang="de-DE"/>
-              <a:t>Software Engineering</a:t>
-            </a:r>
-            <a:endParaRPr lang="de-DE" dirty="0"/>
-          </a:p>
-        </p:txBody>
-      </p:sp>
-    </p:spTree>
-    <p:extLst>
-      <p:ext uri="{BB962C8B-B14F-4D97-AF65-F5344CB8AC3E}">
-        <p14:creationId xmlns:p14="http://schemas.microsoft.com/office/powerpoint/2010/main" val="1029131241"/>
-      </p:ext>
-    </p:extLst>
-  </p:cSld>
-  <p:clrMapOvr>
-    <a:masterClrMapping/>
-  </p:clrMapOvr>
-</p:sld>
-</file>
-
-<file path=ppt/slides/slide16.xml><?xml version="1.0" encoding="utf-8"?>
-<p:sld xmlns:a="http://schemas.openxmlformats.org/drawingml/2006/main" xmlns:r="http://schemas.openxmlformats.org/officeDocument/2006/relationships" xmlns:p="http://schemas.openxmlformats.org/presentationml/2006/main">
-  <p:cSld>
-    <p:spTree>
-      <p:nvGrpSpPr>
-        <p:cNvPr id="1" name=""/>
-        <p:cNvGrpSpPr/>
-        <p:nvPr/>
-      </p:nvGrpSpPr>
-      <p:grpSpPr>
-        <a:xfrm>
-          <a:off x="0" y="0"/>
-          <a:ext cx="0" cy="0"/>
-          <a:chOff x="0" y="0"/>
-          <a:chExt cx="0" cy="0"/>
-        </a:xfrm>
-      </p:grpSpPr>
-      <p:sp>
-        <p:nvSpPr>
-          <p:cNvPr id="2" name="Titel 1"/>
-          <p:cNvSpPr>
-            <a:spLocks noGrp="1"/>
-          </p:cNvSpPr>
-          <p:nvPr>
-            <p:ph type="title"/>
-          </p:nvPr>
-        </p:nvSpPr>
-        <p:spPr/>
-        <p:txBody>
-          <a:bodyPr/>
-          <a:lstStyle/>
-          <a:p>
-            <a:r>
-              <a:rPr lang="de-DE" dirty="0">
-                <a:solidFill>
-                  <a:schemeClr val="tx2"/>
-                </a:solidFill>
-              </a:rPr>
-              <a:t> What Current Tools do? - RQ 3: .. traceability!</a:t>
-            </a:r>
-          </a:p>
-        </p:txBody>
-      </p:sp>
-      <p:sp>
-        <p:nvSpPr>
-          <p:cNvPr id="4" name="Foliennummernplatzhalter 3"/>
-          <p:cNvSpPr>
-            <a:spLocks noGrp="1"/>
-          </p:cNvSpPr>
-          <p:nvPr>
-            <p:ph type="sldNum" sz="quarter" idx="11"/>
-          </p:nvPr>
-        </p:nvSpPr>
-        <p:spPr/>
-        <p:txBody>
-          <a:bodyPr/>
-          <a:lstStyle/>
-          <a:p>
-            <a:fld id="{815DB69B-0A2B-4D0B-A3BD-360AAA24381D}" type="slidenum">
-              <a:rPr lang="de-DE" smtClean="0"/>
-              <a:pPr/>
-              <a:t>16</a:t>
             </a:fld>
             <a:endParaRPr lang="de-DE" dirty="0"/>
           </a:p>
@@ -28965,7 +28801,7 @@
 </p:sld>
 </file>
 
-<file path=ppt/slides/slide17.xml><?xml version="1.0" encoding="utf-8"?>
+<file path=ppt/slides/slide16.xml><?xml version="1.0" encoding="utf-8"?>
 <p:sld xmlns:a="http://schemas.openxmlformats.org/drawingml/2006/main" xmlns:r="http://schemas.openxmlformats.org/officeDocument/2006/relationships" xmlns:p="http://schemas.openxmlformats.org/presentationml/2006/main">
   <p:cSld>
     <p:spTree>
@@ -29026,7 +28862,7 @@
             <a:fld id="{815DB69B-0A2B-4D0B-A3BD-360AAA24381D}" type="slidenum">
               <a:rPr lang="de-DE" smtClean="0"/>
               <a:pPr/>
-              <a:t>17</a:t>
+              <a:t>16</a:t>
             </a:fld>
             <a:endParaRPr lang="de-DE" dirty="0"/>
           </a:p>
@@ -29174,6 +29010,221 @@
 </p:sld>
 </file>
 
+<file path=ppt/slides/slide17.xml><?xml version="1.0" encoding="utf-8"?>
+<p:sld xmlns:a="http://schemas.openxmlformats.org/drawingml/2006/main" xmlns:r="http://schemas.openxmlformats.org/officeDocument/2006/relationships" xmlns:p="http://schemas.openxmlformats.org/presentationml/2006/main">
+  <p:cSld>
+    <p:spTree>
+      <p:nvGrpSpPr>
+        <p:cNvPr id="1" name=""/>
+        <p:cNvGrpSpPr/>
+        <p:nvPr/>
+      </p:nvGrpSpPr>
+      <p:grpSpPr>
+        <a:xfrm>
+          <a:off x="0" y="0"/>
+          <a:ext cx="0" cy="0"/>
+          <a:chOff x="0" y="0"/>
+          <a:chExt cx="0" cy="0"/>
+        </a:xfrm>
+      </p:grpSpPr>
+      <p:sp>
+        <p:nvSpPr>
+          <p:cNvPr id="2" name="Titel 1"/>
+          <p:cNvSpPr>
+            <a:spLocks noGrp="1"/>
+          </p:cNvSpPr>
+          <p:nvPr>
+            <p:ph type="title"/>
+          </p:nvPr>
+        </p:nvSpPr>
+        <p:spPr/>
+        <p:txBody>
+          <a:bodyPr/>
+          <a:lstStyle/>
+          <a:p>
+            <a:r>
+              <a:rPr lang="de-DE" dirty="0">
+                <a:solidFill>
+                  <a:schemeClr val="tx2"/>
+                </a:solidFill>
+              </a:rPr>
+              <a:t>Our Approaches</a:t>
+            </a:r>
+          </a:p>
+        </p:txBody>
+      </p:sp>
+      <p:sp>
+        <p:nvSpPr>
+          <p:cNvPr id="4" name="Foliennummernplatzhalter 3"/>
+          <p:cNvSpPr>
+            <a:spLocks noGrp="1"/>
+          </p:cNvSpPr>
+          <p:nvPr>
+            <p:ph type="sldNum" sz="quarter" idx="11"/>
+          </p:nvPr>
+        </p:nvSpPr>
+        <p:spPr/>
+        <p:txBody>
+          <a:bodyPr/>
+          <a:lstStyle/>
+          <a:p>
+            <a:fld id="{815DB69B-0A2B-4D0B-A3BD-360AAA24381D}" type="slidenum">
+              <a:rPr lang="de-DE" smtClean="0"/>
+              <a:pPr/>
+              <a:t>17</a:t>
+            </a:fld>
+            <a:endParaRPr lang="de-DE" dirty="0"/>
+          </a:p>
+        </p:txBody>
+      </p:sp>
+      <p:sp>
+        <p:nvSpPr>
+          <p:cNvPr id="5" name="Textplatzhalter 4"/>
+          <p:cNvSpPr>
+            <a:spLocks noGrp="1"/>
+          </p:cNvSpPr>
+          <p:nvPr>
+            <p:ph type="body" sz="quarter" idx="12"/>
+          </p:nvPr>
+        </p:nvSpPr>
+        <p:spPr/>
+        <p:txBody>
+          <a:bodyPr/>
+          <a:lstStyle/>
+          <a:p>
+            <a:pPr marL="0" indent="0">
+              <a:buNone/>
+            </a:pPr>
+            <a:endParaRPr lang="de-DE" dirty="0"/>
+          </a:p>
+          <a:p>
+            <a:r>
+              <a:rPr lang="de-DE" dirty="0"/>
+              <a:t>Software Engineering disciplines:</a:t>
+            </a:r>
+            <a:br>
+              <a:rPr lang="de-DE" dirty="0"/>
+            </a:br>
+            <a:endParaRPr lang="de-DE" dirty="0"/>
+          </a:p>
+          <a:p>
+            <a:pPr lvl="4">
+              <a:buFont typeface="Wingdings" panose="05000000000000000000" pitchFamily="2" charset="2"/>
+              <a:buChar char="§"/>
+            </a:pPr>
+            <a:r>
+              <a:rPr lang="de-DE" dirty="0"/>
+              <a:t>Complex datasets</a:t>
+            </a:r>
+          </a:p>
+          <a:p>
+            <a:pPr lvl="4">
+              <a:buFont typeface="Wingdings" panose="05000000000000000000" pitchFamily="2" charset="2"/>
+              <a:buChar char="§"/>
+            </a:pPr>
+            <a:r>
+              <a:rPr lang="de-DE" dirty="0"/>
+              <a:t>Compiler reporting</a:t>
+            </a:r>
+          </a:p>
+          <a:p>
+            <a:pPr lvl="4">
+              <a:buFont typeface="Wingdings" panose="05000000000000000000" pitchFamily="2" charset="2"/>
+              <a:buChar char="§"/>
+            </a:pPr>
+            <a:r>
+              <a:rPr lang="de-DE" dirty="0"/>
+              <a:t>Continuous integration</a:t>
+            </a:r>
+          </a:p>
+          <a:p>
+            <a:pPr lvl="4">
+              <a:buFont typeface="Wingdings" panose="05000000000000000000" pitchFamily="2" charset="2"/>
+              <a:buChar char="§"/>
+            </a:pPr>
+            <a:r>
+              <a:rPr lang="de-DE" dirty="0"/>
+              <a:t>Refactoring tools</a:t>
+            </a:r>
+          </a:p>
+          <a:p>
+            <a:pPr lvl="4">
+              <a:buFont typeface="Wingdings" panose="05000000000000000000" pitchFamily="2" charset="2"/>
+              <a:buChar char="§"/>
+            </a:pPr>
+            <a:r>
+              <a:rPr lang="de-DE" dirty="0"/>
+              <a:t>Issue tracker</a:t>
+            </a:r>
+          </a:p>
+          <a:p>
+            <a:pPr lvl="4">
+              <a:buFont typeface="Wingdings" panose="05000000000000000000" pitchFamily="2" charset="2"/>
+              <a:buChar char="§"/>
+            </a:pPr>
+            <a:r>
+              <a:rPr lang="de-DE" dirty="0"/>
+              <a:t>Stack Overflow </a:t>
+            </a:r>
+          </a:p>
+          <a:p>
+            <a:pPr lvl="4">
+              <a:buFont typeface="Wingdings" panose="05000000000000000000" pitchFamily="2" charset="2"/>
+              <a:buChar char="§"/>
+            </a:pPr>
+            <a:r>
+              <a:rPr lang="de-DE" dirty="0"/>
+              <a:t>Gamification</a:t>
+            </a:r>
+          </a:p>
+          <a:p>
+            <a:pPr lvl="4">
+              <a:buFont typeface="Wingdings" panose="05000000000000000000" pitchFamily="2" charset="2"/>
+              <a:buChar char="§"/>
+            </a:pPr>
+            <a:r>
+              <a:rPr lang="de-DE" dirty="0"/>
+              <a:t>Usability Engineering</a:t>
+            </a:r>
+          </a:p>
+        </p:txBody>
+      </p:sp>
+      <p:sp>
+        <p:nvSpPr>
+          <p:cNvPr id="3" name="Fußzeilenplatzhalter 2"/>
+          <p:cNvSpPr>
+            <a:spLocks noGrp="1"/>
+          </p:cNvSpPr>
+          <p:nvPr>
+            <p:ph type="ftr" sz="quarter" idx="10"/>
+          </p:nvPr>
+        </p:nvSpPr>
+        <p:spPr/>
+        <p:txBody>
+          <a:bodyPr/>
+          <a:lstStyle/>
+          <a:p>
+            <a:r>
+              <a:rPr lang="de-DE"/>
+              <a:t>Software Engineering</a:t>
+            </a:r>
+            <a:endParaRPr lang="de-DE" dirty="0"/>
+          </a:p>
+        </p:txBody>
+      </p:sp>
+    </p:spTree>
+    <p:extLst>
+      <p:ext uri="{BB962C8B-B14F-4D97-AF65-F5344CB8AC3E}">
+        <p14:creationId xmlns:p14="http://schemas.microsoft.com/office/powerpoint/2010/main" val="4265672591"/>
+      </p:ext>
+    </p:extLst>
+  </p:cSld>
+  <p:clrMapOvr>
+    <a:masterClrMapping/>
+  </p:clrMapOvr>
+</p:sld>
+</file>
+
 <file path=ppt/slides/slide18.xml><?xml version="1.0" encoding="utf-8"?>
 <p:sld xmlns:a="http://schemas.openxmlformats.org/drawingml/2006/main" xmlns:r="http://schemas.openxmlformats.org/officeDocument/2006/relationships" xmlns:p="http://schemas.openxmlformats.org/presentationml/2006/main">
   <p:cSld>
@@ -29212,7 +29263,7 @@
                   <a:schemeClr val="tx2"/>
                 </a:solidFill>
               </a:rPr>
-              <a:t>Our Approaches</a:t>
+              <a:t>Our Approaches – research existing scenarios!</a:t>
             </a:r>
           </a:p>
         </p:txBody>
@@ -29236,221 +29287,6 @@
               <a:rPr lang="de-DE" smtClean="0"/>
               <a:pPr/>
               <a:t>18</a:t>
-            </a:fld>
-            <a:endParaRPr lang="de-DE" dirty="0"/>
-          </a:p>
-        </p:txBody>
-      </p:sp>
-      <p:sp>
-        <p:nvSpPr>
-          <p:cNvPr id="5" name="Textplatzhalter 4"/>
-          <p:cNvSpPr>
-            <a:spLocks noGrp="1"/>
-          </p:cNvSpPr>
-          <p:nvPr>
-            <p:ph type="body" sz="quarter" idx="12"/>
-          </p:nvPr>
-        </p:nvSpPr>
-        <p:spPr/>
-        <p:txBody>
-          <a:bodyPr/>
-          <a:lstStyle/>
-          <a:p>
-            <a:pPr marL="0" indent="0">
-              <a:buNone/>
-            </a:pPr>
-            <a:endParaRPr lang="de-DE" dirty="0"/>
-          </a:p>
-          <a:p>
-            <a:r>
-              <a:rPr lang="de-DE" dirty="0"/>
-              <a:t>Software Engineering disciplines:</a:t>
-            </a:r>
-            <a:br>
-              <a:rPr lang="de-DE" dirty="0"/>
-            </a:br>
-            <a:endParaRPr lang="de-DE" dirty="0"/>
-          </a:p>
-          <a:p>
-            <a:pPr lvl="4">
-              <a:buFont typeface="Wingdings" panose="05000000000000000000" pitchFamily="2" charset="2"/>
-              <a:buChar char="§"/>
-            </a:pPr>
-            <a:r>
-              <a:rPr lang="de-DE" dirty="0"/>
-              <a:t>Complex datasets</a:t>
-            </a:r>
-          </a:p>
-          <a:p>
-            <a:pPr lvl="4">
-              <a:buFont typeface="Wingdings" panose="05000000000000000000" pitchFamily="2" charset="2"/>
-              <a:buChar char="§"/>
-            </a:pPr>
-            <a:r>
-              <a:rPr lang="de-DE" dirty="0"/>
-              <a:t>Compiler reporting</a:t>
-            </a:r>
-          </a:p>
-          <a:p>
-            <a:pPr lvl="4">
-              <a:buFont typeface="Wingdings" panose="05000000000000000000" pitchFamily="2" charset="2"/>
-              <a:buChar char="§"/>
-            </a:pPr>
-            <a:r>
-              <a:rPr lang="de-DE" dirty="0"/>
-              <a:t>Continuous integration</a:t>
-            </a:r>
-          </a:p>
-          <a:p>
-            <a:pPr lvl="4">
-              <a:buFont typeface="Wingdings" panose="05000000000000000000" pitchFamily="2" charset="2"/>
-              <a:buChar char="§"/>
-            </a:pPr>
-            <a:r>
-              <a:rPr lang="de-DE" dirty="0"/>
-              <a:t>Refactoring tools</a:t>
-            </a:r>
-          </a:p>
-          <a:p>
-            <a:pPr lvl="4">
-              <a:buFont typeface="Wingdings" panose="05000000000000000000" pitchFamily="2" charset="2"/>
-              <a:buChar char="§"/>
-            </a:pPr>
-            <a:r>
-              <a:rPr lang="de-DE" dirty="0"/>
-              <a:t>Issue tracker</a:t>
-            </a:r>
-          </a:p>
-          <a:p>
-            <a:pPr lvl="4">
-              <a:buFont typeface="Wingdings" panose="05000000000000000000" pitchFamily="2" charset="2"/>
-              <a:buChar char="§"/>
-            </a:pPr>
-            <a:r>
-              <a:rPr lang="de-DE" dirty="0"/>
-              <a:t>Stack Overflow </a:t>
-            </a:r>
-          </a:p>
-          <a:p>
-            <a:pPr lvl="4">
-              <a:buFont typeface="Wingdings" panose="05000000000000000000" pitchFamily="2" charset="2"/>
-              <a:buChar char="§"/>
-            </a:pPr>
-            <a:r>
-              <a:rPr lang="de-DE" dirty="0"/>
-              <a:t>Gamification</a:t>
-            </a:r>
-          </a:p>
-          <a:p>
-            <a:pPr lvl="4">
-              <a:buFont typeface="Wingdings" panose="05000000000000000000" pitchFamily="2" charset="2"/>
-              <a:buChar char="§"/>
-            </a:pPr>
-            <a:r>
-              <a:rPr lang="de-DE" dirty="0"/>
-              <a:t>Usability Engineering</a:t>
-            </a:r>
-          </a:p>
-        </p:txBody>
-      </p:sp>
-      <p:sp>
-        <p:nvSpPr>
-          <p:cNvPr id="3" name="Fußzeilenplatzhalter 2"/>
-          <p:cNvSpPr>
-            <a:spLocks noGrp="1"/>
-          </p:cNvSpPr>
-          <p:nvPr>
-            <p:ph type="ftr" sz="quarter" idx="10"/>
-          </p:nvPr>
-        </p:nvSpPr>
-        <p:spPr/>
-        <p:txBody>
-          <a:bodyPr/>
-          <a:lstStyle/>
-          <a:p>
-            <a:r>
-              <a:rPr lang="de-DE"/>
-              <a:t>Software Engineering</a:t>
-            </a:r>
-            <a:endParaRPr lang="de-DE" dirty="0"/>
-          </a:p>
-        </p:txBody>
-      </p:sp>
-    </p:spTree>
-    <p:extLst>
-      <p:ext uri="{BB962C8B-B14F-4D97-AF65-F5344CB8AC3E}">
-        <p14:creationId xmlns:p14="http://schemas.microsoft.com/office/powerpoint/2010/main" val="4265672591"/>
-      </p:ext>
-    </p:extLst>
-  </p:cSld>
-  <p:clrMapOvr>
-    <a:masterClrMapping/>
-  </p:clrMapOvr>
-</p:sld>
-</file>
-
-<file path=ppt/slides/slide19.xml><?xml version="1.0" encoding="utf-8"?>
-<p:sld xmlns:a="http://schemas.openxmlformats.org/drawingml/2006/main" xmlns:r="http://schemas.openxmlformats.org/officeDocument/2006/relationships" xmlns:p="http://schemas.openxmlformats.org/presentationml/2006/main">
-  <p:cSld>
-    <p:spTree>
-      <p:nvGrpSpPr>
-        <p:cNvPr id="1" name=""/>
-        <p:cNvGrpSpPr/>
-        <p:nvPr/>
-      </p:nvGrpSpPr>
-      <p:grpSpPr>
-        <a:xfrm>
-          <a:off x="0" y="0"/>
-          <a:ext cx="0" cy="0"/>
-          <a:chOff x="0" y="0"/>
-          <a:chExt cx="0" cy="0"/>
-        </a:xfrm>
-      </p:grpSpPr>
-      <p:sp>
-        <p:nvSpPr>
-          <p:cNvPr id="2" name="Titel 1"/>
-          <p:cNvSpPr>
-            <a:spLocks noGrp="1"/>
-          </p:cNvSpPr>
-          <p:nvPr>
-            <p:ph type="title"/>
-          </p:nvPr>
-        </p:nvSpPr>
-        <p:spPr/>
-        <p:txBody>
-          <a:bodyPr/>
-          <a:lstStyle/>
-          <a:p>
-            <a:r>
-              <a:rPr lang="de-DE" dirty="0">
-                <a:solidFill>
-                  <a:schemeClr val="tx2"/>
-                </a:solidFill>
-              </a:rPr>
-              <a:t>Our Approaches – research existing scenarios!</a:t>
-            </a:r>
-          </a:p>
-        </p:txBody>
-      </p:sp>
-      <p:sp>
-        <p:nvSpPr>
-          <p:cNvPr id="4" name="Foliennummernplatzhalter 3"/>
-          <p:cNvSpPr>
-            <a:spLocks noGrp="1"/>
-          </p:cNvSpPr>
-          <p:nvPr>
-            <p:ph type="sldNum" sz="quarter" idx="11"/>
-          </p:nvPr>
-        </p:nvSpPr>
-        <p:spPr/>
-        <p:txBody>
-          <a:bodyPr/>
-          <a:lstStyle/>
-          <a:p>
-            <a:fld id="{815DB69B-0A2B-4D0B-A3BD-360AAA24381D}" type="slidenum">
-              <a:rPr lang="de-DE" smtClean="0"/>
-              <a:pPr/>
-              <a:t>19</a:t>
             </a:fld>
             <a:endParaRPr lang="de-DE" dirty="0"/>
           </a:p>
@@ -29811,6 +29647,167 @@
 </p:sld>
 </file>
 
+<file path=ppt/slides/slide19.xml><?xml version="1.0" encoding="utf-8"?>
+<p:sld xmlns:a="http://schemas.openxmlformats.org/drawingml/2006/main" xmlns:r="http://schemas.openxmlformats.org/officeDocument/2006/relationships" xmlns:p="http://schemas.openxmlformats.org/presentationml/2006/main">
+  <p:cSld>
+    <p:spTree>
+      <p:nvGrpSpPr>
+        <p:cNvPr id="1" name=""/>
+        <p:cNvGrpSpPr/>
+        <p:nvPr/>
+      </p:nvGrpSpPr>
+      <p:grpSpPr>
+        <a:xfrm>
+          <a:off x="0" y="0"/>
+          <a:ext cx="0" cy="0"/>
+          <a:chOff x="0" y="0"/>
+          <a:chExt cx="0" cy="0"/>
+        </a:xfrm>
+      </p:grpSpPr>
+      <p:sp>
+        <p:nvSpPr>
+          <p:cNvPr id="2" name="Titel 1"/>
+          <p:cNvSpPr>
+            <a:spLocks noGrp="1"/>
+          </p:cNvSpPr>
+          <p:nvPr>
+            <p:ph type="title"/>
+          </p:nvPr>
+        </p:nvSpPr>
+        <p:spPr/>
+        <p:txBody>
+          <a:bodyPr/>
+          <a:lstStyle/>
+          <a:p>
+            <a:r>
+              <a:rPr lang="de-DE" dirty="0">
+                <a:solidFill>
+                  <a:schemeClr val="tx2"/>
+                </a:solidFill>
+              </a:rPr>
+              <a:t>Example: RQ 1 - .. display results!</a:t>
+            </a:r>
+          </a:p>
+        </p:txBody>
+      </p:sp>
+      <p:sp>
+        <p:nvSpPr>
+          <p:cNvPr id="4" name="Foliennummernplatzhalter 3"/>
+          <p:cNvSpPr>
+            <a:spLocks noGrp="1"/>
+          </p:cNvSpPr>
+          <p:nvPr>
+            <p:ph type="sldNum" sz="quarter" idx="11"/>
+          </p:nvPr>
+        </p:nvSpPr>
+        <p:spPr/>
+        <p:txBody>
+          <a:bodyPr/>
+          <a:lstStyle/>
+          <a:p>
+            <a:fld id="{815DB69B-0A2B-4D0B-A3BD-360AAA24381D}" type="slidenum">
+              <a:rPr lang="de-DE" smtClean="0"/>
+              <a:pPr/>
+              <a:t>19</a:t>
+            </a:fld>
+            <a:endParaRPr lang="de-DE" dirty="0"/>
+          </a:p>
+        </p:txBody>
+      </p:sp>
+      <p:sp>
+        <p:nvSpPr>
+          <p:cNvPr id="5" name="Textplatzhalter 4"/>
+          <p:cNvSpPr>
+            <a:spLocks noGrp="1"/>
+          </p:cNvSpPr>
+          <p:nvPr>
+            <p:ph type="body" sz="quarter" idx="12"/>
+          </p:nvPr>
+        </p:nvSpPr>
+        <p:spPr/>
+        <p:txBody>
+          <a:bodyPr/>
+          <a:lstStyle/>
+          <a:p>
+            <a:r>
+              <a:rPr lang="de-DE" dirty="0"/>
+              <a:t>Prototype 1</a:t>
+            </a:r>
+          </a:p>
+        </p:txBody>
+      </p:sp>
+      <p:sp>
+        <p:nvSpPr>
+          <p:cNvPr id="3" name="Fußzeilenplatzhalter 2"/>
+          <p:cNvSpPr>
+            <a:spLocks noGrp="1"/>
+          </p:cNvSpPr>
+          <p:nvPr>
+            <p:ph type="ftr" sz="quarter" idx="10"/>
+          </p:nvPr>
+        </p:nvSpPr>
+        <p:spPr/>
+        <p:txBody>
+          <a:bodyPr/>
+          <a:lstStyle/>
+          <a:p>
+            <a:r>
+              <a:rPr lang="de-DE"/>
+              <a:t>Software Engineering</a:t>
+            </a:r>
+            <a:endParaRPr lang="de-DE" dirty="0"/>
+          </a:p>
+        </p:txBody>
+      </p:sp>
+      <p:pic>
+        <p:nvPicPr>
+          <p:cNvPr id="7" name="Picture 6" descr="A screenshot of a cell phone&#10;&#10;Description automatically generated">
+            <a:extLst>
+              <a:ext uri="{FF2B5EF4-FFF2-40B4-BE49-F238E27FC236}">
+                <a16:creationId xmlns:a16="http://schemas.microsoft.com/office/drawing/2014/main" id="{D419A6B9-A463-4E36-AD73-EAB84249ED0F}"/>
+              </a:ext>
+            </a:extLst>
+          </p:cNvPr>
+          <p:cNvPicPr>
+            <a:picLocks noChangeAspect="1"/>
+          </p:cNvPicPr>
+          <p:nvPr/>
+        </p:nvPicPr>
+        <p:blipFill>
+          <a:blip r:embed="rId2">
+            <a:extLst>
+              <a:ext uri="{28A0092B-C50C-407E-A947-70E740481C1C}">
+                <a14:useLocalDpi xmlns:a14="http://schemas.microsoft.com/office/drawing/2010/main" val="0"/>
+              </a:ext>
+            </a:extLst>
+          </a:blip>
+          <a:stretch>
+            <a:fillRect/>
+          </a:stretch>
+        </p:blipFill>
+        <p:spPr>
+          <a:xfrm>
+            <a:off x="833155" y="1994816"/>
+            <a:ext cx="8239125" cy="3933825"/>
+          </a:xfrm>
+          <a:prstGeom prst="rect">
+            <a:avLst/>
+          </a:prstGeom>
+        </p:spPr>
+      </p:pic>
+    </p:spTree>
+    <p:extLst>
+      <p:ext uri="{BB962C8B-B14F-4D97-AF65-F5344CB8AC3E}">
+        <p14:creationId xmlns:p14="http://schemas.microsoft.com/office/powerpoint/2010/main" val="1144100588"/>
+      </p:ext>
+    </p:extLst>
+  </p:cSld>
+  <p:clrMapOvr>
+    <a:masterClrMapping/>
+  </p:clrMapOvr>
+</p:sld>
+</file>
+
 <file path=ppt/slides/slide2.xml><?xml version="1.0" encoding="utf-8"?>
 <p:sld xmlns:a="http://schemas.openxmlformats.org/drawingml/2006/main" xmlns:r="http://schemas.openxmlformats.org/officeDocument/2006/relationships" xmlns:p="http://schemas.openxmlformats.org/presentationml/2006/main">
   <p:cSld>
@@ -30054,167 +30051,6 @@
           <a:p>
             <a:r>
               <a:rPr lang="de-DE" dirty="0"/>
-              <a:t>Prototype 1</a:t>
-            </a:r>
-          </a:p>
-        </p:txBody>
-      </p:sp>
-      <p:sp>
-        <p:nvSpPr>
-          <p:cNvPr id="3" name="Fußzeilenplatzhalter 2"/>
-          <p:cNvSpPr>
-            <a:spLocks noGrp="1"/>
-          </p:cNvSpPr>
-          <p:nvPr>
-            <p:ph type="ftr" sz="quarter" idx="10"/>
-          </p:nvPr>
-        </p:nvSpPr>
-        <p:spPr/>
-        <p:txBody>
-          <a:bodyPr/>
-          <a:lstStyle/>
-          <a:p>
-            <a:r>
-              <a:rPr lang="de-DE"/>
-              <a:t>Software Engineering</a:t>
-            </a:r>
-            <a:endParaRPr lang="de-DE" dirty="0"/>
-          </a:p>
-        </p:txBody>
-      </p:sp>
-      <p:pic>
-        <p:nvPicPr>
-          <p:cNvPr id="7" name="Picture 6" descr="A screenshot of a cell phone&#10;&#10;Description automatically generated">
-            <a:extLst>
-              <a:ext uri="{FF2B5EF4-FFF2-40B4-BE49-F238E27FC236}">
-                <a16:creationId xmlns:a16="http://schemas.microsoft.com/office/drawing/2014/main" id="{D419A6B9-A463-4E36-AD73-EAB84249ED0F}"/>
-              </a:ext>
-            </a:extLst>
-          </p:cNvPr>
-          <p:cNvPicPr>
-            <a:picLocks noChangeAspect="1"/>
-          </p:cNvPicPr>
-          <p:nvPr/>
-        </p:nvPicPr>
-        <p:blipFill>
-          <a:blip r:embed="rId2">
-            <a:extLst>
-              <a:ext uri="{28A0092B-C50C-407E-A947-70E740481C1C}">
-                <a14:useLocalDpi xmlns:a14="http://schemas.microsoft.com/office/drawing/2010/main" val="0"/>
-              </a:ext>
-            </a:extLst>
-          </a:blip>
-          <a:stretch>
-            <a:fillRect/>
-          </a:stretch>
-        </p:blipFill>
-        <p:spPr>
-          <a:xfrm>
-            <a:off x="833155" y="1994816"/>
-            <a:ext cx="8239125" cy="3933825"/>
-          </a:xfrm>
-          <a:prstGeom prst="rect">
-            <a:avLst/>
-          </a:prstGeom>
-        </p:spPr>
-      </p:pic>
-    </p:spTree>
-    <p:extLst>
-      <p:ext uri="{BB962C8B-B14F-4D97-AF65-F5344CB8AC3E}">
-        <p14:creationId xmlns:p14="http://schemas.microsoft.com/office/powerpoint/2010/main" val="1144100588"/>
-      </p:ext>
-    </p:extLst>
-  </p:cSld>
-  <p:clrMapOvr>
-    <a:masterClrMapping/>
-  </p:clrMapOvr>
-</p:sld>
-</file>
-
-<file path=ppt/slides/slide21.xml><?xml version="1.0" encoding="utf-8"?>
-<p:sld xmlns:a="http://schemas.openxmlformats.org/drawingml/2006/main" xmlns:r="http://schemas.openxmlformats.org/officeDocument/2006/relationships" xmlns:p="http://schemas.openxmlformats.org/presentationml/2006/main">
-  <p:cSld>
-    <p:spTree>
-      <p:nvGrpSpPr>
-        <p:cNvPr id="1" name=""/>
-        <p:cNvGrpSpPr/>
-        <p:nvPr/>
-      </p:nvGrpSpPr>
-      <p:grpSpPr>
-        <a:xfrm>
-          <a:off x="0" y="0"/>
-          <a:ext cx="0" cy="0"/>
-          <a:chOff x="0" y="0"/>
-          <a:chExt cx="0" cy="0"/>
-        </a:xfrm>
-      </p:grpSpPr>
-      <p:sp>
-        <p:nvSpPr>
-          <p:cNvPr id="2" name="Titel 1"/>
-          <p:cNvSpPr>
-            <a:spLocks noGrp="1"/>
-          </p:cNvSpPr>
-          <p:nvPr>
-            <p:ph type="title"/>
-          </p:nvPr>
-        </p:nvSpPr>
-        <p:spPr/>
-        <p:txBody>
-          <a:bodyPr/>
-          <a:lstStyle/>
-          <a:p>
-            <a:r>
-              <a:rPr lang="de-DE" dirty="0">
-                <a:solidFill>
-                  <a:schemeClr val="tx2"/>
-                </a:solidFill>
-              </a:rPr>
-              <a:t>Example: RQ 1 - .. display results!</a:t>
-            </a:r>
-          </a:p>
-        </p:txBody>
-      </p:sp>
-      <p:sp>
-        <p:nvSpPr>
-          <p:cNvPr id="4" name="Foliennummernplatzhalter 3"/>
-          <p:cNvSpPr>
-            <a:spLocks noGrp="1"/>
-          </p:cNvSpPr>
-          <p:nvPr>
-            <p:ph type="sldNum" sz="quarter" idx="11"/>
-          </p:nvPr>
-        </p:nvSpPr>
-        <p:spPr/>
-        <p:txBody>
-          <a:bodyPr/>
-          <a:lstStyle/>
-          <a:p>
-            <a:fld id="{815DB69B-0A2B-4D0B-A3BD-360AAA24381D}" type="slidenum">
-              <a:rPr lang="de-DE" smtClean="0"/>
-              <a:pPr/>
-              <a:t>21</a:t>
-            </a:fld>
-            <a:endParaRPr lang="de-DE" dirty="0"/>
-          </a:p>
-        </p:txBody>
-      </p:sp>
-      <p:sp>
-        <p:nvSpPr>
-          <p:cNvPr id="5" name="Textplatzhalter 4"/>
-          <p:cNvSpPr>
-            <a:spLocks noGrp="1"/>
-          </p:cNvSpPr>
-          <p:nvPr>
-            <p:ph type="body" sz="quarter" idx="12"/>
-          </p:nvPr>
-        </p:nvSpPr>
-        <p:spPr/>
-        <p:txBody>
-          <a:bodyPr/>
-          <a:lstStyle/>
-          <a:p>
-            <a:r>
-              <a:rPr lang="de-DE" dirty="0"/>
               <a:t>Prototype 2</a:t>
             </a:r>
           </a:p>
@@ -30292,6 +30128,197 @@
 </p:sld>
 </file>
 
+<file path=ppt/slides/slide21.xml><?xml version="1.0" encoding="utf-8"?>
+<p:sld xmlns:a="http://schemas.openxmlformats.org/drawingml/2006/main" xmlns:r="http://schemas.openxmlformats.org/officeDocument/2006/relationships" xmlns:p="http://schemas.openxmlformats.org/presentationml/2006/main">
+  <p:cSld>
+    <p:spTree>
+      <p:nvGrpSpPr>
+        <p:cNvPr id="1" name=""/>
+        <p:cNvGrpSpPr/>
+        <p:nvPr/>
+      </p:nvGrpSpPr>
+      <p:grpSpPr>
+        <a:xfrm>
+          <a:off x="0" y="0"/>
+          <a:ext cx="0" cy="0"/>
+          <a:chOff x="0" y="0"/>
+          <a:chExt cx="0" cy="0"/>
+        </a:xfrm>
+      </p:grpSpPr>
+      <p:sp>
+        <p:nvSpPr>
+          <p:cNvPr id="2" name="Titel 1"/>
+          <p:cNvSpPr>
+            <a:spLocks noGrp="1"/>
+          </p:cNvSpPr>
+          <p:nvPr>
+            <p:ph type="title"/>
+          </p:nvPr>
+        </p:nvSpPr>
+        <p:spPr/>
+        <p:txBody>
+          <a:bodyPr/>
+          <a:lstStyle/>
+          <a:p>
+            <a:r>
+              <a:rPr lang="de-DE" dirty="0">
+                <a:solidFill>
+                  <a:schemeClr val="tx2"/>
+                </a:solidFill>
+              </a:rPr>
+              <a:t>Evaluation</a:t>
+            </a:r>
+          </a:p>
+        </p:txBody>
+      </p:sp>
+      <p:sp>
+        <p:nvSpPr>
+          <p:cNvPr id="4" name="Foliennummernplatzhalter 3"/>
+          <p:cNvSpPr>
+            <a:spLocks noGrp="1"/>
+          </p:cNvSpPr>
+          <p:nvPr>
+            <p:ph type="sldNum" sz="quarter" idx="11"/>
+          </p:nvPr>
+        </p:nvSpPr>
+        <p:spPr/>
+        <p:txBody>
+          <a:bodyPr/>
+          <a:lstStyle/>
+          <a:p>
+            <a:fld id="{815DB69B-0A2B-4D0B-A3BD-360AAA24381D}" type="slidenum">
+              <a:rPr lang="de-DE" smtClean="0"/>
+              <a:pPr/>
+              <a:t>21</a:t>
+            </a:fld>
+            <a:endParaRPr lang="de-DE" dirty="0"/>
+          </a:p>
+        </p:txBody>
+      </p:sp>
+      <p:sp>
+        <p:nvSpPr>
+          <p:cNvPr id="5" name="Textplatzhalter 4"/>
+          <p:cNvSpPr>
+            <a:spLocks noGrp="1"/>
+          </p:cNvSpPr>
+          <p:nvPr>
+            <p:ph type="body" sz="quarter" idx="12"/>
+          </p:nvPr>
+        </p:nvSpPr>
+        <p:spPr>
+          <a:xfrm>
+            <a:off x="273050" y="1268412"/>
+            <a:ext cx="9361488" cy="5113337"/>
+          </a:xfrm>
+        </p:spPr>
+        <p:txBody>
+          <a:bodyPr/>
+          <a:lstStyle/>
+          <a:p>
+            <a:endParaRPr lang="de-DE" dirty="0"/>
+          </a:p>
+          <a:p>
+            <a:r>
+              <a:rPr lang="de-DE" dirty="0"/>
+              <a:t>Experimental Design</a:t>
+            </a:r>
+          </a:p>
+          <a:p>
+            <a:endParaRPr lang="de-DE" dirty="0"/>
+          </a:p>
+          <a:p>
+            <a:pPr lvl="1">
+              <a:buFont typeface="Wingdings" panose="05000000000000000000" pitchFamily="2" charset="2"/>
+              <a:buChar char="§"/>
+            </a:pPr>
+            <a:r>
+              <a:rPr lang="de-DE" dirty="0"/>
+              <a:t>Recruit Test Users</a:t>
+            </a:r>
+            <a:br>
+              <a:rPr lang="de-DE" dirty="0"/>
+            </a:br>
+            <a:endParaRPr lang="de-DE" dirty="0"/>
+          </a:p>
+          <a:p>
+            <a:pPr lvl="1">
+              <a:buFont typeface="Wingdings" panose="05000000000000000000" pitchFamily="2" charset="2"/>
+              <a:buChar char="§"/>
+            </a:pPr>
+            <a:r>
+              <a:rPr lang="de-DE" dirty="0"/>
+              <a:t>Order of evaluation altered</a:t>
+            </a:r>
+          </a:p>
+          <a:p>
+            <a:pPr lvl="1">
+              <a:buFont typeface="Wingdings" panose="05000000000000000000" pitchFamily="2" charset="2"/>
+              <a:buChar char="§"/>
+            </a:pPr>
+            <a:endParaRPr lang="de-DE" dirty="0"/>
+          </a:p>
+          <a:p>
+            <a:pPr lvl="1">
+              <a:buFont typeface="Wingdings" panose="05000000000000000000" pitchFamily="2" charset="2"/>
+              <a:buChar char="§"/>
+            </a:pPr>
+            <a:r>
+              <a:rPr lang="de-DE" dirty="0"/>
+              <a:t>Perform Tasks</a:t>
+            </a:r>
+            <a:br>
+              <a:rPr lang="de-DE" dirty="0"/>
+            </a:br>
+            <a:endParaRPr lang="de-DE" dirty="0"/>
+          </a:p>
+          <a:p>
+            <a:pPr lvl="2">
+              <a:buFont typeface="Wingdings" panose="05000000000000000000" pitchFamily="2" charset="2"/>
+              <a:buChar char="§"/>
+            </a:pPr>
+            <a:r>
+              <a:rPr lang="de-DE" dirty="0"/>
+              <a:t>Example: Find a bug which is reported in common by available tools.</a:t>
+            </a:r>
+          </a:p>
+        </p:txBody>
+      </p:sp>
+      <p:sp>
+        <p:nvSpPr>
+          <p:cNvPr id="3" name="Fußzeilenplatzhalter 2"/>
+          <p:cNvSpPr>
+            <a:spLocks noGrp="1"/>
+          </p:cNvSpPr>
+          <p:nvPr>
+            <p:ph type="ftr" sz="quarter" idx="10"/>
+          </p:nvPr>
+        </p:nvSpPr>
+        <p:spPr/>
+        <p:txBody>
+          <a:bodyPr/>
+          <a:lstStyle/>
+          <a:p>
+            <a:r>
+              <a:rPr lang="de-DE"/>
+              <a:t>Software Engineering</a:t>
+            </a:r>
+            <a:endParaRPr lang="de-DE" dirty="0"/>
+          </a:p>
+        </p:txBody>
+      </p:sp>
+    </p:spTree>
+    <p:extLst>
+      <p:ext uri="{BB962C8B-B14F-4D97-AF65-F5344CB8AC3E}">
+        <p14:creationId xmlns:p14="http://schemas.microsoft.com/office/powerpoint/2010/main" val="3338934910"/>
+      </p:ext>
+    </p:extLst>
+  </p:cSld>
+  <p:clrMapOvr>
+    <a:masterClrMapping/>
+  </p:clrMapOvr>
+</p:sld>
+</file>
+
 <file path=ppt/slides/slide22.xml><?xml version="1.0" encoding="utf-8"?>
 <p:sld xmlns:a="http://schemas.openxmlformats.org/drawingml/2006/main" xmlns:r="http://schemas.openxmlformats.org/officeDocument/2006/relationships" xmlns:p="http://schemas.openxmlformats.org/presentationml/2006/main">
   <p:cSld>
@@ -30330,7 +30357,7 @@
                   <a:schemeClr val="tx2"/>
                 </a:solidFill>
               </a:rPr>
-              <a:t>Evaluation</a:t>
+              <a:t>Evaluation – Usability Inspection Methods </a:t>
             </a:r>
           </a:p>
         </p:txBody>
@@ -30369,81 +30396,89 @@
             <p:ph type="body" sz="quarter" idx="12"/>
           </p:nvPr>
         </p:nvSpPr>
-        <p:spPr>
-          <a:xfrm>
-            <a:off x="273050" y="1268412"/>
-            <a:ext cx="9361488" cy="5113337"/>
-          </a:xfrm>
-        </p:spPr>
+        <p:spPr/>
         <p:txBody>
           <a:bodyPr/>
           <a:lstStyle/>
           <a:p>
+            <a:r>
+              <a:rPr lang="de-DE" dirty="0"/>
+              <a:t>Cognitive Walkthrough</a:t>
+            </a:r>
+          </a:p>
+          <a:p>
+            <a:pPr marL="0" indent="0">
+              <a:buNone/>
+            </a:pPr>
             <a:endParaRPr lang="de-DE" dirty="0"/>
           </a:p>
           <a:p>
+            <a:pPr marL="0" indent="0">
+              <a:buNone/>
+            </a:pPr>
             <a:r>
               <a:rPr lang="de-DE" dirty="0"/>
-              <a:t>Experimental Design</a:t>
-            </a:r>
-          </a:p>
-          <a:p>
+              <a:t>For each step to a predefined task, the following aspects are analysed.</a:t>
+            </a:r>
+          </a:p>
+          <a:p>
+            <a:pPr marL="0" indent="0">
+              <a:buNone/>
+            </a:pPr>
             <a:endParaRPr lang="de-DE" dirty="0"/>
           </a:p>
           <a:p>
-            <a:pPr lvl="1">
+            <a:pPr>
               <a:buFont typeface="Wingdings" panose="05000000000000000000" pitchFamily="2" charset="2"/>
               <a:buChar char="§"/>
             </a:pPr>
             <a:r>
-              <a:rPr lang="de-DE" dirty="0"/>
-              <a:t>Recruit Test Users</a:t>
+              <a:rPr lang="en-GB" dirty="0"/>
+              <a:t>Will the user try and achieve the right outcome?	</a:t>
             </a:r>
             <a:br>
-              <a:rPr lang="de-DE" dirty="0"/>
+              <a:rPr lang="en-GB" dirty="0"/>
             </a:br>
-            <a:endParaRPr lang="de-DE" dirty="0"/>
-          </a:p>
-          <a:p>
-            <a:pPr lvl="1">
+            <a:endParaRPr lang="en-GB" dirty="0"/>
+          </a:p>
+          <a:p>
+            <a:pPr>
               <a:buFont typeface="Wingdings" panose="05000000000000000000" pitchFamily="2" charset="2"/>
               <a:buChar char="§"/>
             </a:pPr>
             <a:r>
-              <a:rPr lang="de-DE" dirty="0"/>
-              <a:t>Order of evaluation altered</a:t>
-            </a:r>
-          </a:p>
-          <a:p>
-            <a:pPr lvl="1">
+              <a:rPr lang="en-GB" dirty="0"/>
+              <a:t>Will the user notice that the correct action is available to them?</a:t>
+            </a:r>
+            <a:br>
+              <a:rPr lang="en-GB" dirty="0"/>
+            </a:br>
+            <a:endParaRPr lang="en-GB" dirty="0"/>
+          </a:p>
+          <a:p>
+            <a:pPr>
               <a:buFont typeface="Wingdings" panose="05000000000000000000" pitchFamily="2" charset="2"/>
               <a:buChar char="§"/>
             </a:pPr>
-            <a:endParaRPr lang="de-DE" dirty="0"/>
-          </a:p>
-          <a:p>
-            <a:pPr lvl="1">
+            <a:r>
+              <a:rPr lang="en-GB" dirty="0"/>
+              <a:t>Will the user associate the correct action with the outcome they expect to achieve?</a:t>
+            </a:r>
+            <a:br>
+              <a:rPr lang="en-GB" dirty="0"/>
+            </a:br>
+            <a:endParaRPr lang="en-GB" dirty="0"/>
+          </a:p>
+          <a:p>
+            <a:pPr>
               <a:buFont typeface="Wingdings" panose="05000000000000000000" pitchFamily="2" charset="2"/>
               <a:buChar char="§"/>
             </a:pPr>
             <a:r>
-              <a:rPr lang="de-DE" dirty="0"/>
-              <a:t>Perform Tasks</a:t>
-            </a:r>
-            <a:br>
-              <a:rPr lang="de-DE" dirty="0"/>
-            </a:br>
+              <a:rPr lang="en-GB" dirty="0"/>
+              <a:t>If the correct action is performed; will the user see that progress is being made towards their intended outcome?</a:t>
+            </a:r>
             <a:endParaRPr lang="de-DE" dirty="0"/>
-          </a:p>
-          <a:p>
-            <a:pPr lvl="2">
-              <a:buFont typeface="Wingdings" panose="05000000000000000000" pitchFamily="2" charset="2"/>
-              <a:buChar char="§"/>
-            </a:pPr>
-            <a:r>
-              <a:rPr lang="de-DE" dirty="0"/>
-              <a:t>Example: Find a bug which is reported in common by available tools.</a:t>
-            </a:r>
           </a:p>
         </p:txBody>
       </p:sp>
@@ -30470,10 +30505,57 @@
           </a:p>
         </p:txBody>
       </p:sp>
+      <p:sp>
+        <p:nvSpPr>
+          <p:cNvPr id="6" name="TextBox 5">
+            <a:extLst>
+              <a:ext uri="{FF2B5EF4-FFF2-40B4-BE49-F238E27FC236}">
+                <a16:creationId xmlns:a16="http://schemas.microsoft.com/office/drawing/2014/main" id="{1DCB0CB5-6D34-40A5-B2C4-4B05B3BF41B9}"/>
+              </a:ext>
+            </a:extLst>
+          </p:cNvPr>
+          <p:cNvSpPr txBox="1"/>
+          <p:nvPr/>
+        </p:nvSpPr>
+        <p:spPr>
+          <a:xfrm>
+            <a:off x="304476" y="6135528"/>
+            <a:ext cx="8752980" cy="246221"/>
+          </a:xfrm>
+          <a:prstGeom prst="rect">
+            <a:avLst/>
+          </a:prstGeom>
+          <a:noFill/>
+        </p:spPr>
+        <p:txBody>
+          <a:bodyPr wrap="square" lIns="0" rIns="0" rtlCol="0">
+            <a:spAutoFit/>
+          </a:bodyPr>
+          <a:lstStyle/>
+          <a:p>
+            <a:pPr marL="360000" indent="-360000">
+              <a:spcAft>
+                <a:spcPts val="1000"/>
+              </a:spcAft>
+              <a:buClr>
+                <a:schemeClr val="tx2"/>
+              </a:buClr>
+              <a:buSzPct val="80000"/>
+              <a:buFont typeface="Wingdings" panose="05000000000000000000" pitchFamily="2" charset="2"/>
+              <a:buChar char="v"/>
+            </a:pPr>
+            <a:r>
+              <a:rPr lang="en-GB" sz="1000" dirty="0"/>
+              <a:t>Jakob Nielsen. “Usability inspection methods”. In: Conference companion on Human factors in computing systems. ACM. 1994, pp. 413–414.</a:t>
+            </a:r>
+            <a:endParaRPr lang="LID4096" sz="1000" dirty="0" err="1"/>
+          </a:p>
+        </p:txBody>
+      </p:sp>
     </p:spTree>
     <p:extLst>
       <p:ext uri="{BB962C8B-B14F-4D97-AF65-F5344CB8AC3E}">
-        <p14:creationId xmlns:p14="http://schemas.microsoft.com/office/powerpoint/2010/main" val="3338934910"/>
+        <p14:creationId xmlns:p14="http://schemas.microsoft.com/office/powerpoint/2010/main" val="2950414662"/>
       </p:ext>
     </p:extLst>
   </p:cSld>
@@ -30545,252 +30627,6 @@
               <a:rPr lang="de-DE" smtClean="0"/>
               <a:pPr/>
               <a:t>23</a:t>
-            </a:fld>
-            <a:endParaRPr lang="de-DE" dirty="0"/>
-          </a:p>
-        </p:txBody>
-      </p:sp>
-      <p:sp>
-        <p:nvSpPr>
-          <p:cNvPr id="5" name="Textplatzhalter 4"/>
-          <p:cNvSpPr>
-            <a:spLocks noGrp="1"/>
-          </p:cNvSpPr>
-          <p:nvPr>
-            <p:ph type="body" sz="quarter" idx="12"/>
-          </p:nvPr>
-        </p:nvSpPr>
-        <p:spPr/>
-        <p:txBody>
-          <a:bodyPr/>
-          <a:lstStyle/>
-          <a:p>
-            <a:r>
-              <a:rPr lang="de-DE" dirty="0"/>
-              <a:t>Cognitive Walkthrough</a:t>
-            </a:r>
-          </a:p>
-          <a:p>
-            <a:pPr marL="0" indent="0">
-              <a:buNone/>
-            </a:pPr>
-            <a:endParaRPr lang="de-DE" dirty="0"/>
-          </a:p>
-          <a:p>
-            <a:pPr marL="0" indent="0">
-              <a:buNone/>
-            </a:pPr>
-            <a:r>
-              <a:rPr lang="de-DE" dirty="0"/>
-              <a:t>For each step to a predefined task, the following aspects are analysed.</a:t>
-            </a:r>
-          </a:p>
-          <a:p>
-            <a:pPr marL="0" indent="0">
-              <a:buNone/>
-            </a:pPr>
-            <a:endParaRPr lang="de-DE" dirty="0"/>
-          </a:p>
-          <a:p>
-            <a:pPr>
-              <a:buFont typeface="Wingdings" panose="05000000000000000000" pitchFamily="2" charset="2"/>
-              <a:buChar char="§"/>
-            </a:pPr>
-            <a:r>
-              <a:rPr lang="en-GB" dirty="0"/>
-              <a:t>Will the user try and achieve the right outcome?	</a:t>
-            </a:r>
-            <a:br>
-              <a:rPr lang="en-GB" dirty="0"/>
-            </a:br>
-            <a:endParaRPr lang="en-GB" dirty="0"/>
-          </a:p>
-          <a:p>
-            <a:pPr>
-              <a:buFont typeface="Wingdings" panose="05000000000000000000" pitchFamily="2" charset="2"/>
-              <a:buChar char="§"/>
-            </a:pPr>
-            <a:r>
-              <a:rPr lang="en-GB" dirty="0"/>
-              <a:t>Will the user notice that the correct action is available to them?</a:t>
-            </a:r>
-            <a:br>
-              <a:rPr lang="en-GB" dirty="0"/>
-            </a:br>
-            <a:endParaRPr lang="en-GB" dirty="0"/>
-          </a:p>
-          <a:p>
-            <a:pPr>
-              <a:buFont typeface="Wingdings" panose="05000000000000000000" pitchFamily="2" charset="2"/>
-              <a:buChar char="§"/>
-            </a:pPr>
-            <a:r>
-              <a:rPr lang="en-GB" dirty="0"/>
-              <a:t>Will the user associate the correct action with the outcome they expect to achieve?</a:t>
-            </a:r>
-            <a:br>
-              <a:rPr lang="en-GB" dirty="0"/>
-            </a:br>
-            <a:endParaRPr lang="en-GB" dirty="0"/>
-          </a:p>
-          <a:p>
-            <a:pPr>
-              <a:buFont typeface="Wingdings" panose="05000000000000000000" pitchFamily="2" charset="2"/>
-              <a:buChar char="§"/>
-            </a:pPr>
-            <a:r>
-              <a:rPr lang="en-GB" dirty="0"/>
-              <a:t>If the correct action is performed; will the user see that progress is being made towards their intended outcome?</a:t>
-            </a:r>
-            <a:endParaRPr lang="de-DE" dirty="0"/>
-          </a:p>
-        </p:txBody>
-      </p:sp>
-      <p:sp>
-        <p:nvSpPr>
-          <p:cNvPr id="3" name="Fußzeilenplatzhalter 2"/>
-          <p:cNvSpPr>
-            <a:spLocks noGrp="1"/>
-          </p:cNvSpPr>
-          <p:nvPr>
-            <p:ph type="ftr" sz="quarter" idx="10"/>
-          </p:nvPr>
-        </p:nvSpPr>
-        <p:spPr/>
-        <p:txBody>
-          <a:bodyPr/>
-          <a:lstStyle/>
-          <a:p>
-            <a:r>
-              <a:rPr lang="de-DE"/>
-              <a:t>Software Engineering</a:t>
-            </a:r>
-            <a:endParaRPr lang="de-DE" dirty="0"/>
-          </a:p>
-        </p:txBody>
-      </p:sp>
-      <p:sp>
-        <p:nvSpPr>
-          <p:cNvPr id="6" name="TextBox 5">
-            <a:extLst>
-              <a:ext uri="{FF2B5EF4-FFF2-40B4-BE49-F238E27FC236}">
-                <a16:creationId xmlns:a16="http://schemas.microsoft.com/office/drawing/2014/main" id="{1DCB0CB5-6D34-40A5-B2C4-4B05B3BF41B9}"/>
-              </a:ext>
-            </a:extLst>
-          </p:cNvPr>
-          <p:cNvSpPr txBox="1"/>
-          <p:nvPr/>
-        </p:nvSpPr>
-        <p:spPr>
-          <a:xfrm>
-            <a:off x="304476" y="6135528"/>
-            <a:ext cx="8752980" cy="246221"/>
-          </a:xfrm>
-          <a:prstGeom prst="rect">
-            <a:avLst/>
-          </a:prstGeom>
-          <a:noFill/>
-        </p:spPr>
-        <p:txBody>
-          <a:bodyPr wrap="square" lIns="0" rIns="0" rtlCol="0">
-            <a:spAutoFit/>
-          </a:bodyPr>
-          <a:lstStyle/>
-          <a:p>
-            <a:pPr marL="360000" indent="-360000">
-              <a:spcAft>
-                <a:spcPts val="1000"/>
-              </a:spcAft>
-              <a:buClr>
-                <a:schemeClr val="tx2"/>
-              </a:buClr>
-              <a:buSzPct val="80000"/>
-              <a:buFont typeface="Wingdings" panose="05000000000000000000" pitchFamily="2" charset="2"/>
-              <a:buChar char="v"/>
-            </a:pPr>
-            <a:r>
-              <a:rPr lang="en-GB" sz="1000" dirty="0"/>
-              <a:t>Jakob Nielsen. “Usability inspection methods”. In: Conference companion on Human factors in computing systems. ACM. 1994, pp. 413–414.</a:t>
-            </a:r>
-            <a:endParaRPr lang="LID4096" sz="1000" dirty="0" err="1"/>
-          </a:p>
-        </p:txBody>
-      </p:sp>
-    </p:spTree>
-    <p:extLst>
-      <p:ext uri="{BB962C8B-B14F-4D97-AF65-F5344CB8AC3E}">
-        <p14:creationId xmlns:p14="http://schemas.microsoft.com/office/powerpoint/2010/main" val="2950414662"/>
-      </p:ext>
-    </p:extLst>
-  </p:cSld>
-  <p:clrMapOvr>
-    <a:masterClrMapping/>
-  </p:clrMapOvr>
-</p:sld>
-</file>
-
-<file path=ppt/slides/slide24.xml><?xml version="1.0" encoding="utf-8"?>
-<p:sld xmlns:a="http://schemas.openxmlformats.org/drawingml/2006/main" xmlns:r="http://schemas.openxmlformats.org/officeDocument/2006/relationships" xmlns:p="http://schemas.openxmlformats.org/presentationml/2006/main">
-  <p:cSld>
-    <p:spTree>
-      <p:nvGrpSpPr>
-        <p:cNvPr id="1" name=""/>
-        <p:cNvGrpSpPr/>
-        <p:nvPr/>
-      </p:nvGrpSpPr>
-      <p:grpSpPr>
-        <a:xfrm>
-          <a:off x="0" y="0"/>
-          <a:ext cx="0" cy="0"/>
-          <a:chOff x="0" y="0"/>
-          <a:chExt cx="0" cy="0"/>
-        </a:xfrm>
-      </p:grpSpPr>
-      <p:sp>
-        <p:nvSpPr>
-          <p:cNvPr id="2" name="Titel 1"/>
-          <p:cNvSpPr>
-            <a:spLocks noGrp="1"/>
-          </p:cNvSpPr>
-          <p:nvPr>
-            <p:ph type="title"/>
-          </p:nvPr>
-        </p:nvSpPr>
-        <p:spPr/>
-        <p:txBody>
-          <a:bodyPr/>
-          <a:lstStyle/>
-          <a:p>
-            <a:r>
-              <a:rPr lang="de-DE" dirty="0">
-                <a:solidFill>
-                  <a:schemeClr val="tx2"/>
-                </a:solidFill>
-              </a:rPr>
-              <a:t>Evaluation – Usability Inspection Methods </a:t>
-            </a:r>
-          </a:p>
-        </p:txBody>
-      </p:sp>
-      <p:sp>
-        <p:nvSpPr>
-          <p:cNvPr id="4" name="Foliennummernplatzhalter 3"/>
-          <p:cNvSpPr>
-            <a:spLocks noGrp="1"/>
-          </p:cNvSpPr>
-          <p:nvPr>
-            <p:ph type="sldNum" sz="quarter" idx="11"/>
-          </p:nvPr>
-        </p:nvSpPr>
-        <p:spPr/>
-        <p:txBody>
-          <a:bodyPr/>
-          <a:lstStyle/>
-          <a:p>
-            <a:fld id="{815DB69B-0A2B-4D0B-A3BD-360AAA24381D}" type="slidenum">
-              <a:rPr lang="de-DE" smtClean="0"/>
-              <a:pPr/>
-              <a:t>24</a:t>
             </a:fld>
             <a:endParaRPr lang="de-DE" dirty="0"/>
           </a:p>
@@ -30949,6 +30785,274 @@
 </p:sld>
 </file>
 
+<file path=ppt/slides/slide24.xml><?xml version="1.0" encoding="utf-8"?>
+<p:sld xmlns:a="http://schemas.openxmlformats.org/drawingml/2006/main" xmlns:r="http://schemas.openxmlformats.org/officeDocument/2006/relationships" xmlns:p="http://schemas.openxmlformats.org/presentationml/2006/main">
+  <p:cSld>
+    <p:spTree>
+      <p:nvGrpSpPr>
+        <p:cNvPr id="1" name=""/>
+        <p:cNvGrpSpPr/>
+        <p:nvPr/>
+      </p:nvGrpSpPr>
+      <p:grpSpPr>
+        <a:xfrm>
+          <a:off x="0" y="0"/>
+          <a:ext cx="0" cy="0"/>
+          <a:chOff x="0" y="0"/>
+          <a:chExt cx="0" cy="0"/>
+        </a:xfrm>
+      </p:grpSpPr>
+      <p:sp>
+        <p:nvSpPr>
+          <p:cNvPr id="2" name="Titel 1"/>
+          <p:cNvSpPr>
+            <a:spLocks noGrp="1"/>
+          </p:cNvSpPr>
+          <p:nvPr>
+            <p:ph type="title"/>
+          </p:nvPr>
+        </p:nvSpPr>
+        <p:spPr/>
+        <p:txBody>
+          <a:bodyPr/>
+          <a:lstStyle/>
+          <a:p>
+            <a:r>
+              <a:rPr lang="de-DE" dirty="0">
+                <a:solidFill>
+                  <a:schemeClr val="tx2"/>
+                </a:solidFill>
+              </a:rPr>
+              <a:t>Evaluation – Usability Inspection Methods </a:t>
+            </a:r>
+          </a:p>
+        </p:txBody>
+      </p:sp>
+      <p:sp>
+        <p:nvSpPr>
+          <p:cNvPr id="4" name="Foliennummernplatzhalter 3"/>
+          <p:cNvSpPr>
+            <a:spLocks noGrp="1"/>
+          </p:cNvSpPr>
+          <p:nvPr>
+            <p:ph type="sldNum" sz="quarter" idx="11"/>
+          </p:nvPr>
+        </p:nvSpPr>
+        <p:spPr/>
+        <p:txBody>
+          <a:bodyPr/>
+          <a:lstStyle/>
+          <a:p>
+            <a:fld id="{815DB69B-0A2B-4D0B-A3BD-360AAA24381D}" type="slidenum">
+              <a:rPr lang="de-DE" smtClean="0"/>
+              <a:pPr/>
+              <a:t>24</a:t>
+            </a:fld>
+            <a:endParaRPr lang="de-DE" dirty="0"/>
+          </a:p>
+        </p:txBody>
+      </p:sp>
+      <p:sp>
+        <p:nvSpPr>
+          <p:cNvPr id="5" name="Textplatzhalter 4"/>
+          <p:cNvSpPr>
+            <a:spLocks noGrp="1"/>
+          </p:cNvSpPr>
+          <p:nvPr>
+            <p:ph type="body" sz="quarter" idx="12"/>
+          </p:nvPr>
+        </p:nvSpPr>
+        <p:spPr/>
+        <p:txBody>
+          <a:bodyPr/>
+          <a:lstStyle/>
+          <a:p>
+            <a:r>
+              <a:rPr lang="de-DE" dirty="0"/>
+              <a:t>Heuristic Evaluation</a:t>
+            </a:r>
+          </a:p>
+          <a:p>
+            <a:endParaRPr lang="de-DE" dirty="0"/>
+          </a:p>
+          <a:p>
+            <a:pPr marL="0" indent="0">
+              <a:buNone/>
+            </a:pPr>
+            <a:endParaRPr lang="de-DE" dirty="0"/>
+          </a:p>
+          <a:p>
+            <a:pPr marL="0" indent="0">
+              <a:buNone/>
+            </a:pPr>
+            <a:r>
+              <a:rPr lang="de-DE" dirty="0"/>
+              <a:t>Each problem w.r.t. a heuristic is rated accordingly; 0 – 4</a:t>
+            </a:r>
+          </a:p>
+          <a:p>
+            <a:pPr marL="0" indent="0">
+              <a:buNone/>
+            </a:pPr>
+            <a:endParaRPr lang="de-DE" dirty="0"/>
+          </a:p>
+          <a:p>
+            <a:pPr marL="0" indent="0">
+              <a:buNone/>
+            </a:pPr>
+            <a:r>
+              <a:rPr lang="en-GB" b="1" dirty="0"/>
+              <a:t>0</a:t>
+            </a:r>
+            <a:r>
+              <a:rPr lang="en-GB" dirty="0"/>
+              <a:t> - do not agree this is a usability problem </a:t>
+            </a:r>
+          </a:p>
+          <a:p>
+            <a:pPr marL="0" indent="0">
+              <a:buNone/>
+            </a:pPr>
+            <a:r>
+              <a:rPr lang="en-GB" b="1" dirty="0"/>
+              <a:t>1</a:t>
+            </a:r>
+            <a:r>
+              <a:rPr lang="en-GB" dirty="0"/>
+              <a:t> - cosmetic problem</a:t>
+            </a:r>
+          </a:p>
+          <a:p>
+            <a:pPr marL="0" indent="0">
+              <a:buNone/>
+            </a:pPr>
+            <a:r>
+              <a:rPr lang="en-GB" b="1" dirty="0"/>
+              <a:t>2</a:t>
+            </a:r>
+            <a:r>
+              <a:rPr lang="en-GB" dirty="0"/>
+              <a:t> - minor usability problem</a:t>
+            </a:r>
+          </a:p>
+          <a:p>
+            <a:pPr marL="0" indent="0">
+              <a:buNone/>
+            </a:pPr>
+            <a:r>
+              <a:rPr lang="en-GB" b="1" dirty="0"/>
+              <a:t>3</a:t>
+            </a:r>
+            <a:r>
+              <a:rPr lang="en-GB" dirty="0"/>
+              <a:t> - major usability problem ( important to fix ) </a:t>
+            </a:r>
+          </a:p>
+          <a:p>
+            <a:pPr marL="0" indent="0">
+              <a:buNone/>
+            </a:pPr>
+            <a:r>
+              <a:rPr lang="en-GB" b="1" dirty="0"/>
+              <a:t>4</a:t>
+            </a:r>
+            <a:r>
+              <a:rPr lang="en-GB" dirty="0"/>
+              <a:t> - usability catastrophe ( imperative to fix )</a:t>
+            </a:r>
+            <a:endParaRPr lang="de-DE" dirty="0"/>
+          </a:p>
+        </p:txBody>
+      </p:sp>
+      <p:sp>
+        <p:nvSpPr>
+          <p:cNvPr id="3" name="Fußzeilenplatzhalter 2"/>
+          <p:cNvSpPr>
+            <a:spLocks noGrp="1"/>
+          </p:cNvSpPr>
+          <p:nvPr>
+            <p:ph type="ftr" sz="quarter" idx="10"/>
+          </p:nvPr>
+        </p:nvSpPr>
+        <p:spPr/>
+        <p:txBody>
+          <a:bodyPr/>
+          <a:lstStyle/>
+          <a:p>
+            <a:r>
+              <a:rPr lang="de-DE"/>
+              <a:t>Software Engineering</a:t>
+            </a:r>
+            <a:endParaRPr lang="de-DE" dirty="0"/>
+          </a:p>
+        </p:txBody>
+      </p:sp>
+      <p:sp>
+        <p:nvSpPr>
+          <p:cNvPr id="6" name="TextBox 5">
+            <a:extLst>
+              <a:ext uri="{FF2B5EF4-FFF2-40B4-BE49-F238E27FC236}">
+                <a16:creationId xmlns:a16="http://schemas.microsoft.com/office/drawing/2014/main" id="{2BF7B2BA-669C-40D9-9469-E11D62866F00}"/>
+              </a:ext>
+            </a:extLst>
+          </p:cNvPr>
+          <p:cNvSpPr txBox="1"/>
+          <p:nvPr/>
+        </p:nvSpPr>
+        <p:spPr>
+          <a:xfrm rot="20466419">
+            <a:off x="5675400" y="5062213"/>
+            <a:ext cx="3058530" cy="523220"/>
+          </a:xfrm>
+          <a:prstGeom prst="rect">
+            <a:avLst/>
+          </a:prstGeom>
+          <a:noFill/>
+        </p:spPr>
+        <p:txBody>
+          <a:bodyPr wrap="none" lIns="0" rIns="0" rtlCol="0">
+            <a:spAutoFit/>
+          </a:bodyPr>
+          <a:lstStyle/>
+          <a:p>
+            <a:pPr>
+              <a:spcAft>
+                <a:spcPts val="1000"/>
+              </a:spcAft>
+              <a:buClr>
+                <a:schemeClr val="tx2"/>
+              </a:buClr>
+              <a:buSzPct val="80000"/>
+            </a:pPr>
+            <a:r>
+              <a:rPr lang="en-GB" sz="2800" dirty="0">
+                <a:solidFill>
+                  <a:srgbClr val="00B050"/>
+                </a:solidFill>
+              </a:rPr>
+              <a:t>Comparative Study</a:t>
+            </a:r>
+            <a:endParaRPr lang="LID4096" sz="2800" dirty="0" err="1">
+              <a:solidFill>
+                <a:srgbClr val="00B050"/>
+              </a:solidFill>
+            </a:endParaRPr>
+          </a:p>
+        </p:txBody>
+      </p:sp>
+    </p:spTree>
+    <p:extLst>
+      <p:ext uri="{BB962C8B-B14F-4D97-AF65-F5344CB8AC3E}">
+        <p14:creationId xmlns:p14="http://schemas.microsoft.com/office/powerpoint/2010/main" val="3297951378"/>
+      </p:ext>
+    </p:extLst>
+  </p:cSld>
+  <p:clrMapOvr>
+    <a:masterClrMapping/>
+  </p:clrMapOvr>
+</p:sld>
+</file>
+
 <file path=ppt/slides/slide25.xml><?xml version="1.0" encoding="utf-8"?>
 <p:sld xmlns:a="http://schemas.openxmlformats.org/drawingml/2006/main" xmlns:r="http://schemas.openxmlformats.org/officeDocument/2006/relationships" xmlns:p="http://schemas.openxmlformats.org/presentationml/2006/main">
   <p:cSld>
@@ -30987,7 +31091,7 @@
                   <a:schemeClr val="tx2"/>
                 </a:solidFill>
               </a:rPr>
-              <a:t>Evaluation – Usability Inspection Methods </a:t>
+              <a:t>Time Plan</a:t>
             </a:r>
           </a:p>
         </p:txBody>
@@ -31011,274 +31115,6 @@
               <a:rPr lang="de-DE" smtClean="0"/>
               <a:pPr/>
               <a:t>25</a:t>
-            </a:fld>
-            <a:endParaRPr lang="de-DE" dirty="0"/>
-          </a:p>
-        </p:txBody>
-      </p:sp>
-      <p:sp>
-        <p:nvSpPr>
-          <p:cNvPr id="5" name="Textplatzhalter 4"/>
-          <p:cNvSpPr>
-            <a:spLocks noGrp="1"/>
-          </p:cNvSpPr>
-          <p:nvPr>
-            <p:ph type="body" sz="quarter" idx="12"/>
-          </p:nvPr>
-        </p:nvSpPr>
-        <p:spPr/>
-        <p:txBody>
-          <a:bodyPr/>
-          <a:lstStyle/>
-          <a:p>
-            <a:r>
-              <a:rPr lang="de-DE" dirty="0"/>
-              <a:t>Heuristic Evaluation</a:t>
-            </a:r>
-          </a:p>
-          <a:p>
-            <a:endParaRPr lang="de-DE" dirty="0"/>
-          </a:p>
-          <a:p>
-            <a:pPr marL="0" indent="0">
-              <a:buNone/>
-            </a:pPr>
-            <a:endParaRPr lang="de-DE" dirty="0"/>
-          </a:p>
-          <a:p>
-            <a:pPr marL="0" indent="0">
-              <a:buNone/>
-            </a:pPr>
-            <a:r>
-              <a:rPr lang="de-DE" dirty="0"/>
-              <a:t>Each problem w.r.t. a heuristic is rated accordingly; 0 – 4</a:t>
-            </a:r>
-          </a:p>
-          <a:p>
-            <a:pPr marL="0" indent="0">
-              <a:buNone/>
-            </a:pPr>
-            <a:endParaRPr lang="de-DE" dirty="0"/>
-          </a:p>
-          <a:p>
-            <a:pPr marL="0" indent="0">
-              <a:buNone/>
-            </a:pPr>
-            <a:r>
-              <a:rPr lang="en-GB" b="1" dirty="0"/>
-              <a:t>0</a:t>
-            </a:r>
-            <a:r>
-              <a:rPr lang="en-GB" dirty="0"/>
-              <a:t> - do not agree this is a usability problem </a:t>
-            </a:r>
-          </a:p>
-          <a:p>
-            <a:pPr marL="0" indent="0">
-              <a:buNone/>
-            </a:pPr>
-            <a:r>
-              <a:rPr lang="en-GB" b="1" dirty="0"/>
-              <a:t>1</a:t>
-            </a:r>
-            <a:r>
-              <a:rPr lang="en-GB" dirty="0"/>
-              <a:t> - cosmetic problem</a:t>
-            </a:r>
-          </a:p>
-          <a:p>
-            <a:pPr marL="0" indent="0">
-              <a:buNone/>
-            </a:pPr>
-            <a:r>
-              <a:rPr lang="en-GB" b="1" dirty="0"/>
-              <a:t>2</a:t>
-            </a:r>
-            <a:r>
-              <a:rPr lang="en-GB" dirty="0"/>
-              <a:t> - minor usability problem</a:t>
-            </a:r>
-          </a:p>
-          <a:p>
-            <a:pPr marL="0" indent="0">
-              <a:buNone/>
-            </a:pPr>
-            <a:r>
-              <a:rPr lang="en-GB" b="1" dirty="0"/>
-              <a:t>3</a:t>
-            </a:r>
-            <a:r>
-              <a:rPr lang="en-GB" dirty="0"/>
-              <a:t> - major usability problem ( important to fix ) </a:t>
-            </a:r>
-          </a:p>
-          <a:p>
-            <a:pPr marL="0" indent="0">
-              <a:buNone/>
-            </a:pPr>
-            <a:r>
-              <a:rPr lang="en-GB" b="1" dirty="0"/>
-              <a:t>4</a:t>
-            </a:r>
-            <a:r>
-              <a:rPr lang="en-GB" dirty="0"/>
-              <a:t> - usability catastrophe ( imperative to fix )</a:t>
-            </a:r>
-            <a:endParaRPr lang="de-DE" dirty="0"/>
-          </a:p>
-        </p:txBody>
-      </p:sp>
-      <p:sp>
-        <p:nvSpPr>
-          <p:cNvPr id="3" name="Fußzeilenplatzhalter 2"/>
-          <p:cNvSpPr>
-            <a:spLocks noGrp="1"/>
-          </p:cNvSpPr>
-          <p:nvPr>
-            <p:ph type="ftr" sz="quarter" idx="10"/>
-          </p:nvPr>
-        </p:nvSpPr>
-        <p:spPr/>
-        <p:txBody>
-          <a:bodyPr/>
-          <a:lstStyle/>
-          <a:p>
-            <a:r>
-              <a:rPr lang="de-DE"/>
-              <a:t>Software Engineering</a:t>
-            </a:r>
-            <a:endParaRPr lang="de-DE" dirty="0"/>
-          </a:p>
-        </p:txBody>
-      </p:sp>
-      <p:sp>
-        <p:nvSpPr>
-          <p:cNvPr id="6" name="TextBox 5">
-            <a:extLst>
-              <a:ext uri="{FF2B5EF4-FFF2-40B4-BE49-F238E27FC236}">
-                <a16:creationId xmlns:a16="http://schemas.microsoft.com/office/drawing/2014/main" id="{2BF7B2BA-669C-40D9-9469-E11D62866F00}"/>
-              </a:ext>
-            </a:extLst>
-          </p:cNvPr>
-          <p:cNvSpPr txBox="1"/>
-          <p:nvPr/>
-        </p:nvSpPr>
-        <p:spPr>
-          <a:xfrm rot="20466419">
-            <a:off x="5675400" y="5062213"/>
-            <a:ext cx="3058530" cy="523220"/>
-          </a:xfrm>
-          <a:prstGeom prst="rect">
-            <a:avLst/>
-          </a:prstGeom>
-          <a:noFill/>
-        </p:spPr>
-        <p:txBody>
-          <a:bodyPr wrap="none" lIns="0" rIns="0" rtlCol="0">
-            <a:spAutoFit/>
-          </a:bodyPr>
-          <a:lstStyle/>
-          <a:p>
-            <a:pPr>
-              <a:spcAft>
-                <a:spcPts val="1000"/>
-              </a:spcAft>
-              <a:buClr>
-                <a:schemeClr val="tx2"/>
-              </a:buClr>
-              <a:buSzPct val="80000"/>
-            </a:pPr>
-            <a:r>
-              <a:rPr lang="en-GB" sz="2800" dirty="0">
-                <a:solidFill>
-                  <a:srgbClr val="00B050"/>
-                </a:solidFill>
-              </a:rPr>
-              <a:t>Comparative Study</a:t>
-            </a:r>
-            <a:endParaRPr lang="LID4096" sz="2800" dirty="0" err="1">
-              <a:solidFill>
-                <a:srgbClr val="00B050"/>
-              </a:solidFill>
-            </a:endParaRPr>
-          </a:p>
-        </p:txBody>
-      </p:sp>
-    </p:spTree>
-    <p:extLst>
-      <p:ext uri="{BB962C8B-B14F-4D97-AF65-F5344CB8AC3E}">
-        <p14:creationId xmlns:p14="http://schemas.microsoft.com/office/powerpoint/2010/main" val="3297951378"/>
-      </p:ext>
-    </p:extLst>
-  </p:cSld>
-  <p:clrMapOvr>
-    <a:masterClrMapping/>
-  </p:clrMapOvr>
-</p:sld>
-</file>
-
-<file path=ppt/slides/slide26.xml><?xml version="1.0" encoding="utf-8"?>
-<p:sld xmlns:a="http://schemas.openxmlformats.org/drawingml/2006/main" xmlns:r="http://schemas.openxmlformats.org/officeDocument/2006/relationships" xmlns:p="http://schemas.openxmlformats.org/presentationml/2006/main">
-  <p:cSld>
-    <p:spTree>
-      <p:nvGrpSpPr>
-        <p:cNvPr id="1" name=""/>
-        <p:cNvGrpSpPr/>
-        <p:nvPr/>
-      </p:nvGrpSpPr>
-      <p:grpSpPr>
-        <a:xfrm>
-          <a:off x="0" y="0"/>
-          <a:ext cx="0" cy="0"/>
-          <a:chOff x="0" y="0"/>
-          <a:chExt cx="0" cy="0"/>
-        </a:xfrm>
-      </p:grpSpPr>
-      <p:sp>
-        <p:nvSpPr>
-          <p:cNvPr id="2" name="Titel 1"/>
-          <p:cNvSpPr>
-            <a:spLocks noGrp="1"/>
-          </p:cNvSpPr>
-          <p:nvPr>
-            <p:ph type="title"/>
-          </p:nvPr>
-        </p:nvSpPr>
-        <p:spPr/>
-        <p:txBody>
-          <a:bodyPr/>
-          <a:lstStyle/>
-          <a:p>
-            <a:r>
-              <a:rPr lang="de-DE" dirty="0">
-                <a:solidFill>
-                  <a:schemeClr val="tx2"/>
-                </a:solidFill>
-              </a:rPr>
-              <a:t>Time Plan</a:t>
-            </a:r>
-          </a:p>
-        </p:txBody>
-      </p:sp>
-      <p:sp>
-        <p:nvSpPr>
-          <p:cNvPr id="4" name="Foliennummernplatzhalter 3"/>
-          <p:cNvSpPr>
-            <a:spLocks noGrp="1"/>
-          </p:cNvSpPr>
-          <p:nvPr>
-            <p:ph type="sldNum" sz="quarter" idx="11"/>
-          </p:nvPr>
-        </p:nvSpPr>
-        <p:spPr/>
-        <p:txBody>
-          <a:bodyPr/>
-          <a:lstStyle/>
-          <a:p>
-            <a:fld id="{815DB69B-0A2B-4D0B-A3BD-360AAA24381D}" type="slidenum">
-              <a:rPr lang="de-DE" smtClean="0"/>
-              <a:pPr/>
-              <a:t>26</a:t>
             </a:fld>
             <a:endParaRPr lang="de-DE" dirty="0"/>
           </a:p>
@@ -31408,7 +31244,7 @@
 </p:sld>
 </file>
 
-<file path=ppt/slides/slide27.xml><?xml version="1.0" encoding="utf-8"?>
+<file path=ppt/slides/slide26.xml><?xml version="1.0" encoding="utf-8"?>
 <p:sld xmlns:a="http://schemas.openxmlformats.org/drawingml/2006/main" xmlns:r="http://schemas.openxmlformats.org/officeDocument/2006/relationships" xmlns:p="http://schemas.openxmlformats.org/presentationml/2006/main">
   <p:cSld>
     <p:spTree>
@@ -31505,7 +31341,7 @@
             <a:fld id="{815DB69B-0A2B-4D0B-A3BD-360AAA24381D}" type="slidenum">
               <a:rPr lang="de-DE" smtClean="0"/>
               <a:pPr/>
-              <a:t>27</a:t>
+              <a:t>26</a:t>
             </a:fld>
             <a:endParaRPr lang="de-DE" dirty="0"/>
           </a:p>
@@ -31581,7 +31417,7 @@
 </p:sld>
 </file>
 
-<file path=ppt/slides/slide28.xml><?xml version="1.0" encoding="utf-8"?>
+<file path=ppt/slides/slide27.xml><?xml version="1.0" encoding="utf-8"?>
 <p:sld xmlns:a="http://schemas.openxmlformats.org/drawingml/2006/main" xmlns:r="http://schemas.openxmlformats.org/officeDocument/2006/relationships" xmlns:p="http://schemas.openxmlformats.org/presentationml/2006/main">
   <p:cSld>
     <p:spTree>
@@ -31642,7 +31478,7 @@
             <a:fld id="{815DB69B-0A2B-4D0B-A3BD-360AAA24381D}" type="slidenum">
               <a:rPr lang="de-DE" smtClean="0"/>
               <a:pPr/>
-              <a:t>28</a:t>
+              <a:t>27</a:t>
             </a:fld>
             <a:endParaRPr lang="de-DE" dirty="0"/>
           </a:p>
@@ -31720,7 +31556,7 @@
 </p:sld>
 </file>
 
-<file path=ppt/slides/slide29.xml><?xml version="1.0" encoding="utf-8"?>
+<file path=ppt/slides/slide28.xml><?xml version="1.0" encoding="utf-8"?>
 <p:sld xmlns:a="http://schemas.openxmlformats.org/drawingml/2006/main" xmlns:r="http://schemas.openxmlformats.org/officeDocument/2006/relationships" xmlns:p="http://schemas.openxmlformats.org/presentationml/2006/main">
   <p:cSld>
     <p:spTree>
@@ -31781,7 +31617,7 @@
             <a:fld id="{815DB69B-0A2B-4D0B-A3BD-360AAA24381D}" type="slidenum">
               <a:rPr lang="de-DE" smtClean="0"/>
               <a:pPr/>
-              <a:t>29</a:t>
+              <a:t>28</a:t>
             </a:fld>
             <a:endParaRPr lang="de-DE" dirty="0"/>
           </a:p>
@@ -32859,42 +32695,6 @@
           <a:chExt cx="0" cy="0"/>
         </a:xfrm>
       </p:grpSpPr>
-      <p:pic>
-        <p:nvPicPr>
-          <p:cNvPr id="7" name="Picture 6">
-            <a:extLst>
-              <a:ext uri="{FF2B5EF4-FFF2-40B4-BE49-F238E27FC236}">
-                <a16:creationId xmlns:a16="http://schemas.microsoft.com/office/drawing/2014/main" id="{A1F3EE1C-0560-470B-9045-9D5ADAF9F2F1}"/>
-              </a:ext>
-            </a:extLst>
-          </p:cNvPr>
-          <p:cNvPicPr>
-            <a:picLocks noChangeAspect="1"/>
-          </p:cNvPicPr>
-          <p:nvPr/>
-        </p:nvPicPr>
-        <p:blipFill>
-          <a:blip r:embed="rId3">
-            <a:extLst>
-              <a:ext uri="{28A0092B-C50C-407E-A947-70E740481C1C}">
-                <a14:useLocalDpi xmlns:a14="http://schemas.microsoft.com/office/drawing/2010/main" val="0"/>
-              </a:ext>
-            </a:extLst>
-          </a:blip>
-          <a:stretch>
-            <a:fillRect/>
-          </a:stretch>
-        </p:blipFill>
-        <p:spPr>
-          <a:xfrm>
-            <a:off x="3321786" y="193789"/>
-            <a:ext cx="6458997" cy="4963403"/>
-          </a:xfrm>
-          <a:prstGeom prst="rect">
-            <a:avLst/>
-          </a:prstGeom>
-        </p:spPr>
-      </p:pic>
       <p:sp>
         <p:nvSpPr>
           <p:cNvPr id="4" name="Foliennummernplatzhalter 3"/>
@@ -33088,7 +32888,7 @@
         </p:nvSpPr>
         <p:spPr>
           <a:xfrm>
-            <a:off x="452374" y="1268414"/>
+            <a:off x="6249144" y="3717032"/>
             <a:ext cx="1787669" cy="369332"/>
           </a:xfrm>
           <a:prstGeom prst="rect">
@@ -33112,98 +32912,6 @@
             <a:endParaRPr lang="LID4096" dirty="0">
               <a:solidFill>
                 <a:srgbClr val="00B050"/>
-              </a:solidFill>
-            </a:endParaRPr>
-          </a:p>
-        </p:txBody>
-      </p:sp>
-      <p:cxnSp>
-        <p:nvCxnSpPr>
-          <p:cNvPr id="9" name="Straight Arrow Connector 8">
-            <a:extLst>
-              <a:ext uri="{FF2B5EF4-FFF2-40B4-BE49-F238E27FC236}">
-                <a16:creationId xmlns:a16="http://schemas.microsoft.com/office/drawing/2014/main" id="{210B974A-706F-443C-B99B-98D539EC8CCD}"/>
-              </a:ext>
-            </a:extLst>
-          </p:cNvPr>
-          <p:cNvCxnSpPr/>
-          <p:nvPr/>
-        </p:nvCxnSpPr>
-        <p:spPr>
-          <a:xfrm>
-            <a:off x="6551284" y="5085184"/>
-            <a:ext cx="2520280" cy="0"/>
-          </a:xfrm>
-          <a:prstGeom prst="straightConnector1">
-            <a:avLst/>
-          </a:prstGeom>
-          <a:ln>
-            <a:tailEnd type="triangle"/>
-          </a:ln>
-        </p:spPr>
-        <p:style>
-          <a:lnRef idx="1">
-            <a:schemeClr val="accent2"/>
-          </a:lnRef>
-          <a:fillRef idx="0">
-            <a:schemeClr val="accent2"/>
-          </a:fillRef>
-          <a:effectRef idx="0">
-            <a:schemeClr val="accent2"/>
-          </a:effectRef>
-          <a:fontRef idx="minor">
-            <a:schemeClr val="tx1"/>
-          </a:fontRef>
-        </p:style>
-      </p:cxnSp>
-      <p:sp>
-        <p:nvSpPr>
-          <p:cNvPr id="10" name="TextBox 9">
-            <a:extLst>
-              <a:ext uri="{FF2B5EF4-FFF2-40B4-BE49-F238E27FC236}">
-                <a16:creationId xmlns:a16="http://schemas.microsoft.com/office/drawing/2014/main" id="{FC32CC40-E826-4236-8E02-A0D2FC5387C2}"/>
-              </a:ext>
-            </a:extLst>
-          </p:cNvPr>
-          <p:cNvSpPr txBox="1"/>
-          <p:nvPr/>
-        </p:nvSpPr>
-        <p:spPr>
-          <a:xfrm>
-            <a:off x="7904578" y="5157192"/>
-            <a:ext cx="1166986" cy="261610"/>
-          </a:xfrm>
-          <a:prstGeom prst="rect">
-            <a:avLst/>
-          </a:prstGeom>
-          <a:noFill/>
-        </p:spPr>
-        <p:txBody>
-          <a:bodyPr wrap="none" lIns="0" rIns="0" rtlCol="0">
-            <a:spAutoFit/>
-          </a:bodyPr>
-          <a:lstStyle/>
-          <a:p>
-            <a:pPr>
-              <a:spcAft>
-                <a:spcPts val="1000"/>
-              </a:spcAft>
-              <a:buClr>
-                <a:schemeClr val="tx2"/>
-              </a:buClr>
-              <a:buSzPct val="80000"/>
-            </a:pPr>
-            <a:r>
-              <a:rPr lang="en-GB" sz="1100" dirty="0">
-                <a:solidFill>
-                  <a:srgbClr val="7030A0"/>
-                </a:solidFill>
-              </a:rPr>
-              <a:t>Survey responses </a:t>
-            </a:r>
-            <a:endParaRPr lang="LID4096" sz="1100" dirty="0" err="1">
-              <a:solidFill>
-                <a:srgbClr val="7030A0"/>
               </a:solidFill>
             </a:endParaRPr>
           </a:p>
@@ -33351,6 +33059,32 @@
       </p:grpSpPr>
       <p:sp>
         <p:nvSpPr>
+          <p:cNvPr id="2" name="Titel 1"/>
+          <p:cNvSpPr>
+            <a:spLocks noGrp="1"/>
+          </p:cNvSpPr>
+          <p:nvPr>
+            <p:ph type="title"/>
+          </p:nvPr>
+        </p:nvSpPr>
+        <p:spPr/>
+        <p:txBody>
+          <a:bodyPr/>
+          <a:lstStyle/>
+          <a:p>
+            <a:r>
+              <a:rPr lang="de-DE" dirty="0">
+                <a:solidFill>
+                  <a:schemeClr val="tx2"/>
+                </a:solidFill>
+              </a:rPr>
+              <a:t>Multiple Tools</a:t>
+            </a:r>
+          </a:p>
+        </p:txBody>
+      </p:sp>
+      <p:sp>
+        <p:nvSpPr>
           <p:cNvPr id="4" name="Foliennummernplatzhalter 3"/>
           <p:cNvSpPr>
             <a:spLocks noGrp="1"/>
@@ -33383,38 +33117,71 @@
             <p:ph type="body" sz="quarter" idx="12"/>
           </p:nvPr>
         </p:nvSpPr>
-        <p:spPr>
-          <a:xfrm>
-            <a:off x="462823" y="2112463"/>
-            <a:ext cx="3626081" cy="2096235"/>
-          </a:xfrm>
-        </p:spPr>
+        <p:spPr/>
         <p:txBody>
           <a:bodyPr/>
           <a:lstStyle/>
           <a:p>
-            <a:r>
-              <a:rPr lang="en-GB" dirty="0"/>
-              <a:t>Christakis et. al.</a:t>
-            </a:r>
-            <a:br>
-              <a:rPr lang="en-GB" dirty="0"/>
-            </a:br>
-            <a:endParaRPr lang="en-GB" dirty="0"/>
-          </a:p>
-          <a:p>
-            <a:pPr>
-              <a:buFontTx/>
-              <a:buChar char="-"/>
+            <a:pPr marL="0" indent="0">
+              <a:buNone/>
             </a:pPr>
             <a:endParaRPr lang="de-DE" dirty="0"/>
           </a:p>
           <a:p>
+            <a:r>
+              <a:rPr lang="de-DE" dirty="0"/>
+              <a:t>Developers use multiple static analysis tools each having own coverage.</a:t>
+            </a:r>
+          </a:p>
+          <a:p>
+            <a:endParaRPr lang="de-DE" dirty="0"/>
+          </a:p>
+          <a:p>
+            <a:r>
+              <a:rPr lang="de-DE" dirty="0"/>
+              <a:t>Research trends:</a:t>
+            </a:r>
+          </a:p>
+          <a:p>
+            <a:endParaRPr lang="de-DE" dirty="0"/>
+          </a:p>
+          <a:p>
             <a:pPr>
-              <a:buFontTx/>
-              <a:buChar char="-"/>
+              <a:buFont typeface="Arial" panose="020B0604020202020204" pitchFamily="34" charset="0"/>
+              <a:buChar char="•"/>
             </a:pPr>
-            <a:endParaRPr lang="de-DE" dirty="0"/>
+            <a:r>
+              <a:rPr lang="en-GB" dirty="0"/>
+              <a:t>Prioritise the bug warning alerts</a:t>
+            </a:r>
+          </a:p>
+          <a:p>
+            <a:pPr marL="0" indent="0" algn="r">
+              <a:buNone/>
+            </a:pPr>
+            <a:r>
+              <a:rPr lang="en-GB" dirty="0"/>
+              <a:t>( Flynn et. al. )</a:t>
+            </a:r>
+          </a:p>
+          <a:p>
+            <a:pPr>
+              <a:buFont typeface="Arial" panose="020B0604020202020204" pitchFamily="34" charset="0"/>
+              <a:buChar char="•"/>
+            </a:pPr>
+            <a:r>
+              <a:rPr lang="en-GB" dirty="0"/>
+              <a:t>Merges 3 tools for Java to show warnings </a:t>
+            </a:r>
+          </a:p>
+          <a:p>
+            <a:pPr marL="0" indent="0" algn="r">
+              <a:buNone/>
+            </a:pPr>
+            <a:r>
+              <a:rPr lang="en-GB" dirty="0"/>
+              <a:t>( Meng et. al. )</a:t>
+            </a:r>
           </a:p>
         </p:txBody>
       </p:sp>
@@ -33443,129 +33210,10 @@
       </p:sp>
       <p:sp>
         <p:nvSpPr>
-          <p:cNvPr id="8" name="Titel 1">
+          <p:cNvPr id="6" name="TextBox 5">
             <a:extLst>
               <a:ext uri="{FF2B5EF4-FFF2-40B4-BE49-F238E27FC236}">
-                <a16:creationId xmlns:a16="http://schemas.microsoft.com/office/drawing/2014/main" id="{8F3356E1-DF59-4BA5-8E40-09958117AED1}"/>
-              </a:ext>
-            </a:extLst>
-          </p:cNvPr>
-          <p:cNvSpPr>
-            <a:spLocks noGrp="1"/>
-          </p:cNvSpPr>
-          <p:nvPr>
-            <p:ph type="title"/>
-          </p:nvPr>
-        </p:nvSpPr>
-        <p:spPr>
-          <a:xfrm>
-            <a:off x="270900" y="188642"/>
-            <a:ext cx="9363637" cy="1079772"/>
-          </a:xfrm>
-        </p:spPr>
-        <p:txBody>
-          <a:bodyPr/>
-          <a:lstStyle/>
-          <a:p>
-            <a:r>
-              <a:rPr lang="de-DE" dirty="0">
-                <a:solidFill>
-                  <a:schemeClr val="tx2"/>
-                </a:solidFill>
-              </a:rPr>
-              <a:t>Static Code Analysis</a:t>
-            </a:r>
-          </a:p>
-        </p:txBody>
-      </p:sp>
-      <p:sp>
-        <p:nvSpPr>
-          <p:cNvPr id="6" name="Rectangle 5">
-            <a:extLst>
-              <a:ext uri="{FF2B5EF4-FFF2-40B4-BE49-F238E27FC236}">
-                <a16:creationId xmlns:a16="http://schemas.microsoft.com/office/drawing/2014/main" id="{DDFAA2B6-4D61-4CED-ACEF-6473307B202E}"/>
-              </a:ext>
-            </a:extLst>
-          </p:cNvPr>
-          <p:cNvSpPr/>
-          <p:nvPr/>
-        </p:nvSpPr>
-        <p:spPr>
-          <a:xfrm>
-            <a:off x="452374" y="1412560"/>
-            <a:ext cx="1787669" cy="369332"/>
-          </a:xfrm>
-          <a:prstGeom prst="rect">
-            <a:avLst/>
-          </a:prstGeom>
-        </p:spPr>
-        <p:txBody>
-          <a:bodyPr wrap="none">
-            <a:spAutoFit/>
-          </a:bodyPr>
-          <a:lstStyle/>
-          <a:p>
-            <a:r>
-              <a:rPr lang="de-DE" dirty="0">
-                <a:solidFill>
-                  <a:srgbClr val="00B050"/>
-                </a:solidFill>
-              </a:rPr>
-              <a:t>Usability Issues</a:t>
-            </a:r>
-            <a:endParaRPr lang="LID4096" dirty="0">
-              <a:solidFill>
-                <a:srgbClr val="00B050"/>
-              </a:solidFill>
-            </a:endParaRPr>
-          </a:p>
-        </p:txBody>
-      </p:sp>
-      <p:cxnSp>
-        <p:nvCxnSpPr>
-          <p:cNvPr id="9" name="Straight Arrow Connector 8">
-            <a:extLst>
-              <a:ext uri="{FF2B5EF4-FFF2-40B4-BE49-F238E27FC236}">
-                <a16:creationId xmlns:a16="http://schemas.microsoft.com/office/drawing/2014/main" id="{210B974A-706F-443C-B99B-98D539EC8CCD}"/>
-              </a:ext>
-            </a:extLst>
-          </p:cNvPr>
-          <p:cNvCxnSpPr/>
-          <p:nvPr/>
-        </p:nvCxnSpPr>
-        <p:spPr>
-          <a:xfrm>
-            <a:off x="6551284" y="5007899"/>
-            <a:ext cx="2520280" cy="0"/>
-          </a:xfrm>
-          <a:prstGeom prst="straightConnector1">
-            <a:avLst/>
-          </a:prstGeom>
-          <a:ln>
-            <a:tailEnd type="triangle"/>
-          </a:ln>
-        </p:spPr>
-        <p:style>
-          <a:lnRef idx="1">
-            <a:schemeClr val="accent2"/>
-          </a:lnRef>
-          <a:fillRef idx="0">
-            <a:schemeClr val="accent2"/>
-          </a:fillRef>
-          <a:effectRef idx="0">
-            <a:schemeClr val="accent2"/>
-          </a:effectRef>
-          <a:fontRef idx="minor">
-            <a:schemeClr val="tx1"/>
-          </a:fontRef>
-        </p:style>
-      </p:cxnSp>
-      <p:sp>
-        <p:nvSpPr>
-          <p:cNvPr id="10" name="TextBox 9">
-            <a:extLst>
-              <a:ext uri="{FF2B5EF4-FFF2-40B4-BE49-F238E27FC236}">
-                <a16:creationId xmlns:a16="http://schemas.microsoft.com/office/drawing/2014/main" id="{FC32CC40-E826-4236-8E02-A0D2FC5387C2}"/>
+                <a16:creationId xmlns:a16="http://schemas.microsoft.com/office/drawing/2014/main" id="{BE000176-FB64-494D-85BE-2C0B58A1CB46}"/>
               </a:ext>
             </a:extLst>
           </p:cNvPr>
@@ -33574,8 +33222,8 @@
         </p:nvSpPr>
         <p:spPr>
           <a:xfrm>
-            <a:off x="7960065" y="5021240"/>
-            <a:ext cx="1166986" cy="261610"/>
+            <a:off x="270900" y="5492411"/>
+            <a:ext cx="9433352" cy="990015"/>
           </a:xfrm>
           <a:prstGeom prst="rect">
             <a:avLst/>
@@ -33588,95 +33236,6 @@
           </a:bodyPr>
           <a:lstStyle/>
           <a:p>
-            <a:pPr>
-              <a:spcAft>
-                <a:spcPts val="1000"/>
-              </a:spcAft>
-              <a:buClr>
-                <a:schemeClr val="tx2"/>
-              </a:buClr>
-              <a:buSzPct val="80000"/>
-            </a:pPr>
-            <a:r>
-              <a:rPr lang="en-GB" sz="1100" dirty="0">
-                <a:solidFill>
-                  <a:srgbClr val="7030A0"/>
-                </a:solidFill>
-              </a:rPr>
-              <a:t>Survey responses </a:t>
-            </a:r>
-            <a:endParaRPr lang="LID4096" sz="1100" dirty="0" err="1">
-              <a:solidFill>
-                <a:srgbClr val="7030A0"/>
-              </a:solidFill>
-            </a:endParaRPr>
-          </a:p>
-        </p:txBody>
-      </p:sp>
-      <p:pic>
-        <p:nvPicPr>
-          <p:cNvPr id="12" name="Picture 11">
-            <a:extLst>
-              <a:ext uri="{FF2B5EF4-FFF2-40B4-BE49-F238E27FC236}">
-                <a16:creationId xmlns:a16="http://schemas.microsoft.com/office/drawing/2014/main" id="{9C36C666-F1E1-486A-9C42-9CA960B9BE66}"/>
-              </a:ext>
-            </a:extLst>
-          </p:cNvPr>
-          <p:cNvPicPr>
-            <a:picLocks noChangeAspect="1"/>
-          </p:cNvPicPr>
-          <p:nvPr/>
-        </p:nvPicPr>
-        <p:blipFill>
-          <a:blip r:embed="rId2">
-            <a:extLst>
-              <a:ext uri="{28A0092B-C50C-407E-A947-70E740481C1C}">
-                <a14:useLocalDpi xmlns:a14="http://schemas.microsoft.com/office/drawing/2010/main" val="0"/>
-              </a:ext>
-            </a:extLst>
-          </a:blip>
-          <a:stretch>
-            <a:fillRect/>
-          </a:stretch>
-        </p:blipFill>
-        <p:spPr>
-          <a:xfrm>
-            <a:off x="4308120" y="2594702"/>
-            <a:ext cx="5301588" cy="2096235"/>
-          </a:xfrm>
-          <a:prstGeom prst="rect">
-            <a:avLst/>
-          </a:prstGeom>
-        </p:spPr>
-      </p:pic>
-      <p:sp>
-        <p:nvSpPr>
-          <p:cNvPr id="11" name="TextBox 10">
-            <a:extLst>
-              <a:ext uri="{FF2B5EF4-FFF2-40B4-BE49-F238E27FC236}">
-                <a16:creationId xmlns:a16="http://schemas.microsoft.com/office/drawing/2014/main" id="{98EDD8D3-AB6D-4CDA-AEF5-7195714C51A1}"/>
-              </a:ext>
-            </a:extLst>
-          </p:cNvPr>
-          <p:cNvSpPr txBox="1"/>
-          <p:nvPr/>
-        </p:nvSpPr>
-        <p:spPr>
-          <a:xfrm>
-            <a:off x="285361" y="5869571"/>
-            <a:ext cx="9324347" cy="400110"/>
-          </a:xfrm>
-          <a:prstGeom prst="rect">
-            <a:avLst/>
-          </a:prstGeom>
-          <a:noFill/>
-        </p:spPr>
-        <p:txBody>
-          <a:bodyPr wrap="none" lIns="0" rIns="0" rtlCol="0">
-            <a:spAutoFit/>
-          </a:bodyPr>
-          <a:lstStyle/>
-          <a:p>
             <a:pPr marL="360000" indent="-360000">
               <a:spcAft>
                 <a:spcPts val="1000"/>
@@ -33690,22 +33249,85 @@
             </a:pPr>
             <a:r>
               <a:rPr lang="en-GB" sz="1000" dirty="0"/>
-              <a:t>Maria Christakis and Christian Bird. 2016. What developers want and need from program analysis: an empirical study. In </a:t>
+              <a:t>Lori Flynn, William Snavely, David Svoboda, Nathan </a:t>
+            </a:r>
+            <a:r>
+              <a:rPr lang="en-GB" sz="1000" dirty="0" err="1"/>
+              <a:t>VanHoudnos</a:t>
+            </a:r>
+            <a:r>
+              <a:rPr lang="en-GB" sz="1000" dirty="0"/>
+              <a:t>, Richard Qin, Jennifer Burns, David </a:t>
+            </a:r>
+            <a:r>
+              <a:rPr lang="en-GB" sz="1000" dirty="0" err="1"/>
+              <a:t>Zubrow</a:t>
+            </a:r>
+            <a:r>
+              <a:rPr lang="en-GB" sz="1000" dirty="0"/>
+              <a:t>, Robert Stoddard, and Guillermo </a:t>
+            </a:r>
+            <a:r>
+              <a:rPr lang="en-GB" sz="1000" dirty="0" err="1"/>
+              <a:t>Marce-Santurio</a:t>
+            </a:r>
+            <a:r>
+              <a:rPr lang="en-GB" sz="1000" dirty="0"/>
+              <a:t>. </a:t>
+            </a:r>
+            <a:br>
+              <a:rPr lang="en-GB" sz="1000" dirty="0"/>
+            </a:br>
+            <a:r>
+              <a:rPr lang="en-GB" sz="1000" dirty="0"/>
+              <a:t>2018. Prioritizing alerts from multiple static analysis tools, using classification models. In </a:t>
             </a:r>
             <a:r>
               <a:rPr lang="en-GB" sz="1000" i="1" dirty="0"/>
-              <a:t>Proceedings of the 31st IEEE/ACM </a:t>
+              <a:t>Proceedings of the 1st International Workshop on Software Qualities </a:t>
             </a:r>
             <a:br>
               <a:rPr lang="en-GB" sz="1000" i="1" dirty="0"/>
             </a:br>
             <a:r>
               <a:rPr lang="en-GB" sz="1000" i="1" dirty="0"/>
-              <a:t>International Conference on Automated Software Engineering</a:t>
+              <a:t>and Their Dependencies</a:t>
             </a:r>
             <a:r>
               <a:rPr lang="en-GB" sz="1000" dirty="0"/>
-              <a:t> (ASE 2016). ACM, New York, NY, USA, 332-343. DOI: https://doi.org/10.1145/2970276.2970347</a:t>
+              <a:t> (SQUADE '18). ACM, New York, NY, USA, 13-20. DOI: https://doi.org/10.1145/3194095.3194100 </a:t>
+            </a:r>
+          </a:p>
+          <a:p>
+            <a:pPr marL="360000" indent="-360000">
+              <a:spcAft>
+                <a:spcPts val="1000"/>
+              </a:spcAft>
+              <a:buClr>
+                <a:schemeClr val="tx2"/>
+              </a:buClr>
+              <a:buSzPct val="80000"/>
+              <a:buFont typeface="Wingdings" panose="05000000000000000000" pitchFamily="2" charset="2"/>
+              <a:buChar char="v"/>
+            </a:pPr>
+            <a:r>
+              <a:rPr lang="en-GB" sz="1000" dirty="0"/>
+              <a:t>N. Meng, Q. Wang, Q. Wu and H. Mei, "An Approach to Merge Results of Multiple Static Analysis Tools (Short Paper)," </a:t>
+            </a:r>
+            <a:r>
+              <a:rPr lang="en-GB" sz="1000" i="1" dirty="0"/>
+              <a:t>2008 The Eighth International </a:t>
+            </a:r>
+            <a:br>
+              <a:rPr lang="en-GB" sz="1000" i="1" dirty="0"/>
+            </a:br>
+            <a:r>
+              <a:rPr lang="en-GB" sz="1000" i="1" dirty="0"/>
+              <a:t>Conference on Quality Software</a:t>
+            </a:r>
+            <a:r>
+              <a:rPr lang="en-GB" sz="1000" dirty="0"/>
+              <a:t>, Oxford, 2008, pp. 169-174.doi: 10.1109/QSIC.2008.30</a:t>
             </a:r>
             <a:endParaRPr lang="LID4096" sz="1000" dirty="0" err="1"/>
           </a:p>
@@ -33714,7 +33336,7 @@
     </p:spTree>
     <p:extLst>
       <p:ext uri="{BB962C8B-B14F-4D97-AF65-F5344CB8AC3E}">
-        <p14:creationId xmlns:p14="http://schemas.microsoft.com/office/powerpoint/2010/main" val="1743097999"/>
+        <p14:creationId xmlns:p14="http://schemas.microsoft.com/office/powerpoint/2010/main" val="3993522925"/>
       </p:ext>
     </p:extLst>
   </p:cSld>
@@ -33806,28 +33428,54 @@
           <a:bodyPr/>
           <a:lstStyle/>
           <a:p>
-            <a:pPr marL="0" indent="0">
+            <a:pPr>
+              <a:buFont typeface="Wingdings" panose="05000000000000000000" pitchFamily="2" charset="2"/>
+              <a:buChar char="§"/>
+            </a:pPr>
+            <a:r>
+              <a:rPr lang="en-GB" dirty="0"/>
+              <a:t>Tricorder</a:t>
+            </a:r>
+          </a:p>
+          <a:p>
+            <a:pPr lvl="1">
+              <a:buFont typeface="Arial" panose="020B0604020202020204" pitchFamily="34" charset="0"/>
+              <a:buChar char="•"/>
+            </a:pPr>
+            <a:r>
+              <a:rPr lang="en-GB" sz="1600" dirty="0" err="1"/>
+              <a:t>ReviewBot</a:t>
+            </a:r>
+            <a:endParaRPr lang="en-GB" sz="1600" dirty="0"/>
+          </a:p>
+          <a:p>
+            <a:pPr lvl="1">
+              <a:buFont typeface="Arial" panose="020B0604020202020204" pitchFamily="34" charset="0"/>
+              <a:buChar char="•"/>
+            </a:pPr>
+            <a:r>
+              <a:rPr lang="en-GB" sz="1600" dirty="0"/>
+              <a:t>Separate bug coverage by separate tool </a:t>
+            </a:r>
+          </a:p>
+          <a:p>
+            <a:pPr lvl="1">
+              <a:buFont typeface="Arial" panose="020B0604020202020204" pitchFamily="34" charset="0"/>
+              <a:buChar char="•"/>
+            </a:pPr>
+            <a:r>
+              <a:rPr lang="en-GB" sz="1600" dirty="0"/>
+              <a:t>Evaluation: Summative – Click rates</a:t>
+            </a:r>
+          </a:p>
+          <a:p>
+            <a:pPr marL="0" indent="0" algn="r">
               <a:buNone/>
             </a:pPr>
-            <a:endParaRPr lang="de-DE" dirty="0"/>
-          </a:p>
-          <a:p>
-            <a:r>
-              <a:rPr lang="de-DE" dirty="0"/>
-              <a:t>Developers use multiple static analysis tools each having own coverage.</a:t>
-            </a:r>
-          </a:p>
-          <a:p>
-            <a:endParaRPr lang="de-DE" dirty="0"/>
-          </a:p>
-          <a:p>
-            <a:r>
-              <a:rPr lang="de-DE" dirty="0"/>
-              <a:t>Research trends:</a:t>
-            </a:r>
-          </a:p>
-          <a:p>
-            <a:endParaRPr lang="de-DE" dirty="0"/>
+            <a:r>
+              <a:rPr lang="en-GB" dirty="0"/>
+              <a:t>(Sadowski et. al. )</a:t>
+            </a:r>
           </a:p>
           <a:p>
             <a:pPr>
@@ -33836,7 +33484,27 @@
             </a:pPr>
             <a:r>
               <a:rPr lang="en-GB" dirty="0"/>
-              <a:t>Prioritise the bug warning alerts</a:t>
+              <a:t>Parfait</a:t>
+            </a:r>
+          </a:p>
+          <a:p>
+            <a:pPr lvl="1">
+              <a:buFont typeface="Arial" panose="020B0604020202020204" pitchFamily="34" charset="0"/>
+              <a:buChar char="•"/>
+            </a:pPr>
+            <a:r>
+              <a:rPr lang="en-GB" sz="1600" dirty="0"/>
+              <a:t>Scalability ( easy , expensive analysis )</a:t>
+            </a:r>
+          </a:p>
+          <a:p>
+            <a:pPr lvl="1">
+              <a:buFont typeface="Arial" panose="020B0604020202020204" pitchFamily="34" charset="0"/>
+              <a:buChar char="•"/>
+            </a:pPr>
+            <a:r>
+              <a:rPr lang="en-GB" sz="1600" dirty="0"/>
+              <a:t>Precision ( bug track – real, no, potential ) </a:t>
             </a:r>
           </a:p>
           <a:p>
@@ -33845,27 +33513,33 @@
             </a:pPr>
             <a:r>
               <a:rPr lang="en-GB" dirty="0"/>
-              <a:t>( Flynn et. al. )</a:t>
-            </a:r>
-          </a:p>
-          <a:p>
-            <a:pPr>
-              <a:buFont typeface="Arial" panose="020B0604020202020204" pitchFamily="34" charset="0"/>
-              <a:buChar char="•"/>
-            </a:pPr>
-            <a:r>
-              <a:rPr lang="en-GB" dirty="0"/>
-              <a:t>Merges 3 tools for Java to show warnings </a:t>
-            </a:r>
-          </a:p>
-          <a:p>
-            <a:pPr marL="0" indent="0" algn="r">
+              <a:t>(Cifuentes et. al. )</a:t>
+            </a:r>
+          </a:p>
+          <a:p>
+            <a:pPr marL="0" indent="0" algn="ctr">
               <a:buNone/>
             </a:pPr>
-            <a:r>
+            <a:br>
               <a:rPr lang="en-GB" dirty="0"/>
-              <a:t>( Meng et. al. )</a:t>
-            </a:r>
+            </a:br>
+            <a:r>
+              <a:rPr lang="en-GB" dirty="0"/>
+              <a:t>But </a:t>
+            </a:r>
+            <a:r>
+              <a:rPr lang="en-GB" dirty="0">
+                <a:solidFill>
+                  <a:srgbClr val="00B050"/>
+                </a:solidFill>
+              </a:rPr>
+              <a:t>USABILITY</a:t>
+            </a:r>
+            <a:r>
+              <a:rPr lang="en-GB" dirty="0"/>
+              <a:t> is not addressed…</a:t>
+            </a:r>
+            <a:endParaRPr lang="de-DE" dirty="0"/>
           </a:p>
         </p:txBody>
       </p:sp>
@@ -33894,10 +33568,54 @@
       </p:sp>
       <p:sp>
         <p:nvSpPr>
-          <p:cNvPr id="6" name="TextBox 5">
+          <p:cNvPr id="6" name="Rectangle: Rounded Corners 5">
             <a:extLst>
               <a:ext uri="{FF2B5EF4-FFF2-40B4-BE49-F238E27FC236}">
-                <a16:creationId xmlns:a16="http://schemas.microsoft.com/office/drawing/2014/main" id="{BE000176-FB64-494D-85BE-2C0B58A1CB46}"/>
+                <a16:creationId xmlns:a16="http://schemas.microsoft.com/office/drawing/2014/main" id="{7B1A95CE-58D3-4A2F-96D9-3FCCC8DB722D}"/>
+              </a:ext>
+            </a:extLst>
+          </p:cNvPr>
+          <p:cNvSpPr/>
+          <p:nvPr/>
+        </p:nvSpPr>
+        <p:spPr bwMode="auto">
+          <a:xfrm>
+            <a:off x="3152800" y="4941168"/>
+            <a:ext cx="3672408" cy="432048"/>
+          </a:xfrm>
+          <a:prstGeom prst="roundRect">
+            <a:avLst/>
+          </a:prstGeom>
+          <a:noFill/>
+          <a:ln w="12700">
+            <a:solidFill>
+              <a:srgbClr val="FF0000"/>
+            </a:solidFill>
+            <a:miter lim="800000"/>
+            <a:headEnd/>
+            <a:tailEnd/>
+          </a:ln>
+          <a:effectLst/>
+        </p:spPr>
+        <p:txBody>
+          <a:bodyPr wrap="none" rtlCol="0" anchor="ctr"/>
+          <a:lstStyle/>
+          <a:p>
+            <a:pPr algn="ctr"/>
+            <a:endParaRPr lang="LID4096" sz="1600" b="1" dirty="0">
+              <a:solidFill>
+                <a:schemeClr val="bg1"/>
+              </a:solidFill>
+            </a:endParaRPr>
+          </a:p>
+        </p:txBody>
+      </p:sp>
+      <p:sp>
+        <p:nvSpPr>
+          <p:cNvPr id="7" name="TextBox 6">
+            <a:extLst>
+              <a:ext uri="{FF2B5EF4-FFF2-40B4-BE49-F238E27FC236}">
+                <a16:creationId xmlns:a16="http://schemas.microsoft.com/office/drawing/2014/main" id="{69EF1288-A1A1-4D2C-91B6-7C4C1C4B12A1}"/>
               </a:ext>
             </a:extLst>
           </p:cNvPr>
@@ -33906,8 +33624,8 @@
         </p:nvSpPr>
         <p:spPr>
           <a:xfrm>
-            <a:off x="270900" y="5492411"/>
-            <a:ext cx="9433352" cy="990015"/>
+            <a:off x="270900" y="5646301"/>
+            <a:ext cx="9226565" cy="836126"/>
           </a:xfrm>
           <a:prstGeom prst="rect">
             <a:avLst/>
@@ -33933,53 +33651,38 @@
             </a:pPr>
             <a:r>
               <a:rPr lang="en-GB" sz="1000" dirty="0"/>
-              <a:t>Lori Flynn, William Snavely, David Svoboda, Nathan </a:t>
+              <a:t>Caitlin Sadowski, Jeffrey van Gogh, Ciera </a:t>
             </a:r>
             <a:r>
               <a:rPr lang="en-GB" sz="1000" dirty="0" err="1"/>
-              <a:t>VanHoudnos</a:t>
+              <a:t>Jaspan</a:t>
             </a:r>
             <a:r>
               <a:rPr lang="en-GB" sz="1000" dirty="0"/>
-              <a:t>, Richard Qin, Jennifer Burns, David </a:t>
+              <a:t>, Emma </a:t>
             </a:r>
             <a:r>
               <a:rPr lang="en-GB" sz="1000" dirty="0" err="1"/>
-              <a:t>Zubrow</a:t>
+              <a:t>Söderberg</a:t>
             </a:r>
             <a:r>
               <a:rPr lang="en-GB" sz="1000" dirty="0"/>
-              <a:t>, Robert Stoddard, and Guillermo </a:t>
-            </a:r>
-            <a:r>
-              <a:rPr lang="en-GB" sz="1000" dirty="0" err="1"/>
-              <a:t>Marce-Santurio</a:t>
-            </a:r>
-            <a:r>
-              <a:rPr lang="en-GB" sz="1000" dirty="0"/>
-              <a:t>. </a:t>
+              <a:t>, and Collin Winter. 2015. Tricorder: building a program analysis ecosystem. </a:t>
             </a:r>
             <a:br>
               <a:rPr lang="en-GB" sz="1000" dirty="0"/>
             </a:br>
             <a:r>
               <a:rPr lang="en-GB" sz="1000" dirty="0"/>
-              <a:t>2018. Prioritizing alerts from multiple static analysis tools, using classification models. In </a:t>
+              <a:t>In </a:t>
             </a:r>
             <a:r>
               <a:rPr lang="en-GB" sz="1000" i="1" dirty="0"/>
-              <a:t>Proceedings of the 1st International Workshop on Software Qualities </a:t>
-            </a:r>
-            <a:br>
-              <a:rPr lang="en-GB" sz="1000" i="1" dirty="0"/>
-            </a:br>
-            <a:r>
-              <a:rPr lang="en-GB" sz="1000" i="1" dirty="0"/>
-              <a:t>and Their Dependencies</a:t>
+              <a:t>Proceedings of the 37th International Conference on Software Engineering - Volume 1</a:t>
             </a:r>
             <a:r>
               <a:rPr lang="en-GB" sz="1000" dirty="0"/>
-              <a:t> (SQUADE '18). ACM, New York, NY, USA, 13-20. DOI: https://doi.org/10.1145/3194095.3194100 </a:t>
+              <a:t> (ICSE '15), Vol. 1. IEEE Press, Piscataway, NJ, USA, 598-608.  </a:t>
             </a:r>
           </a:p>
           <a:p>
@@ -33996,22 +33699,22 @@
             </a:pPr>
             <a:r>
               <a:rPr lang="en-GB" sz="1000" dirty="0"/>
-              <a:t>N. Meng, Q. Wang, Q. Wu and H. Mei, "An Approach to Merge Results of Multiple Static Analysis Tools (Short Paper)," </a:t>
+              <a:t>Cristina Cifuentes and Bernhard Scholz. 2008. Parfait: designing a scalable bug checker. In </a:t>
             </a:r>
             <a:r>
               <a:rPr lang="en-GB" sz="1000" i="1" dirty="0"/>
-              <a:t>2008 The Eighth International </a:t>
+              <a:t>Proceedings of the 2008 workshop on Static analysis</a:t>
+            </a:r>
+            <a:r>
+              <a:rPr lang="en-GB" sz="1000" dirty="0"/>
+              <a:t> (SAW '08). </a:t>
             </a:r>
             <a:br>
-              <a:rPr lang="en-GB" sz="1000" i="1" dirty="0"/>
+              <a:rPr lang="en-GB" sz="1000" dirty="0"/>
             </a:br>
             <a:r>
-              <a:rPr lang="en-GB" sz="1000" i="1" dirty="0"/>
-              <a:t>Conference on Quality Software</a:t>
-            </a:r>
-            <a:r>
               <a:rPr lang="en-GB" sz="1000" dirty="0"/>
-              <a:t>, Oxford, 2008, pp. 169-174.doi: 10.1109/QSIC.2008.30</a:t>
+              <a:t>ACM, New York, NY, USA, 4-11. DOI=http://dx.doi.org/10.1145/1394504.1394505 </a:t>
             </a:r>
             <a:endParaRPr lang="LID4096" sz="1000" dirty="0" err="1"/>
           </a:p>
@@ -34020,7 +33723,7 @@
     </p:spTree>
     <p:extLst>
       <p:ext uri="{BB962C8B-B14F-4D97-AF65-F5344CB8AC3E}">
-        <p14:creationId xmlns:p14="http://schemas.microsoft.com/office/powerpoint/2010/main" val="3993522925"/>
+        <p14:creationId xmlns:p14="http://schemas.microsoft.com/office/powerpoint/2010/main" val="1143630792"/>
       </p:ext>
     </p:extLst>
   </p:cSld>
@@ -34068,7 +33771,7 @@
                   <a:schemeClr val="tx2"/>
                 </a:solidFill>
               </a:rPr>
-              <a:t>Multiple Tools</a:t>
+              <a:t> Problem Statement</a:t>
             </a:r>
           </a:p>
         </p:txBody>
@@ -34112,118 +33815,48 @@
           <a:bodyPr/>
           <a:lstStyle/>
           <a:p>
-            <a:pPr>
-              <a:buFont typeface="Wingdings" panose="05000000000000000000" pitchFamily="2" charset="2"/>
-              <a:buChar char="§"/>
-            </a:pPr>
-            <a:r>
-              <a:rPr lang="en-GB" dirty="0"/>
-              <a:t>Tricorder</a:t>
-            </a:r>
-          </a:p>
-          <a:p>
-            <a:pPr lvl="1">
-              <a:buFont typeface="Arial" panose="020B0604020202020204" pitchFamily="34" charset="0"/>
-              <a:buChar char="•"/>
-            </a:pPr>
-            <a:r>
-              <a:rPr lang="en-GB" sz="1600" dirty="0" err="1"/>
-              <a:t>ReviewBot</a:t>
-            </a:r>
-            <a:endParaRPr lang="en-GB" sz="1600" dirty="0"/>
-          </a:p>
-          <a:p>
-            <a:pPr lvl="1">
-              <a:buFont typeface="Arial" panose="020B0604020202020204" pitchFamily="34" charset="0"/>
-              <a:buChar char="•"/>
-            </a:pPr>
-            <a:r>
-              <a:rPr lang="en-GB" sz="1600" dirty="0"/>
-              <a:t>Separate bug coverage by separate tool </a:t>
-            </a:r>
-          </a:p>
-          <a:p>
-            <a:pPr lvl="1">
-              <a:buFont typeface="Arial" panose="020B0604020202020204" pitchFamily="34" charset="0"/>
-              <a:buChar char="•"/>
-            </a:pPr>
-            <a:r>
-              <a:rPr lang="en-GB" sz="1600" dirty="0"/>
-              <a:t>Evaluation: Summative – Click rates</a:t>
-            </a:r>
-          </a:p>
-          <a:p>
-            <a:pPr marL="0" indent="0" algn="r">
+            <a:endParaRPr lang="en-GB" dirty="0"/>
+          </a:p>
+          <a:p>
+            <a:endParaRPr lang="en-GB" dirty="0"/>
+          </a:p>
+          <a:p>
+            <a:endParaRPr lang="en-GB" dirty="0"/>
+          </a:p>
+          <a:p>
+            <a:r>
+              <a:rPr lang="en-GB" sz="2400" dirty="0"/>
+              <a:t>How to integrate the results of multiple static analysis tools </a:t>
+            </a:r>
+            <a:br>
+              <a:rPr lang="en-GB" sz="2400" dirty="0"/>
+            </a:br>
+            <a:endParaRPr lang="en-GB" sz="2400" dirty="0"/>
+          </a:p>
+          <a:p>
+            <a:pPr marL="0" indent="0">
               <a:buNone/>
             </a:pPr>
             <a:r>
-              <a:rPr lang="en-GB" dirty="0"/>
-              <a:t>(Sadowski et. al. )</a:t>
-            </a:r>
-          </a:p>
-          <a:p>
-            <a:pPr>
-              <a:buFont typeface="Arial" panose="020B0604020202020204" pitchFamily="34" charset="0"/>
-              <a:buChar char="•"/>
+              <a:rPr lang="en-GB" sz="2400" dirty="0"/>
+              <a:t>													in a unified user interface?</a:t>
+            </a:r>
+          </a:p>
+          <a:p>
+            <a:endParaRPr lang="de-DE" dirty="0"/>
+          </a:p>
+          <a:p>
+            <a:endParaRPr lang="de-DE" dirty="0"/>
+          </a:p>
+          <a:p>
+            <a:pPr lvl="1">
+              <a:buFont typeface="Wingdings" panose="05000000000000000000" pitchFamily="2" charset="2"/>
+              <a:buChar char="v"/>
             </a:pPr>
             <a:r>
-              <a:rPr lang="en-GB" dirty="0"/>
-              <a:t>Parfait</a:t>
-            </a:r>
-          </a:p>
-          <a:p>
-            <a:pPr lvl="1">
-              <a:buFont typeface="Arial" panose="020B0604020202020204" pitchFamily="34" charset="0"/>
-              <a:buChar char="•"/>
-            </a:pPr>
-            <a:r>
-              <a:rPr lang="en-GB" sz="1600" dirty="0"/>
-              <a:t>Scalability ( easy , expensive analysis )</a:t>
-            </a:r>
-          </a:p>
-          <a:p>
-            <a:pPr lvl="1">
-              <a:buFont typeface="Arial" panose="020B0604020202020204" pitchFamily="34" charset="0"/>
-              <a:buChar char="•"/>
-            </a:pPr>
-            <a:r>
-              <a:rPr lang="en-GB" sz="1600" dirty="0"/>
-              <a:t>Precision ( bug track – real, no, potential ) </a:t>
-            </a:r>
-          </a:p>
-          <a:p>
-            <a:pPr marL="0" indent="0" algn="r">
-              <a:buNone/>
-            </a:pPr>
-            <a:r>
-              <a:rPr lang="en-GB" dirty="0"/>
-              <a:t>(Cifuentes et. al. )</a:t>
-            </a:r>
-          </a:p>
-          <a:p>
-            <a:pPr marL="0" indent="0" algn="ctr">
-              <a:buNone/>
-            </a:pPr>
-            <a:br>
-              <a:rPr lang="en-GB" dirty="0"/>
-            </a:br>
-            <a:r>
-              <a:rPr lang="en-GB" dirty="0"/>
-              <a:t>But </a:t>
-            </a:r>
-            <a:r>
-              <a:rPr lang="en-GB" dirty="0">
-                <a:solidFill>
-                  <a:srgbClr val="00B050"/>
-                </a:solidFill>
-              </a:rPr>
-              <a:t>USABILITY</a:t>
-            </a:r>
-            <a:r>
-              <a:rPr lang="en-GB" dirty="0"/>
-              <a:t> is not addressed…</a:t>
-            </a:r>
-            <a:endParaRPr lang="de-DE" dirty="0"/>
+              <a:rPr lang="de-DE" dirty="0"/>
+              <a:t>3 Research Questions</a:t>
+            </a:r>
           </a:p>
         </p:txBody>
       </p:sp>
@@ -34250,164 +33883,10 @@
           </a:p>
         </p:txBody>
       </p:sp>
-      <p:sp>
-        <p:nvSpPr>
-          <p:cNvPr id="6" name="Rectangle: Rounded Corners 5">
-            <a:extLst>
-              <a:ext uri="{FF2B5EF4-FFF2-40B4-BE49-F238E27FC236}">
-                <a16:creationId xmlns:a16="http://schemas.microsoft.com/office/drawing/2014/main" id="{7B1A95CE-58D3-4A2F-96D9-3FCCC8DB722D}"/>
-              </a:ext>
-            </a:extLst>
-          </p:cNvPr>
-          <p:cNvSpPr/>
-          <p:nvPr/>
-        </p:nvSpPr>
-        <p:spPr bwMode="auto">
-          <a:xfrm>
-            <a:off x="3152800" y="4941168"/>
-            <a:ext cx="3672408" cy="432048"/>
-          </a:xfrm>
-          <a:prstGeom prst="roundRect">
-            <a:avLst/>
-          </a:prstGeom>
-          <a:noFill/>
-          <a:ln w="12700">
-            <a:solidFill>
-              <a:srgbClr val="FF0000"/>
-            </a:solidFill>
-            <a:miter lim="800000"/>
-            <a:headEnd/>
-            <a:tailEnd/>
-          </a:ln>
-          <a:effectLst/>
-        </p:spPr>
-        <p:txBody>
-          <a:bodyPr wrap="none" rtlCol="0" anchor="ctr"/>
-          <a:lstStyle/>
-          <a:p>
-            <a:pPr algn="ctr"/>
-            <a:endParaRPr lang="LID4096" sz="1600" b="1" dirty="0">
-              <a:solidFill>
-                <a:schemeClr val="bg1"/>
-              </a:solidFill>
-            </a:endParaRPr>
-          </a:p>
-        </p:txBody>
-      </p:sp>
-      <p:sp>
-        <p:nvSpPr>
-          <p:cNvPr id="7" name="TextBox 6">
-            <a:extLst>
-              <a:ext uri="{FF2B5EF4-FFF2-40B4-BE49-F238E27FC236}">
-                <a16:creationId xmlns:a16="http://schemas.microsoft.com/office/drawing/2014/main" id="{69EF1288-A1A1-4D2C-91B6-7C4C1C4B12A1}"/>
-              </a:ext>
-            </a:extLst>
-          </p:cNvPr>
-          <p:cNvSpPr txBox="1"/>
-          <p:nvPr/>
-        </p:nvSpPr>
-        <p:spPr>
-          <a:xfrm>
-            <a:off x="270900" y="5646301"/>
-            <a:ext cx="9226565" cy="836126"/>
-          </a:xfrm>
-          <a:prstGeom prst="rect">
-            <a:avLst/>
-          </a:prstGeom>
-          <a:noFill/>
-        </p:spPr>
-        <p:txBody>
-          <a:bodyPr wrap="none" lIns="0" rIns="0" rtlCol="0">
-            <a:spAutoFit/>
-          </a:bodyPr>
-          <a:lstStyle/>
-          <a:p>
-            <a:pPr marL="360000" indent="-360000">
-              <a:spcAft>
-                <a:spcPts val="1000"/>
-              </a:spcAft>
-              <a:buClr>
-                <a:schemeClr val="tx2"/>
-              </a:buClr>
-              <a:buSzPct val="80000"/>
-              <a:buFont typeface="Wingdings" panose="05000000000000000000" pitchFamily="2" charset="2"/>
-              <a:buChar char="v"/>
-            </a:pPr>
-            <a:r>
-              <a:rPr lang="en-GB" sz="1000" dirty="0"/>
-              <a:t>Caitlin Sadowski, Jeffrey van Gogh, Ciera </a:t>
-            </a:r>
-            <a:r>
-              <a:rPr lang="en-GB" sz="1000" dirty="0" err="1"/>
-              <a:t>Jaspan</a:t>
-            </a:r>
-            <a:r>
-              <a:rPr lang="en-GB" sz="1000" dirty="0"/>
-              <a:t>, Emma </a:t>
-            </a:r>
-            <a:r>
-              <a:rPr lang="en-GB" sz="1000" dirty="0" err="1"/>
-              <a:t>Söderberg</a:t>
-            </a:r>
-            <a:r>
-              <a:rPr lang="en-GB" sz="1000" dirty="0"/>
-              <a:t>, and Collin Winter. 2015. Tricorder: building a program analysis ecosystem. </a:t>
-            </a:r>
-            <a:br>
-              <a:rPr lang="en-GB" sz="1000" dirty="0"/>
-            </a:br>
-            <a:r>
-              <a:rPr lang="en-GB" sz="1000" dirty="0"/>
-              <a:t>In </a:t>
-            </a:r>
-            <a:r>
-              <a:rPr lang="en-GB" sz="1000" i="1" dirty="0"/>
-              <a:t>Proceedings of the 37th International Conference on Software Engineering - Volume 1</a:t>
-            </a:r>
-            <a:r>
-              <a:rPr lang="en-GB" sz="1000" dirty="0"/>
-              <a:t> (ICSE '15), Vol. 1. IEEE Press, Piscataway, NJ, USA, 598-608.  </a:t>
-            </a:r>
-          </a:p>
-          <a:p>
-            <a:pPr marL="360000" indent="-360000">
-              <a:spcAft>
-                <a:spcPts val="1000"/>
-              </a:spcAft>
-              <a:buClr>
-                <a:schemeClr val="tx2"/>
-              </a:buClr>
-              <a:buSzPct val="80000"/>
-              <a:buFont typeface="Wingdings" panose="05000000000000000000" pitchFamily="2" charset="2"/>
-              <a:buChar char="v"/>
-            </a:pPr>
-            <a:r>
-              <a:rPr lang="en-GB" sz="1000" dirty="0"/>
-              <a:t>Cristina Cifuentes and Bernhard Scholz. 2008. Parfait: designing a scalable bug checker. In </a:t>
-            </a:r>
-            <a:r>
-              <a:rPr lang="en-GB" sz="1000" i="1" dirty="0"/>
-              <a:t>Proceedings of the 2008 workshop on Static analysis</a:t>
-            </a:r>
-            <a:r>
-              <a:rPr lang="en-GB" sz="1000" dirty="0"/>
-              <a:t> (SAW '08). </a:t>
-            </a:r>
-            <a:br>
-              <a:rPr lang="en-GB" sz="1000" dirty="0"/>
-            </a:br>
-            <a:r>
-              <a:rPr lang="en-GB" sz="1000" dirty="0"/>
-              <a:t>ACM, New York, NY, USA, 4-11. DOI=http://dx.doi.org/10.1145/1394504.1394505 </a:t>
-            </a:r>
-            <a:endParaRPr lang="LID4096" sz="1000" dirty="0" err="1"/>
-          </a:p>
-        </p:txBody>
-      </p:sp>
     </p:spTree>
     <p:extLst>
       <p:ext uri="{BB962C8B-B14F-4D97-AF65-F5344CB8AC3E}">
-        <p14:creationId xmlns:p14="http://schemas.microsoft.com/office/powerpoint/2010/main" val="1143630792"/>
+        <p14:creationId xmlns:p14="http://schemas.microsoft.com/office/powerpoint/2010/main" val="4204401702"/>
       </p:ext>
     </p:extLst>
   </p:cSld>

</xml_diff>

<commit_message>
Adds IDE example image and fixes few typos
</commit_message>
<xml_diff>
--- a/docs/slides/Proposal_presentation_MSAT-UI.pptx
+++ b/docs/slides/Proposal_presentation_MSAT-UI.pptx
@@ -357,7 +357,7 @@
               <a:pPr>
                 <a:defRPr/>
               </a:pPr>
-              <a:t>05.05.2019</a:t>
+              <a:t>08.05.2019</a:t>
             </a:fld>
             <a:endParaRPr lang="de-DE"/>
           </a:p>
@@ -573,7 +573,7 @@
               <a:pPr>
                 <a:defRPr/>
               </a:pPr>
-              <a:t>05.05.2019</a:t>
+              <a:t>08.05.2019</a:t>
             </a:fld>
             <a:endParaRPr lang="de-DE"/>
           </a:p>
@@ -30264,6 +30264,20 @@
             </a:pPr>
             <a:r>
               <a:rPr lang="de-DE" dirty="0"/>
+              <a:t>Usability inspection methods: Cognitive Walkthrough, Heuristic Evaluation</a:t>
+            </a:r>
+            <a:br>
+              <a:rPr lang="de-DE" dirty="0"/>
+            </a:br>
+            <a:endParaRPr lang="de-DE" dirty="0"/>
+          </a:p>
+          <a:p>
+            <a:pPr lvl="1">
+              <a:buFont typeface="Wingdings" panose="05000000000000000000" pitchFamily="2" charset="2"/>
+              <a:buChar char="§"/>
+            </a:pPr>
+            <a:r>
+              <a:rPr lang="de-DE" dirty="0"/>
               <a:t>Perform Tasks</a:t>
             </a:r>
             <a:br>
@@ -32208,7 +32222,7 @@
             </a:pPr>
             <a:r>
               <a:rPr lang="en-GB" dirty="0"/>
-              <a:t>	- Buffer Overflow, and Dead Code etc</a:t>
+              <a:t>	- Buffer Overflow, and Dead Code etc.</a:t>
             </a:r>
             <a:endParaRPr lang="de-DE" dirty="0"/>
           </a:p>
@@ -32326,7 +32340,17 @@
             </a:pPr>
             <a:r>
               <a:rPr lang="en-GB" sz="1000" dirty="0"/>
-              <a:t>Designing code analyses for Large Software Systems (DECA). url: https://www.hni.uni-paderborn.de/swt/lehre/deca/.</a:t>
+              <a:t>Designing code analyses for Large Software Systems (DECA). url: </a:t>
+            </a:r>
+            <a:r>
+              <a:rPr lang="en-GB" sz="1000" dirty="0">
+                <a:hlinkClick r:id="rId3"/>
+              </a:rPr>
+              <a:t>https://www.hni.uni-paderborn.de/swt/lehre/deca/</a:t>
+            </a:r>
+            <a:r>
+              <a:rPr lang="en-GB" sz="1000" dirty="0"/>
+              <a:t>.</a:t>
             </a:r>
           </a:p>
         </p:txBody>
@@ -32549,8 +32573,8 @@
         </p:blipFill>
         <p:spPr>
           <a:xfrm>
-            <a:off x="4808984" y="1268412"/>
-            <a:ext cx="4416962" cy="1186695"/>
+            <a:off x="5124933" y="697198"/>
+            <a:ext cx="2376264" cy="638425"/>
           </a:xfrm>
           <a:prstGeom prst="rect">
             <a:avLst/>
@@ -32585,8 +32609,8 @@
         </p:blipFill>
         <p:spPr>
           <a:xfrm>
-            <a:off x="5812384" y="2612524"/>
-            <a:ext cx="2410161" cy="1829055"/>
+            <a:off x="7839695" y="5020860"/>
+            <a:ext cx="1793255" cy="1360889"/>
           </a:xfrm>
           <a:prstGeom prst="rect">
             <a:avLst/>
@@ -32607,8 +32631,8 @@
         </p:nvSpPr>
         <p:spPr>
           <a:xfrm>
-            <a:off x="270900" y="5773707"/>
-            <a:ext cx="6124754" cy="528350"/>
+            <a:off x="270900" y="5638207"/>
+            <a:ext cx="6208110" cy="810478"/>
           </a:xfrm>
           <a:prstGeom prst="rect">
             <a:avLst/>
@@ -32638,8 +32662,15 @@
             </a:r>
             <a:r>
               <a:rPr lang="en-GB" sz="1000" dirty="0"/>
-              <a:t> – Application Security Testing and Static Code Analysis. url: https://www.checkmarx.com/.</a:t>
-            </a:r>
+              <a:t> – Application Security Testing and Static Code Analysis. url: </a:t>
+            </a:r>
+            <a:r>
+              <a:rPr lang="en-GB" sz="1000" dirty="0">
+                <a:hlinkClick r:id="rId4"/>
+              </a:rPr>
+              <a:t>https://www.checkmarx.com/</a:t>
+            </a:r>
+            <a:endParaRPr lang="en-GB" sz="1000" dirty="0"/>
           </a:p>
           <a:p>
             <a:pPr marL="360000" indent="-360000">
@@ -32655,16 +32686,90 @@
             </a:pPr>
             <a:r>
               <a:rPr lang="en-GB" sz="1000" dirty="0" err="1"/>
+              <a:t>CxViewer</a:t>
+            </a:r>
+            <a:r>
+              <a:rPr lang="en-GB" sz="1000" dirty="0"/>
+              <a:t> - Plugins | JetBrains, url: </a:t>
+            </a:r>
+            <a:r>
+              <a:rPr lang="en-GB" sz="1000" dirty="0">
+                <a:hlinkClick r:id="rId5"/>
+              </a:rPr>
+              <a:t>https://plugins.jetbrains.com/plugin/7593-cxviewer</a:t>
+            </a:r>
+            <a:endParaRPr lang="en-GB" sz="1000" dirty="0"/>
+          </a:p>
+          <a:p>
+            <a:pPr marL="360000" indent="-360000">
+              <a:spcAft>
+                <a:spcPts val="1000"/>
+              </a:spcAft>
+              <a:buClr>
+                <a:schemeClr val="tx2"/>
+              </a:buClr>
+              <a:buSzPct val="80000"/>
+              <a:buFont typeface="Wingdings" panose="05000000000000000000" pitchFamily="2" charset="2"/>
+              <a:buChar char="v"/>
+            </a:pPr>
+            <a:r>
+              <a:rPr lang="en-GB" sz="1000" dirty="0" err="1"/>
               <a:t>FindBugs</a:t>
             </a:r>
             <a:r>
               <a:rPr lang="en-GB" sz="1000" dirty="0"/>
-              <a:t>™ - Find Bugs in Java Programs. url: http://findbugs.sourceforge.net/.</a:t>
+              <a:t>™ - Find Bugs in Java Programs. url:</a:t>
+            </a:r>
+            <a:r>
+              <a:rPr lang="en-GB" sz="1000" dirty="0">
+                <a:hlinkClick r:id="rId6"/>
+              </a:rPr>
+              <a:t> http://findbugs.sourceforge.net/</a:t>
+            </a:r>
+            <a:r>
+              <a:rPr lang="en-GB" sz="1000" dirty="0"/>
+              <a:t>.</a:t>
             </a:r>
             <a:endParaRPr lang="LID4096" sz="1000" dirty="0" err="1"/>
           </a:p>
         </p:txBody>
       </p:sp>
+      <p:pic>
+        <p:nvPicPr>
+          <p:cNvPr id="7" name="Picture 6" descr="A screenshot of a computer&#10;&#10;Description automatically generated">
+            <a:extLst>
+              <a:ext uri="{FF2B5EF4-FFF2-40B4-BE49-F238E27FC236}">
+                <a16:creationId xmlns:a16="http://schemas.microsoft.com/office/drawing/2014/main" id="{3265DF74-0E05-44C2-A4D9-6799EF9F12FF}"/>
+              </a:ext>
+            </a:extLst>
+          </p:cNvPr>
+          <p:cNvPicPr>
+            <a:picLocks noChangeAspect="1"/>
+          </p:cNvPicPr>
+          <p:nvPr/>
+        </p:nvPicPr>
+        <p:blipFill>
+          <a:blip r:embed="rId7" cstate="print">
+            <a:extLst>
+              <a:ext uri="{28A0092B-C50C-407E-A947-70E740481C1C}">
+                <a14:useLocalDpi xmlns:a14="http://schemas.microsoft.com/office/drawing/2010/main" val="0"/>
+              </a:ext>
+            </a:extLst>
+          </a:blip>
+          <a:stretch>
+            <a:fillRect/>
+          </a:stretch>
+        </p:blipFill>
+        <p:spPr>
+          <a:xfrm>
+            <a:off x="3152800" y="1387624"/>
+            <a:ext cx="6320531" cy="3505881"/>
+          </a:xfrm>
+          <a:prstGeom prst="rect">
+            <a:avLst/>
+          </a:prstGeom>
+        </p:spPr>
+      </p:pic>
     </p:spTree>
     <p:extLst>
       <p:ext uri="{BB962C8B-B14F-4D97-AF65-F5344CB8AC3E}">

</xml_diff>